<commit_message>
Added Bubblesort, Shellsort to docs and source, extended ignore
</commit_message>
<xml_diff>
--- a/docs/sorting algorithms - presentation/Sortierverfahren.pptx
+++ b/docs/sorting algorithms - presentation/Sortierverfahren.pptx
@@ -29,6 +29,11 @@
     <p:sldId id="277" r:id="rId23"/>
     <p:sldId id="278" r:id="rId24"/>
     <p:sldId id="279" r:id="rId25"/>
+    <p:sldId id="280" r:id="rId26"/>
+    <p:sldId id="281" r:id="rId27"/>
+    <p:sldId id="282" r:id="rId28"/>
+    <p:sldId id="283" r:id="rId29"/>
+    <p:sldId id="284" r:id="rId30"/>
   </p:sldIdLst>
   <p:sldSz cx="12192000" cy="6858000"/>
   <p:notesSz cx="6858000" cy="9144000"/>
@@ -192,7 +197,7 @@
           <a:noFill/>
           <a:extLst>
             <a:ext uri="{909E8E84-426E-40dd-AFC4-6F175D3DCCD1}">
-              <a14:hiddenFill xmlns:a14="http://schemas.microsoft.com/office/drawing/2010/main" xmlns="">
+              <a14:hiddenFill xmlns="" xmlns:a14="http://schemas.microsoft.com/office/drawing/2010/main">
                 <a:solidFill>
                   <a:srgbClr val="FFFFFF"/>
                 </a:solidFill>
@@ -251,7 +256,7 @@
             </a:ln>
             <a:extLst>
               <a:ext uri="{91240B29-F687-4f45-9708-019B960494DF}">
-                <a14:hiddenLine xmlns:a14="http://schemas.microsoft.com/office/drawing/2010/main" xmlns="" w="9525">
+                <a14:hiddenLine xmlns="" xmlns:a14="http://schemas.microsoft.com/office/drawing/2010/main" w="9525">
                   <a:solidFill>
                     <a:srgbClr val="000000"/>
                   </a:solidFill>
@@ -341,7 +346,7 @@
             </a:ln>
             <a:extLst>
               <a:ext uri="{91240B29-F687-4f45-9708-019B960494DF}">
-                <a14:hiddenLine xmlns:a14="http://schemas.microsoft.com/office/drawing/2010/main" xmlns="" w="9525">
+                <a14:hiddenLine xmlns="" xmlns:a14="http://schemas.microsoft.com/office/drawing/2010/main" w="9525">
                   <a:solidFill>
                     <a:srgbClr val="000000"/>
                   </a:solidFill>
@@ -431,7 +436,7 @@
             </a:ln>
             <a:extLst>
               <a:ext uri="{91240B29-F687-4f45-9708-019B960494DF}">
-                <a14:hiddenLine xmlns:a14="http://schemas.microsoft.com/office/drawing/2010/main" xmlns="" w="9525">
+                <a14:hiddenLine xmlns="" xmlns:a14="http://schemas.microsoft.com/office/drawing/2010/main" w="9525">
                   <a:solidFill>
                     <a:srgbClr val="000000"/>
                   </a:solidFill>
@@ -465,7 +470,7 @@
             </a:ln>
             <a:extLst>
               <a:ext uri="{91240B29-F687-4f45-9708-019B960494DF}">
-                <a14:hiddenLine xmlns:a14="http://schemas.microsoft.com/office/drawing/2010/main" xmlns="" w="9525">
+                <a14:hiddenLine xmlns="" xmlns:a14="http://schemas.microsoft.com/office/drawing/2010/main" w="9525">
                   <a:solidFill>
                     <a:srgbClr val="000000"/>
                   </a:solidFill>
@@ -555,7 +560,7 @@
             </a:ln>
             <a:extLst>
               <a:ext uri="{91240B29-F687-4f45-9708-019B960494DF}">
-                <a14:hiddenLine xmlns:a14="http://schemas.microsoft.com/office/drawing/2010/main" xmlns="" w="9525">
+                <a14:hiddenLine xmlns="" xmlns:a14="http://schemas.microsoft.com/office/drawing/2010/main" w="9525">
                   <a:solidFill>
                     <a:srgbClr val="000000"/>
                   </a:solidFill>
@@ -617,7 +622,7 @@
             </a:ln>
             <a:extLst>
               <a:ext uri="{91240B29-F687-4f45-9708-019B960494DF}">
-                <a14:hiddenLine xmlns:a14="http://schemas.microsoft.com/office/drawing/2010/main" xmlns="" w="9525">
+                <a14:hiddenLine xmlns="" xmlns:a14="http://schemas.microsoft.com/office/drawing/2010/main" w="9525">
                   <a:solidFill>
                     <a:srgbClr val="000000"/>
                   </a:solidFill>
@@ -679,7 +684,7 @@
             </a:ln>
             <a:extLst>
               <a:ext uri="{91240B29-F687-4f45-9708-019B960494DF}">
-                <a14:hiddenLine xmlns:a14="http://schemas.microsoft.com/office/drawing/2010/main" xmlns="" w="9525">
+                <a14:hiddenLine xmlns="" xmlns:a14="http://schemas.microsoft.com/office/drawing/2010/main" w="9525">
                   <a:solidFill>
                     <a:srgbClr val="000000"/>
                   </a:solidFill>
@@ -769,7 +774,7 @@
             </a:ln>
             <a:extLst>
               <a:ext uri="{91240B29-F687-4f45-9708-019B960494DF}">
-                <a14:hiddenLine xmlns:a14="http://schemas.microsoft.com/office/drawing/2010/main" xmlns="" w="9525">
+                <a14:hiddenLine xmlns="" xmlns:a14="http://schemas.microsoft.com/office/drawing/2010/main" w="9525">
                   <a:solidFill>
                     <a:srgbClr val="000000"/>
                   </a:solidFill>
@@ -831,7 +836,7 @@
             </a:ln>
             <a:extLst>
               <a:ext uri="{91240B29-F687-4f45-9708-019B960494DF}">
-                <a14:hiddenLine xmlns:a14="http://schemas.microsoft.com/office/drawing/2010/main" xmlns="" w="9525">
+                <a14:hiddenLine xmlns="" xmlns:a14="http://schemas.microsoft.com/office/drawing/2010/main" w="9525">
                   <a:solidFill>
                     <a:srgbClr val="000000"/>
                   </a:solidFill>
@@ -893,7 +898,7 @@
             </a:ln>
             <a:extLst>
               <a:ext uri="{91240B29-F687-4f45-9708-019B960494DF}">
-                <a14:hiddenLine xmlns:a14="http://schemas.microsoft.com/office/drawing/2010/main" xmlns="" w="9525">
+                <a14:hiddenLine xmlns="" xmlns:a14="http://schemas.microsoft.com/office/drawing/2010/main" w="9525">
                   <a:solidFill>
                     <a:srgbClr val="000000"/>
                   </a:solidFill>
@@ -983,7 +988,7 @@
             </a:ln>
             <a:extLst>
               <a:ext uri="{91240B29-F687-4f45-9708-019B960494DF}">
-                <a14:hiddenLine xmlns:a14="http://schemas.microsoft.com/office/drawing/2010/main" xmlns="" w="9525">
+                <a14:hiddenLine xmlns="" xmlns:a14="http://schemas.microsoft.com/office/drawing/2010/main" w="9525">
                   <a:solidFill>
                     <a:srgbClr val="000000"/>
                   </a:solidFill>
@@ -1073,7 +1078,7 @@
             </a:ln>
             <a:extLst>
               <a:ext uri="{91240B29-F687-4f45-9708-019B960494DF}">
-                <a14:hiddenLine xmlns:a14="http://schemas.microsoft.com/office/drawing/2010/main" xmlns="" w="9525">
+                <a14:hiddenLine xmlns="" xmlns:a14="http://schemas.microsoft.com/office/drawing/2010/main" w="9525">
                   <a:solidFill>
                     <a:srgbClr val="000000"/>
                   </a:solidFill>
@@ -1135,7 +1140,7 @@
             </a:ln>
             <a:extLst>
               <a:ext uri="{91240B29-F687-4f45-9708-019B960494DF}">
-                <a14:hiddenLine xmlns:a14="http://schemas.microsoft.com/office/drawing/2010/main" xmlns="" w="9525">
+                <a14:hiddenLine xmlns="" xmlns:a14="http://schemas.microsoft.com/office/drawing/2010/main" w="9525">
                   <a:solidFill>
                     <a:srgbClr val="000000"/>
                   </a:solidFill>
@@ -1245,7 +1250,7 @@
             </a:ln>
             <a:extLst>
               <a:ext uri="{91240B29-F687-4f45-9708-019B960494DF}">
-                <a14:hiddenLine xmlns:a14="http://schemas.microsoft.com/office/drawing/2010/main" xmlns="" w="9525">
+                <a14:hiddenLine xmlns="" xmlns:a14="http://schemas.microsoft.com/office/drawing/2010/main" w="9525">
                   <a:solidFill>
                     <a:srgbClr val="000000"/>
                   </a:solidFill>
@@ -1307,7 +1312,7 @@
             </a:ln>
             <a:extLst>
               <a:ext uri="{91240B29-F687-4f45-9708-019B960494DF}">
-                <a14:hiddenLine xmlns:a14="http://schemas.microsoft.com/office/drawing/2010/main" xmlns="" w="9525">
+                <a14:hiddenLine xmlns="" xmlns:a14="http://schemas.microsoft.com/office/drawing/2010/main" w="9525">
                   <a:solidFill>
                     <a:srgbClr val="000000"/>
                   </a:solidFill>
@@ -1397,7 +1402,7 @@
             </a:ln>
             <a:extLst>
               <a:ext uri="{91240B29-F687-4f45-9708-019B960494DF}">
-                <a14:hiddenLine xmlns:a14="http://schemas.microsoft.com/office/drawing/2010/main" xmlns="" w="9525">
+                <a14:hiddenLine xmlns="" xmlns:a14="http://schemas.microsoft.com/office/drawing/2010/main" w="9525">
                   <a:solidFill>
                     <a:srgbClr val="000000"/>
                   </a:solidFill>
@@ -1487,7 +1492,7 @@
             </a:ln>
             <a:extLst>
               <a:ext uri="{91240B29-F687-4f45-9708-019B960494DF}">
-                <a14:hiddenLine xmlns:a14="http://schemas.microsoft.com/office/drawing/2010/main" xmlns="" w="9525">
+                <a14:hiddenLine xmlns="" xmlns:a14="http://schemas.microsoft.com/office/drawing/2010/main" w="9525">
                   <a:solidFill>
                     <a:srgbClr val="000000"/>
                   </a:solidFill>
@@ -1549,7 +1554,7 @@
             </a:ln>
             <a:extLst>
               <a:ext uri="{91240B29-F687-4f45-9708-019B960494DF}">
-                <a14:hiddenLine xmlns:a14="http://schemas.microsoft.com/office/drawing/2010/main" xmlns="" w="9525">
+                <a14:hiddenLine xmlns="" xmlns:a14="http://schemas.microsoft.com/office/drawing/2010/main" w="9525">
                   <a:solidFill>
                     <a:srgbClr val="000000"/>
                   </a:solidFill>
@@ -1639,7 +1644,7 @@
             </a:ln>
             <a:extLst>
               <a:ext uri="{91240B29-F687-4f45-9708-019B960494DF}">
-                <a14:hiddenLine xmlns:a14="http://schemas.microsoft.com/office/drawing/2010/main" xmlns="" w="9525">
+                <a14:hiddenLine xmlns="" xmlns:a14="http://schemas.microsoft.com/office/drawing/2010/main" w="9525">
                   <a:solidFill>
                     <a:srgbClr val="000000"/>
                   </a:solidFill>
@@ -1729,7 +1734,7 @@
             </a:ln>
             <a:extLst>
               <a:ext uri="{91240B29-F687-4f45-9708-019B960494DF}">
-                <a14:hiddenLine xmlns:a14="http://schemas.microsoft.com/office/drawing/2010/main" xmlns="" w="9525">
+                <a14:hiddenLine xmlns="" xmlns:a14="http://schemas.microsoft.com/office/drawing/2010/main" w="9525">
                   <a:solidFill>
                     <a:srgbClr val="000000"/>
                   </a:solidFill>
@@ -1785,7 +1790,7 @@
             </a:ln>
             <a:extLst>
               <a:ext uri="{91240B29-F687-4f45-9708-019B960494DF}">
-                <a14:hiddenLine xmlns:a14="http://schemas.microsoft.com/office/drawing/2010/main" xmlns="" w="9525">
+                <a14:hiddenLine xmlns="" xmlns:a14="http://schemas.microsoft.com/office/drawing/2010/main" w="9525">
                   <a:solidFill>
                     <a:srgbClr val="000000"/>
                   </a:solidFill>
@@ -1875,7 +1880,7 @@
             </a:ln>
             <a:extLst>
               <a:ext uri="{91240B29-F687-4f45-9708-019B960494DF}">
-                <a14:hiddenLine xmlns:a14="http://schemas.microsoft.com/office/drawing/2010/main" xmlns="" w="9525">
+                <a14:hiddenLine xmlns="" xmlns:a14="http://schemas.microsoft.com/office/drawing/2010/main" w="9525">
                   <a:solidFill>
                     <a:srgbClr val="000000"/>
                   </a:solidFill>
@@ -1931,7 +1936,7 @@
             </a:ln>
             <a:extLst>
               <a:ext uri="{91240B29-F687-4f45-9708-019B960494DF}">
-                <a14:hiddenLine xmlns:a14="http://schemas.microsoft.com/office/drawing/2010/main" xmlns="" w="9525">
+                <a14:hiddenLine xmlns="" xmlns:a14="http://schemas.microsoft.com/office/drawing/2010/main" w="9525">
                   <a:solidFill>
                     <a:srgbClr val="000000"/>
                   </a:solidFill>
@@ -2021,7 +2026,7 @@
             </a:ln>
             <a:extLst>
               <a:ext uri="{91240B29-F687-4f45-9708-019B960494DF}">
-                <a14:hiddenLine xmlns:a14="http://schemas.microsoft.com/office/drawing/2010/main" xmlns="" w="9525">
+                <a14:hiddenLine xmlns="" xmlns:a14="http://schemas.microsoft.com/office/drawing/2010/main" w="9525">
                   <a:solidFill>
                     <a:srgbClr val="000000"/>
                   </a:solidFill>
@@ -2089,7 +2094,7 @@
             </a:ln>
             <a:extLst>
               <a:ext uri="{91240B29-F687-4f45-9708-019B960494DF}">
-                <a14:hiddenLine xmlns:a14="http://schemas.microsoft.com/office/drawing/2010/main" xmlns="" w="9525">
+                <a14:hiddenLine xmlns="" xmlns:a14="http://schemas.microsoft.com/office/drawing/2010/main" w="9525">
                   <a:solidFill>
                     <a:srgbClr val="000000"/>
                   </a:solidFill>
@@ -2179,7 +2184,7 @@
             </a:ln>
             <a:extLst>
               <a:ext uri="{91240B29-F687-4f45-9708-019B960494DF}">
-                <a14:hiddenLine xmlns:a14="http://schemas.microsoft.com/office/drawing/2010/main" xmlns="" w="9525">
+                <a14:hiddenLine xmlns="" xmlns:a14="http://schemas.microsoft.com/office/drawing/2010/main" w="9525">
                   <a:solidFill>
                     <a:srgbClr val="000000"/>
                   </a:solidFill>
@@ -2247,7 +2252,7 @@
             </a:ln>
             <a:extLst>
               <a:ext uri="{91240B29-F687-4f45-9708-019B960494DF}">
-                <a14:hiddenLine xmlns:a14="http://schemas.microsoft.com/office/drawing/2010/main" xmlns="" w="9525">
+                <a14:hiddenLine xmlns="" xmlns:a14="http://schemas.microsoft.com/office/drawing/2010/main" w="9525">
                   <a:solidFill>
                     <a:srgbClr val="000000"/>
                   </a:solidFill>
@@ -2337,7 +2342,7 @@
             </a:ln>
             <a:extLst>
               <a:ext uri="{91240B29-F687-4f45-9708-019B960494DF}">
-                <a14:hiddenLine xmlns:a14="http://schemas.microsoft.com/office/drawing/2010/main" xmlns="" w="9525">
+                <a14:hiddenLine xmlns="" xmlns:a14="http://schemas.microsoft.com/office/drawing/2010/main" w="9525">
                   <a:solidFill>
                     <a:srgbClr val="000000"/>
                   </a:solidFill>
@@ -2371,7 +2376,7 @@
             </a:ln>
             <a:extLst>
               <a:ext uri="{91240B29-F687-4f45-9708-019B960494DF}">
-                <a14:hiddenLine xmlns:a14="http://schemas.microsoft.com/office/drawing/2010/main" xmlns="" w="9525">
+                <a14:hiddenLine xmlns="" xmlns:a14="http://schemas.microsoft.com/office/drawing/2010/main" w="9525">
                   <a:solidFill>
                     <a:srgbClr val="000000"/>
                   </a:solidFill>
@@ -2461,7 +2466,7 @@
             </a:ln>
             <a:extLst>
               <a:ext uri="{91240B29-F687-4f45-9708-019B960494DF}">
-                <a14:hiddenLine xmlns:a14="http://schemas.microsoft.com/office/drawing/2010/main" xmlns="" w="9525">
+                <a14:hiddenLine xmlns="" xmlns:a14="http://schemas.microsoft.com/office/drawing/2010/main" w="9525">
                   <a:solidFill>
                     <a:srgbClr val="000000"/>
                   </a:solidFill>
@@ -2523,7 +2528,7 @@
             </a:ln>
             <a:extLst>
               <a:ext uri="{91240B29-F687-4f45-9708-019B960494DF}">
-                <a14:hiddenLine xmlns:a14="http://schemas.microsoft.com/office/drawing/2010/main" xmlns="" w="9525">
+                <a14:hiddenLine xmlns="" xmlns:a14="http://schemas.microsoft.com/office/drawing/2010/main" w="9525">
                   <a:solidFill>
                     <a:srgbClr val="000000"/>
                   </a:solidFill>
@@ -2585,7 +2590,7 @@
             </a:ln>
             <a:extLst>
               <a:ext uri="{91240B29-F687-4f45-9708-019B960494DF}">
-                <a14:hiddenLine xmlns:a14="http://schemas.microsoft.com/office/drawing/2010/main" xmlns="" w="9525">
+                <a14:hiddenLine xmlns="" xmlns:a14="http://schemas.microsoft.com/office/drawing/2010/main" w="9525">
                   <a:solidFill>
                     <a:srgbClr val="000000"/>
                   </a:solidFill>
@@ -2675,7 +2680,7 @@
             </a:ln>
             <a:extLst>
               <a:ext uri="{91240B29-F687-4f45-9708-019B960494DF}">
-                <a14:hiddenLine xmlns:a14="http://schemas.microsoft.com/office/drawing/2010/main" xmlns="" w="9525">
+                <a14:hiddenLine xmlns="" xmlns:a14="http://schemas.microsoft.com/office/drawing/2010/main" w="9525">
                   <a:solidFill>
                     <a:srgbClr val="000000"/>
                   </a:solidFill>
@@ -2743,7 +2748,7 @@
             </a:ln>
             <a:extLst>
               <a:ext uri="{91240B29-F687-4f45-9708-019B960494DF}">
-                <a14:hiddenLine xmlns:a14="http://schemas.microsoft.com/office/drawing/2010/main" xmlns="" w="9525">
+                <a14:hiddenLine xmlns="" xmlns:a14="http://schemas.microsoft.com/office/drawing/2010/main" w="9525">
                   <a:solidFill>
                     <a:srgbClr val="000000"/>
                   </a:solidFill>
@@ -2805,7 +2810,7 @@
             </a:ln>
             <a:extLst>
               <a:ext uri="{91240B29-F687-4f45-9708-019B960494DF}">
-                <a14:hiddenLine xmlns:a14="http://schemas.microsoft.com/office/drawing/2010/main" xmlns="" w="9525">
+                <a14:hiddenLine xmlns="" xmlns:a14="http://schemas.microsoft.com/office/drawing/2010/main" w="9525">
                   <a:solidFill>
                     <a:srgbClr val="000000"/>
                   </a:solidFill>
@@ -2895,7 +2900,7 @@
             </a:ln>
             <a:extLst>
               <a:ext uri="{91240B29-F687-4f45-9708-019B960494DF}">
-                <a14:hiddenLine xmlns:a14="http://schemas.microsoft.com/office/drawing/2010/main" xmlns="" w="9525">
+                <a14:hiddenLine xmlns="" xmlns:a14="http://schemas.microsoft.com/office/drawing/2010/main" w="9525">
                   <a:solidFill>
                     <a:srgbClr val="000000"/>
                   </a:solidFill>
@@ -2957,7 +2962,7 @@
             </a:ln>
             <a:extLst>
               <a:ext uri="{91240B29-F687-4f45-9708-019B960494DF}">
-                <a14:hiddenLine xmlns:a14="http://schemas.microsoft.com/office/drawing/2010/main" xmlns="" w="9525">
+                <a14:hiddenLine xmlns="" xmlns:a14="http://schemas.microsoft.com/office/drawing/2010/main" w="9525">
                   <a:solidFill>
                     <a:srgbClr val="000000"/>
                   </a:solidFill>
@@ -3047,7 +3052,7 @@
             </a:ln>
             <a:extLst>
               <a:ext uri="{91240B29-F687-4f45-9708-019B960494DF}">
-                <a14:hiddenLine xmlns:a14="http://schemas.microsoft.com/office/drawing/2010/main" xmlns="" w="9525">
+                <a14:hiddenLine xmlns="" xmlns:a14="http://schemas.microsoft.com/office/drawing/2010/main" w="9525">
                   <a:solidFill>
                     <a:srgbClr val="000000"/>
                   </a:solidFill>
@@ -3109,7 +3114,7 @@
             </a:ln>
             <a:extLst>
               <a:ext uri="{91240B29-F687-4f45-9708-019B960494DF}">
-                <a14:hiddenLine xmlns:a14="http://schemas.microsoft.com/office/drawing/2010/main" xmlns="" w="9525">
+                <a14:hiddenLine xmlns="" xmlns:a14="http://schemas.microsoft.com/office/drawing/2010/main" w="9525">
                   <a:solidFill>
                     <a:srgbClr val="000000"/>
                   </a:solidFill>
@@ -3199,7 +3204,7 @@
             </a:ln>
             <a:extLst>
               <a:ext uri="{91240B29-F687-4f45-9708-019B960494DF}">
-                <a14:hiddenLine xmlns:a14="http://schemas.microsoft.com/office/drawing/2010/main" xmlns="" w="9525">
+                <a14:hiddenLine xmlns="" xmlns:a14="http://schemas.microsoft.com/office/drawing/2010/main" w="9525">
                   <a:solidFill>
                     <a:srgbClr val="000000"/>
                   </a:solidFill>
@@ -3233,7 +3238,7 @@
             </a:ln>
             <a:extLst>
               <a:ext uri="{91240B29-F687-4f45-9708-019B960494DF}">
-                <a14:hiddenLine xmlns:a14="http://schemas.microsoft.com/office/drawing/2010/main" xmlns="" w="9525">
+                <a14:hiddenLine xmlns="" xmlns:a14="http://schemas.microsoft.com/office/drawing/2010/main" w="9525">
                   <a:solidFill>
                     <a:srgbClr val="000000"/>
                   </a:solidFill>
@@ -3298,7 +3303,7 @@
             </a:ln>
             <a:extLst>
               <a:ext uri="{91240B29-F687-4f45-9708-019B960494DF}">
-                <a14:hiddenLine xmlns:a14="http://schemas.microsoft.com/office/drawing/2010/main" xmlns="" w="9525">
+                <a14:hiddenLine xmlns="" xmlns:a14="http://schemas.microsoft.com/office/drawing/2010/main" w="9525">
                   <a:solidFill>
                     <a:srgbClr val="000000"/>
                   </a:solidFill>
@@ -3388,7 +3393,7 @@
             </a:ln>
             <a:extLst>
               <a:ext uri="{91240B29-F687-4f45-9708-019B960494DF}">
-                <a14:hiddenLine xmlns:a14="http://schemas.microsoft.com/office/drawing/2010/main" xmlns="" w="9525">
+                <a14:hiddenLine xmlns="" xmlns:a14="http://schemas.microsoft.com/office/drawing/2010/main" w="9525">
                   <a:solidFill>
                     <a:srgbClr val="000000"/>
                   </a:solidFill>
@@ -3450,7 +3455,7 @@
             </a:ln>
             <a:extLst>
               <a:ext uri="{91240B29-F687-4f45-9708-019B960494DF}">
-                <a14:hiddenLine xmlns:a14="http://schemas.microsoft.com/office/drawing/2010/main" xmlns="" w="9525">
+                <a14:hiddenLine xmlns="" xmlns:a14="http://schemas.microsoft.com/office/drawing/2010/main" w="9525">
                   <a:solidFill>
                     <a:srgbClr val="000000"/>
                   </a:solidFill>
@@ -3540,7 +3545,7 @@
             </a:ln>
             <a:extLst>
               <a:ext uri="{91240B29-F687-4f45-9708-019B960494DF}">
-                <a14:hiddenLine xmlns:a14="http://schemas.microsoft.com/office/drawing/2010/main" xmlns="" w="9525">
+                <a14:hiddenLine xmlns="" xmlns:a14="http://schemas.microsoft.com/office/drawing/2010/main" w="9525">
                   <a:solidFill>
                     <a:srgbClr val="000000"/>
                   </a:solidFill>
@@ -3630,7 +3635,7 @@
             </a:ln>
             <a:extLst>
               <a:ext uri="{91240B29-F687-4f45-9708-019B960494DF}">
-                <a14:hiddenLine xmlns:a14="http://schemas.microsoft.com/office/drawing/2010/main" xmlns="" w="9525">
+                <a14:hiddenLine xmlns="" xmlns:a14="http://schemas.microsoft.com/office/drawing/2010/main" w="9525">
                   <a:solidFill>
                     <a:srgbClr val="000000"/>
                   </a:solidFill>
@@ -3695,7 +3700,7 @@
             </a:ln>
             <a:extLst>
               <a:ext uri="{91240B29-F687-4f45-9708-019B960494DF}">
-                <a14:hiddenLine xmlns:a14="http://schemas.microsoft.com/office/drawing/2010/main" xmlns="" w="9525">
+                <a14:hiddenLine xmlns="" xmlns:a14="http://schemas.microsoft.com/office/drawing/2010/main" w="9525">
                   <a:solidFill>
                     <a:srgbClr val="000000"/>
                   </a:solidFill>
@@ -3757,7 +3762,7 @@
             </a:ln>
             <a:extLst>
               <a:ext uri="{91240B29-F687-4f45-9708-019B960494DF}">
-                <a14:hiddenLine xmlns:a14="http://schemas.microsoft.com/office/drawing/2010/main" xmlns="" w="9525">
+                <a14:hiddenLine xmlns="" xmlns:a14="http://schemas.microsoft.com/office/drawing/2010/main" w="9525">
                   <a:solidFill>
                     <a:srgbClr val="000000"/>
                   </a:solidFill>
@@ -3847,7 +3852,7 @@
             </a:ln>
             <a:extLst>
               <a:ext uri="{91240B29-F687-4f45-9708-019B960494DF}">
-                <a14:hiddenLine xmlns:a14="http://schemas.microsoft.com/office/drawing/2010/main" xmlns="" w="9525">
+                <a14:hiddenLine xmlns="" xmlns:a14="http://schemas.microsoft.com/office/drawing/2010/main" w="9525">
                   <a:solidFill>
                     <a:srgbClr val="000000"/>
                   </a:solidFill>
@@ -3937,7 +3942,7 @@
             </a:ln>
             <a:extLst>
               <a:ext uri="{91240B29-F687-4f45-9708-019B960494DF}">
-                <a14:hiddenLine xmlns:a14="http://schemas.microsoft.com/office/drawing/2010/main" xmlns="" w="9525">
+                <a14:hiddenLine xmlns="" xmlns:a14="http://schemas.microsoft.com/office/drawing/2010/main" w="9525">
                   <a:solidFill>
                     <a:srgbClr val="000000"/>
                   </a:solidFill>
@@ -3999,7 +4004,7 @@
             </a:ln>
             <a:extLst>
               <a:ext uri="{91240B29-F687-4f45-9708-019B960494DF}">
-                <a14:hiddenLine xmlns:a14="http://schemas.microsoft.com/office/drawing/2010/main" xmlns="" w="9525">
+                <a14:hiddenLine xmlns="" xmlns:a14="http://schemas.microsoft.com/office/drawing/2010/main" w="9525">
                   <a:solidFill>
                     <a:srgbClr val="000000"/>
                   </a:solidFill>
@@ -4119,7 +4124,7 @@
             </a:ln>
             <a:extLst>
               <a:ext uri="{91240B29-F687-4f45-9708-019B960494DF}">
-                <a14:hiddenLine xmlns:a14="http://schemas.microsoft.com/office/drawing/2010/main" xmlns="" w="9525">
+                <a14:hiddenLine xmlns="" xmlns:a14="http://schemas.microsoft.com/office/drawing/2010/main" w="9525">
                   <a:solidFill>
                     <a:srgbClr val="000000"/>
                   </a:solidFill>
@@ -4187,7 +4192,7 @@
             </a:ln>
             <a:extLst>
               <a:ext uri="{91240B29-F687-4f45-9708-019B960494DF}">
-                <a14:hiddenLine xmlns:a14="http://schemas.microsoft.com/office/drawing/2010/main" xmlns="" w="9525">
+                <a14:hiddenLine xmlns="" xmlns:a14="http://schemas.microsoft.com/office/drawing/2010/main" w="9525">
                   <a:solidFill>
                     <a:srgbClr val="000000"/>
                   </a:solidFill>
@@ -4277,7 +4282,7 @@
             </a:ln>
             <a:extLst>
               <a:ext uri="{91240B29-F687-4f45-9708-019B960494DF}">
-                <a14:hiddenLine xmlns:a14="http://schemas.microsoft.com/office/drawing/2010/main" xmlns="" w="9525">
+                <a14:hiddenLine xmlns="" xmlns:a14="http://schemas.microsoft.com/office/drawing/2010/main" w="9525">
                   <a:solidFill>
                     <a:srgbClr val="000000"/>
                   </a:solidFill>
@@ -4417,7 +4422,7 @@
           <a:p>
             <a:fld id="{48F1EE82-E6B2-4C00-8761-1CCE549031D8}" type="datetimeFigureOut">
               <a:rPr lang="bg-BG" smtClean="0"/>
-              <a:t>05.07.2015</a:t>
+              <a:t>11.07.2015</a:t>
             </a:fld>
             <a:endParaRPr lang="bg-BG"/>
           </a:p>
@@ -4689,7 +4694,7 @@
           <a:p>
             <a:fld id="{48F1EE82-E6B2-4C00-8761-1CCE549031D8}" type="datetimeFigureOut">
               <a:rPr lang="bg-BG" smtClean="0"/>
-              <a:t>05.07.2015</a:t>
+              <a:t>11.07.2015</a:t>
             </a:fld>
             <a:endParaRPr lang="bg-BG"/>
           </a:p>
@@ -4885,7 +4890,7 @@
           <a:p>
             <a:fld id="{48F1EE82-E6B2-4C00-8761-1CCE549031D8}" type="datetimeFigureOut">
               <a:rPr lang="bg-BG" smtClean="0"/>
-              <a:t>05.07.2015</a:t>
+              <a:t>11.07.2015</a:t>
             </a:fld>
             <a:endParaRPr lang="bg-BG"/>
           </a:p>
@@ -5148,7 +5153,7 @@
           <a:p>
             <a:fld id="{48F1EE82-E6B2-4C00-8761-1CCE549031D8}" type="datetimeFigureOut">
               <a:rPr lang="bg-BG" smtClean="0"/>
-              <a:t>05.07.2015</a:t>
+              <a:t>11.07.2015</a:t>
             </a:fld>
             <a:endParaRPr lang="bg-BG"/>
           </a:p>
@@ -5582,7 +5587,7 @@
           <a:p>
             <a:fld id="{48F1EE82-E6B2-4C00-8761-1CCE549031D8}" type="datetimeFigureOut">
               <a:rPr lang="bg-BG" smtClean="0"/>
-              <a:t>05.07.2015</a:t>
+              <a:t>11.07.2015</a:t>
             </a:fld>
             <a:endParaRPr lang="bg-BG"/>
           </a:p>
@@ -6128,7 +6133,7 @@
           <a:p>
             <a:fld id="{48F1EE82-E6B2-4C00-8761-1CCE549031D8}" type="datetimeFigureOut">
               <a:rPr lang="bg-BG" smtClean="0"/>
-              <a:t>05.07.2015</a:t>
+              <a:t>11.07.2015</a:t>
             </a:fld>
             <a:endParaRPr lang="bg-BG"/>
           </a:p>
@@ -6848,7 +6853,7 @@
           <a:p>
             <a:fld id="{48F1EE82-E6B2-4C00-8761-1CCE549031D8}" type="datetimeFigureOut">
               <a:rPr lang="bg-BG" smtClean="0"/>
-              <a:t>05.07.2015</a:t>
+              <a:t>11.07.2015</a:t>
             </a:fld>
             <a:endParaRPr lang="bg-BG"/>
           </a:p>
@@ -7018,7 +7023,7 @@
           <a:p>
             <a:fld id="{48F1EE82-E6B2-4C00-8761-1CCE549031D8}" type="datetimeFigureOut">
               <a:rPr lang="bg-BG" smtClean="0"/>
-              <a:t>05.07.2015</a:t>
+              <a:t>11.07.2015</a:t>
             </a:fld>
             <a:endParaRPr lang="bg-BG"/>
           </a:p>
@@ -7198,7 +7203,7 @@
           <a:p>
             <a:fld id="{48F1EE82-E6B2-4C00-8761-1CCE549031D8}" type="datetimeFigureOut">
               <a:rPr lang="bg-BG" smtClean="0"/>
-              <a:t>05.07.2015</a:t>
+              <a:t>11.07.2015</a:t>
             </a:fld>
             <a:endParaRPr lang="bg-BG"/>
           </a:p>
@@ -7373,7 +7378,7 @@
           <a:p>
             <a:fld id="{48F1EE82-E6B2-4C00-8761-1CCE549031D8}" type="datetimeFigureOut">
               <a:rPr lang="bg-BG" smtClean="0"/>
-              <a:t>05.07.2015</a:t>
+              <a:t>11.07.2015</a:t>
             </a:fld>
             <a:endParaRPr lang="bg-BG"/>
           </a:p>
@@ -7623,7 +7628,7 @@
           <a:p>
             <a:fld id="{48F1EE82-E6B2-4C00-8761-1CCE549031D8}" type="datetimeFigureOut">
               <a:rPr lang="bg-BG" smtClean="0"/>
-              <a:t>05.07.2015</a:t>
+              <a:t>11.07.2015</a:t>
             </a:fld>
             <a:endParaRPr lang="bg-BG"/>
           </a:p>
@@ -7860,7 +7865,7 @@
           <a:p>
             <a:fld id="{48F1EE82-E6B2-4C00-8761-1CCE549031D8}" type="datetimeFigureOut">
               <a:rPr lang="bg-BG" smtClean="0"/>
-              <a:t>05.07.2015</a:t>
+              <a:t>11.07.2015</a:t>
             </a:fld>
             <a:endParaRPr lang="bg-BG"/>
           </a:p>
@@ -8241,7 +8246,7 @@
           <a:p>
             <a:fld id="{48F1EE82-E6B2-4C00-8761-1CCE549031D8}" type="datetimeFigureOut">
               <a:rPr lang="bg-BG" smtClean="0"/>
-              <a:t>05.07.2015</a:t>
+              <a:t>11.07.2015</a:t>
             </a:fld>
             <a:endParaRPr lang="bg-BG"/>
           </a:p>
@@ -8359,7 +8364,7 @@
           <a:p>
             <a:fld id="{48F1EE82-E6B2-4C00-8761-1CCE549031D8}" type="datetimeFigureOut">
               <a:rPr lang="bg-BG" smtClean="0"/>
-              <a:t>05.07.2015</a:t>
+              <a:t>11.07.2015</a:t>
             </a:fld>
             <a:endParaRPr lang="bg-BG"/>
           </a:p>
@@ -8454,7 +8459,7 @@
           <a:p>
             <a:fld id="{48F1EE82-E6B2-4C00-8761-1CCE549031D8}" type="datetimeFigureOut">
               <a:rPr lang="bg-BG" smtClean="0"/>
-              <a:t>05.07.2015</a:t>
+              <a:t>11.07.2015</a:t>
             </a:fld>
             <a:endParaRPr lang="bg-BG"/>
           </a:p>
@@ -8703,7 +8708,7 @@
           <a:p>
             <a:fld id="{48F1EE82-E6B2-4C00-8761-1CCE549031D8}" type="datetimeFigureOut">
               <a:rPr lang="bg-BG" smtClean="0"/>
-              <a:t>05.07.2015</a:t>
+              <a:t>11.07.2015</a:t>
             </a:fld>
             <a:endParaRPr lang="bg-BG"/>
           </a:p>
@@ -8983,7 +8988,7 @@
           <a:p>
             <a:fld id="{48F1EE82-E6B2-4C00-8761-1CCE549031D8}" type="datetimeFigureOut">
               <a:rPr lang="bg-BG" smtClean="0"/>
-              <a:t>05.07.2015</a:t>
+              <a:t>11.07.2015</a:t>
             </a:fld>
             <a:endParaRPr lang="bg-BG"/>
           </a:p>
@@ -9106,7 +9111,7 @@
           <a:noFill/>
           <a:extLst>
             <a:ext uri="{909E8E84-426E-40dd-AFC4-6F175D3DCCD1}">
-              <a14:hiddenFill xmlns:a14="http://schemas.microsoft.com/office/drawing/2010/main" xmlns="">
+              <a14:hiddenFill xmlns="" xmlns:a14="http://schemas.microsoft.com/office/drawing/2010/main">
                 <a:solidFill>
                   <a:srgbClr val="FFFFFF"/>
                 </a:solidFill>
@@ -9180,7 +9185,7 @@
               </a:ln>
               <a:extLst>
                 <a:ext uri="{91240B29-F687-4f45-9708-019B960494DF}">
-                  <a14:hiddenLine xmlns:a14="http://schemas.microsoft.com/office/drawing/2010/main" xmlns="" w="9525">
+                  <a14:hiddenLine xmlns="" xmlns:a14="http://schemas.microsoft.com/office/drawing/2010/main" w="9525">
                     <a:solidFill>
                       <a:srgbClr val="000000"/>
                     </a:solidFill>
@@ -9270,7 +9275,7 @@
               </a:ln>
               <a:extLst>
                 <a:ext uri="{91240B29-F687-4f45-9708-019B960494DF}">
-                  <a14:hiddenLine xmlns:a14="http://schemas.microsoft.com/office/drawing/2010/main" xmlns="" w="9525">
+                  <a14:hiddenLine xmlns="" xmlns:a14="http://schemas.microsoft.com/office/drawing/2010/main" w="9525">
                     <a:solidFill>
                       <a:srgbClr val="000000"/>
                     </a:solidFill>
@@ -9360,7 +9365,7 @@
               </a:ln>
               <a:extLst>
                 <a:ext uri="{91240B29-F687-4f45-9708-019B960494DF}">
-                  <a14:hiddenLine xmlns:a14="http://schemas.microsoft.com/office/drawing/2010/main" xmlns="" w="9525">
+                  <a14:hiddenLine xmlns="" xmlns:a14="http://schemas.microsoft.com/office/drawing/2010/main" w="9525">
                     <a:solidFill>
                       <a:srgbClr val="000000"/>
                     </a:solidFill>
@@ -9422,7 +9427,7 @@
               </a:ln>
               <a:extLst>
                 <a:ext uri="{91240B29-F687-4f45-9708-019B960494DF}">
-                  <a14:hiddenLine xmlns:a14="http://schemas.microsoft.com/office/drawing/2010/main" xmlns="" w="9525">
+                  <a14:hiddenLine xmlns="" xmlns:a14="http://schemas.microsoft.com/office/drawing/2010/main" w="9525">
                     <a:solidFill>
                       <a:srgbClr val="000000"/>
                     </a:solidFill>
@@ -9512,7 +9517,7 @@
               </a:ln>
               <a:extLst>
                 <a:ext uri="{91240B29-F687-4f45-9708-019B960494DF}">
-                  <a14:hiddenLine xmlns:a14="http://schemas.microsoft.com/office/drawing/2010/main" xmlns="" w="9525">
+                  <a14:hiddenLine xmlns="" xmlns:a14="http://schemas.microsoft.com/office/drawing/2010/main" w="9525">
                     <a:solidFill>
                       <a:srgbClr val="000000"/>
                     </a:solidFill>
@@ -9574,7 +9579,7 @@
               </a:ln>
               <a:extLst>
                 <a:ext uri="{91240B29-F687-4f45-9708-019B960494DF}">
-                  <a14:hiddenLine xmlns:a14="http://schemas.microsoft.com/office/drawing/2010/main" xmlns="" w="9525">
+                  <a14:hiddenLine xmlns="" xmlns:a14="http://schemas.microsoft.com/office/drawing/2010/main" w="9525">
                     <a:solidFill>
                       <a:srgbClr val="000000"/>
                     </a:solidFill>
@@ -9636,7 +9641,7 @@
               </a:ln>
               <a:extLst>
                 <a:ext uri="{91240B29-F687-4f45-9708-019B960494DF}">
-                  <a14:hiddenLine xmlns:a14="http://schemas.microsoft.com/office/drawing/2010/main" xmlns="" w="9525">
+                  <a14:hiddenLine xmlns="" xmlns:a14="http://schemas.microsoft.com/office/drawing/2010/main" w="9525">
                     <a:solidFill>
                       <a:srgbClr val="000000"/>
                     </a:solidFill>
@@ -9726,7 +9731,7 @@
               </a:ln>
               <a:extLst>
                 <a:ext uri="{91240B29-F687-4f45-9708-019B960494DF}">
-                  <a14:hiddenLine xmlns:a14="http://schemas.microsoft.com/office/drawing/2010/main" xmlns="" w="9525">
+                  <a14:hiddenLine xmlns="" xmlns:a14="http://schemas.microsoft.com/office/drawing/2010/main" w="9525">
                     <a:solidFill>
                       <a:srgbClr val="000000"/>
                     </a:solidFill>
@@ -9816,7 +9821,7 @@
               </a:ln>
               <a:extLst>
                 <a:ext uri="{91240B29-F687-4f45-9708-019B960494DF}">
-                  <a14:hiddenLine xmlns:a14="http://schemas.microsoft.com/office/drawing/2010/main" xmlns="" w="9525">
+                  <a14:hiddenLine xmlns="" xmlns:a14="http://schemas.microsoft.com/office/drawing/2010/main" w="9525">
                     <a:solidFill>
                       <a:srgbClr val="000000"/>
                     </a:solidFill>
@@ -9878,7 +9883,7 @@
               </a:ln>
               <a:extLst>
                 <a:ext uri="{91240B29-F687-4f45-9708-019B960494DF}">
-                  <a14:hiddenLine xmlns:a14="http://schemas.microsoft.com/office/drawing/2010/main" xmlns="" w="9525">
+                  <a14:hiddenLine xmlns="" xmlns:a14="http://schemas.microsoft.com/office/drawing/2010/main" w="9525">
                     <a:solidFill>
                       <a:srgbClr val="000000"/>
                     </a:solidFill>
@@ -9988,7 +9993,7 @@
               </a:ln>
               <a:extLst>
                 <a:ext uri="{91240B29-F687-4f45-9708-019B960494DF}">
-                  <a14:hiddenLine xmlns:a14="http://schemas.microsoft.com/office/drawing/2010/main" xmlns="" w="9525">
+                  <a14:hiddenLine xmlns="" xmlns:a14="http://schemas.microsoft.com/office/drawing/2010/main" w="9525">
                     <a:solidFill>
                       <a:srgbClr val="000000"/>
                     </a:solidFill>
@@ -10072,7 +10077,7 @@
               </a:ln>
               <a:extLst>
                 <a:ext uri="{91240B29-F687-4f45-9708-019B960494DF}">
-                  <a14:hiddenLine xmlns:a14="http://schemas.microsoft.com/office/drawing/2010/main" xmlns="" w="9525">
+                  <a14:hiddenLine xmlns="" xmlns:a14="http://schemas.microsoft.com/office/drawing/2010/main" w="9525">
                     <a:solidFill>
                       <a:srgbClr val="000000"/>
                     </a:solidFill>
@@ -10134,7 +10139,7 @@
               </a:ln>
               <a:extLst>
                 <a:ext uri="{91240B29-F687-4f45-9708-019B960494DF}">
-                  <a14:hiddenLine xmlns:a14="http://schemas.microsoft.com/office/drawing/2010/main" xmlns="" w="9525">
+                  <a14:hiddenLine xmlns="" xmlns:a14="http://schemas.microsoft.com/office/drawing/2010/main" w="9525">
                     <a:solidFill>
                       <a:srgbClr val="000000"/>
                     </a:solidFill>
@@ -10196,7 +10201,7 @@
               </a:ln>
               <a:extLst>
                 <a:ext uri="{91240B29-F687-4f45-9708-019B960494DF}">
-                  <a14:hiddenLine xmlns:a14="http://schemas.microsoft.com/office/drawing/2010/main" xmlns="" w="9525">
+                  <a14:hiddenLine xmlns="" xmlns:a14="http://schemas.microsoft.com/office/drawing/2010/main" w="9525">
                     <a:solidFill>
                       <a:srgbClr val="000000"/>
                     </a:solidFill>
@@ -10286,7 +10291,7 @@
               </a:ln>
               <a:extLst>
                 <a:ext uri="{91240B29-F687-4f45-9708-019B960494DF}">
-                  <a14:hiddenLine xmlns:a14="http://schemas.microsoft.com/office/drawing/2010/main" xmlns="" w="9525">
+                  <a14:hiddenLine xmlns="" xmlns:a14="http://schemas.microsoft.com/office/drawing/2010/main" w="9525">
                     <a:solidFill>
                       <a:srgbClr val="000000"/>
                     </a:solidFill>
@@ -10320,7 +10325,7 @@
               </a:ln>
               <a:extLst>
                 <a:ext uri="{91240B29-F687-4f45-9708-019B960494DF}">
-                  <a14:hiddenLine xmlns:a14="http://schemas.microsoft.com/office/drawing/2010/main" xmlns="" w="9525">
+                  <a14:hiddenLine xmlns="" xmlns:a14="http://schemas.microsoft.com/office/drawing/2010/main" w="9525">
                     <a:solidFill>
                       <a:srgbClr val="000000"/>
                     </a:solidFill>
@@ -10385,7 +10390,7 @@
               </a:ln>
               <a:extLst>
                 <a:ext uri="{91240B29-F687-4f45-9708-019B960494DF}">
-                  <a14:hiddenLine xmlns:a14="http://schemas.microsoft.com/office/drawing/2010/main" xmlns="" w="9525">
+                  <a14:hiddenLine xmlns="" xmlns:a14="http://schemas.microsoft.com/office/drawing/2010/main" w="9525">
                     <a:solidFill>
                       <a:srgbClr val="000000"/>
                     </a:solidFill>
@@ -10475,7 +10480,7 @@
               </a:ln>
               <a:extLst>
                 <a:ext uri="{91240B29-F687-4f45-9708-019B960494DF}">
-                  <a14:hiddenLine xmlns:a14="http://schemas.microsoft.com/office/drawing/2010/main" xmlns="" w="9525">
+                  <a14:hiddenLine xmlns="" xmlns:a14="http://schemas.microsoft.com/office/drawing/2010/main" w="9525">
                     <a:solidFill>
                       <a:srgbClr val="000000"/>
                     </a:solidFill>
@@ -10537,7 +10542,7 @@
               </a:ln>
               <a:extLst>
                 <a:ext uri="{91240B29-F687-4f45-9708-019B960494DF}">
-                  <a14:hiddenLine xmlns:a14="http://schemas.microsoft.com/office/drawing/2010/main" xmlns="" w="9525">
+                  <a14:hiddenLine xmlns="" xmlns:a14="http://schemas.microsoft.com/office/drawing/2010/main" w="9525">
                     <a:solidFill>
                       <a:srgbClr val="000000"/>
                     </a:solidFill>
@@ -10627,7 +10632,7 @@
               </a:ln>
               <a:extLst>
                 <a:ext uri="{91240B29-F687-4f45-9708-019B960494DF}">
-                  <a14:hiddenLine xmlns:a14="http://schemas.microsoft.com/office/drawing/2010/main" xmlns="" w="9525">
+                  <a14:hiddenLine xmlns="" xmlns:a14="http://schemas.microsoft.com/office/drawing/2010/main" w="9525">
                     <a:solidFill>
                       <a:srgbClr val="000000"/>
                     </a:solidFill>
@@ -10692,7 +10697,7 @@
               </a:ln>
               <a:extLst>
                 <a:ext uri="{91240B29-F687-4f45-9708-019B960494DF}">
-                  <a14:hiddenLine xmlns:a14="http://schemas.microsoft.com/office/drawing/2010/main" xmlns="" w="9525">
+                  <a14:hiddenLine xmlns="" xmlns:a14="http://schemas.microsoft.com/office/drawing/2010/main" w="9525">
                     <a:solidFill>
                       <a:srgbClr val="000000"/>
                     </a:solidFill>
@@ -10754,7 +10759,7 @@
               </a:ln>
               <a:extLst>
                 <a:ext uri="{91240B29-F687-4f45-9708-019B960494DF}">
-                  <a14:hiddenLine xmlns:a14="http://schemas.microsoft.com/office/drawing/2010/main" xmlns="" w="9525">
+                  <a14:hiddenLine xmlns="" xmlns:a14="http://schemas.microsoft.com/office/drawing/2010/main" w="9525">
                     <a:solidFill>
                       <a:srgbClr val="000000"/>
                     </a:solidFill>
@@ -10844,7 +10849,7 @@
               </a:ln>
               <a:extLst>
                 <a:ext uri="{91240B29-F687-4f45-9708-019B960494DF}">
-                  <a14:hiddenLine xmlns:a14="http://schemas.microsoft.com/office/drawing/2010/main" xmlns="" w="9525">
+                  <a14:hiddenLine xmlns="" xmlns:a14="http://schemas.microsoft.com/office/drawing/2010/main" w="9525">
                     <a:solidFill>
                       <a:srgbClr val="000000"/>
                     </a:solidFill>
@@ -10934,7 +10939,7 @@
               </a:ln>
               <a:extLst>
                 <a:ext uri="{91240B29-F687-4f45-9708-019B960494DF}">
-                  <a14:hiddenLine xmlns:a14="http://schemas.microsoft.com/office/drawing/2010/main" xmlns="" w="9525">
+                  <a14:hiddenLine xmlns="" xmlns:a14="http://schemas.microsoft.com/office/drawing/2010/main" w="9525">
                     <a:solidFill>
                       <a:srgbClr val="000000"/>
                     </a:solidFill>
@@ -10999,7 +11004,7 @@
               </a:ln>
               <a:extLst>
                 <a:ext uri="{91240B29-F687-4f45-9708-019B960494DF}">
-                  <a14:hiddenLine xmlns:a14="http://schemas.microsoft.com/office/drawing/2010/main" xmlns="" w="9525">
+                  <a14:hiddenLine xmlns="" xmlns:a14="http://schemas.microsoft.com/office/drawing/2010/main" w="9525">
                     <a:solidFill>
                       <a:srgbClr val="000000"/>
                     </a:solidFill>
@@ -11119,7 +11124,7 @@
               </a:ln>
               <a:extLst>
                 <a:ext uri="{91240B29-F687-4f45-9708-019B960494DF}">
-                  <a14:hiddenLine xmlns:a14="http://schemas.microsoft.com/office/drawing/2010/main" xmlns="" w="9525">
+                  <a14:hiddenLine xmlns="" xmlns:a14="http://schemas.microsoft.com/office/drawing/2010/main" w="9525">
                     <a:solidFill>
                       <a:srgbClr val="000000"/>
                     </a:solidFill>
@@ -11200,7 +11205,7 @@
               </a:ln>
               <a:extLst>
                 <a:ext uri="{91240B29-F687-4f45-9708-019B960494DF}">
-                  <a14:hiddenLine xmlns:a14="http://schemas.microsoft.com/office/drawing/2010/main" xmlns="" w="9525">
+                  <a14:hiddenLine xmlns="" xmlns:a14="http://schemas.microsoft.com/office/drawing/2010/main" w="9525">
                     <a:solidFill>
                       <a:srgbClr val="000000"/>
                     </a:solidFill>
@@ -11315,7 +11320,7 @@
               </a:ln>
               <a:extLst>
                 <a:ext uri="{91240B29-F687-4f45-9708-019B960494DF}">
-                  <a14:hiddenLine xmlns:a14="http://schemas.microsoft.com/office/drawing/2010/main" xmlns="" w="9525">
+                  <a14:hiddenLine xmlns="" xmlns:a14="http://schemas.microsoft.com/office/drawing/2010/main" w="9525">
                     <a:solidFill>
                       <a:srgbClr val="000000"/>
                     </a:solidFill>
@@ -11405,7 +11410,7 @@
               </a:ln>
               <a:extLst>
                 <a:ext uri="{91240B29-F687-4f45-9708-019B960494DF}">
-                  <a14:hiddenLine xmlns:a14="http://schemas.microsoft.com/office/drawing/2010/main" xmlns="" w="9525">
+                  <a14:hiddenLine xmlns="" xmlns:a14="http://schemas.microsoft.com/office/drawing/2010/main" w="9525">
                     <a:solidFill>
                       <a:srgbClr val="000000"/>
                     </a:solidFill>
@@ -11470,7 +11475,7 @@
               </a:ln>
               <a:extLst>
                 <a:ext uri="{91240B29-F687-4f45-9708-019B960494DF}">
-                  <a14:hiddenLine xmlns:a14="http://schemas.microsoft.com/office/drawing/2010/main" xmlns="" w="9525">
+                  <a14:hiddenLine xmlns="" xmlns:a14="http://schemas.microsoft.com/office/drawing/2010/main" w="9525">
                     <a:solidFill>
                       <a:srgbClr val="000000"/>
                     </a:solidFill>
@@ -11560,7 +11565,7 @@
               </a:ln>
               <a:extLst>
                 <a:ext uri="{91240B29-F687-4f45-9708-019B960494DF}">
-                  <a14:hiddenLine xmlns:a14="http://schemas.microsoft.com/office/drawing/2010/main" xmlns="" w="9525">
+                  <a14:hiddenLine xmlns="" xmlns:a14="http://schemas.microsoft.com/office/drawing/2010/main" w="9525">
                     <a:solidFill>
                       <a:srgbClr val="000000"/>
                     </a:solidFill>
@@ -11628,7 +11633,7 @@
               </a:ln>
               <a:extLst>
                 <a:ext uri="{91240B29-F687-4f45-9708-019B960494DF}">
-                  <a14:hiddenLine xmlns:a14="http://schemas.microsoft.com/office/drawing/2010/main" xmlns="" w="9525">
+                  <a14:hiddenLine xmlns="" xmlns:a14="http://schemas.microsoft.com/office/drawing/2010/main" w="9525">
                     <a:solidFill>
                       <a:srgbClr val="000000"/>
                     </a:solidFill>
@@ -11718,7 +11723,7 @@
               </a:ln>
               <a:extLst>
                 <a:ext uri="{91240B29-F687-4f45-9708-019B960494DF}">
-                  <a14:hiddenLine xmlns:a14="http://schemas.microsoft.com/office/drawing/2010/main" xmlns="" w="9525">
+                  <a14:hiddenLine xmlns="" xmlns:a14="http://schemas.microsoft.com/office/drawing/2010/main" w="9525">
                     <a:solidFill>
                       <a:srgbClr val="000000"/>
                     </a:solidFill>
@@ -11786,7 +11791,7 @@
               </a:ln>
               <a:extLst>
                 <a:ext uri="{91240B29-F687-4f45-9708-019B960494DF}">
-                  <a14:hiddenLine xmlns:a14="http://schemas.microsoft.com/office/drawing/2010/main" xmlns="" w="9525">
+                  <a14:hiddenLine xmlns="" xmlns:a14="http://schemas.microsoft.com/office/drawing/2010/main" w="9525">
                     <a:solidFill>
                       <a:srgbClr val="000000"/>
                     </a:solidFill>
@@ -11876,7 +11881,7 @@
               </a:ln>
               <a:extLst>
                 <a:ext uri="{91240B29-F687-4f45-9708-019B960494DF}">
-                  <a14:hiddenLine xmlns:a14="http://schemas.microsoft.com/office/drawing/2010/main" xmlns="" w="9525">
+                  <a14:hiddenLine xmlns="" xmlns:a14="http://schemas.microsoft.com/office/drawing/2010/main" w="9525">
                     <a:solidFill>
                       <a:srgbClr val="000000"/>
                     </a:solidFill>
@@ -11910,7 +11915,7 @@
               </a:ln>
               <a:extLst>
                 <a:ext uri="{91240B29-F687-4f45-9708-019B960494DF}">
-                  <a14:hiddenLine xmlns:a14="http://schemas.microsoft.com/office/drawing/2010/main" xmlns="" w="9525">
+                  <a14:hiddenLine xmlns="" xmlns:a14="http://schemas.microsoft.com/office/drawing/2010/main" w="9525">
                     <a:solidFill>
                       <a:srgbClr val="000000"/>
                     </a:solidFill>
@@ -12050,7 +12055,7 @@
           <a:p>
             <a:fld id="{48F1EE82-E6B2-4C00-8761-1CCE549031D8}" type="datetimeFigureOut">
               <a:rPr lang="bg-BG" smtClean="0"/>
-              <a:t>05.07.2015</a:t>
+              <a:t>11.07.2015</a:t>
             </a:fld>
             <a:endParaRPr lang="bg-BG"/>
           </a:p>
@@ -12527,6 +12532,13 @@
   <p:clrMapOvr>
     <a:masterClrMapping/>
   </p:clrMapOvr>
+  <p:timing>
+    <p:tnLst>
+      <p:par>
+        <p:cTn id="1" dur="indefinite" restart="never" nodeType="tmRoot"/>
+      </p:par>
+    </p:tnLst>
+  </p:timing>
 </p:sld>
 </file>
 
@@ -15602,7 +15614,7 @@
             </a:r>
             <a:r>
               <a:rPr lang="en-US" dirty="0" err="1" smtClean="0"/>
-              <a:t>konergiert</a:t>
+              <a:t>konvergiert</a:t>
             </a:r>
             <a:r>
               <a:rPr lang="en-US" dirty="0" smtClean="0"/>
@@ -17001,12 +17013,24 @@
           <a:lstStyle/>
           <a:p>
             <a:r>
-              <a:rPr lang="en-US" dirty="0" smtClean="0"/>
-              <a:t>5.2 </a:t>
-            </a:r>
-            <a:r>
               <a:rPr lang="en-US" dirty="0" err="1" smtClean="0"/>
               <a:t>Bubblesort</a:t>
+            </a:r>
+            <a:r>
+              <a:rPr lang="en-US" dirty="0" smtClean="0"/>
+              <a:t> – </a:t>
+            </a:r>
+            <a:r>
+              <a:rPr lang="en-US" dirty="0" err="1" smtClean="0"/>
+              <a:t>allgemeine</a:t>
+            </a:r>
+            <a:r>
+              <a:rPr lang="en-US" dirty="0" smtClean="0"/>
+              <a:t> </a:t>
+            </a:r>
+            <a:r>
+              <a:rPr lang="en-US" dirty="0" err="1" smtClean="0"/>
+              <a:t>idee</a:t>
             </a:r>
             <a:endParaRPr lang="bg-BG" dirty="0"/>
           </a:p>
@@ -17027,7 +17051,261 @@
           <a:bodyPr/>
           <a:lstStyle/>
           <a:p>
-            <a:endParaRPr lang="bg-BG"/>
+            <a:r>
+              <a:rPr lang="en-US" dirty="0" smtClean="0"/>
+              <a:t>Man </a:t>
+            </a:r>
+            <a:r>
+              <a:rPr lang="en-US" dirty="0" err="1" smtClean="0"/>
+              <a:t>lauft</a:t>
+            </a:r>
+            <a:r>
+              <a:rPr lang="en-US" dirty="0" smtClean="0"/>
+              <a:t> </a:t>
+            </a:r>
+            <a:r>
+              <a:rPr lang="en-US" dirty="0" err="1" smtClean="0"/>
+              <a:t>durch</a:t>
+            </a:r>
+            <a:r>
+              <a:rPr lang="en-US" dirty="0" smtClean="0"/>
+              <a:t> die </a:t>
+            </a:r>
+            <a:r>
+              <a:rPr lang="en-US" dirty="0" err="1" smtClean="0"/>
+              <a:t>Datenmenge</a:t>
+            </a:r>
+            <a:r>
+              <a:rPr lang="en-US" dirty="0" smtClean="0"/>
+              <a:t> von links </a:t>
+            </a:r>
+            <a:r>
+              <a:rPr lang="en-US" dirty="0" err="1" smtClean="0"/>
+              <a:t>nach</a:t>
+            </a:r>
+            <a:r>
+              <a:rPr lang="en-US" dirty="0" smtClean="0"/>
+              <a:t> </a:t>
+            </a:r>
+            <a:r>
+              <a:rPr lang="en-US" dirty="0" err="1" smtClean="0"/>
+              <a:t>rechts</a:t>
+            </a:r>
+            <a:r>
+              <a:rPr lang="en-US" dirty="0" smtClean="0"/>
+              <a:t>, </a:t>
+            </a:r>
+            <a:r>
+              <a:rPr lang="en-US" dirty="0" err="1" smtClean="0"/>
+              <a:t>damit</a:t>
+            </a:r>
+            <a:r>
+              <a:rPr lang="en-US" dirty="0" smtClean="0"/>
+              <a:t> </a:t>
+            </a:r>
+            <a:r>
+              <a:rPr lang="en-US" dirty="0" err="1" smtClean="0"/>
+              <a:t>werden</a:t>
+            </a:r>
+            <a:r>
+              <a:rPr lang="en-US" dirty="0" smtClean="0"/>
+              <a:t> das </a:t>
+            </a:r>
+            <a:r>
+              <a:rPr lang="en-US" dirty="0" err="1" smtClean="0"/>
+              <a:t>aktuelle</a:t>
+            </a:r>
+            <a:r>
+              <a:rPr lang="en-US" dirty="0" smtClean="0"/>
+              <a:t> Element und sein </a:t>
+            </a:r>
+            <a:r>
+              <a:rPr lang="en-US" dirty="0" err="1" smtClean="0"/>
+              <a:t>Nachbar</a:t>
+            </a:r>
+            <a:r>
+              <a:rPr lang="en-US" dirty="0" smtClean="0"/>
+              <a:t> </a:t>
+            </a:r>
+            <a:r>
+              <a:rPr lang="en-US" dirty="0" err="1" smtClean="0"/>
+              <a:t>nach</a:t>
+            </a:r>
+            <a:r>
+              <a:rPr lang="en-US" dirty="0" smtClean="0"/>
+              <a:t> </a:t>
+            </a:r>
+            <a:r>
+              <a:rPr lang="en-US" dirty="0" err="1" smtClean="0"/>
+              <a:t>rechts</a:t>
+            </a:r>
+            <a:r>
+              <a:rPr lang="en-US" dirty="0" smtClean="0"/>
+              <a:t> </a:t>
+            </a:r>
+            <a:r>
+              <a:rPr lang="en-US" dirty="0" err="1" smtClean="0"/>
+              <a:t>verglichen</a:t>
+            </a:r>
+            <a:r>
+              <a:rPr lang="en-US" dirty="0" smtClean="0"/>
+              <a:t> (die </a:t>
+            </a:r>
+            <a:r>
+              <a:rPr lang="en-US" dirty="0" err="1" smtClean="0"/>
+              <a:t>s.g</a:t>
+            </a:r>
+            <a:r>
+              <a:rPr lang="en-US" dirty="0" smtClean="0"/>
+              <a:t>. Bubble-</a:t>
+            </a:r>
+            <a:r>
+              <a:rPr lang="en-US" dirty="0" err="1" smtClean="0"/>
+              <a:t>pahse</a:t>
+            </a:r>
+            <a:r>
+              <a:rPr lang="en-US" dirty="0" smtClean="0"/>
+              <a:t>). Falls die </a:t>
+            </a:r>
+            <a:r>
+              <a:rPr lang="en-US" dirty="0" err="1" smtClean="0"/>
+              <a:t>Elementen</a:t>
+            </a:r>
+            <a:r>
+              <a:rPr lang="en-US" dirty="0" smtClean="0"/>
+              <a:t> </a:t>
+            </a:r>
+            <a:r>
+              <a:rPr lang="en-US" dirty="0" err="1" smtClean="0"/>
+              <a:t>unterschieden</a:t>
+            </a:r>
+            <a:r>
+              <a:rPr lang="en-US" dirty="0" smtClean="0"/>
+              <a:t> </a:t>
+            </a:r>
+            <a:r>
+              <a:rPr lang="en-US" dirty="0" err="1" smtClean="0"/>
+              <a:t>sich</a:t>
+            </a:r>
+            <a:r>
+              <a:rPr lang="en-US" dirty="0" smtClean="0"/>
+              <a:t> </a:t>
+            </a:r>
+            <a:r>
+              <a:rPr lang="en-US" dirty="0" err="1" smtClean="0"/>
+              <a:t>nach</a:t>
+            </a:r>
+            <a:r>
+              <a:rPr lang="en-US" dirty="0" smtClean="0"/>
+              <a:t> </a:t>
+            </a:r>
+            <a:r>
+              <a:rPr lang="en-US" dirty="0" err="1" smtClean="0"/>
+              <a:t>dem</a:t>
+            </a:r>
+            <a:r>
+              <a:rPr lang="en-US" dirty="0" smtClean="0"/>
+              <a:t> </a:t>
+            </a:r>
+            <a:r>
+              <a:rPr lang="en-US" dirty="0" err="1" smtClean="0"/>
+              <a:t>Kriterium</a:t>
+            </a:r>
+            <a:r>
+              <a:rPr lang="en-US" dirty="0" smtClean="0"/>
+              <a:t>, </a:t>
+            </a:r>
+            <a:r>
+              <a:rPr lang="en-US" dirty="0" err="1" smtClean="0"/>
+              <a:t>werden</a:t>
+            </a:r>
+            <a:r>
+              <a:rPr lang="en-US" dirty="0" smtClean="0"/>
+              <a:t> </a:t>
+            </a:r>
+            <a:r>
+              <a:rPr lang="en-US" dirty="0" err="1" smtClean="0"/>
+              <a:t>sie</a:t>
+            </a:r>
+            <a:r>
+              <a:rPr lang="en-US" dirty="0" smtClean="0"/>
+              <a:t> </a:t>
+            </a:r>
+            <a:r>
+              <a:rPr lang="en-US" dirty="0" err="1" smtClean="0"/>
+              <a:t>getauscht</a:t>
+            </a:r>
+            <a:r>
+              <a:rPr lang="en-US" dirty="0" smtClean="0"/>
+              <a:t>. </a:t>
+            </a:r>
+            <a:r>
+              <a:rPr lang="en-US" dirty="0" err="1" smtClean="0"/>
+              <a:t>Diese</a:t>
+            </a:r>
+            <a:r>
+              <a:rPr lang="en-US" dirty="0" smtClean="0"/>
+              <a:t> </a:t>
+            </a:r>
+            <a:r>
+              <a:rPr lang="en-US" dirty="0" err="1" smtClean="0"/>
+              <a:t>Prozedur</a:t>
+            </a:r>
+            <a:r>
+              <a:rPr lang="en-US" dirty="0" smtClean="0"/>
+              <a:t> </a:t>
+            </a:r>
+            <a:r>
+              <a:rPr lang="en-US" dirty="0" err="1" smtClean="0"/>
+              <a:t>wiederholt</a:t>
+            </a:r>
+            <a:r>
+              <a:rPr lang="en-US" dirty="0" smtClean="0"/>
+              <a:t> man, </a:t>
+            </a:r>
+            <a:r>
+              <a:rPr lang="en-US" dirty="0" err="1" smtClean="0"/>
+              <a:t>bis</a:t>
+            </a:r>
+            <a:r>
+              <a:rPr lang="en-US" dirty="0" smtClean="0"/>
+              <a:t> die </a:t>
+            </a:r>
+            <a:r>
+              <a:rPr lang="en-US" dirty="0" err="1" smtClean="0"/>
+              <a:t>ganze</a:t>
+            </a:r>
+            <a:r>
+              <a:rPr lang="en-US" dirty="0" smtClean="0"/>
+              <a:t> </a:t>
+            </a:r>
+            <a:r>
+              <a:rPr lang="en-US" dirty="0" err="1" smtClean="0"/>
+              <a:t>Menge</a:t>
+            </a:r>
+            <a:r>
+              <a:rPr lang="en-US" dirty="0" smtClean="0"/>
+              <a:t> </a:t>
+            </a:r>
+            <a:r>
+              <a:rPr lang="en-US" dirty="0" err="1" smtClean="0"/>
+              <a:t>sortiert</a:t>
+            </a:r>
+            <a:r>
+              <a:rPr lang="en-US" dirty="0" smtClean="0"/>
+              <a:t> </a:t>
+            </a:r>
+            <a:r>
+              <a:rPr lang="en-US" dirty="0" err="1" smtClean="0"/>
+              <a:t>ist</a:t>
+            </a:r>
+            <a:r>
+              <a:rPr lang="en-US" dirty="0" smtClean="0"/>
+              <a:t>.</a:t>
+            </a:r>
+          </a:p>
+          <a:p>
+            <a:endParaRPr lang="bg-BG" dirty="0"/>
           </a:p>
         </p:txBody>
       </p:sp>
@@ -17048,6 +17326,1952 @@
       </p:par>
     </p:tnLst>
   </p:timing>
+</p:sld>
+</file>
+
+<file path=ppt/slides/slide25.xml><?xml version="1.0" encoding="utf-8"?>
+<p:sld xmlns:a="http://schemas.openxmlformats.org/drawingml/2006/main" xmlns:r="http://schemas.openxmlformats.org/officeDocument/2006/relationships" xmlns:p="http://schemas.openxmlformats.org/presentationml/2006/main">
+  <p:cSld>
+    <p:spTree>
+      <p:nvGrpSpPr>
+        <p:cNvPr id="1" name=""/>
+        <p:cNvGrpSpPr/>
+        <p:nvPr/>
+      </p:nvGrpSpPr>
+      <p:grpSpPr>
+        <a:xfrm>
+          <a:off x="0" y="0"/>
+          <a:ext cx="0" cy="0"/>
+          <a:chOff x="0" y="0"/>
+          <a:chExt cx="0" cy="0"/>
+        </a:xfrm>
+      </p:grpSpPr>
+      <p:sp>
+        <p:nvSpPr>
+          <p:cNvPr id="2" name="Title 1"/>
+          <p:cNvSpPr>
+            <a:spLocks noGrp="1"/>
+          </p:cNvSpPr>
+          <p:nvPr>
+            <p:ph type="title"/>
+          </p:nvPr>
+        </p:nvSpPr>
+        <p:spPr/>
+        <p:txBody>
+          <a:bodyPr/>
+          <a:lstStyle/>
+          <a:p>
+            <a:r>
+              <a:rPr lang="en-US" dirty="0" err="1" smtClean="0"/>
+              <a:t>Bubblesort</a:t>
+            </a:r>
+            <a:r>
+              <a:rPr lang="en-US" dirty="0" smtClean="0"/>
+              <a:t> – </a:t>
+            </a:r>
+            <a:r>
+              <a:rPr lang="en-US" dirty="0" err="1" smtClean="0"/>
+              <a:t>pseudocode</a:t>
+            </a:r>
+            <a:r>
+              <a:rPr lang="en-US" dirty="0" smtClean="0"/>
+              <a:t> und </a:t>
+            </a:r>
+            <a:r>
+              <a:rPr lang="en-US" dirty="0" err="1" smtClean="0"/>
+              <a:t>c++</a:t>
+            </a:r>
+            <a:endParaRPr lang="bg-BG" dirty="0"/>
+          </a:p>
+        </p:txBody>
+      </p:sp>
+      <p:pic>
+        <p:nvPicPr>
+          <p:cNvPr id="4" name="Content Placeholder 3"/>
+          <p:cNvPicPr>
+            <a:picLocks noGrp="1" noChangeAspect="1"/>
+          </p:cNvPicPr>
+          <p:nvPr>
+            <p:ph idx="1"/>
+          </p:nvPr>
+        </p:nvPicPr>
+        <p:blipFill>
+          <a:blip r:embed="rId2">
+            <a:extLst>
+              <a:ext uri="{28A0092B-C50C-407E-A947-70E740481C1C}">
+                <a14:useLocalDpi xmlns:a14="http://schemas.microsoft.com/office/drawing/2010/main" val="0"/>
+              </a:ext>
+            </a:extLst>
+          </a:blip>
+          <a:stretch>
+            <a:fillRect/>
+          </a:stretch>
+        </p:blipFill>
+        <p:spPr>
+          <a:xfrm>
+            <a:off x="1141413" y="2196227"/>
+            <a:ext cx="3343742" cy="1133633"/>
+          </a:xfrm>
+        </p:spPr>
+      </p:pic>
+      <p:pic>
+        <p:nvPicPr>
+          <p:cNvPr id="5" name="Picture 4"/>
+          <p:cNvPicPr>
+            <a:picLocks noChangeAspect="1"/>
+          </p:cNvPicPr>
+          <p:nvPr/>
+        </p:nvPicPr>
+        <p:blipFill>
+          <a:blip r:embed="rId3">
+            <a:extLst>
+              <a:ext uri="{28A0092B-C50C-407E-A947-70E740481C1C}">
+                <a14:useLocalDpi xmlns:a14="http://schemas.microsoft.com/office/drawing/2010/main" val="0"/>
+              </a:ext>
+            </a:extLst>
+          </a:blip>
+          <a:stretch>
+            <a:fillRect/>
+          </a:stretch>
+        </p:blipFill>
+        <p:spPr>
+          <a:xfrm>
+            <a:off x="5389281" y="2196227"/>
+            <a:ext cx="4029637" cy="2591162"/>
+          </a:xfrm>
+          <a:prstGeom prst="rect">
+            <a:avLst/>
+          </a:prstGeom>
+        </p:spPr>
+      </p:pic>
+    </p:spTree>
+    <p:extLst>
+      <p:ext uri="{BB962C8B-B14F-4D97-AF65-F5344CB8AC3E}">
+        <p14:creationId xmlns:p14="http://schemas.microsoft.com/office/powerpoint/2010/main" val="2705002632"/>
+      </p:ext>
+    </p:extLst>
+  </p:cSld>
+  <p:clrMapOvr>
+    <a:masterClrMapping/>
+  </p:clrMapOvr>
+</p:sld>
+</file>
+
+<file path=ppt/slides/slide26.xml><?xml version="1.0" encoding="utf-8"?>
+<p:sld xmlns:a="http://schemas.openxmlformats.org/drawingml/2006/main" xmlns:r="http://schemas.openxmlformats.org/officeDocument/2006/relationships" xmlns:p="http://schemas.openxmlformats.org/presentationml/2006/main">
+  <p:cSld>
+    <p:spTree>
+      <p:nvGrpSpPr>
+        <p:cNvPr id="1" name=""/>
+        <p:cNvGrpSpPr/>
+        <p:nvPr/>
+      </p:nvGrpSpPr>
+      <p:grpSpPr>
+        <a:xfrm>
+          <a:off x="0" y="0"/>
+          <a:ext cx="0" cy="0"/>
+          <a:chOff x="0" y="0"/>
+          <a:chExt cx="0" cy="0"/>
+        </a:xfrm>
+      </p:grpSpPr>
+      <p:sp>
+        <p:nvSpPr>
+          <p:cNvPr id="2" name="Title 1"/>
+          <p:cNvSpPr>
+            <a:spLocks noGrp="1"/>
+          </p:cNvSpPr>
+          <p:nvPr>
+            <p:ph type="title"/>
+          </p:nvPr>
+        </p:nvSpPr>
+        <p:spPr/>
+        <p:txBody>
+          <a:bodyPr/>
+          <a:lstStyle/>
+          <a:p>
+            <a:r>
+              <a:rPr lang="en-US" dirty="0" err="1" smtClean="0"/>
+              <a:t>Bubblesort</a:t>
+            </a:r>
+            <a:r>
+              <a:rPr lang="en-US" dirty="0" smtClean="0"/>
+              <a:t> - </a:t>
+            </a:r>
+            <a:r>
+              <a:rPr lang="en-US" dirty="0" err="1" smtClean="0"/>
+              <a:t>eigenschaften</a:t>
+            </a:r>
+            <a:endParaRPr lang="bg-BG" dirty="0"/>
+          </a:p>
+        </p:txBody>
+      </p:sp>
+      <p:sp>
+        <p:nvSpPr>
+          <p:cNvPr id="3" name="Content Placeholder 2"/>
+          <p:cNvSpPr>
+            <a:spLocks noGrp="1"/>
+          </p:cNvSpPr>
+          <p:nvPr>
+            <p:ph idx="1"/>
+          </p:nvPr>
+        </p:nvSpPr>
+        <p:spPr/>
+        <p:txBody>
+          <a:bodyPr/>
+          <a:lstStyle/>
+          <a:p>
+            <a:r>
+              <a:rPr lang="en-US" dirty="0" err="1" smtClean="0"/>
+              <a:t>Stabil</a:t>
+            </a:r>
+            <a:r>
+              <a:rPr lang="en-US" dirty="0" smtClean="0"/>
+              <a:t> </a:t>
+            </a:r>
+            <a:r>
+              <a:rPr lang="en-US" dirty="0" err="1" smtClean="0"/>
+              <a:t>beim</a:t>
+            </a:r>
+            <a:r>
+              <a:rPr lang="en-US" dirty="0" smtClean="0"/>
+              <a:t> Design</a:t>
+            </a:r>
+          </a:p>
+          <a:p>
+            <a:r>
+              <a:rPr lang="en-US" dirty="0" err="1" smtClean="0"/>
+              <a:t>Arbeitet</a:t>
+            </a:r>
+            <a:r>
+              <a:rPr lang="en-US" dirty="0" smtClean="0"/>
+              <a:t> in-place (hat </a:t>
+            </a:r>
+            <a:r>
+              <a:rPr lang="en-US" dirty="0" err="1" smtClean="0"/>
+              <a:t>kein</a:t>
+            </a:r>
+            <a:r>
+              <a:rPr lang="en-US" dirty="0" smtClean="0"/>
+              <a:t> </a:t>
+            </a:r>
+            <a:r>
+              <a:rPr lang="en-US" dirty="0" err="1" smtClean="0"/>
+              <a:t>weiteres</a:t>
+            </a:r>
+            <a:r>
+              <a:rPr lang="en-US" dirty="0" smtClean="0"/>
+              <a:t> </a:t>
+            </a:r>
+            <a:r>
+              <a:rPr lang="en-US" dirty="0" err="1" smtClean="0"/>
+              <a:t>Speicherbedarf</a:t>
+            </a:r>
+            <a:r>
+              <a:rPr lang="en-US" dirty="0" smtClean="0"/>
+              <a:t>)</a:t>
+            </a:r>
+          </a:p>
+          <a:p>
+            <a:r>
+              <a:rPr lang="en-US" dirty="0" smtClean="0"/>
+              <a:t>Worst-case </a:t>
+            </a:r>
+            <a:r>
+              <a:rPr lang="en-US" dirty="0"/>
+              <a:t>O(n</a:t>
+            </a:r>
+            <a:r>
+              <a:rPr lang="en-US" baseline="30000" dirty="0"/>
+              <a:t>2</a:t>
+            </a:r>
+            <a:r>
+              <a:rPr lang="en-US" dirty="0" smtClean="0"/>
+              <a:t>)</a:t>
+            </a:r>
+          </a:p>
+          <a:p>
+            <a:r>
+              <a:rPr lang="en-US" dirty="0" smtClean="0"/>
+              <a:t>Average-case </a:t>
+            </a:r>
+            <a:r>
+              <a:rPr lang="en-US" dirty="0" err="1" smtClean="0"/>
+              <a:t>auch</a:t>
+            </a:r>
+            <a:r>
+              <a:rPr lang="en-US" dirty="0" smtClean="0"/>
+              <a:t> </a:t>
+            </a:r>
+            <a:r>
+              <a:rPr lang="en-US" dirty="0"/>
+              <a:t>O(n</a:t>
+            </a:r>
+            <a:r>
+              <a:rPr lang="en-US" baseline="30000" dirty="0"/>
+              <a:t>2</a:t>
+            </a:r>
+            <a:r>
+              <a:rPr lang="en-US" dirty="0" smtClean="0"/>
+              <a:t>)</a:t>
+            </a:r>
+          </a:p>
+          <a:p>
+            <a:r>
+              <a:rPr lang="en-US" dirty="0" err="1" smtClean="0"/>
+              <a:t>Keine</a:t>
+            </a:r>
+            <a:r>
+              <a:rPr lang="en-US" dirty="0" smtClean="0"/>
+              <a:t> </a:t>
+            </a:r>
+            <a:r>
+              <a:rPr lang="en-US" dirty="0" err="1" smtClean="0"/>
+              <a:t>gute</a:t>
+            </a:r>
+            <a:r>
+              <a:rPr lang="en-US" dirty="0" smtClean="0"/>
+              <a:t> </a:t>
+            </a:r>
+            <a:r>
+              <a:rPr lang="en-US" dirty="0" err="1" smtClean="0"/>
+              <a:t>Eignung</a:t>
+            </a:r>
+            <a:r>
+              <a:rPr lang="en-US" dirty="0"/>
+              <a:t> </a:t>
+            </a:r>
+            <a:r>
+              <a:rPr lang="en-US" dirty="0" smtClean="0"/>
+              <a:t>– </a:t>
+            </a:r>
+            <a:r>
+              <a:rPr lang="en-US" dirty="0" err="1" smtClean="0"/>
+              <a:t>wird</a:t>
+            </a:r>
+            <a:r>
+              <a:rPr lang="en-US" dirty="0" smtClean="0"/>
+              <a:t> am </a:t>
+            </a:r>
+            <a:r>
+              <a:rPr lang="en-US" dirty="0" err="1" smtClean="0"/>
+              <a:t>meistens</a:t>
+            </a:r>
+            <a:r>
+              <a:rPr lang="en-US" dirty="0" smtClean="0"/>
+              <a:t> </a:t>
+            </a:r>
+            <a:r>
+              <a:rPr lang="en-US" dirty="0" err="1" smtClean="0"/>
+              <a:t>zum</a:t>
+            </a:r>
+            <a:r>
+              <a:rPr lang="en-US" dirty="0" smtClean="0"/>
+              <a:t> </a:t>
+            </a:r>
+            <a:r>
+              <a:rPr lang="en-US" dirty="0" err="1" smtClean="0"/>
+              <a:t>Einfachslernen</a:t>
+            </a:r>
+            <a:r>
+              <a:rPr lang="en-US" dirty="0" smtClean="0"/>
+              <a:t> un </a:t>
+            </a:r>
+            <a:r>
+              <a:rPr lang="en-US" dirty="0" err="1" smtClean="0"/>
+              <a:t>Demonstrationen</a:t>
+            </a:r>
+            <a:r>
+              <a:rPr lang="en-US" dirty="0" smtClean="0"/>
+              <a:t> </a:t>
+            </a:r>
+            <a:r>
+              <a:rPr lang="en-US" dirty="0" err="1" smtClean="0"/>
+              <a:t>genutzt</a:t>
+            </a:r>
+            <a:r>
+              <a:rPr lang="en-US" dirty="0" smtClean="0"/>
+              <a:t>.</a:t>
+            </a:r>
+            <a:endParaRPr lang="bg-BG" dirty="0"/>
+          </a:p>
+        </p:txBody>
+      </p:sp>
+    </p:spTree>
+    <p:extLst>
+      <p:ext uri="{BB962C8B-B14F-4D97-AF65-F5344CB8AC3E}">
+        <p14:creationId xmlns:p14="http://schemas.microsoft.com/office/powerpoint/2010/main" val="3773116434"/>
+      </p:ext>
+    </p:extLst>
+  </p:cSld>
+  <p:clrMapOvr>
+    <a:masterClrMapping/>
+  </p:clrMapOvr>
+</p:sld>
+</file>
+
+<file path=ppt/slides/slide27.xml><?xml version="1.0" encoding="utf-8"?>
+<p:sld xmlns:a="http://schemas.openxmlformats.org/drawingml/2006/main" xmlns:r="http://schemas.openxmlformats.org/officeDocument/2006/relationships" xmlns:p="http://schemas.openxmlformats.org/presentationml/2006/main">
+  <p:cSld>
+    <p:spTree>
+      <p:nvGrpSpPr>
+        <p:cNvPr id="1" name=""/>
+        <p:cNvGrpSpPr/>
+        <p:nvPr/>
+      </p:nvGrpSpPr>
+      <p:grpSpPr>
+        <a:xfrm>
+          <a:off x="0" y="0"/>
+          <a:ext cx="0" cy="0"/>
+          <a:chOff x="0" y="0"/>
+          <a:chExt cx="0" cy="0"/>
+        </a:xfrm>
+      </p:grpSpPr>
+      <p:sp>
+        <p:nvSpPr>
+          <p:cNvPr id="2" name="Title 1"/>
+          <p:cNvSpPr>
+            <a:spLocks noGrp="1"/>
+          </p:cNvSpPr>
+          <p:nvPr>
+            <p:ph type="title"/>
+          </p:nvPr>
+        </p:nvSpPr>
+        <p:spPr/>
+        <p:txBody>
+          <a:bodyPr/>
+          <a:lstStyle/>
+          <a:p>
+            <a:r>
+              <a:rPr lang="en-US" dirty="0" err="1" smtClean="0"/>
+              <a:t>Shellsort</a:t>
+            </a:r>
+            <a:r>
+              <a:rPr lang="en-US" dirty="0" smtClean="0"/>
+              <a:t> – </a:t>
+            </a:r>
+            <a:r>
+              <a:rPr lang="en-US" dirty="0" err="1" smtClean="0"/>
+              <a:t>allgemeine</a:t>
+            </a:r>
+            <a:r>
+              <a:rPr lang="en-US" dirty="0" smtClean="0"/>
+              <a:t> </a:t>
+            </a:r>
+            <a:r>
+              <a:rPr lang="en-US" dirty="0" err="1" smtClean="0"/>
+              <a:t>idee</a:t>
+            </a:r>
+            <a:endParaRPr lang="bg-BG" dirty="0"/>
+          </a:p>
+        </p:txBody>
+      </p:sp>
+      <p:sp>
+        <p:nvSpPr>
+          <p:cNvPr id="3" name="Content Placeholder 2"/>
+          <p:cNvSpPr>
+            <a:spLocks noGrp="1"/>
+          </p:cNvSpPr>
+          <p:nvPr>
+            <p:ph idx="1"/>
+          </p:nvPr>
+        </p:nvSpPr>
+        <p:spPr>
+          <a:xfrm>
+            <a:off x="1141412" y="1803400"/>
+            <a:ext cx="9905999" cy="4838699"/>
+          </a:xfrm>
+        </p:spPr>
+        <p:txBody>
+          <a:bodyPr>
+            <a:normAutofit fontScale="85000" lnSpcReduction="20000"/>
+          </a:bodyPr>
+          <a:lstStyle/>
+          <a:p>
+            <a:r>
+              <a:rPr lang="en-US" dirty="0" err="1" smtClean="0"/>
+              <a:t>Arebeitet</a:t>
+            </a:r>
+            <a:r>
+              <a:rPr lang="en-US" dirty="0" smtClean="0"/>
+              <a:t> </a:t>
+            </a:r>
+            <a:r>
+              <a:rPr lang="en-US" dirty="0" err="1" smtClean="0"/>
+              <a:t>nach</a:t>
+            </a:r>
+            <a:r>
+              <a:rPr lang="en-US" dirty="0" smtClean="0"/>
+              <a:t> </a:t>
+            </a:r>
+            <a:r>
+              <a:rPr lang="en-US" dirty="0" err="1" smtClean="0"/>
+              <a:t>dem</a:t>
+            </a:r>
+            <a:r>
+              <a:rPr lang="en-US" dirty="0" smtClean="0"/>
+              <a:t> </a:t>
+            </a:r>
+            <a:r>
+              <a:rPr lang="en-US" dirty="0" err="1" smtClean="0"/>
+              <a:t>Prinzip</a:t>
+            </a:r>
+            <a:r>
+              <a:rPr lang="en-US" dirty="0" smtClean="0"/>
+              <a:t> des </a:t>
+            </a:r>
+            <a:r>
+              <a:rPr lang="en-US" dirty="0" err="1" smtClean="0"/>
+              <a:t>Insertionsorts</a:t>
+            </a:r>
+            <a:r>
+              <a:rPr lang="en-US" dirty="0" smtClean="0"/>
+              <a:t>.</a:t>
+            </a:r>
+          </a:p>
+          <a:p>
+            <a:r>
+              <a:rPr lang="en-US" dirty="0" smtClean="0"/>
+              <a:t>Man </a:t>
+            </a:r>
+            <a:r>
+              <a:rPr lang="en-US" dirty="0" err="1" smtClean="0"/>
+              <a:t>versucht</a:t>
+            </a:r>
+            <a:r>
+              <a:rPr lang="en-US" dirty="0" smtClean="0"/>
+              <a:t> </a:t>
+            </a:r>
+            <a:r>
+              <a:rPr lang="en-US" dirty="0" err="1" smtClean="0"/>
+              <a:t>damit</a:t>
+            </a:r>
+            <a:r>
+              <a:rPr lang="en-US" dirty="0" smtClean="0"/>
+              <a:t> die </a:t>
+            </a:r>
+            <a:r>
+              <a:rPr lang="en-US" dirty="0" err="1" smtClean="0"/>
+              <a:t>Nachteile</a:t>
+            </a:r>
+            <a:r>
+              <a:rPr lang="en-US" dirty="0" smtClean="0"/>
+              <a:t> des </a:t>
+            </a:r>
+            <a:r>
+              <a:rPr lang="en-US" dirty="0" err="1" smtClean="0"/>
+              <a:t>Insertionsorts</a:t>
+            </a:r>
+            <a:r>
+              <a:rPr lang="en-US" dirty="0" smtClean="0"/>
+              <a:t> </a:t>
+            </a:r>
+            <a:r>
+              <a:rPr lang="en-US" dirty="0" err="1" smtClean="0"/>
+              <a:t>zu</a:t>
+            </a:r>
+            <a:r>
+              <a:rPr lang="en-US" dirty="0" smtClean="0"/>
+              <a:t> </a:t>
+            </a:r>
+            <a:r>
+              <a:rPr lang="en-US" dirty="0" err="1" smtClean="0"/>
+              <a:t>vermeiden</a:t>
+            </a:r>
+            <a:r>
+              <a:rPr lang="en-US" dirty="0" smtClean="0"/>
+              <a:t>.</a:t>
+            </a:r>
+          </a:p>
+          <a:p>
+            <a:r>
+              <a:rPr lang="en-US" dirty="0" err="1" smtClean="0"/>
+              <a:t>Ein</a:t>
+            </a:r>
+            <a:r>
+              <a:rPr lang="en-US" dirty="0" smtClean="0"/>
+              <a:t> </a:t>
+            </a:r>
+            <a:r>
+              <a:rPr lang="en-US" dirty="0" err="1" smtClean="0"/>
+              <a:t>solches</a:t>
+            </a:r>
+            <a:r>
+              <a:rPr lang="en-US" dirty="0" smtClean="0"/>
+              <a:t> </a:t>
+            </a:r>
+            <a:r>
+              <a:rPr lang="en-US" dirty="0" err="1" smtClean="0"/>
+              <a:t>Nachteil</a:t>
+            </a:r>
+            <a:r>
+              <a:rPr lang="en-US" dirty="0" smtClean="0"/>
+              <a:t> </a:t>
+            </a:r>
+            <a:r>
+              <a:rPr lang="en-US" dirty="0" err="1" smtClean="0"/>
+              <a:t>ist</a:t>
+            </a:r>
+            <a:r>
+              <a:rPr lang="en-US" dirty="0" smtClean="0"/>
+              <a:t>, </a:t>
+            </a:r>
+            <a:r>
+              <a:rPr lang="en-US" dirty="0" err="1" smtClean="0"/>
+              <a:t>dass</a:t>
+            </a:r>
+            <a:r>
+              <a:rPr lang="en-US" dirty="0" smtClean="0"/>
+              <a:t> </a:t>
+            </a:r>
+            <a:r>
+              <a:rPr lang="en-US" dirty="0" err="1" smtClean="0"/>
+              <a:t>Elementen</a:t>
+            </a:r>
+            <a:r>
+              <a:rPr lang="en-US" dirty="0" smtClean="0"/>
+              <a:t>, die </a:t>
+            </a:r>
+            <a:r>
+              <a:rPr lang="en-US" dirty="0" err="1" smtClean="0"/>
+              <a:t>sich</a:t>
+            </a:r>
+            <a:r>
+              <a:rPr lang="en-US" dirty="0" smtClean="0"/>
+              <a:t> </a:t>
+            </a:r>
+            <a:r>
+              <a:rPr lang="en-US" dirty="0" err="1" smtClean="0"/>
+              <a:t>viel</a:t>
+            </a:r>
+            <a:r>
+              <a:rPr lang="en-US" dirty="0" smtClean="0"/>
+              <a:t> </a:t>
+            </a:r>
+            <a:r>
+              <a:rPr lang="en-US" dirty="0" err="1" smtClean="0"/>
+              <a:t>unterscheiden</a:t>
+            </a:r>
+            <a:r>
+              <a:rPr lang="en-US" dirty="0" smtClean="0"/>
+              <a:t>, </a:t>
+            </a:r>
+            <a:r>
+              <a:rPr lang="en-US" dirty="0" err="1" smtClean="0"/>
+              <a:t>durch</a:t>
+            </a:r>
+            <a:r>
+              <a:rPr lang="en-US" dirty="0" smtClean="0"/>
+              <a:t> </a:t>
+            </a:r>
+            <a:r>
+              <a:rPr lang="en-US" dirty="0" err="1" smtClean="0"/>
+              <a:t>weite</a:t>
+            </a:r>
+            <a:r>
+              <a:rPr lang="en-US" dirty="0" smtClean="0"/>
+              <a:t> </a:t>
+            </a:r>
+            <a:r>
+              <a:rPr lang="en-US" dirty="0" err="1" smtClean="0"/>
+              <a:t>Strecken</a:t>
+            </a:r>
+            <a:r>
+              <a:rPr lang="en-US" dirty="0" smtClean="0"/>
+              <a:t> der </a:t>
+            </a:r>
+            <a:r>
+              <a:rPr lang="en-US" dirty="0" err="1" smtClean="0"/>
+              <a:t>Eingabemenge</a:t>
+            </a:r>
+            <a:r>
+              <a:rPr lang="en-US" dirty="0" smtClean="0"/>
+              <a:t> </a:t>
+            </a:r>
+            <a:r>
+              <a:rPr lang="en-US" dirty="0" err="1" smtClean="0"/>
+              <a:t>verschoben</a:t>
+            </a:r>
+            <a:r>
+              <a:rPr lang="en-US" dirty="0" smtClean="0"/>
+              <a:t> sein </a:t>
+            </a:r>
+            <a:r>
+              <a:rPr lang="en-US" dirty="0" err="1" smtClean="0"/>
+              <a:t>müssen</a:t>
+            </a:r>
+            <a:r>
+              <a:rPr lang="en-US" dirty="0" smtClean="0"/>
+              <a:t>.</a:t>
+            </a:r>
+          </a:p>
+          <a:p>
+            <a:r>
+              <a:rPr lang="en-US" dirty="0" err="1" smtClean="0"/>
+              <a:t>Darum</a:t>
+            </a:r>
+            <a:r>
+              <a:rPr lang="en-US" dirty="0" smtClean="0"/>
+              <a:t> </a:t>
+            </a:r>
+            <a:r>
+              <a:rPr lang="en-US" dirty="0" err="1" smtClean="0"/>
+              <a:t>wird</a:t>
+            </a:r>
+            <a:r>
+              <a:rPr lang="en-US" dirty="0" smtClean="0"/>
+              <a:t> die </a:t>
+            </a:r>
+            <a:r>
+              <a:rPr lang="en-US" dirty="0" err="1" smtClean="0"/>
+              <a:t>Eingabemenge</a:t>
+            </a:r>
+            <a:r>
+              <a:rPr lang="en-US" dirty="0" smtClean="0"/>
+              <a:t> in </a:t>
+            </a:r>
+            <a:r>
+              <a:rPr lang="en-US" dirty="0" err="1" smtClean="0"/>
+              <a:t>kleinere</a:t>
+            </a:r>
+            <a:r>
+              <a:rPr lang="en-US" dirty="0" smtClean="0"/>
+              <a:t> Mengen </a:t>
+            </a:r>
+            <a:r>
+              <a:rPr lang="en-US" dirty="0" err="1" smtClean="0"/>
+              <a:t>unterteilt</a:t>
+            </a:r>
+            <a:r>
+              <a:rPr lang="en-US" dirty="0" smtClean="0"/>
+              <a:t>, </a:t>
+            </a:r>
+            <a:r>
+              <a:rPr lang="en-US" dirty="0" err="1" smtClean="0"/>
+              <a:t>denen</a:t>
+            </a:r>
+            <a:r>
+              <a:rPr lang="en-US" dirty="0" smtClean="0"/>
+              <a:t> </a:t>
+            </a:r>
+            <a:r>
+              <a:rPr lang="en-US" dirty="0" err="1" smtClean="0"/>
+              <a:t>Elementenanzahl</a:t>
+            </a:r>
+            <a:r>
+              <a:rPr lang="en-US" dirty="0" smtClean="0"/>
+              <a:t> </a:t>
+            </a:r>
+            <a:r>
+              <a:rPr lang="en-US" dirty="0" err="1" smtClean="0"/>
+              <a:t>sich</a:t>
+            </a:r>
+            <a:r>
+              <a:rPr lang="en-US" dirty="0" smtClean="0"/>
+              <a:t> </a:t>
+            </a:r>
+            <a:r>
+              <a:rPr lang="en-US" dirty="0" err="1" smtClean="0"/>
+              <a:t>jeder</a:t>
+            </a:r>
+            <a:r>
+              <a:rPr lang="en-US" dirty="0" smtClean="0"/>
+              <a:t> Iteration </a:t>
+            </a:r>
+            <a:r>
+              <a:rPr lang="en-US" dirty="0" err="1" smtClean="0"/>
+              <a:t>unterscheidet</a:t>
+            </a:r>
+            <a:r>
+              <a:rPr lang="en-US" dirty="0" smtClean="0"/>
+              <a:t>. </a:t>
+            </a:r>
+            <a:r>
+              <a:rPr lang="en-US" dirty="0" err="1" smtClean="0"/>
+              <a:t>Diese</a:t>
+            </a:r>
+            <a:r>
+              <a:rPr lang="en-US" dirty="0" smtClean="0"/>
+              <a:t> </a:t>
+            </a:r>
+            <a:r>
+              <a:rPr lang="en-US" dirty="0" err="1" smtClean="0"/>
+              <a:t>Gruppierung</a:t>
+            </a:r>
+            <a:r>
+              <a:rPr lang="en-US" dirty="0" smtClean="0"/>
+              <a:t> </a:t>
+            </a:r>
+            <a:r>
+              <a:rPr lang="en-US" dirty="0" err="1" smtClean="0"/>
+              <a:t>wird</a:t>
+            </a:r>
+            <a:r>
+              <a:rPr lang="en-US" dirty="0" smtClean="0"/>
+              <a:t> </a:t>
+            </a:r>
+            <a:r>
+              <a:rPr lang="en-US" dirty="0" err="1" smtClean="0"/>
+              <a:t>nach</a:t>
+            </a:r>
+            <a:r>
+              <a:rPr lang="en-US" dirty="0" smtClean="0"/>
+              <a:t> der </a:t>
+            </a:r>
+            <a:r>
+              <a:rPr lang="en-US" dirty="0" err="1" smtClean="0"/>
+              <a:t>Distanz</a:t>
+            </a:r>
+            <a:r>
+              <a:rPr lang="en-US" dirty="0" smtClean="0"/>
+              <a:t> </a:t>
+            </a:r>
+            <a:r>
+              <a:rPr lang="en-US" dirty="0" err="1" smtClean="0"/>
+              <a:t>zwischen</a:t>
+            </a:r>
+            <a:r>
+              <a:rPr lang="en-US" dirty="0" smtClean="0"/>
+              <a:t> den </a:t>
+            </a:r>
+            <a:r>
+              <a:rPr lang="en-US" dirty="0" err="1" smtClean="0"/>
+              <a:t>Elementen</a:t>
+            </a:r>
+            <a:r>
+              <a:rPr lang="en-US" dirty="0" smtClean="0"/>
+              <a:t> </a:t>
+            </a:r>
+            <a:r>
+              <a:rPr lang="en-US" dirty="0" err="1" smtClean="0"/>
+              <a:t>ausgeführt</a:t>
+            </a:r>
+            <a:r>
+              <a:rPr lang="en-US" dirty="0" smtClean="0"/>
+              <a:t>. </a:t>
+            </a:r>
+            <a:r>
+              <a:rPr lang="en-US" dirty="0" err="1" smtClean="0"/>
+              <a:t>Diese</a:t>
+            </a:r>
+            <a:r>
+              <a:rPr lang="en-US" dirty="0" smtClean="0"/>
+              <a:t> </a:t>
+            </a:r>
+            <a:r>
+              <a:rPr lang="en-US" dirty="0" err="1" smtClean="0"/>
+              <a:t>Distanz</a:t>
+            </a:r>
+            <a:r>
+              <a:rPr lang="en-US" dirty="0" smtClean="0"/>
+              <a:t> </a:t>
+            </a:r>
+            <a:r>
+              <a:rPr lang="en-US" dirty="0" err="1" smtClean="0"/>
+              <a:t>wird</a:t>
+            </a:r>
+            <a:r>
+              <a:rPr lang="en-US" dirty="0" smtClean="0"/>
+              <a:t> </a:t>
+            </a:r>
+            <a:r>
+              <a:rPr lang="en-US" dirty="0" err="1" smtClean="0"/>
+              <a:t>Faktor</a:t>
+            </a:r>
+            <a:r>
+              <a:rPr lang="en-US" dirty="0" smtClean="0"/>
+              <a:t> </a:t>
+            </a:r>
+            <a:r>
+              <a:rPr lang="en-US" dirty="0" err="1" smtClean="0"/>
+              <a:t>genannt</a:t>
+            </a:r>
+            <a:r>
+              <a:rPr lang="en-US" dirty="0" smtClean="0"/>
+              <a:t>.</a:t>
+            </a:r>
+          </a:p>
+          <a:p>
+            <a:r>
+              <a:rPr lang="en-US" dirty="0" err="1" smtClean="0"/>
+              <a:t>Zum</a:t>
+            </a:r>
+            <a:r>
+              <a:rPr lang="en-US" dirty="0" smtClean="0"/>
+              <a:t> </a:t>
+            </a:r>
+            <a:r>
+              <a:rPr lang="en-US" dirty="0" err="1" smtClean="0"/>
+              <a:t>Beispiel</a:t>
+            </a:r>
+            <a:r>
+              <a:rPr lang="en-US" dirty="0" smtClean="0"/>
+              <a:t> – </a:t>
+            </a:r>
+            <a:r>
+              <a:rPr lang="en-US" dirty="0" err="1" smtClean="0"/>
+              <a:t>Faktor</a:t>
+            </a:r>
+            <a:r>
+              <a:rPr lang="en-US" dirty="0" smtClean="0"/>
+              <a:t> 2 </a:t>
+            </a:r>
+            <a:r>
+              <a:rPr lang="en-US" dirty="0" err="1" smtClean="0"/>
+              <a:t>bedeutet</a:t>
+            </a:r>
+            <a:r>
+              <a:rPr lang="en-US" dirty="0" smtClean="0"/>
+              <a:t>, </a:t>
+            </a:r>
+            <a:r>
+              <a:rPr lang="en-US" dirty="0" err="1" smtClean="0"/>
+              <a:t>dass</a:t>
+            </a:r>
+            <a:r>
+              <a:rPr lang="en-US" dirty="0" smtClean="0"/>
+              <a:t> in </a:t>
+            </a:r>
+            <a:r>
+              <a:rPr lang="en-US" dirty="0" err="1" smtClean="0"/>
+              <a:t>einer</a:t>
+            </a:r>
+            <a:r>
+              <a:rPr lang="en-US" dirty="0" smtClean="0"/>
+              <a:t> </a:t>
+            </a:r>
+            <a:r>
+              <a:rPr lang="en-US" dirty="0" err="1" smtClean="0"/>
+              <a:t>Menge</a:t>
+            </a:r>
+            <a:r>
+              <a:rPr lang="en-US" dirty="0" smtClean="0"/>
+              <a:t> die </a:t>
+            </a:r>
+            <a:r>
+              <a:rPr lang="en-US" dirty="0" err="1" smtClean="0"/>
+              <a:t>Indizes</a:t>
+            </a:r>
+            <a:r>
+              <a:rPr lang="en-US" dirty="0" smtClean="0"/>
+              <a:t> 0,2,4,6 </a:t>
+            </a:r>
+            <a:r>
+              <a:rPr lang="en-US" dirty="0" err="1" smtClean="0"/>
+              <a:t>usw</a:t>
+            </a:r>
+            <a:r>
+              <a:rPr lang="en-US" dirty="0" smtClean="0"/>
+              <a:t>. </a:t>
+            </a:r>
+            <a:r>
+              <a:rPr lang="en-US" dirty="0" err="1" smtClean="0"/>
+              <a:t>Eine</a:t>
+            </a:r>
+            <a:r>
+              <a:rPr lang="en-US" dirty="0" smtClean="0"/>
+              <a:t> </a:t>
+            </a:r>
+            <a:r>
+              <a:rPr lang="en-US" dirty="0" err="1" smtClean="0"/>
+              <a:t>Untermenge</a:t>
+            </a:r>
+            <a:r>
+              <a:rPr lang="en-US" dirty="0" smtClean="0"/>
+              <a:t> </a:t>
+            </a:r>
+            <a:r>
+              <a:rPr lang="en-US" dirty="0" err="1" smtClean="0"/>
+              <a:t>darstellen</a:t>
+            </a:r>
+            <a:r>
+              <a:rPr lang="en-US" dirty="0" smtClean="0"/>
+              <a:t>. Die </a:t>
+            </a:r>
+            <a:r>
+              <a:rPr lang="en-US" dirty="0" err="1" smtClean="0"/>
+              <a:t>andere</a:t>
+            </a:r>
+            <a:r>
+              <a:rPr lang="en-US" dirty="0" smtClean="0"/>
+              <a:t> </a:t>
+            </a:r>
+            <a:r>
+              <a:rPr lang="en-US" dirty="0" err="1" smtClean="0"/>
+              <a:t>Menge</a:t>
+            </a:r>
+            <a:r>
+              <a:rPr lang="en-US" dirty="0" smtClean="0"/>
+              <a:t> </a:t>
+            </a:r>
+            <a:r>
+              <a:rPr lang="en-US" dirty="0" err="1" smtClean="0"/>
+              <a:t>würde</a:t>
+            </a:r>
+            <a:r>
+              <a:rPr lang="en-US" dirty="0" smtClean="0"/>
+              <a:t> </a:t>
+            </a:r>
+            <a:r>
+              <a:rPr lang="en-US" dirty="0" err="1" smtClean="0"/>
+              <a:t>dann</a:t>
+            </a:r>
+            <a:r>
+              <a:rPr lang="en-US" dirty="0" smtClean="0"/>
+              <a:t> 1,3,5,7 </a:t>
+            </a:r>
+            <a:r>
+              <a:rPr lang="en-US" dirty="0" err="1" smtClean="0"/>
+              <a:t>usw</a:t>
+            </a:r>
+            <a:r>
+              <a:rPr lang="en-US" dirty="0" smtClean="0"/>
+              <a:t>.</a:t>
+            </a:r>
+          </a:p>
+          <a:p>
+            <a:r>
+              <a:rPr lang="en-US" dirty="0" smtClean="0"/>
+              <a:t>Die </a:t>
+            </a:r>
+            <a:r>
+              <a:rPr lang="en-US" dirty="0" err="1" smtClean="0"/>
+              <a:t>allgemeine</a:t>
+            </a:r>
+            <a:r>
+              <a:rPr lang="en-US" dirty="0" smtClean="0"/>
+              <a:t> </a:t>
+            </a:r>
+            <a:r>
+              <a:rPr lang="en-US" dirty="0" err="1" smtClean="0"/>
+              <a:t>Idee</a:t>
+            </a:r>
+            <a:r>
+              <a:rPr lang="en-US" dirty="0" smtClean="0"/>
+              <a:t> </a:t>
+            </a:r>
+            <a:r>
+              <a:rPr lang="en-US" dirty="0" err="1" smtClean="0"/>
+              <a:t>ist</a:t>
+            </a:r>
+            <a:r>
+              <a:rPr lang="en-US" dirty="0" smtClean="0"/>
+              <a:t>, die </a:t>
+            </a:r>
+            <a:r>
+              <a:rPr lang="en-US" dirty="0" err="1" smtClean="0"/>
+              <a:t>beliebige</a:t>
+            </a:r>
+            <a:r>
+              <a:rPr lang="en-US" dirty="0" smtClean="0"/>
+              <a:t> </a:t>
+            </a:r>
+            <a:r>
+              <a:rPr lang="en-US" dirty="0" err="1" smtClean="0"/>
+              <a:t>Distanz</a:t>
+            </a:r>
+            <a:r>
+              <a:rPr lang="en-US" dirty="0" smtClean="0"/>
+              <a:t> </a:t>
+            </a:r>
+            <a:r>
+              <a:rPr lang="en-US" dirty="0" err="1" smtClean="0"/>
+              <a:t>zwischen</a:t>
+            </a:r>
+            <a:r>
+              <a:rPr lang="en-US" dirty="0" smtClean="0"/>
+              <a:t> </a:t>
+            </a:r>
+            <a:r>
+              <a:rPr lang="en-US" dirty="0" err="1" smtClean="0"/>
+              <a:t>Elementen</a:t>
+            </a:r>
+            <a:r>
+              <a:rPr lang="en-US" dirty="0" smtClean="0"/>
+              <a:t> </a:t>
+            </a:r>
+            <a:r>
+              <a:rPr lang="en-US" dirty="0" err="1" smtClean="0"/>
+              <a:t>zu</a:t>
+            </a:r>
+            <a:r>
+              <a:rPr lang="en-US" dirty="0" smtClean="0"/>
+              <a:t> </a:t>
+            </a:r>
+            <a:r>
+              <a:rPr lang="en-US" dirty="0" err="1" smtClean="0"/>
+              <a:t>eliminieren</a:t>
+            </a:r>
+            <a:r>
+              <a:rPr lang="en-US" dirty="0" smtClean="0"/>
+              <a:t>, </a:t>
+            </a:r>
+            <a:r>
+              <a:rPr lang="en-US" dirty="0" err="1" smtClean="0"/>
+              <a:t>dann</a:t>
+            </a:r>
+            <a:r>
+              <a:rPr lang="en-US" dirty="0" smtClean="0"/>
+              <a:t> </a:t>
+            </a:r>
+            <a:r>
+              <a:rPr lang="en-US" dirty="0" err="1" smtClean="0"/>
+              <a:t>durch</a:t>
+            </a:r>
+            <a:r>
+              <a:rPr lang="en-US" dirty="0" smtClean="0"/>
+              <a:t> </a:t>
+            </a:r>
+            <a:r>
+              <a:rPr lang="en-US" dirty="0" err="1" smtClean="0"/>
+              <a:t>normales</a:t>
+            </a:r>
+            <a:r>
+              <a:rPr lang="en-US" dirty="0" smtClean="0"/>
+              <a:t> </a:t>
+            </a:r>
+            <a:r>
+              <a:rPr lang="en-US" dirty="0" err="1" smtClean="0"/>
+              <a:t>Insertionsort</a:t>
+            </a:r>
+            <a:r>
+              <a:rPr lang="en-US" dirty="0" smtClean="0"/>
+              <a:t> die </a:t>
+            </a:r>
+            <a:r>
+              <a:rPr lang="en-US" dirty="0" err="1" smtClean="0"/>
+              <a:t>Arbeit</a:t>
+            </a:r>
+            <a:r>
+              <a:rPr lang="en-US" dirty="0" smtClean="0"/>
+              <a:t> </a:t>
+            </a:r>
+            <a:r>
+              <a:rPr lang="en-US" dirty="0" err="1" smtClean="0"/>
+              <a:t>abzuschließen</a:t>
+            </a:r>
+            <a:r>
+              <a:rPr lang="en-US" dirty="0" smtClean="0"/>
+              <a:t>.</a:t>
+            </a:r>
+          </a:p>
+          <a:p>
+            <a:r>
+              <a:rPr lang="en-US" dirty="0" err="1" smtClean="0"/>
+              <a:t>Im</a:t>
+            </a:r>
+            <a:r>
+              <a:rPr lang="en-US" dirty="0" smtClean="0"/>
+              <a:t> </a:t>
+            </a:r>
+            <a:r>
+              <a:rPr lang="en-US" dirty="0" err="1" smtClean="0"/>
+              <a:t>Praktikum</a:t>
+            </a:r>
+            <a:r>
+              <a:rPr lang="en-US" dirty="0" smtClean="0"/>
+              <a:t> </a:t>
+            </a:r>
+            <a:r>
+              <a:rPr lang="en-US" dirty="0" err="1" smtClean="0"/>
+              <a:t>benutzt</a:t>
+            </a:r>
+            <a:r>
+              <a:rPr lang="en-US" dirty="0" smtClean="0"/>
+              <a:t> man </a:t>
+            </a:r>
+            <a:r>
+              <a:rPr lang="en-US" dirty="0" err="1" smtClean="0"/>
+              <a:t>bekannte</a:t>
+            </a:r>
+            <a:r>
+              <a:rPr lang="en-US" dirty="0" smtClean="0"/>
+              <a:t> </a:t>
+            </a:r>
+            <a:r>
+              <a:rPr lang="en-US" dirty="0" err="1" smtClean="0"/>
+              <a:t>Distanzfolgen</a:t>
+            </a:r>
+            <a:r>
+              <a:rPr lang="en-US" dirty="0" smtClean="0"/>
+              <a:t>, und der Wahl </a:t>
+            </a:r>
+            <a:r>
+              <a:rPr lang="en-US" dirty="0" err="1" smtClean="0"/>
+              <a:t>einer</a:t>
+            </a:r>
+            <a:r>
+              <a:rPr lang="en-US" dirty="0" smtClean="0"/>
+              <a:t> </a:t>
+            </a:r>
+            <a:r>
+              <a:rPr lang="en-US" dirty="0" err="1" smtClean="0"/>
+              <a:t>korrekten</a:t>
+            </a:r>
+            <a:r>
+              <a:rPr lang="en-US" dirty="0" smtClean="0"/>
+              <a:t> </a:t>
+            </a:r>
+            <a:r>
+              <a:rPr lang="en-US" dirty="0" err="1" smtClean="0"/>
+              <a:t>Distanzfolge</a:t>
+            </a:r>
+            <a:r>
+              <a:rPr lang="en-US" dirty="0" smtClean="0"/>
+              <a:t> </a:t>
+            </a:r>
+            <a:r>
+              <a:rPr lang="en-US" dirty="0" err="1" smtClean="0"/>
+              <a:t>ist</a:t>
+            </a:r>
+            <a:r>
+              <a:rPr lang="en-US" dirty="0" smtClean="0"/>
+              <a:t> </a:t>
+            </a:r>
+            <a:r>
+              <a:rPr lang="en-US" dirty="0" err="1" smtClean="0"/>
+              <a:t>kritisch</a:t>
+            </a:r>
+            <a:r>
+              <a:rPr lang="en-US" dirty="0" smtClean="0"/>
+              <a:t> </a:t>
+            </a:r>
+            <a:r>
+              <a:rPr lang="en-US" dirty="0" err="1" smtClean="0"/>
+              <a:t>zum</a:t>
+            </a:r>
+            <a:r>
+              <a:rPr lang="en-US" dirty="0" smtClean="0"/>
+              <a:t> </a:t>
+            </a:r>
+            <a:r>
+              <a:rPr lang="en-US" dirty="0" err="1" smtClean="0"/>
+              <a:t>Prozess</a:t>
+            </a:r>
+            <a:r>
+              <a:rPr lang="en-US" dirty="0" smtClean="0"/>
+              <a:t>.</a:t>
+            </a:r>
+            <a:endParaRPr lang="bg-BG" dirty="0"/>
+          </a:p>
+        </p:txBody>
+      </p:sp>
+    </p:spTree>
+    <p:extLst>
+      <p:ext uri="{BB962C8B-B14F-4D97-AF65-F5344CB8AC3E}">
+        <p14:creationId xmlns:p14="http://schemas.microsoft.com/office/powerpoint/2010/main" val="3932632043"/>
+      </p:ext>
+    </p:extLst>
+  </p:cSld>
+  <p:clrMapOvr>
+    <a:masterClrMapping/>
+  </p:clrMapOvr>
+</p:sld>
+</file>
+
+<file path=ppt/slides/slide28.xml><?xml version="1.0" encoding="utf-8"?>
+<p:sld xmlns:a="http://schemas.openxmlformats.org/drawingml/2006/main" xmlns:r="http://schemas.openxmlformats.org/officeDocument/2006/relationships" xmlns:p="http://schemas.openxmlformats.org/presentationml/2006/main">
+  <p:cSld>
+    <p:spTree>
+      <p:nvGrpSpPr>
+        <p:cNvPr id="1" name=""/>
+        <p:cNvGrpSpPr/>
+        <p:nvPr/>
+      </p:nvGrpSpPr>
+      <p:grpSpPr>
+        <a:xfrm>
+          <a:off x="0" y="0"/>
+          <a:ext cx="0" cy="0"/>
+          <a:chOff x="0" y="0"/>
+          <a:chExt cx="0" cy="0"/>
+        </a:xfrm>
+      </p:grpSpPr>
+      <p:sp>
+        <p:nvSpPr>
+          <p:cNvPr id="2" name="Title 1"/>
+          <p:cNvSpPr>
+            <a:spLocks noGrp="1"/>
+          </p:cNvSpPr>
+          <p:nvPr>
+            <p:ph type="title"/>
+          </p:nvPr>
+        </p:nvSpPr>
+        <p:spPr/>
+        <p:txBody>
+          <a:bodyPr/>
+          <a:lstStyle/>
+          <a:p>
+            <a:r>
+              <a:rPr lang="en-US" dirty="0" err="1" smtClean="0"/>
+              <a:t>Shellsort</a:t>
+            </a:r>
+            <a:r>
+              <a:rPr lang="en-US" dirty="0" smtClean="0"/>
+              <a:t> – </a:t>
+            </a:r>
+            <a:r>
+              <a:rPr lang="en-US" dirty="0" err="1" smtClean="0"/>
+              <a:t>pseudocode</a:t>
+            </a:r>
+            <a:r>
+              <a:rPr lang="en-US" dirty="0" smtClean="0"/>
+              <a:t> und </a:t>
+            </a:r>
+            <a:r>
+              <a:rPr lang="en-US" dirty="0" err="1" smtClean="0"/>
+              <a:t>c++</a:t>
+            </a:r>
+            <a:endParaRPr lang="bg-BG" dirty="0"/>
+          </a:p>
+        </p:txBody>
+      </p:sp>
+      <p:pic>
+        <p:nvPicPr>
+          <p:cNvPr id="4" name="Content Placeholder 3"/>
+          <p:cNvPicPr>
+            <a:picLocks noGrp="1" noChangeAspect="1"/>
+          </p:cNvPicPr>
+          <p:nvPr>
+            <p:ph idx="1"/>
+          </p:nvPr>
+        </p:nvPicPr>
+        <p:blipFill>
+          <a:blip r:embed="rId2">
+            <a:extLst>
+              <a:ext uri="{28A0092B-C50C-407E-A947-70E740481C1C}">
+                <a14:useLocalDpi xmlns:a14="http://schemas.microsoft.com/office/drawing/2010/main" val="0"/>
+              </a:ext>
+            </a:extLst>
+          </a:blip>
+          <a:stretch>
+            <a:fillRect/>
+          </a:stretch>
+        </p:blipFill>
+        <p:spPr>
+          <a:xfrm>
+            <a:off x="232742" y="1652588"/>
+            <a:ext cx="5258534" cy="2638793"/>
+          </a:xfrm>
+        </p:spPr>
+      </p:pic>
+      <p:pic>
+        <p:nvPicPr>
+          <p:cNvPr id="7" name="Picture 6"/>
+          <p:cNvPicPr>
+            <a:picLocks noChangeAspect="1"/>
+          </p:cNvPicPr>
+          <p:nvPr/>
+        </p:nvPicPr>
+        <p:blipFill>
+          <a:blip r:embed="rId3">
+            <a:extLst>
+              <a:ext uri="{28A0092B-C50C-407E-A947-70E740481C1C}">
+                <a14:useLocalDpi xmlns:a14="http://schemas.microsoft.com/office/drawing/2010/main" val="0"/>
+              </a:ext>
+            </a:extLst>
+          </a:blip>
+          <a:stretch>
+            <a:fillRect/>
+          </a:stretch>
+        </p:blipFill>
+        <p:spPr>
+          <a:xfrm>
+            <a:off x="4704462" y="3655798"/>
+            <a:ext cx="7173326" cy="3077004"/>
+          </a:xfrm>
+          <a:prstGeom prst="rect">
+            <a:avLst/>
+          </a:prstGeom>
+        </p:spPr>
+      </p:pic>
+    </p:spTree>
+    <p:extLst>
+      <p:ext uri="{BB962C8B-B14F-4D97-AF65-F5344CB8AC3E}">
+        <p14:creationId xmlns:p14="http://schemas.microsoft.com/office/powerpoint/2010/main" val="3400477779"/>
+      </p:ext>
+    </p:extLst>
+  </p:cSld>
+  <p:clrMapOvr>
+    <a:masterClrMapping/>
+  </p:clrMapOvr>
+</p:sld>
+</file>
+
+<file path=ppt/slides/slide29.xml><?xml version="1.0" encoding="utf-8"?>
+<p:sld xmlns:a="http://schemas.openxmlformats.org/drawingml/2006/main" xmlns:r="http://schemas.openxmlformats.org/officeDocument/2006/relationships" xmlns:p="http://schemas.openxmlformats.org/presentationml/2006/main">
+  <p:cSld>
+    <p:spTree>
+      <p:nvGrpSpPr>
+        <p:cNvPr id="1" name=""/>
+        <p:cNvGrpSpPr/>
+        <p:nvPr/>
+      </p:nvGrpSpPr>
+      <p:grpSpPr>
+        <a:xfrm>
+          <a:off x="0" y="0"/>
+          <a:ext cx="0" cy="0"/>
+          <a:chOff x="0" y="0"/>
+          <a:chExt cx="0" cy="0"/>
+        </a:xfrm>
+      </p:grpSpPr>
+      <p:sp>
+        <p:nvSpPr>
+          <p:cNvPr id="2" name="Title 1"/>
+          <p:cNvSpPr>
+            <a:spLocks noGrp="1"/>
+          </p:cNvSpPr>
+          <p:nvPr>
+            <p:ph type="title"/>
+          </p:nvPr>
+        </p:nvSpPr>
+        <p:spPr/>
+        <p:txBody>
+          <a:bodyPr/>
+          <a:lstStyle/>
+          <a:p>
+            <a:r>
+              <a:rPr lang="en-US" dirty="0" err="1" smtClean="0"/>
+              <a:t>Shellsort</a:t>
+            </a:r>
+            <a:r>
+              <a:rPr lang="en-US" dirty="0" smtClean="0"/>
+              <a:t> - </a:t>
+            </a:r>
+            <a:r>
+              <a:rPr lang="en-US" dirty="0" err="1" smtClean="0"/>
+              <a:t>eigenschaften</a:t>
+            </a:r>
+            <a:endParaRPr lang="bg-BG" dirty="0"/>
+          </a:p>
+        </p:txBody>
+      </p:sp>
+      <mc:AlternateContent xmlns:mc="http://schemas.openxmlformats.org/markup-compatibility/2006">
+        <mc:Choice xmlns:a14="http://schemas.microsoft.com/office/drawing/2010/main" Requires="a14">
+          <p:sp>
+            <p:nvSpPr>
+              <p:cNvPr id="3" name="Content Placeholder 2"/>
+              <p:cNvSpPr>
+                <a:spLocks noGrp="1"/>
+              </p:cNvSpPr>
+              <p:nvPr>
+                <p:ph idx="1"/>
+              </p:nvPr>
+            </p:nvSpPr>
+            <p:spPr/>
+            <p:txBody>
+              <a:bodyPr>
+                <a:normAutofit fontScale="92500" lnSpcReduction="20000"/>
+              </a:bodyPr>
+              <a:lstStyle/>
+              <a:p>
+                <a:r>
+                  <a:rPr lang="en-US" dirty="0" smtClean="0"/>
+                  <a:t>Komlexität </a:t>
+                </a:r>
+                <a:r>
+                  <a:rPr lang="en-US" dirty="0" err="1" smtClean="0"/>
+                  <a:t>hängt</a:t>
+                </a:r>
+                <a:r>
+                  <a:rPr lang="en-US" dirty="0" smtClean="0"/>
+                  <a:t> von der </a:t>
+                </a:r>
+                <a:r>
+                  <a:rPr lang="en-US" dirty="0" err="1" smtClean="0"/>
+                  <a:t>Sequenz</a:t>
+                </a:r>
+                <a:r>
+                  <a:rPr lang="en-US" dirty="0" smtClean="0"/>
+                  <a:t>, die man </a:t>
+                </a:r>
+                <a:r>
+                  <a:rPr lang="en-US" dirty="0" err="1" smtClean="0"/>
+                  <a:t>benuzt</a:t>
+                </a:r>
+                <a:r>
+                  <a:rPr lang="en-US" dirty="0" smtClean="0"/>
+                  <a:t>. </a:t>
+                </a:r>
+                <a:r>
+                  <a:rPr lang="en-US" dirty="0" err="1" smtClean="0"/>
+                  <a:t>Es</a:t>
+                </a:r>
+                <a:r>
+                  <a:rPr lang="en-US" dirty="0" smtClean="0"/>
+                  <a:t> </a:t>
+                </a:r>
+                <a:r>
+                  <a:rPr lang="en-US" dirty="0" err="1" smtClean="0"/>
+                  <a:t>gibt</a:t>
+                </a:r>
+                <a:r>
+                  <a:rPr lang="en-US" dirty="0" smtClean="0"/>
+                  <a:t> </a:t>
+                </a:r>
+                <a:r>
+                  <a:rPr lang="en-US" dirty="0" err="1" smtClean="0"/>
+                  <a:t>viele</a:t>
+                </a:r>
+                <a:r>
+                  <a:rPr lang="en-US" dirty="0" smtClean="0"/>
+                  <a:t> </a:t>
+                </a:r>
+                <a:r>
+                  <a:rPr lang="en-US" dirty="0" err="1" smtClean="0"/>
+                  <a:t>bekannte</a:t>
+                </a:r>
+                <a:r>
+                  <a:rPr lang="en-US" dirty="0" smtClean="0"/>
+                  <a:t> </a:t>
+                </a:r>
+                <a:r>
+                  <a:rPr lang="en-US" dirty="0" err="1" smtClean="0"/>
+                  <a:t>Folgen</a:t>
+                </a:r>
+                <a:r>
+                  <a:rPr lang="en-US" dirty="0" smtClean="0"/>
+                  <a:t>, </a:t>
+                </a:r>
+                <a:r>
+                  <a:rPr lang="en-US" dirty="0" err="1" smtClean="0"/>
+                  <a:t>wie</a:t>
+                </a:r>
+                <a:r>
+                  <a:rPr lang="en-US" dirty="0" smtClean="0"/>
+                  <a:t> die Donald Shell </a:t>
+                </a:r>
+                <a:r>
+                  <a:rPr lang="en-US" dirty="0" err="1" smtClean="0"/>
+                  <a:t>Folge</a:t>
+                </a:r>
+                <a:r>
+                  <a:rPr lang="en-US" dirty="0" smtClean="0"/>
+                  <a:t> {1,2,4,8..2</a:t>
+                </a:r>
+                <a:r>
+                  <a:rPr lang="en-US" baseline="30000" dirty="0" smtClean="0"/>
+                  <a:t>k</a:t>
+                </a:r>
+                <a:r>
+                  <a:rPr lang="en-US" dirty="0" smtClean="0"/>
+                  <a:t>}, die </a:t>
+                </a:r>
+                <a:r>
+                  <a:rPr lang="en-US" dirty="0"/>
+                  <a:t>O(n</a:t>
+                </a:r>
+                <a:r>
+                  <a:rPr lang="en-US" baseline="30000" dirty="0"/>
+                  <a:t>2</a:t>
+                </a:r>
+                <a:r>
+                  <a:rPr lang="en-US" dirty="0" smtClean="0"/>
+                  <a:t>)</a:t>
+                </a:r>
+                <a:r>
+                  <a:rPr lang="en-US" dirty="0"/>
+                  <a:t> </a:t>
+                </a:r>
+                <a:r>
+                  <a:rPr lang="en-US" dirty="0" err="1"/>
+                  <a:t>Komlexität</a:t>
+                </a:r>
+                <a:r>
+                  <a:rPr lang="en-US" dirty="0"/>
+                  <a:t> </a:t>
+                </a:r>
+                <a:r>
+                  <a:rPr lang="en-US" dirty="0" err="1" smtClean="0"/>
+                  <a:t>bezeigt</a:t>
+                </a:r>
+                <a:r>
+                  <a:rPr lang="en-US" dirty="0" smtClean="0"/>
+                  <a:t>.</a:t>
+                </a:r>
+              </a:p>
+              <a:p>
+                <a:r>
+                  <a:rPr lang="en-US" dirty="0" err="1" smtClean="0"/>
+                  <a:t>Es</a:t>
+                </a:r>
+                <a:r>
+                  <a:rPr lang="en-US" dirty="0" smtClean="0"/>
+                  <a:t> </a:t>
+                </a:r>
+                <a:r>
+                  <a:rPr lang="en-US" dirty="0" err="1" smtClean="0"/>
+                  <a:t>gibt</a:t>
+                </a:r>
+                <a:r>
+                  <a:rPr lang="en-US" dirty="0" smtClean="0"/>
+                  <a:t> </a:t>
+                </a:r>
+                <a:r>
+                  <a:rPr lang="en-US" dirty="0" err="1" smtClean="0"/>
+                  <a:t>solche</a:t>
+                </a:r>
+                <a:r>
+                  <a:rPr lang="en-US" dirty="0" smtClean="0"/>
+                  <a:t> </a:t>
+                </a:r>
+                <a:r>
+                  <a:rPr lang="en-US" dirty="0" err="1" smtClean="0"/>
+                  <a:t>Folgen</a:t>
+                </a:r>
+                <a:r>
+                  <a:rPr lang="en-US" dirty="0" smtClean="0"/>
+                  <a:t>, die </a:t>
+                </a:r>
+                <a:r>
+                  <a:rPr lang="en-US" dirty="0" err="1" smtClean="0"/>
+                  <a:t>seht</a:t>
+                </a:r>
+                <a:r>
+                  <a:rPr lang="en-US" dirty="0" smtClean="0"/>
+                  <a:t> </a:t>
+                </a:r>
+                <a:r>
+                  <a:rPr lang="en-US" dirty="0" err="1" smtClean="0"/>
+                  <a:t>effizient</a:t>
+                </a:r>
+                <a:r>
+                  <a:rPr lang="en-US" dirty="0" smtClean="0"/>
+                  <a:t> </a:t>
+                </a:r>
+                <a:r>
+                  <a:rPr lang="en-US" dirty="0" err="1" smtClean="0"/>
+                  <a:t>arbeiten</a:t>
+                </a:r>
+                <a:r>
+                  <a:rPr lang="en-US" dirty="0" smtClean="0"/>
+                  <a:t>, </a:t>
+                </a:r>
+                <a:r>
+                  <a:rPr lang="en-US" dirty="0" err="1" smtClean="0"/>
+                  <a:t>aber</a:t>
+                </a:r>
+                <a:r>
+                  <a:rPr lang="en-US" dirty="0" smtClean="0"/>
+                  <a:t> </a:t>
+                </a:r>
+                <a:r>
+                  <a:rPr lang="en-US" dirty="0" err="1" smtClean="0"/>
+                  <a:t>es</a:t>
+                </a:r>
+                <a:r>
+                  <a:rPr lang="en-US" dirty="0" smtClean="0"/>
+                  <a:t> </a:t>
+                </a:r>
+                <a:r>
+                  <a:rPr lang="en-US" dirty="0" err="1" smtClean="0"/>
+                  <a:t>ist</a:t>
+                </a:r>
+                <a:r>
+                  <a:rPr lang="en-US" dirty="0" smtClean="0"/>
+                  <a:t> </a:t>
+                </a:r>
+                <a:r>
+                  <a:rPr lang="en-US" dirty="0" err="1" smtClean="0"/>
+                  <a:t>nicht</a:t>
+                </a:r>
+                <a:r>
+                  <a:rPr lang="en-US" dirty="0" smtClean="0"/>
+                  <a:t> </a:t>
+                </a:r>
+                <a:r>
+                  <a:rPr lang="en-US" dirty="0" err="1" smtClean="0"/>
+                  <a:t>bekannt</a:t>
+                </a:r>
+                <a:r>
+                  <a:rPr lang="en-US" dirty="0" smtClean="0"/>
+                  <a:t> </a:t>
+                </a:r>
+                <a:r>
+                  <a:rPr lang="en-US" dirty="0" err="1" smtClean="0"/>
+                  <a:t>warum</a:t>
+                </a:r>
+                <a:r>
+                  <a:rPr lang="en-US" dirty="0" smtClean="0"/>
+                  <a:t>. </a:t>
+                </a:r>
+                <a:r>
+                  <a:rPr lang="en-US" dirty="0" err="1" smtClean="0"/>
+                  <a:t>Eine</a:t>
+                </a:r>
+                <a:r>
+                  <a:rPr lang="en-US" dirty="0" smtClean="0"/>
+                  <a:t> </a:t>
+                </a:r>
+                <a:r>
+                  <a:rPr lang="en-US" dirty="0" err="1" smtClean="0"/>
+                  <a:t>solche</a:t>
+                </a:r>
+                <a:r>
+                  <a:rPr lang="en-US" dirty="0" smtClean="0"/>
+                  <a:t> </a:t>
+                </a:r>
+                <a:r>
+                  <a:rPr lang="en-US" dirty="0" err="1" smtClean="0"/>
+                  <a:t>Folge</a:t>
+                </a:r>
+                <a:r>
+                  <a:rPr lang="en-US" dirty="0" smtClean="0"/>
+                  <a:t> </a:t>
+                </a:r>
+                <a:r>
+                  <a:rPr lang="en-US" dirty="0" err="1" smtClean="0"/>
+                  <a:t>ist</a:t>
+                </a:r>
+                <a:r>
+                  <a:rPr lang="en-US" dirty="0" smtClean="0"/>
+                  <a:t> die </a:t>
+                </a:r>
+                <a:r>
+                  <a:rPr lang="en-US" dirty="0" err="1" smtClean="0"/>
+                  <a:t>Ciura-Folge</a:t>
+                </a:r>
+                <a:r>
+                  <a:rPr lang="en-US" dirty="0"/>
+                  <a:t> {</a:t>
+                </a:r>
+                <a:r>
+                  <a:rPr lang="en-US" dirty="0" smtClean="0"/>
+                  <a:t>701,301,132,57,23,10,4,1}</a:t>
+                </a:r>
+              </a:p>
+              <a:p>
+                <a:r>
+                  <a:rPr lang="en-US" dirty="0" smtClean="0"/>
+                  <a:t>Die </a:t>
+                </a:r>
+                <a:r>
+                  <a:rPr lang="en-US" dirty="0" err="1" smtClean="0"/>
+                  <a:t>beste</a:t>
+                </a:r>
+                <a:r>
+                  <a:rPr lang="en-US" dirty="0" smtClean="0"/>
+                  <a:t> </a:t>
+                </a:r>
+                <a:r>
+                  <a:rPr lang="en-US" dirty="0" err="1" smtClean="0"/>
+                  <a:t>Folge</a:t>
+                </a:r>
+                <a:r>
+                  <a:rPr lang="en-US" dirty="0" smtClean="0"/>
+                  <a:t> </a:t>
+                </a:r>
+                <a:r>
+                  <a:rPr lang="en-US" dirty="0" err="1" smtClean="0"/>
+                  <a:t>im</a:t>
+                </a:r>
+                <a:r>
+                  <a:rPr lang="en-US" dirty="0" smtClean="0"/>
+                  <a:t> </a:t>
+                </a:r>
+                <a:r>
+                  <a:rPr lang="en-US" dirty="0" err="1" smtClean="0"/>
+                  <a:t>Praktikum</a:t>
+                </a:r>
+                <a:r>
+                  <a:rPr lang="en-US" dirty="0" smtClean="0"/>
+                  <a:t> </a:t>
+                </a:r>
+                <a:r>
+                  <a:rPr lang="en-US" dirty="0" err="1" smtClean="0"/>
+                  <a:t>besteht</a:t>
+                </a:r>
+                <a:r>
+                  <a:rPr lang="en-US" dirty="0" smtClean="0"/>
+                  <a:t> die </a:t>
+                </a:r>
+                <a:r>
+                  <a:rPr lang="en-US" dirty="0" err="1" smtClean="0"/>
+                  <a:t>Tokuda-Folge</a:t>
+                </a:r>
+                <a:r>
+                  <a:rPr lang="en-US" dirty="0" smtClean="0"/>
+                  <a:t>, die </a:t>
+                </a:r>
+                <a:r>
+                  <a:rPr lang="en-US" dirty="0" err="1" smtClean="0"/>
+                  <a:t>mit</a:t>
+                </a:r>
+                <a:r>
+                  <a:rPr lang="en-US" dirty="0" smtClean="0"/>
+                  <a:t> der </a:t>
+                </a:r>
+                <a:r>
+                  <a:rPr lang="en-US" dirty="0" err="1" smtClean="0"/>
+                  <a:t>Formel</a:t>
+                </a:r>
+                <a:r>
+                  <a:rPr lang="en-US" dirty="0" smtClean="0"/>
+                  <a:t> </a:t>
+                </a:r>
+                <a14:m>
+                  <m:oMath xmlns:m="http://schemas.openxmlformats.org/officeDocument/2006/math">
+                    <m:f>
+                      <m:fPr>
+                        <m:ctrlPr>
+                          <a:rPr lang="en-US" i="1" smtClean="0">
+                            <a:latin typeface="Cambria Math" panose="02040503050406030204" pitchFamily="18" charset="0"/>
+                          </a:rPr>
+                        </m:ctrlPr>
+                      </m:fPr>
+                      <m:num>
+                        <m:r>
+                          <a:rPr lang="en-US" b="0" i="1" smtClean="0">
+                            <a:latin typeface="Cambria Math" panose="02040503050406030204" pitchFamily="18" charset="0"/>
+                          </a:rPr>
+                          <m:t>9</m:t>
+                        </m:r>
+                        <m:r>
+                          <a:rPr lang="en-US" b="0" i="1" baseline="30000" smtClean="0">
+                            <a:latin typeface="Cambria Math" panose="02040503050406030204" pitchFamily="18" charset="0"/>
+                          </a:rPr>
+                          <m:t>𝑘</m:t>
+                        </m:r>
+                        <m:r>
+                          <a:rPr lang="en-US" b="0" i="1" smtClean="0">
+                            <a:latin typeface="Cambria Math" panose="02040503050406030204" pitchFamily="18" charset="0"/>
+                          </a:rPr>
+                          <m:t>−4</m:t>
+                        </m:r>
+                        <m:r>
+                          <a:rPr lang="en-US" i="1" baseline="30000">
+                            <a:latin typeface="Cambria Math" panose="02040503050406030204" pitchFamily="18" charset="0"/>
+                          </a:rPr>
+                          <m:t>𝑘</m:t>
+                        </m:r>
+                      </m:num>
+                      <m:den>
+                        <m:r>
+                          <a:rPr lang="en-US" b="0" i="1" smtClean="0">
+                            <a:latin typeface="Cambria Math" panose="02040503050406030204" pitchFamily="18" charset="0"/>
+                          </a:rPr>
+                          <m:t>5∗4</m:t>
+                        </m:r>
+                        <m:r>
+                          <a:rPr lang="en-US" i="1" baseline="30000">
+                            <a:latin typeface="Cambria Math" panose="02040503050406030204" pitchFamily="18" charset="0"/>
+                          </a:rPr>
+                          <m:t>𝑘</m:t>
+                        </m:r>
+                        <m:r>
+                          <a:rPr lang="en-US" b="0" i="1" baseline="30000" smtClean="0">
+                            <a:latin typeface="Cambria Math" panose="02040503050406030204" pitchFamily="18" charset="0"/>
+                          </a:rPr>
+                          <m:t>−1</m:t>
+                        </m:r>
+                      </m:den>
+                    </m:f>
+                  </m:oMath>
+                </a14:m>
+                <a:r>
+                  <a:rPr lang="en-US" dirty="0" smtClean="0"/>
+                  <a:t> </a:t>
+                </a:r>
+                <a:r>
+                  <a:rPr lang="en-US" dirty="0" err="1" smtClean="0"/>
+                  <a:t>dargestellt</a:t>
+                </a:r>
+                <a:r>
+                  <a:rPr lang="en-US" dirty="0" smtClean="0"/>
+                  <a:t> </a:t>
+                </a:r>
+                <a:r>
+                  <a:rPr lang="en-US" dirty="0" err="1" smtClean="0"/>
+                  <a:t>wird</a:t>
+                </a:r>
+                <a:r>
+                  <a:rPr lang="en-US" smtClean="0"/>
+                  <a:t>.</a:t>
+                </a:r>
+                <a:endParaRPr lang="en-US" dirty="0" smtClean="0"/>
+              </a:p>
+              <a:p>
+                <a:r>
+                  <a:rPr lang="en-US" dirty="0" err="1" smtClean="0"/>
+                  <a:t>Arbeitet</a:t>
+                </a:r>
+                <a:r>
+                  <a:rPr lang="en-US" dirty="0" smtClean="0"/>
+                  <a:t> in-place.</a:t>
+                </a:r>
+              </a:p>
+              <a:p>
+                <a:r>
+                  <a:rPr lang="en-US" dirty="0" err="1" smtClean="0"/>
+                  <a:t>Ist</a:t>
+                </a:r>
+                <a:r>
+                  <a:rPr lang="en-US" dirty="0" smtClean="0"/>
+                  <a:t> </a:t>
+                </a:r>
+                <a:r>
+                  <a:rPr lang="en-US" dirty="0" err="1" smtClean="0"/>
+                  <a:t>nicht</a:t>
+                </a:r>
+                <a:r>
+                  <a:rPr lang="en-US" dirty="0" smtClean="0"/>
+                  <a:t> </a:t>
+                </a:r>
+                <a:r>
+                  <a:rPr lang="en-US" dirty="0" err="1" smtClean="0"/>
+                  <a:t>stabil</a:t>
+                </a:r>
+                <a:r>
+                  <a:rPr lang="en-US" dirty="0" smtClean="0"/>
+                  <a:t>.</a:t>
+                </a:r>
+                <a:endParaRPr lang="en-US" dirty="0"/>
+              </a:p>
+            </p:txBody>
+          </p:sp>
+        </mc:Choice>
+        <mc:Fallback>
+          <p:sp>
+            <p:nvSpPr>
+              <p:cNvPr id="3" name="Content Placeholder 2"/>
+              <p:cNvSpPr>
+                <a:spLocks noGrp="1" noRot="1" noChangeAspect="1" noMove="1" noResize="1" noEditPoints="1" noAdjustHandles="1" noChangeArrowheads="1" noChangeShapeType="1" noTextEdit="1"/>
+              </p:cNvSpPr>
+              <p:nvPr>
+                <p:ph idx="1"/>
+              </p:nvPr>
+            </p:nvSpPr>
+            <p:spPr>
+              <a:blipFill rotWithShape="0">
+                <a:blip r:embed="rId2"/>
+                <a:stretch>
+                  <a:fillRect l="-1046" t="-3098" b="-1033"/>
+                </a:stretch>
+              </a:blipFill>
+            </p:spPr>
+            <p:txBody>
+              <a:bodyPr/>
+              <a:lstStyle/>
+              <a:p>
+                <a:r>
+                  <a:rPr lang="bg-BG">
+                    <a:noFill/>
+                  </a:rPr>
+                  <a:t> </a:t>
+                </a:r>
+              </a:p>
+            </p:txBody>
+          </p:sp>
+        </mc:Fallback>
+      </mc:AlternateContent>
+    </p:spTree>
+    <p:extLst>
+      <p:ext uri="{BB962C8B-B14F-4D97-AF65-F5344CB8AC3E}">
+        <p14:creationId xmlns:p14="http://schemas.microsoft.com/office/powerpoint/2010/main" val="3621732285"/>
+      </p:ext>
+    </p:extLst>
+  </p:cSld>
+  <p:clrMapOvr>
+    <a:masterClrMapping/>
+  </p:clrMapOvr>
 </p:sld>
 </file>
 

</xml_diff>

<commit_message>
Added Combsort to docs and source
</commit_message>
<xml_diff>
--- a/docs/sorting algorithms - presentation/Sortierverfahren.pptx
+++ b/docs/sorting algorithms - presentation/Sortierverfahren.pptx
@@ -34,6 +34,10 @@
     <p:sldId id="282" r:id="rId28"/>
     <p:sldId id="283" r:id="rId29"/>
     <p:sldId id="284" r:id="rId30"/>
+    <p:sldId id="285" r:id="rId31"/>
+    <p:sldId id="286" r:id="rId32"/>
+    <p:sldId id="287" r:id="rId33"/>
+    <p:sldId id="288" r:id="rId34"/>
   </p:sldIdLst>
   <p:sldSz cx="12192000" cy="6858000"/>
   <p:notesSz cx="6858000" cy="9144000"/>
@@ -197,7 +201,7 @@
           <a:noFill/>
           <a:extLst>
             <a:ext uri="{909E8E84-426E-40dd-AFC4-6F175D3DCCD1}">
-              <a14:hiddenFill xmlns="" xmlns:a14="http://schemas.microsoft.com/office/drawing/2010/main">
+              <a14:hiddenFill xmlns:a14="http://schemas.microsoft.com/office/drawing/2010/main" xmlns="">
                 <a:solidFill>
                   <a:srgbClr val="FFFFFF"/>
                 </a:solidFill>
@@ -256,7 +260,7 @@
             </a:ln>
             <a:extLst>
               <a:ext uri="{91240B29-F687-4f45-9708-019B960494DF}">
-                <a14:hiddenLine xmlns="" xmlns:a14="http://schemas.microsoft.com/office/drawing/2010/main" w="9525">
+                <a14:hiddenLine xmlns:a14="http://schemas.microsoft.com/office/drawing/2010/main" xmlns="" w="9525">
                   <a:solidFill>
                     <a:srgbClr val="000000"/>
                   </a:solidFill>
@@ -346,7 +350,7 @@
             </a:ln>
             <a:extLst>
               <a:ext uri="{91240B29-F687-4f45-9708-019B960494DF}">
-                <a14:hiddenLine xmlns="" xmlns:a14="http://schemas.microsoft.com/office/drawing/2010/main" w="9525">
+                <a14:hiddenLine xmlns:a14="http://schemas.microsoft.com/office/drawing/2010/main" xmlns="" w="9525">
                   <a:solidFill>
                     <a:srgbClr val="000000"/>
                   </a:solidFill>
@@ -436,7 +440,7 @@
             </a:ln>
             <a:extLst>
               <a:ext uri="{91240B29-F687-4f45-9708-019B960494DF}">
-                <a14:hiddenLine xmlns="" xmlns:a14="http://schemas.microsoft.com/office/drawing/2010/main" w="9525">
+                <a14:hiddenLine xmlns:a14="http://schemas.microsoft.com/office/drawing/2010/main" xmlns="" w="9525">
                   <a:solidFill>
                     <a:srgbClr val="000000"/>
                   </a:solidFill>
@@ -470,7 +474,7 @@
             </a:ln>
             <a:extLst>
               <a:ext uri="{91240B29-F687-4f45-9708-019B960494DF}">
-                <a14:hiddenLine xmlns="" xmlns:a14="http://schemas.microsoft.com/office/drawing/2010/main" w="9525">
+                <a14:hiddenLine xmlns:a14="http://schemas.microsoft.com/office/drawing/2010/main" xmlns="" w="9525">
                   <a:solidFill>
                     <a:srgbClr val="000000"/>
                   </a:solidFill>
@@ -560,7 +564,7 @@
             </a:ln>
             <a:extLst>
               <a:ext uri="{91240B29-F687-4f45-9708-019B960494DF}">
-                <a14:hiddenLine xmlns="" xmlns:a14="http://schemas.microsoft.com/office/drawing/2010/main" w="9525">
+                <a14:hiddenLine xmlns:a14="http://schemas.microsoft.com/office/drawing/2010/main" xmlns="" w="9525">
                   <a:solidFill>
                     <a:srgbClr val="000000"/>
                   </a:solidFill>
@@ -622,7 +626,7 @@
             </a:ln>
             <a:extLst>
               <a:ext uri="{91240B29-F687-4f45-9708-019B960494DF}">
-                <a14:hiddenLine xmlns="" xmlns:a14="http://schemas.microsoft.com/office/drawing/2010/main" w="9525">
+                <a14:hiddenLine xmlns:a14="http://schemas.microsoft.com/office/drawing/2010/main" xmlns="" w="9525">
                   <a:solidFill>
                     <a:srgbClr val="000000"/>
                   </a:solidFill>
@@ -684,7 +688,7 @@
             </a:ln>
             <a:extLst>
               <a:ext uri="{91240B29-F687-4f45-9708-019B960494DF}">
-                <a14:hiddenLine xmlns="" xmlns:a14="http://schemas.microsoft.com/office/drawing/2010/main" w="9525">
+                <a14:hiddenLine xmlns:a14="http://schemas.microsoft.com/office/drawing/2010/main" xmlns="" w="9525">
                   <a:solidFill>
                     <a:srgbClr val="000000"/>
                   </a:solidFill>
@@ -774,7 +778,7 @@
             </a:ln>
             <a:extLst>
               <a:ext uri="{91240B29-F687-4f45-9708-019B960494DF}">
-                <a14:hiddenLine xmlns="" xmlns:a14="http://schemas.microsoft.com/office/drawing/2010/main" w="9525">
+                <a14:hiddenLine xmlns:a14="http://schemas.microsoft.com/office/drawing/2010/main" xmlns="" w="9525">
                   <a:solidFill>
                     <a:srgbClr val="000000"/>
                   </a:solidFill>
@@ -836,7 +840,7 @@
             </a:ln>
             <a:extLst>
               <a:ext uri="{91240B29-F687-4f45-9708-019B960494DF}">
-                <a14:hiddenLine xmlns="" xmlns:a14="http://schemas.microsoft.com/office/drawing/2010/main" w="9525">
+                <a14:hiddenLine xmlns:a14="http://schemas.microsoft.com/office/drawing/2010/main" xmlns="" w="9525">
                   <a:solidFill>
                     <a:srgbClr val="000000"/>
                   </a:solidFill>
@@ -898,7 +902,7 @@
             </a:ln>
             <a:extLst>
               <a:ext uri="{91240B29-F687-4f45-9708-019B960494DF}">
-                <a14:hiddenLine xmlns="" xmlns:a14="http://schemas.microsoft.com/office/drawing/2010/main" w="9525">
+                <a14:hiddenLine xmlns:a14="http://schemas.microsoft.com/office/drawing/2010/main" xmlns="" w="9525">
                   <a:solidFill>
                     <a:srgbClr val="000000"/>
                   </a:solidFill>
@@ -988,7 +992,7 @@
             </a:ln>
             <a:extLst>
               <a:ext uri="{91240B29-F687-4f45-9708-019B960494DF}">
-                <a14:hiddenLine xmlns="" xmlns:a14="http://schemas.microsoft.com/office/drawing/2010/main" w="9525">
+                <a14:hiddenLine xmlns:a14="http://schemas.microsoft.com/office/drawing/2010/main" xmlns="" w="9525">
                   <a:solidFill>
                     <a:srgbClr val="000000"/>
                   </a:solidFill>
@@ -1078,7 +1082,7 @@
             </a:ln>
             <a:extLst>
               <a:ext uri="{91240B29-F687-4f45-9708-019B960494DF}">
-                <a14:hiddenLine xmlns="" xmlns:a14="http://schemas.microsoft.com/office/drawing/2010/main" w="9525">
+                <a14:hiddenLine xmlns:a14="http://schemas.microsoft.com/office/drawing/2010/main" xmlns="" w="9525">
                   <a:solidFill>
                     <a:srgbClr val="000000"/>
                   </a:solidFill>
@@ -1140,7 +1144,7 @@
             </a:ln>
             <a:extLst>
               <a:ext uri="{91240B29-F687-4f45-9708-019B960494DF}">
-                <a14:hiddenLine xmlns="" xmlns:a14="http://schemas.microsoft.com/office/drawing/2010/main" w="9525">
+                <a14:hiddenLine xmlns:a14="http://schemas.microsoft.com/office/drawing/2010/main" xmlns="" w="9525">
                   <a:solidFill>
                     <a:srgbClr val="000000"/>
                   </a:solidFill>
@@ -1250,7 +1254,7 @@
             </a:ln>
             <a:extLst>
               <a:ext uri="{91240B29-F687-4f45-9708-019B960494DF}">
-                <a14:hiddenLine xmlns="" xmlns:a14="http://schemas.microsoft.com/office/drawing/2010/main" w="9525">
+                <a14:hiddenLine xmlns:a14="http://schemas.microsoft.com/office/drawing/2010/main" xmlns="" w="9525">
                   <a:solidFill>
                     <a:srgbClr val="000000"/>
                   </a:solidFill>
@@ -1312,7 +1316,7 @@
             </a:ln>
             <a:extLst>
               <a:ext uri="{91240B29-F687-4f45-9708-019B960494DF}">
-                <a14:hiddenLine xmlns="" xmlns:a14="http://schemas.microsoft.com/office/drawing/2010/main" w="9525">
+                <a14:hiddenLine xmlns:a14="http://schemas.microsoft.com/office/drawing/2010/main" xmlns="" w="9525">
                   <a:solidFill>
                     <a:srgbClr val="000000"/>
                   </a:solidFill>
@@ -1402,7 +1406,7 @@
             </a:ln>
             <a:extLst>
               <a:ext uri="{91240B29-F687-4f45-9708-019B960494DF}">
-                <a14:hiddenLine xmlns="" xmlns:a14="http://schemas.microsoft.com/office/drawing/2010/main" w="9525">
+                <a14:hiddenLine xmlns:a14="http://schemas.microsoft.com/office/drawing/2010/main" xmlns="" w="9525">
                   <a:solidFill>
                     <a:srgbClr val="000000"/>
                   </a:solidFill>
@@ -1492,7 +1496,7 @@
             </a:ln>
             <a:extLst>
               <a:ext uri="{91240B29-F687-4f45-9708-019B960494DF}">
-                <a14:hiddenLine xmlns="" xmlns:a14="http://schemas.microsoft.com/office/drawing/2010/main" w="9525">
+                <a14:hiddenLine xmlns:a14="http://schemas.microsoft.com/office/drawing/2010/main" xmlns="" w="9525">
                   <a:solidFill>
                     <a:srgbClr val="000000"/>
                   </a:solidFill>
@@ -1554,7 +1558,7 @@
             </a:ln>
             <a:extLst>
               <a:ext uri="{91240B29-F687-4f45-9708-019B960494DF}">
-                <a14:hiddenLine xmlns="" xmlns:a14="http://schemas.microsoft.com/office/drawing/2010/main" w="9525">
+                <a14:hiddenLine xmlns:a14="http://schemas.microsoft.com/office/drawing/2010/main" xmlns="" w="9525">
                   <a:solidFill>
                     <a:srgbClr val="000000"/>
                   </a:solidFill>
@@ -1644,7 +1648,7 @@
             </a:ln>
             <a:extLst>
               <a:ext uri="{91240B29-F687-4f45-9708-019B960494DF}">
-                <a14:hiddenLine xmlns="" xmlns:a14="http://schemas.microsoft.com/office/drawing/2010/main" w="9525">
+                <a14:hiddenLine xmlns:a14="http://schemas.microsoft.com/office/drawing/2010/main" xmlns="" w="9525">
                   <a:solidFill>
                     <a:srgbClr val="000000"/>
                   </a:solidFill>
@@ -1734,7 +1738,7 @@
             </a:ln>
             <a:extLst>
               <a:ext uri="{91240B29-F687-4f45-9708-019B960494DF}">
-                <a14:hiddenLine xmlns="" xmlns:a14="http://schemas.microsoft.com/office/drawing/2010/main" w="9525">
+                <a14:hiddenLine xmlns:a14="http://schemas.microsoft.com/office/drawing/2010/main" xmlns="" w="9525">
                   <a:solidFill>
                     <a:srgbClr val="000000"/>
                   </a:solidFill>
@@ -1790,7 +1794,7 @@
             </a:ln>
             <a:extLst>
               <a:ext uri="{91240B29-F687-4f45-9708-019B960494DF}">
-                <a14:hiddenLine xmlns="" xmlns:a14="http://schemas.microsoft.com/office/drawing/2010/main" w="9525">
+                <a14:hiddenLine xmlns:a14="http://schemas.microsoft.com/office/drawing/2010/main" xmlns="" w="9525">
                   <a:solidFill>
                     <a:srgbClr val="000000"/>
                   </a:solidFill>
@@ -1880,7 +1884,7 @@
             </a:ln>
             <a:extLst>
               <a:ext uri="{91240B29-F687-4f45-9708-019B960494DF}">
-                <a14:hiddenLine xmlns="" xmlns:a14="http://schemas.microsoft.com/office/drawing/2010/main" w="9525">
+                <a14:hiddenLine xmlns:a14="http://schemas.microsoft.com/office/drawing/2010/main" xmlns="" w="9525">
                   <a:solidFill>
                     <a:srgbClr val="000000"/>
                   </a:solidFill>
@@ -1936,7 +1940,7 @@
             </a:ln>
             <a:extLst>
               <a:ext uri="{91240B29-F687-4f45-9708-019B960494DF}">
-                <a14:hiddenLine xmlns="" xmlns:a14="http://schemas.microsoft.com/office/drawing/2010/main" w="9525">
+                <a14:hiddenLine xmlns:a14="http://schemas.microsoft.com/office/drawing/2010/main" xmlns="" w="9525">
                   <a:solidFill>
                     <a:srgbClr val="000000"/>
                   </a:solidFill>
@@ -2026,7 +2030,7 @@
             </a:ln>
             <a:extLst>
               <a:ext uri="{91240B29-F687-4f45-9708-019B960494DF}">
-                <a14:hiddenLine xmlns="" xmlns:a14="http://schemas.microsoft.com/office/drawing/2010/main" w="9525">
+                <a14:hiddenLine xmlns:a14="http://schemas.microsoft.com/office/drawing/2010/main" xmlns="" w="9525">
                   <a:solidFill>
                     <a:srgbClr val="000000"/>
                   </a:solidFill>
@@ -2094,7 +2098,7 @@
             </a:ln>
             <a:extLst>
               <a:ext uri="{91240B29-F687-4f45-9708-019B960494DF}">
-                <a14:hiddenLine xmlns="" xmlns:a14="http://schemas.microsoft.com/office/drawing/2010/main" w="9525">
+                <a14:hiddenLine xmlns:a14="http://schemas.microsoft.com/office/drawing/2010/main" xmlns="" w="9525">
                   <a:solidFill>
                     <a:srgbClr val="000000"/>
                   </a:solidFill>
@@ -2184,7 +2188,7 @@
             </a:ln>
             <a:extLst>
               <a:ext uri="{91240B29-F687-4f45-9708-019B960494DF}">
-                <a14:hiddenLine xmlns="" xmlns:a14="http://schemas.microsoft.com/office/drawing/2010/main" w="9525">
+                <a14:hiddenLine xmlns:a14="http://schemas.microsoft.com/office/drawing/2010/main" xmlns="" w="9525">
                   <a:solidFill>
                     <a:srgbClr val="000000"/>
                   </a:solidFill>
@@ -2252,7 +2256,7 @@
             </a:ln>
             <a:extLst>
               <a:ext uri="{91240B29-F687-4f45-9708-019B960494DF}">
-                <a14:hiddenLine xmlns="" xmlns:a14="http://schemas.microsoft.com/office/drawing/2010/main" w="9525">
+                <a14:hiddenLine xmlns:a14="http://schemas.microsoft.com/office/drawing/2010/main" xmlns="" w="9525">
                   <a:solidFill>
                     <a:srgbClr val="000000"/>
                   </a:solidFill>
@@ -2342,7 +2346,7 @@
             </a:ln>
             <a:extLst>
               <a:ext uri="{91240B29-F687-4f45-9708-019B960494DF}">
-                <a14:hiddenLine xmlns="" xmlns:a14="http://schemas.microsoft.com/office/drawing/2010/main" w="9525">
+                <a14:hiddenLine xmlns:a14="http://schemas.microsoft.com/office/drawing/2010/main" xmlns="" w="9525">
                   <a:solidFill>
                     <a:srgbClr val="000000"/>
                   </a:solidFill>
@@ -2376,7 +2380,7 @@
             </a:ln>
             <a:extLst>
               <a:ext uri="{91240B29-F687-4f45-9708-019B960494DF}">
-                <a14:hiddenLine xmlns="" xmlns:a14="http://schemas.microsoft.com/office/drawing/2010/main" w="9525">
+                <a14:hiddenLine xmlns:a14="http://schemas.microsoft.com/office/drawing/2010/main" xmlns="" w="9525">
                   <a:solidFill>
                     <a:srgbClr val="000000"/>
                   </a:solidFill>
@@ -2466,7 +2470,7 @@
             </a:ln>
             <a:extLst>
               <a:ext uri="{91240B29-F687-4f45-9708-019B960494DF}">
-                <a14:hiddenLine xmlns="" xmlns:a14="http://schemas.microsoft.com/office/drawing/2010/main" w="9525">
+                <a14:hiddenLine xmlns:a14="http://schemas.microsoft.com/office/drawing/2010/main" xmlns="" w="9525">
                   <a:solidFill>
                     <a:srgbClr val="000000"/>
                   </a:solidFill>
@@ -2528,7 +2532,7 @@
             </a:ln>
             <a:extLst>
               <a:ext uri="{91240B29-F687-4f45-9708-019B960494DF}">
-                <a14:hiddenLine xmlns="" xmlns:a14="http://schemas.microsoft.com/office/drawing/2010/main" w="9525">
+                <a14:hiddenLine xmlns:a14="http://schemas.microsoft.com/office/drawing/2010/main" xmlns="" w="9525">
                   <a:solidFill>
                     <a:srgbClr val="000000"/>
                   </a:solidFill>
@@ -2590,7 +2594,7 @@
             </a:ln>
             <a:extLst>
               <a:ext uri="{91240B29-F687-4f45-9708-019B960494DF}">
-                <a14:hiddenLine xmlns="" xmlns:a14="http://schemas.microsoft.com/office/drawing/2010/main" w="9525">
+                <a14:hiddenLine xmlns:a14="http://schemas.microsoft.com/office/drawing/2010/main" xmlns="" w="9525">
                   <a:solidFill>
                     <a:srgbClr val="000000"/>
                   </a:solidFill>
@@ -2680,7 +2684,7 @@
             </a:ln>
             <a:extLst>
               <a:ext uri="{91240B29-F687-4f45-9708-019B960494DF}">
-                <a14:hiddenLine xmlns="" xmlns:a14="http://schemas.microsoft.com/office/drawing/2010/main" w="9525">
+                <a14:hiddenLine xmlns:a14="http://schemas.microsoft.com/office/drawing/2010/main" xmlns="" w="9525">
                   <a:solidFill>
                     <a:srgbClr val="000000"/>
                   </a:solidFill>
@@ -2748,7 +2752,7 @@
             </a:ln>
             <a:extLst>
               <a:ext uri="{91240B29-F687-4f45-9708-019B960494DF}">
-                <a14:hiddenLine xmlns="" xmlns:a14="http://schemas.microsoft.com/office/drawing/2010/main" w="9525">
+                <a14:hiddenLine xmlns:a14="http://schemas.microsoft.com/office/drawing/2010/main" xmlns="" w="9525">
                   <a:solidFill>
                     <a:srgbClr val="000000"/>
                   </a:solidFill>
@@ -2810,7 +2814,7 @@
             </a:ln>
             <a:extLst>
               <a:ext uri="{91240B29-F687-4f45-9708-019B960494DF}">
-                <a14:hiddenLine xmlns="" xmlns:a14="http://schemas.microsoft.com/office/drawing/2010/main" w="9525">
+                <a14:hiddenLine xmlns:a14="http://schemas.microsoft.com/office/drawing/2010/main" xmlns="" w="9525">
                   <a:solidFill>
                     <a:srgbClr val="000000"/>
                   </a:solidFill>
@@ -2900,7 +2904,7 @@
             </a:ln>
             <a:extLst>
               <a:ext uri="{91240B29-F687-4f45-9708-019B960494DF}">
-                <a14:hiddenLine xmlns="" xmlns:a14="http://schemas.microsoft.com/office/drawing/2010/main" w="9525">
+                <a14:hiddenLine xmlns:a14="http://schemas.microsoft.com/office/drawing/2010/main" xmlns="" w="9525">
                   <a:solidFill>
                     <a:srgbClr val="000000"/>
                   </a:solidFill>
@@ -2962,7 +2966,7 @@
             </a:ln>
             <a:extLst>
               <a:ext uri="{91240B29-F687-4f45-9708-019B960494DF}">
-                <a14:hiddenLine xmlns="" xmlns:a14="http://schemas.microsoft.com/office/drawing/2010/main" w="9525">
+                <a14:hiddenLine xmlns:a14="http://schemas.microsoft.com/office/drawing/2010/main" xmlns="" w="9525">
                   <a:solidFill>
                     <a:srgbClr val="000000"/>
                   </a:solidFill>
@@ -3052,7 +3056,7 @@
             </a:ln>
             <a:extLst>
               <a:ext uri="{91240B29-F687-4f45-9708-019B960494DF}">
-                <a14:hiddenLine xmlns="" xmlns:a14="http://schemas.microsoft.com/office/drawing/2010/main" w="9525">
+                <a14:hiddenLine xmlns:a14="http://schemas.microsoft.com/office/drawing/2010/main" xmlns="" w="9525">
                   <a:solidFill>
                     <a:srgbClr val="000000"/>
                   </a:solidFill>
@@ -3114,7 +3118,7 @@
             </a:ln>
             <a:extLst>
               <a:ext uri="{91240B29-F687-4f45-9708-019B960494DF}">
-                <a14:hiddenLine xmlns="" xmlns:a14="http://schemas.microsoft.com/office/drawing/2010/main" w="9525">
+                <a14:hiddenLine xmlns:a14="http://schemas.microsoft.com/office/drawing/2010/main" xmlns="" w="9525">
                   <a:solidFill>
                     <a:srgbClr val="000000"/>
                   </a:solidFill>
@@ -3204,7 +3208,7 @@
             </a:ln>
             <a:extLst>
               <a:ext uri="{91240B29-F687-4f45-9708-019B960494DF}">
-                <a14:hiddenLine xmlns="" xmlns:a14="http://schemas.microsoft.com/office/drawing/2010/main" w="9525">
+                <a14:hiddenLine xmlns:a14="http://schemas.microsoft.com/office/drawing/2010/main" xmlns="" w="9525">
                   <a:solidFill>
                     <a:srgbClr val="000000"/>
                   </a:solidFill>
@@ -3238,7 +3242,7 @@
             </a:ln>
             <a:extLst>
               <a:ext uri="{91240B29-F687-4f45-9708-019B960494DF}">
-                <a14:hiddenLine xmlns="" xmlns:a14="http://schemas.microsoft.com/office/drawing/2010/main" w="9525">
+                <a14:hiddenLine xmlns:a14="http://schemas.microsoft.com/office/drawing/2010/main" xmlns="" w="9525">
                   <a:solidFill>
                     <a:srgbClr val="000000"/>
                   </a:solidFill>
@@ -3303,7 +3307,7 @@
             </a:ln>
             <a:extLst>
               <a:ext uri="{91240B29-F687-4f45-9708-019B960494DF}">
-                <a14:hiddenLine xmlns="" xmlns:a14="http://schemas.microsoft.com/office/drawing/2010/main" w="9525">
+                <a14:hiddenLine xmlns:a14="http://schemas.microsoft.com/office/drawing/2010/main" xmlns="" w="9525">
                   <a:solidFill>
                     <a:srgbClr val="000000"/>
                   </a:solidFill>
@@ -3393,7 +3397,7 @@
             </a:ln>
             <a:extLst>
               <a:ext uri="{91240B29-F687-4f45-9708-019B960494DF}">
-                <a14:hiddenLine xmlns="" xmlns:a14="http://schemas.microsoft.com/office/drawing/2010/main" w="9525">
+                <a14:hiddenLine xmlns:a14="http://schemas.microsoft.com/office/drawing/2010/main" xmlns="" w="9525">
                   <a:solidFill>
                     <a:srgbClr val="000000"/>
                   </a:solidFill>
@@ -3455,7 +3459,7 @@
             </a:ln>
             <a:extLst>
               <a:ext uri="{91240B29-F687-4f45-9708-019B960494DF}">
-                <a14:hiddenLine xmlns="" xmlns:a14="http://schemas.microsoft.com/office/drawing/2010/main" w="9525">
+                <a14:hiddenLine xmlns:a14="http://schemas.microsoft.com/office/drawing/2010/main" xmlns="" w="9525">
                   <a:solidFill>
                     <a:srgbClr val="000000"/>
                   </a:solidFill>
@@ -3545,7 +3549,7 @@
             </a:ln>
             <a:extLst>
               <a:ext uri="{91240B29-F687-4f45-9708-019B960494DF}">
-                <a14:hiddenLine xmlns="" xmlns:a14="http://schemas.microsoft.com/office/drawing/2010/main" w="9525">
+                <a14:hiddenLine xmlns:a14="http://schemas.microsoft.com/office/drawing/2010/main" xmlns="" w="9525">
                   <a:solidFill>
                     <a:srgbClr val="000000"/>
                   </a:solidFill>
@@ -3635,7 +3639,7 @@
             </a:ln>
             <a:extLst>
               <a:ext uri="{91240B29-F687-4f45-9708-019B960494DF}">
-                <a14:hiddenLine xmlns="" xmlns:a14="http://schemas.microsoft.com/office/drawing/2010/main" w="9525">
+                <a14:hiddenLine xmlns:a14="http://schemas.microsoft.com/office/drawing/2010/main" xmlns="" w="9525">
                   <a:solidFill>
                     <a:srgbClr val="000000"/>
                   </a:solidFill>
@@ -3700,7 +3704,7 @@
             </a:ln>
             <a:extLst>
               <a:ext uri="{91240B29-F687-4f45-9708-019B960494DF}">
-                <a14:hiddenLine xmlns="" xmlns:a14="http://schemas.microsoft.com/office/drawing/2010/main" w="9525">
+                <a14:hiddenLine xmlns:a14="http://schemas.microsoft.com/office/drawing/2010/main" xmlns="" w="9525">
                   <a:solidFill>
                     <a:srgbClr val="000000"/>
                   </a:solidFill>
@@ -3762,7 +3766,7 @@
             </a:ln>
             <a:extLst>
               <a:ext uri="{91240B29-F687-4f45-9708-019B960494DF}">
-                <a14:hiddenLine xmlns="" xmlns:a14="http://schemas.microsoft.com/office/drawing/2010/main" w="9525">
+                <a14:hiddenLine xmlns:a14="http://schemas.microsoft.com/office/drawing/2010/main" xmlns="" w="9525">
                   <a:solidFill>
                     <a:srgbClr val="000000"/>
                   </a:solidFill>
@@ -3852,7 +3856,7 @@
             </a:ln>
             <a:extLst>
               <a:ext uri="{91240B29-F687-4f45-9708-019B960494DF}">
-                <a14:hiddenLine xmlns="" xmlns:a14="http://schemas.microsoft.com/office/drawing/2010/main" w="9525">
+                <a14:hiddenLine xmlns:a14="http://schemas.microsoft.com/office/drawing/2010/main" xmlns="" w="9525">
                   <a:solidFill>
                     <a:srgbClr val="000000"/>
                   </a:solidFill>
@@ -3942,7 +3946,7 @@
             </a:ln>
             <a:extLst>
               <a:ext uri="{91240B29-F687-4f45-9708-019B960494DF}">
-                <a14:hiddenLine xmlns="" xmlns:a14="http://schemas.microsoft.com/office/drawing/2010/main" w="9525">
+                <a14:hiddenLine xmlns:a14="http://schemas.microsoft.com/office/drawing/2010/main" xmlns="" w="9525">
                   <a:solidFill>
                     <a:srgbClr val="000000"/>
                   </a:solidFill>
@@ -4004,7 +4008,7 @@
             </a:ln>
             <a:extLst>
               <a:ext uri="{91240B29-F687-4f45-9708-019B960494DF}">
-                <a14:hiddenLine xmlns="" xmlns:a14="http://schemas.microsoft.com/office/drawing/2010/main" w="9525">
+                <a14:hiddenLine xmlns:a14="http://schemas.microsoft.com/office/drawing/2010/main" xmlns="" w="9525">
                   <a:solidFill>
                     <a:srgbClr val="000000"/>
                   </a:solidFill>
@@ -4124,7 +4128,7 @@
             </a:ln>
             <a:extLst>
               <a:ext uri="{91240B29-F687-4f45-9708-019B960494DF}">
-                <a14:hiddenLine xmlns="" xmlns:a14="http://schemas.microsoft.com/office/drawing/2010/main" w="9525">
+                <a14:hiddenLine xmlns:a14="http://schemas.microsoft.com/office/drawing/2010/main" xmlns="" w="9525">
                   <a:solidFill>
                     <a:srgbClr val="000000"/>
                   </a:solidFill>
@@ -4192,7 +4196,7 @@
             </a:ln>
             <a:extLst>
               <a:ext uri="{91240B29-F687-4f45-9708-019B960494DF}">
-                <a14:hiddenLine xmlns="" xmlns:a14="http://schemas.microsoft.com/office/drawing/2010/main" w="9525">
+                <a14:hiddenLine xmlns:a14="http://schemas.microsoft.com/office/drawing/2010/main" xmlns="" w="9525">
                   <a:solidFill>
                     <a:srgbClr val="000000"/>
                   </a:solidFill>
@@ -4282,7 +4286,7 @@
             </a:ln>
             <a:extLst>
               <a:ext uri="{91240B29-F687-4f45-9708-019B960494DF}">
-                <a14:hiddenLine xmlns="" xmlns:a14="http://schemas.microsoft.com/office/drawing/2010/main" w="9525">
+                <a14:hiddenLine xmlns:a14="http://schemas.microsoft.com/office/drawing/2010/main" xmlns="" w="9525">
                   <a:solidFill>
                     <a:srgbClr val="000000"/>
                   </a:solidFill>
@@ -9111,7 +9115,7 @@
           <a:noFill/>
           <a:extLst>
             <a:ext uri="{909E8E84-426E-40dd-AFC4-6F175D3DCCD1}">
-              <a14:hiddenFill xmlns="" xmlns:a14="http://schemas.microsoft.com/office/drawing/2010/main">
+              <a14:hiddenFill xmlns:a14="http://schemas.microsoft.com/office/drawing/2010/main" xmlns="">
                 <a:solidFill>
                   <a:srgbClr val="FFFFFF"/>
                 </a:solidFill>
@@ -9185,7 +9189,7 @@
               </a:ln>
               <a:extLst>
                 <a:ext uri="{91240B29-F687-4f45-9708-019B960494DF}">
-                  <a14:hiddenLine xmlns="" xmlns:a14="http://schemas.microsoft.com/office/drawing/2010/main" w="9525">
+                  <a14:hiddenLine xmlns:a14="http://schemas.microsoft.com/office/drawing/2010/main" xmlns="" w="9525">
                     <a:solidFill>
                       <a:srgbClr val="000000"/>
                     </a:solidFill>
@@ -9275,7 +9279,7 @@
               </a:ln>
               <a:extLst>
                 <a:ext uri="{91240B29-F687-4f45-9708-019B960494DF}">
-                  <a14:hiddenLine xmlns="" xmlns:a14="http://schemas.microsoft.com/office/drawing/2010/main" w="9525">
+                  <a14:hiddenLine xmlns:a14="http://schemas.microsoft.com/office/drawing/2010/main" xmlns="" w="9525">
                     <a:solidFill>
                       <a:srgbClr val="000000"/>
                     </a:solidFill>
@@ -9365,7 +9369,7 @@
               </a:ln>
               <a:extLst>
                 <a:ext uri="{91240B29-F687-4f45-9708-019B960494DF}">
-                  <a14:hiddenLine xmlns="" xmlns:a14="http://schemas.microsoft.com/office/drawing/2010/main" w="9525">
+                  <a14:hiddenLine xmlns:a14="http://schemas.microsoft.com/office/drawing/2010/main" xmlns="" w="9525">
                     <a:solidFill>
                       <a:srgbClr val="000000"/>
                     </a:solidFill>
@@ -9427,7 +9431,7 @@
               </a:ln>
               <a:extLst>
                 <a:ext uri="{91240B29-F687-4f45-9708-019B960494DF}">
-                  <a14:hiddenLine xmlns="" xmlns:a14="http://schemas.microsoft.com/office/drawing/2010/main" w="9525">
+                  <a14:hiddenLine xmlns:a14="http://schemas.microsoft.com/office/drawing/2010/main" xmlns="" w="9525">
                     <a:solidFill>
                       <a:srgbClr val="000000"/>
                     </a:solidFill>
@@ -9517,7 +9521,7 @@
               </a:ln>
               <a:extLst>
                 <a:ext uri="{91240B29-F687-4f45-9708-019B960494DF}">
-                  <a14:hiddenLine xmlns="" xmlns:a14="http://schemas.microsoft.com/office/drawing/2010/main" w="9525">
+                  <a14:hiddenLine xmlns:a14="http://schemas.microsoft.com/office/drawing/2010/main" xmlns="" w="9525">
                     <a:solidFill>
                       <a:srgbClr val="000000"/>
                     </a:solidFill>
@@ -9579,7 +9583,7 @@
               </a:ln>
               <a:extLst>
                 <a:ext uri="{91240B29-F687-4f45-9708-019B960494DF}">
-                  <a14:hiddenLine xmlns="" xmlns:a14="http://schemas.microsoft.com/office/drawing/2010/main" w="9525">
+                  <a14:hiddenLine xmlns:a14="http://schemas.microsoft.com/office/drawing/2010/main" xmlns="" w="9525">
                     <a:solidFill>
                       <a:srgbClr val="000000"/>
                     </a:solidFill>
@@ -9641,7 +9645,7 @@
               </a:ln>
               <a:extLst>
                 <a:ext uri="{91240B29-F687-4f45-9708-019B960494DF}">
-                  <a14:hiddenLine xmlns="" xmlns:a14="http://schemas.microsoft.com/office/drawing/2010/main" w="9525">
+                  <a14:hiddenLine xmlns:a14="http://schemas.microsoft.com/office/drawing/2010/main" xmlns="" w="9525">
                     <a:solidFill>
                       <a:srgbClr val="000000"/>
                     </a:solidFill>
@@ -9731,7 +9735,7 @@
               </a:ln>
               <a:extLst>
                 <a:ext uri="{91240B29-F687-4f45-9708-019B960494DF}">
-                  <a14:hiddenLine xmlns="" xmlns:a14="http://schemas.microsoft.com/office/drawing/2010/main" w="9525">
+                  <a14:hiddenLine xmlns:a14="http://schemas.microsoft.com/office/drawing/2010/main" xmlns="" w="9525">
                     <a:solidFill>
                       <a:srgbClr val="000000"/>
                     </a:solidFill>
@@ -9821,7 +9825,7 @@
               </a:ln>
               <a:extLst>
                 <a:ext uri="{91240B29-F687-4f45-9708-019B960494DF}">
-                  <a14:hiddenLine xmlns="" xmlns:a14="http://schemas.microsoft.com/office/drawing/2010/main" w="9525">
+                  <a14:hiddenLine xmlns:a14="http://schemas.microsoft.com/office/drawing/2010/main" xmlns="" w="9525">
                     <a:solidFill>
                       <a:srgbClr val="000000"/>
                     </a:solidFill>
@@ -9883,7 +9887,7 @@
               </a:ln>
               <a:extLst>
                 <a:ext uri="{91240B29-F687-4f45-9708-019B960494DF}">
-                  <a14:hiddenLine xmlns="" xmlns:a14="http://schemas.microsoft.com/office/drawing/2010/main" w="9525">
+                  <a14:hiddenLine xmlns:a14="http://schemas.microsoft.com/office/drawing/2010/main" xmlns="" w="9525">
                     <a:solidFill>
                       <a:srgbClr val="000000"/>
                     </a:solidFill>
@@ -9993,7 +9997,7 @@
               </a:ln>
               <a:extLst>
                 <a:ext uri="{91240B29-F687-4f45-9708-019B960494DF}">
-                  <a14:hiddenLine xmlns="" xmlns:a14="http://schemas.microsoft.com/office/drawing/2010/main" w="9525">
+                  <a14:hiddenLine xmlns:a14="http://schemas.microsoft.com/office/drawing/2010/main" xmlns="" w="9525">
                     <a:solidFill>
                       <a:srgbClr val="000000"/>
                     </a:solidFill>
@@ -10077,7 +10081,7 @@
               </a:ln>
               <a:extLst>
                 <a:ext uri="{91240B29-F687-4f45-9708-019B960494DF}">
-                  <a14:hiddenLine xmlns="" xmlns:a14="http://schemas.microsoft.com/office/drawing/2010/main" w="9525">
+                  <a14:hiddenLine xmlns:a14="http://schemas.microsoft.com/office/drawing/2010/main" xmlns="" w="9525">
                     <a:solidFill>
                       <a:srgbClr val="000000"/>
                     </a:solidFill>
@@ -10139,7 +10143,7 @@
               </a:ln>
               <a:extLst>
                 <a:ext uri="{91240B29-F687-4f45-9708-019B960494DF}">
-                  <a14:hiddenLine xmlns="" xmlns:a14="http://schemas.microsoft.com/office/drawing/2010/main" w="9525">
+                  <a14:hiddenLine xmlns:a14="http://schemas.microsoft.com/office/drawing/2010/main" xmlns="" w="9525">
                     <a:solidFill>
                       <a:srgbClr val="000000"/>
                     </a:solidFill>
@@ -10201,7 +10205,7 @@
               </a:ln>
               <a:extLst>
                 <a:ext uri="{91240B29-F687-4f45-9708-019B960494DF}">
-                  <a14:hiddenLine xmlns="" xmlns:a14="http://schemas.microsoft.com/office/drawing/2010/main" w="9525">
+                  <a14:hiddenLine xmlns:a14="http://schemas.microsoft.com/office/drawing/2010/main" xmlns="" w="9525">
                     <a:solidFill>
                       <a:srgbClr val="000000"/>
                     </a:solidFill>
@@ -10291,7 +10295,7 @@
               </a:ln>
               <a:extLst>
                 <a:ext uri="{91240B29-F687-4f45-9708-019B960494DF}">
-                  <a14:hiddenLine xmlns="" xmlns:a14="http://schemas.microsoft.com/office/drawing/2010/main" w="9525">
+                  <a14:hiddenLine xmlns:a14="http://schemas.microsoft.com/office/drawing/2010/main" xmlns="" w="9525">
                     <a:solidFill>
                       <a:srgbClr val="000000"/>
                     </a:solidFill>
@@ -10325,7 +10329,7 @@
               </a:ln>
               <a:extLst>
                 <a:ext uri="{91240B29-F687-4f45-9708-019B960494DF}">
-                  <a14:hiddenLine xmlns="" xmlns:a14="http://schemas.microsoft.com/office/drawing/2010/main" w="9525">
+                  <a14:hiddenLine xmlns:a14="http://schemas.microsoft.com/office/drawing/2010/main" xmlns="" w="9525">
                     <a:solidFill>
                       <a:srgbClr val="000000"/>
                     </a:solidFill>
@@ -10390,7 +10394,7 @@
               </a:ln>
               <a:extLst>
                 <a:ext uri="{91240B29-F687-4f45-9708-019B960494DF}">
-                  <a14:hiddenLine xmlns="" xmlns:a14="http://schemas.microsoft.com/office/drawing/2010/main" w="9525">
+                  <a14:hiddenLine xmlns:a14="http://schemas.microsoft.com/office/drawing/2010/main" xmlns="" w="9525">
                     <a:solidFill>
                       <a:srgbClr val="000000"/>
                     </a:solidFill>
@@ -10480,7 +10484,7 @@
               </a:ln>
               <a:extLst>
                 <a:ext uri="{91240B29-F687-4f45-9708-019B960494DF}">
-                  <a14:hiddenLine xmlns="" xmlns:a14="http://schemas.microsoft.com/office/drawing/2010/main" w="9525">
+                  <a14:hiddenLine xmlns:a14="http://schemas.microsoft.com/office/drawing/2010/main" xmlns="" w="9525">
                     <a:solidFill>
                       <a:srgbClr val="000000"/>
                     </a:solidFill>
@@ -10542,7 +10546,7 @@
               </a:ln>
               <a:extLst>
                 <a:ext uri="{91240B29-F687-4f45-9708-019B960494DF}">
-                  <a14:hiddenLine xmlns="" xmlns:a14="http://schemas.microsoft.com/office/drawing/2010/main" w="9525">
+                  <a14:hiddenLine xmlns:a14="http://schemas.microsoft.com/office/drawing/2010/main" xmlns="" w="9525">
                     <a:solidFill>
                       <a:srgbClr val="000000"/>
                     </a:solidFill>
@@ -10632,7 +10636,7 @@
               </a:ln>
               <a:extLst>
                 <a:ext uri="{91240B29-F687-4f45-9708-019B960494DF}">
-                  <a14:hiddenLine xmlns="" xmlns:a14="http://schemas.microsoft.com/office/drawing/2010/main" w="9525">
+                  <a14:hiddenLine xmlns:a14="http://schemas.microsoft.com/office/drawing/2010/main" xmlns="" w="9525">
                     <a:solidFill>
                       <a:srgbClr val="000000"/>
                     </a:solidFill>
@@ -10697,7 +10701,7 @@
               </a:ln>
               <a:extLst>
                 <a:ext uri="{91240B29-F687-4f45-9708-019B960494DF}">
-                  <a14:hiddenLine xmlns="" xmlns:a14="http://schemas.microsoft.com/office/drawing/2010/main" w="9525">
+                  <a14:hiddenLine xmlns:a14="http://schemas.microsoft.com/office/drawing/2010/main" xmlns="" w="9525">
                     <a:solidFill>
                       <a:srgbClr val="000000"/>
                     </a:solidFill>
@@ -10759,7 +10763,7 @@
               </a:ln>
               <a:extLst>
                 <a:ext uri="{91240B29-F687-4f45-9708-019B960494DF}">
-                  <a14:hiddenLine xmlns="" xmlns:a14="http://schemas.microsoft.com/office/drawing/2010/main" w="9525">
+                  <a14:hiddenLine xmlns:a14="http://schemas.microsoft.com/office/drawing/2010/main" xmlns="" w="9525">
                     <a:solidFill>
                       <a:srgbClr val="000000"/>
                     </a:solidFill>
@@ -10849,7 +10853,7 @@
               </a:ln>
               <a:extLst>
                 <a:ext uri="{91240B29-F687-4f45-9708-019B960494DF}">
-                  <a14:hiddenLine xmlns="" xmlns:a14="http://schemas.microsoft.com/office/drawing/2010/main" w="9525">
+                  <a14:hiddenLine xmlns:a14="http://schemas.microsoft.com/office/drawing/2010/main" xmlns="" w="9525">
                     <a:solidFill>
                       <a:srgbClr val="000000"/>
                     </a:solidFill>
@@ -10939,7 +10943,7 @@
               </a:ln>
               <a:extLst>
                 <a:ext uri="{91240B29-F687-4f45-9708-019B960494DF}">
-                  <a14:hiddenLine xmlns="" xmlns:a14="http://schemas.microsoft.com/office/drawing/2010/main" w="9525">
+                  <a14:hiddenLine xmlns:a14="http://schemas.microsoft.com/office/drawing/2010/main" xmlns="" w="9525">
                     <a:solidFill>
                       <a:srgbClr val="000000"/>
                     </a:solidFill>
@@ -11004,7 +11008,7 @@
               </a:ln>
               <a:extLst>
                 <a:ext uri="{91240B29-F687-4f45-9708-019B960494DF}">
-                  <a14:hiddenLine xmlns="" xmlns:a14="http://schemas.microsoft.com/office/drawing/2010/main" w="9525">
+                  <a14:hiddenLine xmlns:a14="http://schemas.microsoft.com/office/drawing/2010/main" xmlns="" w="9525">
                     <a:solidFill>
                       <a:srgbClr val="000000"/>
                     </a:solidFill>
@@ -11124,7 +11128,7 @@
               </a:ln>
               <a:extLst>
                 <a:ext uri="{91240B29-F687-4f45-9708-019B960494DF}">
-                  <a14:hiddenLine xmlns="" xmlns:a14="http://schemas.microsoft.com/office/drawing/2010/main" w="9525">
+                  <a14:hiddenLine xmlns:a14="http://schemas.microsoft.com/office/drawing/2010/main" xmlns="" w="9525">
                     <a:solidFill>
                       <a:srgbClr val="000000"/>
                     </a:solidFill>
@@ -11205,7 +11209,7 @@
               </a:ln>
               <a:extLst>
                 <a:ext uri="{91240B29-F687-4f45-9708-019B960494DF}">
-                  <a14:hiddenLine xmlns="" xmlns:a14="http://schemas.microsoft.com/office/drawing/2010/main" w="9525">
+                  <a14:hiddenLine xmlns:a14="http://schemas.microsoft.com/office/drawing/2010/main" xmlns="" w="9525">
                     <a:solidFill>
                       <a:srgbClr val="000000"/>
                     </a:solidFill>
@@ -11320,7 +11324,7 @@
               </a:ln>
               <a:extLst>
                 <a:ext uri="{91240B29-F687-4f45-9708-019B960494DF}">
-                  <a14:hiddenLine xmlns="" xmlns:a14="http://schemas.microsoft.com/office/drawing/2010/main" w="9525">
+                  <a14:hiddenLine xmlns:a14="http://schemas.microsoft.com/office/drawing/2010/main" xmlns="" w="9525">
                     <a:solidFill>
                       <a:srgbClr val="000000"/>
                     </a:solidFill>
@@ -11410,7 +11414,7 @@
               </a:ln>
               <a:extLst>
                 <a:ext uri="{91240B29-F687-4f45-9708-019B960494DF}">
-                  <a14:hiddenLine xmlns="" xmlns:a14="http://schemas.microsoft.com/office/drawing/2010/main" w="9525">
+                  <a14:hiddenLine xmlns:a14="http://schemas.microsoft.com/office/drawing/2010/main" xmlns="" w="9525">
                     <a:solidFill>
                       <a:srgbClr val="000000"/>
                     </a:solidFill>
@@ -11475,7 +11479,7 @@
               </a:ln>
               <a:extLst>
                 <a:ext uri="{91240B29-F687-4f45-9708-019B960494DF}">
-                  <a14:hiddenLine xmlns="" xmlns:a14="http://schemas.microsoft.com/office/drawing/2010/main" w="9525">
+                  <a14:hiddenLine xmlns:a14="http://schemas.microsoft.com/office/drawing/2010/main" xmlns="" w="9525">
                     <a:solidFill>
                       <a:srgbClr val="000000"/>
                     </a:solidFill>
@@ -11565,7 +11569,7 @@
               </a:ln>
               <a:extLst>
                 <a:ext uri="{91240B29-F687-4f45-9708-019B960494DF}">
-                  <a14:hiddenLine xmlns="" xmlns:a14="http://schemas.microsoft.com/office/drawing/2010/main" w="9525">
+                  <a14:hiddenLine xmlns:a14="http://schemas.microsoft.com/office/drawing/2010/main" xmlns="" w="9525">
                     <a:solidFill>
                       <a:srgbClr val="000000"/>
                     </a:solidFill>
@@ -11633,7 +11637,7 @@
               </a:ln>
               <a:extLst>
                 <a:ext uri="{91240B29-F687-4f45-9708-019B960494DF}">
-                  <a14:hiddenLine xmlns="" xmlns:a14="http://schemas.microsoft.com/office/drawing/2010/main" w="9525">
+                  <a14:hiddenLine xmlns:a14="http://schemas.microsoft.com/office/drawing/2010/main" xmlns="" w="9525">
                     <a:solidFill>
                       <a:srgbClr val="000000"/>
                     </a:solidFill>
@@ -11723,7 +11727,7 @@
               </a:ln>
               <a:extLst>
                 <a:ext uri="{91240B29-F687-4f45-9708-019B960494DF}">
-                  <a14:hiddenLine xmlns="" xmlns:a14="http://schemas.microsoft.com/office/drawing/2010/main" w="9525">
+                  <a14:hiddenLine xmlns:a14="http://schemas.microsoft.com/office/drawing/2010/main" xmlns="" w="9525">
                     <a:solidFill>
                       <a:srgbClr val="000000"/>
                     </a:solidFill>
@@ -11791,7 +11795,7 @@
               </a:ln>
               <a:extLst>
                 <a:ext uri="{91240B29-F687-4f45-9708-019B960494DF}">
-                  <a14:hiddenLine xmlns="" xmlns:a14="http://schemas.microsoft.com/office/drawing/2010/main" w="9525">
+                  <a14:hiddenLine xmlns:a14="http://schemas.microsoft.com/office/drawing/2010/main" xmlns="" w="9525">
                     <a:solidFill>
                       <a:srgbClr val="000000"/>
                     </a:solidFill>
@@ -11881,7 +11885,7 @@
               </a:ln>
               <a:extLst>
                 <a:ext uri="{91240B29-F687-4f45-9708-019B960494DF}">
-                  <a14:hiddenLine xmlns="" xmlns:a14="http://schemas.microsoft.com/office/drawing/2010/main" w="9525">
+                  <a14:hiddenLine xmlns:a14="http://schemas.microsoft.com/office/drawing/2010/main" xmlns="" w="9525">
                     <a:solidFill>
                       <a:srgbClr val="000000"/>
                     </a:solidFill>
@@ -11915,7 +11919,7 @@
               </a:ln>
               <a:extLst>
                 <a:ext uri="{91240B29-F687-4f45-9708-019B960494DF}">
-                  <a14:hiddenLine xmlns="" xmlns:a14="http://schemas.microsoft.com/office/drawing/2010/main" w="9525">
+                  <a14:hiddenLine xmlns:a14="http://schemas.microsoft.com/office/drawing/2010/main" xmlns="" w="9525">
                     <a:solidFill>
                       <a:srgbClr val="000000"/>
                     </a:solidFill>
@@ -17925,11 +17929,15 @@
             </a:r>
             <a:r>
               <a:rPr lang="en-US" dirty="0" err="1" smtClean="0"/>
-              <a:t>Elementen</a:t>
-            </a:r>
-            <a:r>
-              <a:rPr lang="en-US" dirty="0" smtClean="0"/>
-              <a:t>, die </a:t>
+              <a:t>Elemente</a:t>
+            </a:r>
+            <a:r>
+              <a:rPr lang="en-US" dirty="0" smtClean="0"/>
+              <a:t>, </a:t>
+            </a:r>
+            <a:r>
+              <a:rPr lang="en-US" dirty="0" smtClean="0"/>
+              <a:t>die </a:t>
             </a:r>
             <a:r>
               <a:rPr lang="en-US" dirty="0" err="1" smtClean="0"/>
@@ -18744,8 +18752,8 @@
           </a:p>
         </p:txBody>
       </p:sp>
-      <mc:AlternateContent xmlns:mc="http://schemas.openxmlformats.org/markup-compatibility/2006">
-        <mc:Choice xmlns:a14="http://schemas.microsoft.com/office/drawing/2010/main" Requires="a14">
+      <mc:AlternateContent xmlns:mc="http://schemas.openxmlformats.org/markup-compatibility/2006" xmlns:a14="http://schemas.microsoft.com/office/drawing/2010/main">
+        <mc:Choice Requires="a14">
           <p:sp>
             <p:nvSpPr>
               <p:cNvPr id="3" name="Content Placeholder 2"/>
@@ -19183,10 +19191,9 @@
                   <a:t>wird</a:t>
                 </a:r>
                 <a:r>
-                  <a:rPr lang="en-US" smtClean="0"/>
+                  <a:rPr lang="en-US" dirty="0" smtClean="0"/>
                   <a:t>.</a:t>
                 </a:r>
-                <a:endParaRPr lang="en-US" dirty="0" smtClean="0"/>
               </a:p>
               <a:p>
                 <a:r>
@@ -19228,7 +19235,7 @@
             </p:txBody>
           </p:sp>
         </mc:Choice>
-        <mc:Fallback>
+        <mc:Fallback xmlns="">
           <p:sp>
             <p:nvSpPr>
               <p:cNvPr id="3" name="Content Placeholder 2"/>
@@ -19556,6 +19563,749 @@
       </p:par>
     </p:tnLst>
   </p:timing>
+</p:sld>
+</file>
+
+<file path=ppt/slides/slide30.xml><?xml version="1.0" encoding="utf-8"?>
+<p:sld xmlns:a="http://schemas.openxmlformats.org/drawingml/2006/main" xmlns:r="http://schemas.openxmlformats.org/officeDocument/2006/relationships" xmlns:p="http://schemas.openxmlformats.org/presentationml/2006/main">
+  <p:cSld>
+    <p:spTree>
+      <p:nvGrpSpPr>
+        <p:cNvPr id="1" name=""/>
+        <p:cNvGrpSpPr/>
+        <p:nvPr/>
+      </p:nvGrpSpPr>
+      <p:grpSpPr>
+        <a:xfrm>
+          <a:off x="0" y="0"/>
+          <a:ext cx="0" cy="0"/>
+          <a:chOff x="0" y="0"/>
+          <a:chExt cx="0" cy="0"/>
+        </a:xfrm>
+      </p:grpSpPr>
+      <p:sp>
+        <p:nvSpPr>
+          <p:cNvPr id="2" name="Title 1"/>
+          <p:cNvSpPr>
+            <a:spLocks noGrp="1"/>
+          </p:cNvSpPr>
+          <p:nvPr>
+            <p:ph type="title"/>
+          </p:nvPr>
+        </p:nvSpPr>
+        <p:spPr/>
+        <p:txBody>
+          <a:bodyPr/>
+          <a:lstStyle/>
+          <a:p>
+            <a:r>
+              <a:rPr lang="en-US" dirty="0" err="1" smtClean="0"/>
+              <a:t>Combsort</a:t>
+            </a:r>
+            <a:r>
+              <a:rPr lang="en-US" dirty="0" smtClean="0"/>
+              <a:t> – </a:t>
+            </a:r>
+            <a:r>
+              <a:rPr lang="en-US" dirty="0" err="1" smtClean="0"/>
+              <a:t>allgemeine</a:t>
+            </a:r>
+            <a:r>
+              <a:rPr lang="en-US" dirty="0" smtClean="0"/>
+              <a:t> </a:t>
+            </a:r>
+            <a:r>
+              <a:rPr lang="en-US" dirty="0" err="1" smtClean="0"/>
+              <a:t>idee</a:t>
+            </a:r>
+            <a:endParaRPr lang="bg-BG" dirty="0"/>
+          </a:p>
+        </p:txBody>
+      </p:sp>
+      <p:sp>
+        <p:nvSpPr>
+          <p:cNvPr id="3" name="Content Placeholder 2"/>
+          <p:cNvSpPr>
+            <a:spLocks noGrp="1"/>
+          </p:cNvSpPr>
+          <p:nvPr>
+            <p:ph idx="1"/>
+          </p:nvPr>
+        </p:nvSpPr>
+        <p:spPr/>
+        <p:txBody>
+          <a:bodyPr/>
+          <a:lstStyle/>
+          <a:p>
+            <a:r>
+              <a:rPr lang="en-US" dirty="0" err="1" smtClean="0"/>
+              <a:t>Prinzipiell</a:t>
+            </a:r>
+            <a:r>
+              <a:rPr lang="en-US" dirty="0" smtClean="0"/>
+              <a:t> </a:t>
+            </a:r>
+            <a:r>
+              <a:rPr lang="en-US" dirty="0" err="1" smtClean="0"/>
+              <a:t>ist</a:t>
+            </a:r>
+            <a:r>
+              <a:rPr lang="en-US" dirty="0" smtClean="0"/>
+              <a:t> dieses </a:t>
+            </a:r>
+            <a:r>
+              <a:rPr lang="en-US" dirty="0" err="1" smtClean="0"/>
+              <a:t>Verfahren</a:t>
+            </a:r>
+            <a:r>
+              <a:rPr lang="en-US" dirty="0" smtClean="0"/>
+              <a:t> von </a:t>
+            </a:r>
+            <a:r>
+              <a:rPr lang="en-US" dirty="0" err="1" smtClean="0"/>
+              <a:t>Bubblesort</a:t>
+            </a:r>
+            <a:r>
+              <a:rPr lang="en-US" dirty="0" smtClean="0"/>
+              <a:t> </a:t>
+            </a:r>
+            <a:r>
+              <a:rPr lang="en-US" dirty="0" err="1" smtClean="0"/>
+              <a:t>abgestammt</a:t>
+            </a:r>
+            <a:r>
+              <a:rPr lang="en-US" dirty="0" smtClean="0"/>
+              <a:t>, </a:t>
+            </a:r>
+            <a:r>
+              <a:rPr lang="en-US" dirty="0" err="1" smtClean="0"/>
+              <a:t>kombinert</a:t>
+            </a:r>
+            <a:r>
+              <a:rPr lang="en-US" dirty="0" smtClean="0"/>
+              <a:t> </a:t>
+            </a:r>
+            <a:r>
+              <a:rPr lang="en-US" dirty="0" err="1" smtClean="0"/>
+              <a:t>aber</a:t>
+            </a:r>
+            <a:r>
+              <a:rPr lang="en-US" dirty="0" smtClean="0"/>
+              <a:t> </a:t>
+            </a:r>
+            <a:r>
+              <a:rPr lang="en-US" dirty="0" err="1" smtClean="0"/>
+              <a:t>auch</a:t>
+            </a:r>
+            <a:r>
+              <a:rPr lang="en-US" dirty="0" smtClean="0"/>
+              <a:t> </a:t>
+            </a:r>
+            <a:r>
+              <a:rPr lang="en-US" dirty="0" err="1" smtClean="0"/>
+              <a:t>Techniken</a:t>
+            </a:r>
+            <a:r>
+              <a:rPr lang="en-US" dirty="0" smtClean="0"/>
+              <a:t> von </a:t>
+            </a:r>
+            <a:r>
+              <a:rPr lang="en-US" dirty="0" err="1" smtClean="0"/>
+              <a:t>Shellsort</a:t>
+            </a:r>
+            <a:r>
+              <a:rPr lang="en-US" dirty="0" smtClean="0"/>
+              <a:t>.</a:t>
+            </a:r>
+          </a:p>
+          <a:p>
+            <a:r>
+              <a:rPr lang="en-US" dirty="0" smtClean="0"/>
+              <a:t>Die </a:t>
+            </a:r>
+            <a:r>
+              <a:rPr lang="en-US" dirty="0" err="1" smtClean="0"/>
+              <a:t>Idee</a:t>
+            </a:r>
+            <a:r>
+              <a:rPr lang="en-US" dirty="0" smtClean="0"/>
+              <a:t> </a:t>
+            </a:r>
+            <a:r>
+              <a:rPr lang="en-US" dirty="0" err="1" smtClean="0"/>
+              <a:t>ist</a:t>
+            </a:r>
+            <a:r>
+              <a:rPr lang="en-US" dirty="0" smtClean="0"/>
+              <a:t>, </a:t>
+            </a:r>
+            <a:r>
+              <a:rPr lang="en-US" dirty="0" err="1" smtClean="0"/>
+              <a:t>dass</a:t>
+            </a:r>
+            <a:r>
+              <a:rPr lang="en-US" dirty="0" smtClean="0"/>
+              <a:t> man </a:t>
+            </a:r>
+            <a:r>
+              <a:rPr lang="en-US" dirty="0" err="1" smtClean="0"/>
+              <a:t>nicht</a:t>
+            </a:r>
+            <a:r>
+              <a:rPr lang="en-US" dirty="0" smtClean="0"/>
+              <a:t> </a:t>
+            </a:r>
+            <a:r>
+              <a:rPr lang="en-US" dirty="0" err="1" smtClean="0"/>
+              <a:t>nur</a:t>
+            </a:r>
+            <a:r>
+              <a:rPr lang="en-US" dirty="0" smtClean="0"/>
+              <a:t> </a:t>
+            </a:r>
+            <a:r>
+              <a:rPr lang="en-US" dirty="0" err="1" smtClean="0"/>
+              <a:t>benachbarte</a:t>
+            </a:r>
+            <a:r>
+              <a:rPr lang="en-US" dirty="0" smtClean="0"/>
+              <a:t> </a:t>
+            </a:r>
+            <a:r>
+              <a:rPr lang="en-US" dirty="0" err="1" smtClean="0"/>
+              <a:t>Elemente</a:t>
+            </a:r>
+            <a:r>
+              <a:rPr lang="en-US" dirty="0" smtClean="0"/>
+              <a:t> </a:t>
+            </a:r>
+            <a:r>
+              <a:rPr lang="en-US" dirty="0" err="1" smtClean="0"/>
+              <a:t>vergleicht</a:t>
+            </a:r>
+            <a:r>
+              <a:rPr lang="en-US" dirty="0" smtClean="0"/>
+              <a:t> und </a:t>
+            </a:r>
+            <a:r>
+              <a:rPr lang="en-US" dirty="0" err="1" smtClean="0"/>
+              <a:t>vertauscht</a:t>
+            </a:r>
+            <a:r>
+              <a:rPr lang="en-US" dirty="0" smtClean="0"/>
+              <a:t>. Das </a:t>
+            </a:r>
+            <a:r>
+              <a:rPr lang="en-US" dirty="0" err="1" smtClean="0"/>
+              <a:t>Verfahren</a:t>
+            </a:r>
+            <a:r>
+              <a:rPr lang="en-US" dirty="0" smtClean="0"/>
+              <a:t> </a:t>
+            </a:r>
+            <a:r>
+              <a:rPr lang="en-US" dirty="0" err="1" smtClean="0"/>
+              <a:t>beginnt</a:t>
+            </a:r>
+            <a:r>
+              <a:rPr lang="en-US" dirty="0" smtClean="0"/>
+              <a:t> </a:t>
+            </a:r>
+            <a:r>
+              <a:rPr lang="en-US" dirty="0" err="1" smtClean="0"/>
+              <a:t>mit</a:t>
+            </a:r>
+            <a:r>
+              <a:rPr lang="en-US" dirty="0" smtClean="0"/>
+              <a:t> den </a:t>
+            </a:r>
+            <a:r>
+              <a:rPr lang="en-US" dirty="0" err="1" smtClean="0"/>
+              <a:t>Elementen</a:t>
+            </a:r>
+            <a:r>
+              <a:rPr lang="en-US" dirty="0" smtClean="0"/>
+              <a:t>, die </a:t>
+            </a:r>
+            <a:r>
+              <a:rPr lang="en-US" dirty="0" err="1" smtClean="0"/>
+              <a:t>weit</a:t>
+            </a:r>
+            <a:r>
+              <a:rPr lang="en-US" dirty="0" smtClean="0"/>
+              <a:t> </a:t>
+            </a:r>
+            <a:r>
+              <a:rPr lang="en-US" dirty="0" err="1" smtClean="0"/>
+              <a:t>auseinander</a:t>
+            </a:r>
+            <a:r>
+              <a:rPr lang="en-US" dirty="0" smtClean="0"/>
+              <a:t> </a:t>
+            </a:r>
+            <a:r>
+              <a:rPr lang="en-US" dirty="0" err="1" smtClean="0"/>
+              <a:t>Liegen</a:t>
+            </a:r>
+            <a:r>
+              <a:rPr lang="en-US" dirty="0" smtClean="0"/>
+              <a:t>, und die </a:t>
+            </a:r>
+            <a:r>
+              <a:rPr lang="en-US" dirty="0" err="1" smtClean="0"/>
+              <a:t>Lücke</a:t>
+            </a:r>
+            <a:r>
+              <a:rPr lang="en-US" dirty="0" smtClean="0"/>
+              <a:t> </a:t>
+            </a:r>
+            <a:r>
+              <a:rPr lang="en-US" dirty="0" err="1" smtClean="0"/>
+              <a:t>wird</a:t>
+            </a:r>
+            <a:r>
+              <a:rPr lang="en-US" dirty="0" smtClean="0"/>
+              <a:t> </a:t>
+            </a:r>
+            <a:r>
+              <a:rPr lang="en-US" dirty="0" err="1" smtClean="0"/>
+              <a:t>nach</a:t>
+            </a:r>
+            <a:r>
+              <a:rPr lang="en-US" dirty="0" smtClean="0"/>
+              <a:t> </a:t>
+            </a:r>
+            <a:r>
+              <a:rPr lang="en-US" dirty="0" err="1" smtClean="0"/>
+              <a:t>jeder</a:t>
+            </a:r>
+            <a:r>
+              <a:rPr lang="en-US" dirty="0" smtClean="0"/>
+              <a:t> Iteration </a:t>
+            </a:r>
+            <a:r>
+              <a:rPr lang="en-US" dirty="0" err="1" smtClean="0"/>
+              <a:t>mit</a:t>
+            </a:r>
+            <a:r>
+              <a:rPr lang="en-US" dirty="0" smtClean="0"/>
+              <a:t> </a:t>
+            </a:r>
+            <a:r>
+              <a:rPr lang="en-US" dirty="0" err="1" smtClean="0"/>
+              <a:t>genau</a:t>
+            </a:r>
+            <a:r>
+              <a:rPr lang="en-US" dirty="0" smtClean="0"/>
+              <a:t> 1.3 </a:t>
+            </a:r>
+            <a:r>
+              <a:rPr lang="en-US" dirty="0" err="1" smtClean="0"/>
+              <a:t>verkleinert</a:t>
+            </a:r>
+            <a:r>
+              <a:rPr lang="en-US" dirty="0" smtClean="0"/>
+              <a:t>. Der </a:t>
+            </a:r>
+            <a:r>
+              <a:rPr lang="en-US" dirty="0" err="1" smtClean="0"/>
+              <a:t>Algorithmus</a:t>
+            </a:r>
+            <a:r>
+              <a:rPr lang="en-US" dirty="0" smtClean="0"/>
+              <a:t> </a:t>
+            </a:r>
+            <a:r>
+              <a:rPr lang="en-US" dirty="0" err="1" smtClean="0"/>
+              <a:t>terminiert</a:t>
+            </a:r>
+            <a:r>
+              <a:rPr lang="en-US" dirty="0" smtClean="0"/>
+              <a:t>, </a:t>
+            </a:r>
+            <a:r>
+              <a:rPr lang="en-US" dirty="0" err="1" smtClean="0"/>
+              <a:t>wenn</a:t>
+            </a:r>
+            <a:r>
+              <a:rPr lang="en-US" dirty="0" smtClean="0"/>
+              <a:t> </a:t>
+            </a:r>
+            <a:r>
+              <a:rPr lang="en-US" dirty="0" err="1" smtClean="0"/>
+              <a:t>eine</a:t>
+            </a:r>
+            <a:r>
+              <a:rPr lang="en-US" dirty="0" smtClean="0"/>
+              <a:t> </a:t>
+            </a:r>
+            <a:r>
+              <a:rPr lang="en-US" dirty="0" err="1" smtClean="0"/>
+              <a:t>Lücke</a:t>
+            </a:r>
+            <a:r>
+              <a:rPr lang="en-US" dirty="0" smtClean="0"/>
+              <a:t> von 1 </a:t>
+            </a:r>
+            <a:r>
+              <a:rPr lang="en-US" dirty="0" err="1" smtClean="0"/>
+              <a:t>erreicht</a:t>
+            </a:r>
+            <a:r>
+              <a:rPr lang="en-US" dirty="0" smtClean="0"/>
+              <a:t> </a:t>
+            </a:r>
+            <a:r>
+              <a:rPr lang="en-US" dirty="0" err="1" smtClean="0"/>
+              <a:t>ist</a:t>
+            </a:r>
+            <a:r>
+              <a:rPr lang="en-US" dirty="0" smtClean="0"/>
+              <a:t>.</a:t>
+            </a:r>
+            <a:endParaRPr lang="bg-BG" dirty="0"/>
+          </a:p>
+        </p:txBody>
+      </p:sp>
+    </p:spTree>
+    <p:extLst>
+      <p:ext uri="{BB962C8B-B14F-4D97-AF65-F5344CB8AC3E}">
+        <p14:creationId xmlns:p14="http://schemas.microsoft.com/office/powerpoint/2010/main" val="1651376267"/>
+      </p:ext>
+    </p:extLst>
+  </p:cSld>
+  <p:clrMapOvr>
+    <a:masterClrMapping/>
+  </p:clrMapOvr>
+</p:sld>
+</file>
+
+<file path=ppt/slides/slide31.xml><?xml version="1.0" encoding="utf-8"?>
+<p:sld xmlns:a="http://schemas.openxmlformats.org/drawingml/2006/main" xmlns:r="http://schemas.openxmlformats.org/officeDocument/2006/relationships" xmlns:p="http://schemas.openxmlformats.org/presentationml/2006/main">
+  <p:cSld>
+    <p:spTree>
+      <p:nvGrpSpPr>
+        <p:cNvPr id="1" name=""/>
+        <p:cNvGrpSpPr/>
+        <p:nvPr/>
+      </p:nvGrpSpPr>
+      <p:grpSpPr>
+        <a:xfrm>
+          <a:off x="0" y="0"/>
+          <a:ext cx="0" cy="0"/>
+          <a:chOff x="0" y="0"/>
+          <a:chExt cx="0" cy="0"/>
+        </a:xfrm>
+      </p:grpSpPr>
+      <p:sp>
+        <p:nvSpPr>
+          <p:cNvPr id="2" name="Title 1"/>
+          <p:cNvSpPr>
+            <a:spLocks noGrp="1"/>
+          </p:cNvSpPr>
+          <p:nvPr>
+            <p:ph type="title"/>
+          </p:nvPr>
+        </p:nvSpPr>
+        <p:spPr/>
+        <p:txBody>
+          <a:bodyPr/>
+          <a:lstStyle/>
+          <a:p>
+            <a:r>
+              <a:rPr lang="en-US" dirty="0" err="1" smtClean="0"/>
+              <a:t>Combsort</a:t>
+            </a:r>
+            <a:r>
+              <a:rPr lang="en-US" dirty="0" smtClean="0"/>
+              <a:t> – </a:t>
+            </a:r>
+            <a:r>
+              <a:rPr lang="en-US" dirty="0" err="1" smtClean="0"/>
+              <a:t>pseudocode</a:t>
+            </a:r>
+            <a:endParaRPr lang="bg-BG" dirty="0"/>
+          </a:p>
+        </p:txBody>
+      </p:sp>
+      <p:pic>
+        <p:nvPicPr>
+          <p:cNvPr id="4" name="Content Placeholder 3"/>
+          <p:cNvPicPr>
+            <a:picLocks noGrp="1" noChangeAspect="1"/>
+          </p:cNvPicPr>
+          <p:nvPr>
+            <p:ph idx="1"/>
+          </p:nvPr>
+        </p:nvPicPr>
+        <p:blipFill>
+          <a:blip r:embed="rId2">
+            <a:extLst>
+              <a:ext uri="{28A0092B-C50C-407E-A947-70E740481C1C}">
+                <a14:useLocalDpi xmlns:a14="http://schemas.microsoft.com/office/drawing/2010/main" val="0"/>
+              </a:ext>
+            </a:extLst>
+          </a:blip>
+          <a:stretch>
+            <a:fillRect/>
+          </a:stretch>
+        </p:blipFill>
+        <p:spPr>
+          <a:xfrm>
+            <a:off x="1141413" y="1931037"/>
+            <a:ext cx="4086795" cy="2248214"/>
+          </a:xfrm>
+        </p:spPr>
+      </p:pic>
+    </p:spTree>
+    <p:extLst>
+      <p:ext uri="{BB962C8B-B14F-4D97-AF65-F5344CB8AC3E}">
+        <p14:creationId xmlns:p14="http://schemas.microsoft.com/office/powerpoint/2010/main" val="961411708"/>
+      </p:ext>
+    </p:extLst>
+  </p:cSld>
+  <p:clrMapOvr>
+    <a:masterClrMapping/>
+  </p:clrMapOvr>
+</p:sld>
+</file>
+
+<file path=ppt/slides/slide32.xml><?xml version="1.0" encoding="utf-8"?>
+<p:sld xmlns:a="http://schemas.openxmlformats.org/drawingml/2006/main" xmlns:r="http://schemas.openxmlformats.org/officeDocument/2006/relationships" xmlns:p="http://schemas.openxmlformats.org/presentationml/2006/main">
+  <p:cSld>
+    <p:spTree>
+      <p:nvGrpSpPr>
+        <p:cNvPr id="1" name=""/>
+        <p:cNvGrpSpPr/>
+        <p:nvPr/>
+      </p:nvGrpSpPr>
+      <p:grpSpPr>
+        <a:xfrm>
+          <a:off x="0" y="0"/>
+          <a:ext cx="0" cy="0"/>
+          <a:chOff x="0" y="0"/>
+          <a:chExt cx="0" cy="0"/>
+        </a:xfrm>
+      </p:grpSpPr>
+      <p:sp>
+        <p:nvSpPr>
+          <p:cNvPr id="2" name="Title 1"/>
+          <p:cNvSpPr>
+            <a:spLocks noGrp="1"/>
+          </p:cNvSpPr>
+          <p:nvPr>
+            <p:ph type="title"/>
+          </p:nvPr>
+        </p:nvSpPr>
+        <p:spPr/>
+        <p:txBody>
+          <a:bodyPr/>
+          <a:lstStyle/>
+          <a:p>
+            <a:r>
+              <a:rPr lang="en-US" dirty="0" err="1" smtClean="0"/>
+              <a:t>Combsort</a:t>
+            </a:r>
+            <a:r>
+              <a:rPr lang="en-US" dirty="0" smtClean="0"/>
+              <a:t> – </a:t>
+            </a:r>
+            <a:r>
+              <a:rPr lang="en-US" dirty="0" err="1" smtClean="0"/>
+              <a:t>c++</a:t>
+            </a:r>
+            <a:endParaRPr lang="bg-BG" dirty="0"/>
+          </a:p>
+        </p:txBody>
+      </p:sp>
+      <p:pic>
+        <p:nvPicPr>
+          <p:cNvPr id="6" name="Content Placeholder 5"/>
+          <p:cNvPicPr>
+            <a:picLocks noGrp="1" noChangeAspect="1"/>
+          </p:cNvPicPr>
+          <p:nvPr>
+            <p:ph idx="1"/>
+          </p:nvPr>
+        </p:nvPicPr>
+        <p:blipFill>
+          <a:blip r:embed="rId2">
+            <a:extLst>
+              <a:ext uri="{28A0092B-C50C-407E-A947-70E740481C1C}">
+                <a14:useLocalDpi xmlns:a14="http://schemas.microsoft.com/office/drawing/2010/main" val="0"/>
+              </a:ext>
+            </a:extLst>
+          </a:blip>
+          <a:stretch>
+            <a:fillRect/>
+          </a:stretch>
+        </p:blipFill>
+        <p:spPr>
+          <a:xfrm>
+            <a:off x="5020706" y="326232"/>
+            <a:ext cx="6371193" cy="6276384"/>
+          </a:xfrm>
+        </p:spPr>
+      </p:pic>
+    </p:spTree>
+    <p:extLst>
+      <p:ext uri="{BB962C8B-B14F-4D97-AF65-F5344CB8AC3E}">
+        <p14:creationId xmlns:p14="http://schemas.microsoft.com/office/powerpoint/2010/main" val="1900487027"/>
+      </p:ext>
+    </p:extLst>
+  </p:cSld>
+  <p:clrMapOvr>
+    <a:masterClrMapping/>
+  </p:clrMapOvr>
+</p:sld>
+</file>
+
+<file path=ppt/slides/slide33.xml><?xml version="1.0" encoding="utf-8"?>
+<p:sld xmlns:a="http://schemas.openxmlformats.org/drawingml/2006/main" xmlns:r="http://schemas.openxmlformats.org/officeDocument/2006/relationships" xmlns:p="http://schemas.openxmlformats.org/presentationml/2006/main">
+  <p:cSld>
+    <p:spTree>
+      <p:nvGrpSpPr>
+        <p:cNvPr id="1" name=""/>
+        <p:cNvGrpSpPr/>
+        <p:nvPr/>
+      </p:nvGrpSpPr>
+      <p:grpSpPr>
+        <a:xfrm>
+          <a:off x="0" y="0"/>
+          <a:ext cx="0" cy="0"/>
+          <a:chOff x="0" y="0"/>
+          <a:chExt cx="0" cy="0"/>
+        </a:xfrm>
+      </p:grpSpPr>
+      <p:sp>
+        <p:nvSpPr>
+          <p:cNvPr id="2" name="Title 1"/>
+          <p:cNvSpPr>
+            <a:spLocks noGrp="1"/>
+          </p:cNvSpPr>
+          <p:nvPr>
+            <p:ph type="title"/>
+          </p:nvPr>
+        </p:nvSpPr>
+        <p:spPr/>
+        <p:txBody>
+          <a:bodyPr/>
+          <a:lstStyle/>
+          <a:p>
+            <a:r>
+              <a:rPr lang="en-US" dirty="0" err="1" smtClean="0"/>
+              <a:t>Combsort</a:t>
+            </a:r>
+            <a:r>
+              <a:rPr lang="en-US" dirty="0" smtClean="0"/>
+              <a:t> - </a:t>
+            </a:r>
+            <a:r>
+              <a:rPr lang="en-US" dirty="0" err="1" smtClean="0"/>
+              <a:t>eigenschaften</a:t>
+            </a:r>
+            <a:endParaRPr lang="bg-BG" dirty="0"/>
+          </a:p>
+        </p:txBody>
+      </p:sp>
+      <p:sp>
+        <p:nvSpPr>
+          <p:cNvPr id="3" name="Content Placeholder 2"/>
+          <p:cNvSpPr>
+            <a:spLocks noGrp="1"/>
+          </p:cNvSpPr>
+          <p:nvPr>
+            <p:ph idx="1"/>
+          </p:nvPr>
+        </p:nvSpPr>
+        <p:spPr/>
+        <p:txBody>
+          <a:bodyPr/>
+          <a:lstStyle/>
+          <a:p>
+            <a:r>
+              <a:rPr lang="en-US" dirty="0" err="1" smtClean="0"/>
+              <a:t>Arbeitet</a:t>
+            </a:r>
+            <a:r>
+              <a:rPr lang="en-US" dirty="0" smtClean="0"/>
+              <a:t> in-place</a:t>
+            </a:r>
+          </a:p>
+          <a:p>
+            <a:r>
+              <a:rPr lang="en-US" dirty="0" err="1" smtClean="0"/>
+              <a:t>Ist</a:t>
+            </a:r>
+            <a:r>
+              <a:rPr lang="en-US" dirty="0" smtClean="0"/>
+              <a:t> </a:t>
+            </a:r>
+            <a:r>
+              <a:rPr lang="en-US" dirty="0" err="1" smtClean="0"/>
+              <a:t>nicht</a:t>
+            </a:r>
+            <a:r>
+              <a:rPr lang="en-US" dirty="0" smtClean="0"/>
+              <a:t> </a:t>
+            </a:r>
+            <a:r>
+              <a:rPr lang="en-US" dirty="0" err="1" smtClean="0"/>
+              <a:t>stabil</a:t>
+            </a:r>
+            <a:endParaRPr lang="en-US" dirty="0" smtClean="0"/>
+          </a:p>
+          <a:p>
+            <a:r>
+              <a:rPr lang="en-US" dirty="0" smtClean="0"/>
+              <a:t>Worst-case:</a:t>
+            </a:r>
+            <a:r>
+              <a:rPr lang="en-US" dirty="0"/>
+              <a:t> O(n</a:t>
+            </a:r>
+            <a:r>
+              <a:rPr lang="en-US" baseline="30000" dirty="0"/>
+              <a:t>2</a:t>
+            </a:r>
+            <a:r>
+              <a:rPr lang="en-US" dirty="0" smtClean="0"/>
+              <a:t>)</a:t>
+            </a:r>
+          </a:p>
+          <a:p>
+            <a:r>
+              <a:rPr lang="en-US" dirty="0" smtClean="0"/>
+              <a:t>Average case: O(</a:t>
+            </a:r>
+            <a:r>
+              <a:rPr lang="en-US" dirty="0" err="1" smtClean="0"/>
+              <a:t>nlogn</a:t>
+            </a:r>
+            <a:r>
+              <a:rPr lang="en-US" dirty="0" smtClean="0"/>
+              <a:t>) </a:t>
+            </a:r>
+          </a:p>
+          <a:p>
+            <a:r>
+              <a:rPr lang="en-US" dirty="0" smtClean="0"/>
+              <a:t>Best case: O(n) </a:t>
+            </a:r>
+            <a:endParaRPr lang="bg-BG" dirty="0"/>
+          </a:p>
+        </p:txBody>
+      </p:sp>
+    </p:spTree>
+    <p:extLst>
+      <p:ext uri="{BB962C8B-B14F-4D97-AF65-F5344CB8AC3E}">
+        <p14:creationId xmlns:p14="http://schemas.microsoft.com/office/powerpoint/2010/main" val="2165275442"/>
+      </p:ext>
+    </p:extLst>
+  </p:cSld>
+  <p:clrMapOvr>
+    <a:masterClrMapping/>
+  </p:clrMapOvr>
 </p:sld>
 </file>
 

</xml_diff>

<commit_message>
Added Mergesort to documentation
</commit_message>
<xml_diff>
--- a/docs/sorting algorithms - presentation/Sortierverfahren.pptx
+++ b/docs/sorting algorithms - presentation/Sortierverfahren.pptx
@@ -35,9 +35,11 @@
     <p:sldId id="283" r:id="rId29"/>
     <p:sldId id="284" r:id="rId30"/>
     <p:sldId id="285" r:id="rId31"/>
-    <p:sldId id="286" r:id="rId32"/>
-    <p:sldId id="287" r:id="rId33"/>
-    <p:sldId id="288" r:id="rId34"/>
+    <p:sldId id="287" r:id="rId32"/>
+    <p:sldId id="288" r:id="rId33"/>
+    <p:sldId id="289" r:id="rId34"/>
+    <p:sldId id="290" r:id="rId35"/>
+    <p:sldId id="291" r:id="rId36"/>
   </p:sldIdLst>
   <p:sldSz cx="12192000" cy="6858000"/>
   <p:notesSz cx="6858000" cy="9144000"/>
@@ -18752,8 +18754,8 @@
           </a:p>
         </p:txBody>
       </p:sp>
-      <mc:AlternateContent xmlns:mc="http://schemas.openxmlformats.org/markup-compatibility/2006" xmlns:a14="http://schemas.microsoft.com/office/drawing/2010/main">
-        <mc:Choice Requires="a14">
+      <mc:AlternateContent xmlns:mc="http://schemas.openxmlformats.org/markup-compatibility/2006">
+        <mc:Choice xmlns:a14="http://schemas.microsoft.com/office/drawing/2010/main" Requires="a14">
           <p:sp>
             <p:nvSpPr>
               <p:cNvPr id="3" name="Content Placeholder 2"/>
@@ -18764,10 +18766,15 @@
                 <p:ph idx="1"/>
               </p:nvPr>
             </p:nvSpPr>
-            <p:spPr/>
+            <p:spPr>
+              <a:xfrm>
+                <a:off x="1141412" y="2249486"/>
+                <a:ext cx="9905999" cy="4392613"/>
+              </a:xfrm>
+            </p:spPr>
             <p:txBody>
               <a:bodyPr>
-                <a:normAutofit fontScale="92500" lnSpcReduction="20000"/>
+                <a:normAutofit fontScale="92500" lnSpcReduction="10000"/>
               </a:bodyPr>
               <a:lstStyle/>
               <a:p>
@@ -19230,12 +19237,17 @@
                   <a:rPr lang="en-US" dirty="0" smtClean="0"/>
                   <a:t>.</a:t>
                 </a:r>
-                <a:endParaRPr lang="en-US" dirty="0"/>
+              </a:p>
+              <a:p>
+                <a:r>
+                  <a:rPr lang="en-US" dirty="0" smtClean="0"/>
+                  <a:t>Best known case – O(n)</a:t>
+                </a:r>
               </a:p>
             </p:txBody>
           </p:sp>
         </mc:Choice>
-        <mc:Fallback xmlns="">
+        <mc:Fallback>
           <p:sp>
             <p:nvSpPr>
               <p:cNvPr id="3" name="Content Placeholder 2"/>
@@ -19247,10 +19259,14 @@
               </p:nvPr>
             </p:nvSpPr>
             <p:spPr>
+              <a:xfrm>
+                <a:off x="1141412" y="2249486"/>
+                <a:ext cx="9905999" cy="4392613"/>
+              </a:xfrm>
               <a:blipFill rotWithShape="0">
                 <a:blip r:embed="rId2"/>
                 <a:stretch>
-                  <a:fillRect l="-1046" t="-3098" b="-1033"/>
+                  <a:fillRect l="-1046" t="-2219"/>
                 </a:stretch>
               </a:blipFill>
             </p:spPr>
@@ -20022,6 +20038,21 @@
             </a:r>
             <a:r>
               <a:rPr lang="en-US" dirty="0" err="1" smtClean="0"/>
+              <a:t>c++</a:t>
+            </a:r>
+            <a:r>
+              <a:rPr lang="en-US" dirty="0" smtClean="0"/>
+              <a:t/>
+            </a:r>
+            <a:br>
+              <a:rPr lang="en-US" dirty="0" smtClean="0"/>
+            </a:br>
+            <a:r>
+              <a:rPr lang="en-US" dirty="0" smtClean="0"/>
+              <a:t>and </a:t>
+            </a:r>
+            <a:r>
+              <a:rPr lang="en-US" dirty="0" err="1" smtClean="0"/>
               <a:t>pseudocode</a:t>
             </a:r>
             <a:endParaRPr lang="bg-BG" dirty="0"/>
@@ -20030,7 +20061,7 @@
       </p:sp>
       <p:pic>
         <p:nvPicPr>
-          <p:cNvPr id="4" name="Content Placeholder 3"/>
+          <p:cNvPr id="6" name="Content Placeholder 5"/>
           <p:cNvPicPr>
             <a:picLocks noGrp="1" noChangeAspect="1"/>
           </p:cNvPicPr>
@@ -20052,15 +20083,45 @@
         </p:blipFill>
         <p:spPr>
           <a:xfrm>
-            <a:off x="1141413" y="1931037"/>
+            <a:off x="5020706" y="326232"/>
+            <a:ext cx="6371193" cy="6276384"/>
+          </a:xfrm>
+        </p:spPr>
+      </p:pic>
+      <p:pic>
+        <p:nvPicPr>
+          <p:cNvPr id="7" name="Content Placeholder 3"/>
+          <p:cNvPicPr>
+            <a:picLocks noChangeAspect="1"/>
+          </p:cNvPicPr>
+          <p:nvPr/>
+        </p:nvPicPr>
+        <p:blipFill>
+          <a:blip r:embed="rId3">
+            <a:extLst>
+              <a:ext uri="{28A0092B-C50C-407E-A947-70E740481C1C}">
+                <a14:useLocalDpi xmlns:a14="http://schemas.microsoft.com/office/drawing/2010/main" val="0"/>
+              </a:ext>
+            </a:extLst>
+          </a:blip>
+          <a:stretch>
+            <a:fillRect/>
+          </a:stretch>
+        </p:blipFill>
+        <p:spPr>
+          <a:xfrm>
+            <a:off x="796925" y="2101638"/>
             <a:ext cx="4086795" cy="2248214"/>
           </a:xfrm>
+          <a:prstGeom prst="rect">
+            <a:avLst/>
+          </a:prstGeom>
         </p:spPr>
       </p:pic>
     </p:spTree>
     <p:extLst>
       <p:ext uri="{BB962C8B-B14F-4D97-AF65-F5344CB8AC3E}">
-        <p14:creationId xmlns:p14="http://schemas.microsoft.com/office/powerpoint/2010/main" val="961411708"/>
+        <p14:creationId xmlns:p14="http://schemas.microsoft.com/office/powerpoint/2010/main" val="1900487027"/>
       </p:ext>
     </p:extLst>
   </p:cSld>
@@ -20108,49 +20169,108 @@
             </a:r>
             <a:r>
               <a:rPr lang="en-US" dirty="0" smtClean="0"/>
-              <a:t> – </a:t>
-            </a:r>
-            <a:r>
-              <a:rPr lang="en-US" dirty="0" err="1" smtClean="0"/>
-              <a:t>c++</a:t>
+              <a:t> - </a:t>
+            </a:r>
+            <a:r>
+              <a:rPr lang="en-US" dirty="0" err="1" smtClean="0"/>
+              <a:t>eigenschaften</a:t>
             </a:r>
             <a:endParaRPr lang="bg-BG" dirty="0"/>
           </a:p>
         </p:txBody>
       </p:sp>
-      <p:pic>
-        <p:nvPicPr>
-          <p:cNvPr id="6" name="Content Placeholder 5"/>
-          <p:cNvPicPr>
-            <a:picLocks noGrp="1" noChangeAspect="1"/>
-          </p:cNvPicPr>
+      <p:sp>
+        <p:nvSpPr>
+          <p:cNvPr id="3" name="Content Placeholder 2"/>
+          <p:cNvSpPr>
+            <a:spLocks noGrp="1"/>
+          </p:cNvSpPr>
           <p:nvPr>
             <p:ph idx="1"/>
           </p:nvPr>
-        </p:nvPicPr>
-        <p:blipFill>
-          <a:blip r:embed="rId2">
-            <a:extLst>
-              <a:ext uri="{28A0092B-C50C-407E-A947-70E740481C1C}">
-                <a14:useLocalDpi xmlns:a14="http://schemas.microsoft.com/office/drawing/2010/main" val="0"/>
-              </a:ext>
-            </a:extLst>
-          </a:blip>
-          <a:stretch>
-            <a:fillRect/>
-          </a:stretch>
-        </p:blipFill>
-        <p:spPr>
-          <a:xfrm>
-            <a:off x="5020706" y="326232"/>
-            <a:ext cx="6371193" cy="6276384"/>
-          </a:xfrm>
-        </p:spPr>
-      </p:pic>
+        </p:nvSpPr>
+        <p:spPr/>
+        <p:txBody>
+          <a:bodyPr/>
+          <a:lstStyle/>
+          <a:p>
+            <a:r>
+              <a:rPr lang="en-US" dirty="0" err="1" smtClean="0"/>
+              <a:t>Arbeitet</a:t>
+            </a:r>
+            <a:r>
+              <a:rPr lang="en-US" dirty="0" smtClean="0"/>
+              <a:t> in-place</a:t>
+            </a:r>
+          </a:p>
+          <a:p>
+            <a:r>
+              <a:rPr lang="en-US" dirty="0" err="1" smtClean="0"/>
+              <a:t>Ist</a:t>
+            </a:r>
+            <a:r>
+              <a:rPr lang="en-US" dirty="0" smtClean="0"/>
+              <a:t> </a:t>
+            </a:r>
+            <a:r>
+              <a:rPr lang="en-US" dirty="0" err="1" smtClean="0"/>
+              <a:t>nicht</a:t>
+            </a:r>
+            <a:r>
+              <a:rPr lang="en-US" dirty="0" smtClean="0"/>
+              <a:t> </a:t>
+            </a:r>
+            <a:r>
+              <a:rPr lang="en-US" dirty="0" err="1" smtClean="0"/>
+              <a:t>stabil</a:t>
+            </a:r>
+            <a:endParaRPr lang="en-US" dirty="0" smtClean="0"/>
+          </a:p>
+          <a:p>
+            <a:r>
+              <a:rPr lang="en-US" dirty="0" smtClean="0"/>
+              <a:t>Worst-case:</a:t>
+            </a:r>
+            <a:r>
+              <a:rPr lang="en-US" dirty="0"/>
+              <a:t> O(n</a:t>
+            </a:r>
+            <a:r>
+              <a:rPr lang="en-US" baseline="30000" dirty="0"/>
+              <a:t>2</a:t>
+            </a:r>
+            <a:r>
+              <a:rPr lang="en-US" dirty="0" smtClean="0"/>
+              <a:t>)</a:t>
+            </a:r>
+          </a:p>
+          <a:p>
+            <a:r>
+              <a:rPr lang="en-US" dirty="0" smtClean="0"/>
+              <a:t>Average case: O(</a:t>
+            </a:r>
+            <a:r>
+              <a:rPr lang="en-US" dirty="0" err="1" smtClean="0"/>
+              <a:t>nlogn</a:t>
+            </a:r>
+            <a:r>
+              <a:rPr lang="en-US" dirty="0" smtClean="0"/>
+              <a:t>) </a:t>
+            </a:r>
+          </a:p>
+          <a:p>
+            <a:r>
+              <a:rPr lang="en-US" dirty="0" smtClean="0"/>
+              <a:t>Best case: O(n) </a:t>
+            </a:r>
+            <a:endParaRPr lang="bg-BG" dirty="0"/>
+          </a:p>
+        </p:txBody>
+      </p:sp>
     </p:spTree>
     <p:extLst>
       <p:ext uri="{BB962C8B-B14F-4D97-AF65-F5344CB8AC3E}">
-        <p14:creationId xmlns:p14="http://schemas.microsoft.com/office/powerpoint/2010/main" val="1900487027"/>
+        <p14:creationId xmlns:p14="http://schemas.microsoft.com/office/powerpoint/2010/main" val="2165275442"/>
       </p:ext>
     </p:extLst>
   </p:cSld>
@@ -20194,15 +20314,23 @@
           <a:p>
             <a:r>
               <a:rPr lang="en-US" dirty="0" err="1" smtClean="0"/>
-              <a:t>Combsort</a:t>
-            </a:r>
-            <a:r>
-              <a:rPr lang="en-US" dirty="0" smtClean="0"/>
-              <a:t> - </a:t>
-            </a:r>
-            <a:r>
-              <a:rPr lang="en-US" dirty="0" err="1" smtClean="0"/>
-              <a:t>eigenschaften</a:t>
+              <a:t>Mergesort</a:t>
+            </a:r>
+            <a:r>
+              <a:rPr lang="en-US" dirty="0" smtClean="0"/>
+              <a:t> – </a:t>
+            </a:r>
+            <a:r>
+              <a:rPr lang="en-US" dirty="0" err="1" smtClean="0"/>
+              <a:t>allgemeine</a:t>
+            </a:r>
+            <a:r>
+              <a:rPr lang="en-US" dirty="0" smtClean="0"/>
+              <a:t> </a:t>
+            </a:r>
+            <a:r>
+              <a:rPr lang="en-US" dirty="0" err="1" smtClean="0"/>
+              <a:t>idee</a:t>
             </a:r>
             <a:endParaRPr lang="bg-BG" dirty="0"/>
           </a:p>
@@ -20225,72 +20353,345 @@
           <a:p>
             <a:r>
               <a:rPr lang="en-US" dirty="0" err="1" smtClean="0"/>
-              <a:t>Arbeitet</a:t>
-            </a:r>
-            <a:r>
-              <a:rPr lang="en-US" dirty="0" smtClean="0"/>
-              <a:t> in-place</a:t>
-            </a:r>
-          </a:p>
-          <a:p>
-            <a:r>
-              <a:rPr lang="en-US" dirty="0" err="1" smtClean="0"/>
-              <a:t>Ist</a:t>
-            </a:r>
-            <a:r>
-              <a:rPr lang="en-US" dirty="0" smtClean="0"/>
-              <a:t> </a:t>
-            </a:r>
-            <a:r>
-              <a:rPr lang="en-US" dirty="0" err="1" smtClean="0"/>
-              <a:t>nicht</a:t>
-            </a:r>
-            <a:r>
-              <a:rPr lang="en-US" dirty="0" smtClean="0"/>
-              <a:t> </a:t>
-            </a:r>
-            <a:r>
-              <a:rPr lang="en-US" dirty="0" err="1" smtClean="0"/>
-              <a:t>stabil</a:t>
-            </a:r>
-            <a:endParaRPr lang="en-US" dirty="0" smtClean="0"/>
-          </a:p>
-          <a:p>
-            <a:r>
-              <a:rPr lang="en-US" dirty="0" smtClean="0"/>
-              <a:t>Worst-case:</a:t>
-            </a:r>
-            <a:r>
-              <a:rPr lang="en-US" dirty="0"/>
-              <a:t> O(n</a:t>
-            </a:r>
-            <a:r>
-              <a:rPr lang="en-US" baseline="30000" dirty="0"/>
-              <a:t>2</a:t>
-            </a:r>
-            <a:r>
-              <a:rPr lang="en-US" dirty="0" smtClean="0"/>
-              <a:t>)</a:t>
-            </a:r>
-          </a:p>
-          <a:p>
-            <a:r>
-              <a:rPr lang="en-US" dirty="0" smtClean="0"/>
-              <a:t>Average case: O(</a:t>
-            </a:r>
-            <a:r>
-              <a:rPr lang="en-US" dirty="0" err="1" smtClean="0"/>
-              <a:t>nlogn</a:t>
+              <a:t>Verfahren</a:t>
+            </a:r>
+            <a:r>
+              <a:rPr lang="en-US" dirty="0" smtClean="0"/>
+              <a:t>, das </a:t>
+            </a:r>
+            <a:r>
+              <a:rPr lang="en-US" dirty="0" err="1" smtClean="0"/>
+              <a:t>nach</a:t>
+            </a:r>
+            <a:r>
+              <a:rPr lang="en-US" dirty="0" smtClean="0"/>
+              <a:t> </a:t>
+            </a:r>
+            <a:r>
+              <a:rPr lang="en-US" dirty="0" err="1" smtClean="0"/>
+              <a:t>dem</a:t>
+            </a:r>
+            <a:r>
+              <a:rPr lang="en-US" dirty="0" smtClean="0"/>
+              <a:t> </a:t>
+            </a:r>
+            <a:r>
+              <a:rPr lang="en-US" dirty="0" err="1" smtClean="0"/>
+              <a:t>Prinzip</a:t>
+            </a:r>
+            <a:r>
+              <a:rPr lang="en-US" dirty="0" smtClean="0"/>
+              <a:t> “</a:t>
+            </a:r>
+            <a:r>
+              <a:rPr lang="en-US" dirty="0" err="1" smtClean="0"/>
+              <a:t>teile</a:t>
+            </a:r>
+            <a:r>
+              <a:rPr lang="en-US" dirty="0" smtClean="0"/>
+              <a:t> und </a:t>
+            </a:r>
+            <a:r>
+              <a:rPr lang="en-US" dirty="0" err="1" smtClean="0"/>
+              <a:t>herrsche</a:t>
+            </a:r>
+            <a:r>
+              <a:rPr lang="en-US" dirty="0" smtClean="0"/>
+              <a:t>” </a:t>
+            </a:r>
+            <a:r>
+              <a:rPr lang="en-US" dirty="0" err="1" smtClean="0"/>
+              <a:t>arbeitet</a:t>
+            </a:r>
+            <a:r>
+              <a:rPr lang="en-US" dirty="0" smtClean="0"/>
+              <a:t>.</a:t>
+            </a:r>
+          </a:p>
+          <a:p>
+            <a:r>
+              <a:rPr lang="en-US" dirty="0" smtClean="0"/>
+              <a:t>Die </a:t>
+            </a:r>
+            <a:r>
+              <a:rPr lang="en-US" dirty="0" err="1" smtClean="0"/>
+              <a:t>Eingabemenge</a:t>
+            </a:r>
+            <a:r>
+              <a:rPr lang="en-US" dirty="0" smtClean="0"/>
+              <a:t> </a:t>
+            </a:r>
+            <a:r>
+              <a:rPr lang="en-US" dirty="0" err="1" smtClean="0"/>
+              <a:t>würde</a:t>
+            </a:r>
+            <a:r>
+              <a:rPr lang="en-US" dirty="0" smtClean="0"/>
+              <a:t> </a:t>
+            </a:r>
+            <a:r>
+              <a:rPr lang="en-US" dirty="0" err="1" smtClean="0"/>
+              <a:t>als</a:t>
+            </a:r>
+            <a:r>
+              <a:rPr lang="en-US" dirty="0" smtClean="0"/>
+              <a:t> </a:t>
+            </a:r>
+            <a:r>
+              <a:rPr lang="en-US" dirty="0" err="1" smtClean="0"/>
+              <a:t>eine</a:t>
+            </a:r>
+            <a:r>
+              <a:rPr lang="en-US" dirty="0" smtClean="0"/>
+              <a:t> </a:t>
+            </a:r>
+            <a:r>
+              <a:rPr lang="en-US" dirty="0" err="1" smtClean="0"/>
+              <a:t>Liste</a:t>
+            </a:r>
+            <a:r>
+              <a:rPr lang="en-US" dirty="0" smtClean="0"/>
+              <a:t> </a:t>
+            </a:r>
+            <a:r>
+              <a:rPr lang="en-US" dirty="0" err="1" smtClean="0"/>
+              <a:t>dargestellt</a:t>
+            </a:r>
+            <a:r>
+              <a:rPr lang="en-US" dirty="0" smtClean="0"/>
+              <a:t>, und </a:t>
+            </a:r>
+            <a:r>
+              <a:rPr lang="en-US" dirty="0" err="1" smtClean="0"/>
+              <a:t>dann</a:t>
+            </a:r>
+            <a:r>
+              <a:rPr lang="en-US" dirty="0" smtClean="0"/>
+              <a:t> </a:t>
+            </a:r>
+            <a:r>
+              <a:rPr lang="en-US" dirty="0" err="1" smtClean="0"/>
+              <a:t>würde</a:t>
+            </a:r>
+            <a:r>
+              <a:rPr lang="en-US" dirty="0" smtClean="0"/>
+              <a:t> </a:t>
+            </a:r>
+            <a:r>
+              <a:rPr lang="en-US" dirty="0" err="1" smtClean="0"/>
+              <a:t>diese</a:t>
+            </a:r>
+            <a:r>
+              <a:rPr lang="en-US" dirty="0" smtClean="0"/>
+              <a:t> </a:t>
+            </a:r>
+            <a:r>
+              <a:rPr lang="en-US" dirty="0" err="1" smtClean="0"/>
+              <a:t>Liste</a:t>
+            </a:r>
+            <a:r>
+              <a:rPr lang="en-US" dirty="0" smtClean="0"/>
+              <a:t> in </a:t>
+            </a:r>
+            <a:r>
+              <a:rPr lang="en-US" dirty="0" err="1" smtClean="0"/>
+              <a:t>kleneren</a:t>
+            </a:r>
+            <a:r>
+              <a:rPr lang="en-US" dirty="0" smtClean="0"/>
+              <a:t> Listen (</a:t>
+            </a:r>
+            <a:r>
+              <a:rPr lang="en-US" dirty="0" err="1" smtClean="0"/>
+              <a:t>linke</a:t>
+            </a:r>
+            <a:r>
+              <a:rPr lang="en-US" dirty="0" smtClean="0"/>
+              <a:t> und </a:t>
+            </a:r>
+            <a:r>
+              <a:rPr lang="en-US" dirty="0" err="1" smtClean="0"/>
+              <a:t>rechte</a:t>
+            </a:r>
+            <a:r>
+              <a:rPr lang="en-US" dirty="0" smtClean="0"/>
+              <a:t> </a:t>
+            </a:r>
+            <a:r>
+              <a:rPr lang="en-US" dirty="0" err="1" smtClean="0"/>
+              <a:t>Liste</a:t>
             </a:r>
             <a:r>
               <a:rPr lang="en-US" dirty="0" smtClean="0"/>
               <a:t>) </a:t>
             </a:r>
-          </a:p>
-          <a:p>
-            <a:r>
-              <a:rPr lang="en-US" dirty="0" smtClean="0"/>
-              <a:t>Best case: O(n) </a:t>
+            <a:r>
+              <a:rPr lang="en-US" dirty="0" err="1" smtClean="0"/>
+              <a:t>zerteilt</a:t>
+            </a:r>
+            <a:r>
+              <a:rPr lang="en-US" dirty="0" smtClean="0"/>
+              <a:t> und </a:t>
+            </a:r>
+            <a:r>
+              <a:rPr lang="en-US" dirty="0" err="1" smtClean="0"/>
+              <a:t>jede</a:t>
+            </a:r>
+            <a:r>
+              <a:rPr lang="en-US" dirty="0" smtClean="0"/>
+              <a:t> </a:t>
+            </a:r>
+            <a:r>
+              <a:rPr lang="en-US" dirty="0" err="1" smtClean="0"/>
+              <a:t>für</a:t>
+            </a:r>
+            <a:r>
+              <a:rPr lang="en-US" dirty="0" smtClean="0"/>
+              <a:t> </a:t>
+            </a:r>
+            <a:r>
+              <a:rPr lang="en-US" dirty="0" err="1" smtClean="0"/>
+              <a:t>sich</a:t>
+            </a:r>
+            <a:r>
+              <a:rPr lang="en-US" dirty="0" smtClean="0"/>
+              <a:t> </a:t>
+            </a:r>
+            <a:r>
+              <a:rPr lang="en-US" dirty="0" err="1" smtClean="0"/>
+              <a:t>sortiert</a:t>
+            </a:r>
+            <a:r>
+              <a:rPr lang="en-US" dirty="0" smtClean="0"/>
+              <a:t> </a:t>
+            </a:r>
+            <a:r>
+              <a:rPr lang="en-US" dirty="0" err="1" smtClean="0"/>
+              <a:t>wird</a:t>
+            </a:r>
+            <a:r>
+              <a:rPr lang="en-US" dirty="0" smtClean="0"/>
+              <a:t>. </a:t>
+            </a:r>
+            <a:r>
+              <a:rPr lang="en-US" dirty="0" err="1" smtClean="0"/>
+              <a:t>Dann</a:t>
+            </a:r>
+            <a:r>
+              <a:rPr lang="en-US" dirty="0" smtClean="0"/>
+              <a:t> </a:t>
+            </a:r>
+            <a:r>
+              <a:rPr lang="en-US" dirty="0" err="1" smtClean="0"/>
+              <a:t>werden</a:t>
+            </a:r>
+            <a:r>
+              <a:rPr lang="en-US" dirty="0" smtClean="0"/>
+              <a:t> die </a:t>
+            </a:r>
+            <a:r>
+              <a:rPr lang="en-US" dirty="0" err="1" smtClean="0"/>
+              <a:t>kleine</a:t>
+            </a:r>
+            <a:r>
+              <a:rPr lang="en-US" dirty="0" smtClean="0"/>
+              <a:t> Listen </a:t>
+            </a:r>
+            <a:r>
+              <a:rPr lang="en-US" dirty="0" err="1" smtClean="0"/>
+              <a:t>wieder</a:t>
+            </a:r>
+            <a:r>
+              <a:rPr lang="en-US" dirty="0" smtClean="0"/>
+              <a:t> in </a:t>
+            </a:r>
+            <a:r>
+              <a:rPr lang="en-US" dirty="0" err="1" smtClean="0"/>
+              <a:t>eine</a:t>
+            </a:r>
+            <a:r>
+              <a:rPr lang="en-US" dirty="0" smtClean="0"/>
+              <a:t> </a:t>
+            </a:r>
+            <a:r>
+              <a:rPr lang="en-US" dirty="0" err="1" smtClean="0"/>
+              <a:t>resultante</a:t>
+            </a:r>
+            <a:r>
+              <a:rPr lang="en-US" dirty="0" smtClean="0"/>
+              <a:t> </a:t>
+            </a:r>
+            <a:r>
+              <a:rPr lang="en-US" dirty="0" err="1" smtClean="0"/>
+              <a:t>Menge</a:t>
+            </a:r>
+            <a:r>
+              <a:rPr lang="en-US" dirty="0" smtClean="0"/>
+              <a:t> </a:t>
+            </a:r>
+            <a:r>
+              <a:rPr lang="en-US" dirty="0" err="1" smtClean="0"/>
+              <a:t>eingefügt</a:t>
+            </a:r>
+            <a:r>
+              <a:rPr lang="en-US" dirty="0" smtClean="0"/>
+              <a:t>. Der </a:t>
+            </a:r>
+            <a:r>
+              <a:rPr lang="en-US" dirty="0" err="1" smtClean="0"/>
+              <a:t>Algorithmus</a:t>
+            </a:r>
+            <a:r>
+              <a:rPr lang="en-US" dirty="0" smtClean="0"/>
+              <a:t> </a:t>
+            </a:r>
+            <a:r>
+              <a:rPr lang="en-US" dirty="0" err="1" smtClean="0"/>
+              <a:t>terminitert</a:t>
+            </a:r>
+            <a:r>
+              <a:rPr lang="en-US" dirty="0" smtClean="0"/>
+              <a:t>, </a:t>
+            </a:r>
+            <a:r>
+              <a:rPr lang="en-US" dirty="0" err="1" smtClean="0"/>
+              <a:t>wenn</a:t>
+            </a:r>
+            <a:r>
+              <a:rPr lang="en-US" dirty="0" smtClean="0"/>
+              <a:t> </a:t>
+            </a:r>
+            <a:r>
+              <a:rPr lang="en-US" dirty="0" err="1" smtClean="0"/>
+              <a:t>nur</a:t>
+            </a:r>
+            <a:r>
+              <a:rPr lang="en-US" dirty="0" smtClean="0"/>
+              <a:t> </a:t>
+            </a:r>
+            <a:r>
+              <a:rPr lang="en-US" dirty="0" err="1" smtClean="0"/>
+              <a:t>ein</a:t>
+            </a:r>
+            <a:r>
+              <a:rPr lang="en-US" dirty="0" smtClean="0"/>
+              <a:t> Element in die </a:t>
+            </a:r>
+            <a:r>
+              <a:rPr lang="en-US" dirty="0" err="1" smtClean="0"/>
+              <a:t>Eingabemenge</a:t>
+            </a:r>
+            <a:r>
+              <a:rPr lang="en-US" dirty="0" smtClean="0"/>
+              <a:t> </a:t>
+            </a:r>
+            <a:r>
+              <a:rPr lang="en-US" dirty="0" err="1" smtClean="0"/>
+              <a:t>existiert</a:t>
+            </a:r>
+            <a:r>
+              <a:rPr lang="en-US" dirty="0" smtClean="0"/>
+              <a:t>.</a:t>
             </a:r>
             <a:endParaRPr lang="bg-BG" dirty="0"/>
           </a:p>
@@ -20299,7 +20700,496 @@
     </p:spTree>
     <p:extLst>
       <p:ext uri="{BB962C8B-B14F-4D97-AF65-F5344CB8AC3E}">
-        <p14:creationId xmlns:p14="http://schemas.microsoft.com/office/powerpoint/2010/main" val="2165275442"/>
+        <p14:creationId xmlns:p14="http://schemas.microsoft.com/office/powerpoint/2010/main" val="2566360359"/>
+      </p:ext>
+    </p:extLst>
+  </p:cSld>
+  <p:clrMapOvr>
+    <a:masterClrMapping/>
+  </p:clrMapOvr>
+</p:sld>
+</file>
+
+<file path=ppt/slides/slide34.xml><?xml version="1.0" encoding="utf-8"?>
+<p:sld xmlns:a="http://schemas.openxmlformats.org/drawingml/2006/main" xmlns:r="http://schemas.openxmlformats.org/officeDocument/2006/relationships" xmlns:p="http://schemas.openxmlformats.org/presentationml/2006/main">
+  <p:cSld>
+    <p:spTree>
+      <p:nvGrpSpPr>
+        <p:cNvPr id="1" name=""/>
+        <p:cNvGrpSpPr/>
+        <p:nvPr/>
+      </p:nvGrpSpPr>
+      <p:grpSpPr>
+        <a:xfrm>
+          <a:off x="0" y="0"/>
+          <a:ext cx="0" cy="0"/>
+          <a:chOff x="0" y="0"/>
+          <a:chExt cx="0" cy="0"/>
+        </a:xfrm>
+      </p:grpSpPr>
+      <p:sp>
+        <p:nvSpPr>
+          <p:cNvPr id="2" name="Title 1"/>
+          <p:cNvSpPr>
+            <a:spLocks noGrp="1"/>
+          </p:cNvSpPr>
+          <p:nvPr>
+            <p:ph type="title"/>
+          </p:nvPr>
+        </p:nvSpPr>
+        <p:spPr/>
+        <p:txBody>
+          <a:bodyPr/>
+          <a:lstStyle/>
+          <a:p>
+            <a:r>
+              <a:rPr lang="en-US" dirty="0" err="1" smtClean="0"/>
+              <a:t>Mergesort</a:t>
+            </a:r>
+            <a:r>
+              <a:rPr lang="en-US" dirty="0" smtClean="0"/>
+              <a:t> </a:t>
+            </a:r>
+            <a:r>
+              <a:rPr lang="en-US" dirty="0" err="1" smtClean="0"/>
+              <a:t>c++</a:t>
+            </a:r>
+            <a:r>
+              <a:rPr lang="en-US" dirty="0" smtClean="0"/>
+              <a:t>und</a:t>
+            </a:r>
+            <a:br>
+              <a:rPr lang="en-US" dirty="0" smtClean="0"/>
+            </a:br>
+            <a:r>
+              <a:rPr lang="en-US" dirty="0" err="1" smtClean="0"/>
+              <a:t>pseudocode</a:t>
+            </a:r>
+            <a:endParaRPr lang="bg-BG" dirty="0"/>
+          </a:p>
+        </p:txBody>
+      </p:sp>
+      <p:pic>
+        <p:nvPicPr>
+          <p:cNvPr id="4" name="Content Placeholder 3"/>
+          <p:cNvPicPr>
+            <a:picLocks noGrp="1" noChangeAspect="1"/>
+          </p:cNvPicPr>
+          <p:nvPr>
+            <p:ph idx="1"/>
+          </p:nvPr>
+        </p:nvPicPr>
+        <p:blipFill>
+          <a:blip r:embed="rId2">
+            <a:extLst>
+              <a:ext uri="{28A0092B-C50C-407E-A947-70E740481C1C}">
+                <a14:useLocalDpi xmlns:a14="http://schemas.microsoft.com/office/drawing/2010/main" val="0"/>
+              </a:ext>
+            </a:extLst>
+          </a:blip>
+          <a:stretch>
+            <a:fillRect/>
+          </a:stretch>
+        </p:blipFill>
+        <p:spPr>
+          <a:xfrm>
+            <a:off x="5956300" y="134525"/>
+            <a:ext cx="5296585" cy="6590951"/>
+          </a:xfrm>
+        </p:spPr>
+      </p:pic>
+      <p:pic>
+        <p:nvPicPr>
+          <p:cNvPr id="5" name="Picture 4"/>
+          <p:cNvPicPr>
+            <a:picLocks noChangeAspect="1"/>
+          </p:cNvPicPr>
+          <p:nvPr/>
+        </p:nvPicPr>
+        <p:blipFill>
+          <a:blip r:embed="rId3">
+            <a:extLst>
+              <a:ext uri="{28A0092B-C50C-407E-A947-70E740481C1C}">
+                <a14:useLocalDpi xmlns:a14="http://schemas.microsoft.com/office/drawing/2010/main" val="0"/>
+              </a:ext>
+            </a:extLst>
+          </a:blip>
+          <a:stretch>
+            <a:fillRect/>
+          </a:stretch>
+        </p:blipFill>
+        <p:spPr>
+          <a:xfrm>
+            <a:off x="798513" y="1920811"/>
+            <a:ext cx="4400912" cy="4804665"/>
+          </a:xfrm>
+          <a:prstGeom prst="rect">
+            <a:avLst/>
+          </a:prstGeom>
+        </p:spPr>
+      </p:pic>
+    </p:spTree>
+    <p:extLst>
+      <p:ext uri="{BB962C8B-B14F-4D97-AF65-F5344CB8AC3E}">
+        <p14:creationId xmlns:p14="http://schemas.microsoft.com/office/powerpoint/2010/main" val="1329608519"/>
+      </p:ext>
+    </p:extLst>
+  </p:cSld>
+  <p:clrMapOvr>
+    <a:masterClrMapping/>
+  </p:clrMapOvr>
+</p:sld>
+</file>
+
+<file path=ppt/slides/slide35.xml><?xml version="1.0" encoding="utf-8"?>
+<p:sld xmlns:a="http://schemas.openxmlformats.org/drawingml/2006/main" xmlns:r="http://schemas.openxmlformats.org/officeDocument/2006/relationships" xmlns:p="http://schemas.openxmlformats.org/presentationml/2006/main">
+  <p:cSld>
+    <p:spTree>
+      <p:nvGrpSpPr>
+        <p:cNvPr id="1" name=""/>
+        <p:cNvGrpSpPr/>
+        <p:nvPr/>
+      </p:nvGrpSpPr>
+      <p:grpSpPr>
+        <a:xfrm>
+          <a:off x="0" y="0"/>
+          <a:ext cx="0" cy="0"/>
+          <a:chOff x="0" y="0"/>
+          <a:chExt cx="0" cy="0"/>
+        </a:xfrm>
+      </p:grpSpPr>
+      <p:sp>
+        <p:nvSpPr>
+          <p:cNvPr id="2" name="Title 1"/>
+          <p:cNvSpPr>
+            <a:spLocks noGrp="1"/>
+          </p:cNvSpPr>
+          <p:nvPr>
+            <p:ph type="title"/>
+          </p:nvPr>
+        </p:nvSpPr>
+        <p:spPr/>
+        <p:txBody>
+          <a:bodyPr/>
+          <a:lstStyle/>
+          <a:p>
+            <a:r>
+              <a:rPr lang="en-US" dirty="0" err="1" smtClean="0"/>
+              <a:t>Mergesort</a:t>
+            </a:r>
+            <a:r>
+              <a:rPr lang="en-US" dirty="0" smtClean="0"/>
+              <a:t> </a:t>
+            </a:r>
+            <a:r>
+              <a:rPr lang="en-US" dirty="0" err="1" smtClean="0"/>
+              <a:t>eigenschaften</a:t>
+            </a:r>
+            <a:endParaRPr lang="bg-BG" dirty="0"/>
+          </a:p>
+        </p:txBody>
+      </p:sp>
+      <p:sp>
+        <p:nvSpPr>
+          <p:cNvPr id="3" name="Content Placeholder 2"/>
+          <p:cNvSpPr>
+            <a:spLocks noGrp="1"/>
+          </p:cNvSpPr>
+          <p:nvPr>
+            <p:ph idx="1"/>
+          </p:nvPr>
+        </p:nvSpPr>
+        <p:spPr/>
+        <p:txBody>
+          <a:bodyPr/>
+          <a:lstStyle/>
+          <a:p>
+            <a:r>
+              <a:rPr lang="en-US" dirty="0" err="1" smtClean="0"/>
+              <a:t>Arbeitet</a:t>
+            </a:r>
+            <a:r>
+              <a:rPr lang="en-US" dirty="0" smtClean="0"/>
+              <a:t> </a:t>
+            </a:r>
+            <a:r>
+              <a:rPr lang="en-US" dirty="0" err="1" smtClean="0"/>
+              <a:t>nicht</a:t>
+            </a:r>
+            <a:r>
+              <a:rPr lang="en-US" dirty="0" smtClean="0"/>
+              <a:t> in-place, </a:t>
+            </a:r>
+            <a:r>
+              <a:rPr lang="en-US" dirty="0" err="1" smtClean="0"/>
+              <a:t>weil</a:t>
+            </a:r>
+            <a:r>
+              <a:rPr lang="en-US" dirty="0" smtClean="0"/>
+              <a:t> </a:t>
+            </a:r>
+            <a:r>
+              <a:rPr lang="en-US" dirty="0" err="1" smtClean="0"/>
+              <a:t>eine</a:t>
+            </a:r>
+            <a:r>
+              <a:rPr lang="en-US" dirty="0" smtClean="0"/>
+              <a:t> </a:t>
+            </a:r>
+            <a:r>
+              <a:rPr lang="en-US" dirty="0" err="1" smtClean="0"/>
+              <a:t>resultante</a:t>
+            </a:r>
+            <a:r>
+              <a:rPr lang="en-US" dirty="0" smtClean="0"/>
+              <a:t> </a:t>
+            </a:r>
+            <a:r>
+              <a:rPr lang="en-US" dirty="0" err="1" smtClean="0"/>
+              <a:t>Menge</a:t>
+            </a:r>
+            <a:r>
+              <a:rPr lang="en-US" dirty="0" smtClean="0"/>
+              <a:t> </a:t>
+            </a:r>
+            <a:r>
+              <a:rPr lang="en-US" dirty="0" err="1" smtClean="0"/>
+              <a:t>im</a:t>
+            </a:r>
+            <a:r>
+              <a:rPr lang="en-US" dirty="0" smtClean="0"/>
+              <a:t> </a:t>
+            </a:r>
+            <a:r>
+              <a:rPr lang="en-US" dirty="0" err="1" smtClean="0"/>
+              <a:t>Speicher</a:t>
+            </a:r>
+            <a:r>
+              <a:rPr lang="en-US" dirty="0" smtClean="0"/>
+              <a:t> </a:t>
+            </a:r>
+            <a:r>
+              <a:rPr lang="en-US" dirty="0" err="1" smtClean="0"/>
+              <a:t>zugeteilt</a:t>
+            </a:r>
+            <a:r>
+              <a:rPr lang="en-US" dirty="0" smtClean="0"/>
+              <a:t> </a:t>
+            </a:r>
+            <a:r>
+              <a:rPr lang="en-US" dirty="0" err="1" smtClean="0"/>
+              <a:t>werden</a:t>
+            </a:r>
+            <a:r>
+              <a:rPr lang="en-US" dirty="0" smtClean="0"/>
+              <a:t> muss.</a:t>
+            </a:r>
+          </a:p>
+          <a:p>
+            <a:r>
+              <a:rPr lang="en-US" dirty="0" err="1" smtClean="0"/>
+              <a:t>Arbeitet</a:t>
+            </a:r>
+            <a:r>
+              <a:rPr lang="en-US" dirty="0" smtClean="0"/>
+              <a:t> </a:t>
+            </a:r>
+            <a:r>
+              <a:rPr lang="en-US" dirty="0" err="1" smtClean="0"/>
+              <a:t>stabil</a:t>
+            </a:r>
+            <a:r>
+              <a:rPr lang="en-US" dirty="0" smtClean="0"/>
+              <a:t>.</a:t>
+            </a:r>
+          </a:p>
+          <a:p>
+            <a:r>
+              <a:rPr lang="en-US" dirty="0" smtClean="0"/>
+              <a:t>In </a:t>
+            </a:r>
+            <a:r>
+              <a:rPr lang="en-US" dirty="0" err="1" smtClean="0"/>
+              <a:t>allen</a:t>
+            </a:r>
+            <a:r>
+              <a:rPr lang="en-US" dirty="0" smtClean="0"/>
+              <a:t> </a:t>
+            </a:r>
+            <a:r>
+              <a:rPr lang="en-US" dirty="0" err="1" smtClean="0"/>
+              <a:t>Fällen</a:t>
+            </a:r>
+            <a:r>
+              <a:rPr lang="en-US" dirty="0" smtClean="0"/>
+              <a:t> – </a:t>
+            </a:r>
+            <a:r>
+              <a:rPr lang="en-US" dirty="0" err="1" smtClean="0"/>
+              <a:t>Komlexität</a:t>
+            </a:r>
+            <a:r>
+              <a:rPr lang="en-US" dirty="0" smtClean="0"/>
+              <a:t> is </a:t>
+            </a:r>
+            <a:r>
+              <a:rPr lang="en-US" dirty="0"/>
+              <a:t>O(</a:t>
+            </a:r>
+            <a:r>
+              <a:rPr lang="en-US" dirty="0" err="1"/>
+              <a:t>nlogn</a:t>
+            </a:r>
+            <a:r>
+              <a:rPr lang="en-US" dirty="0" smtClean="0"/>
+              <a:t>) – das </a:t>
+            </a:r>
+            <a:r>
+              <a:rPr lang="en-US" dirty="0" err="1" smtClean="0"/>
+              <a:t>heißt</a:t>
+            </a:r>
+            <a:r>
+              <a:rPr lang="en-US" dirty="0" smtClean="0"/>
+              <a:t>, </a:t>
+            </a:r>
+            <a:r>
+              <a:rPr lang="en-US" dirty="0" err="1" smtClean="0"/>
+              <a:t>dass</a:t>
+            </a:r>
+            <a:r>
+              <a:rPr lang="en-US" dirty="0" smtClean="0"/>
+              <a:t> dieses </a:t>
+            </a:r>
+            <a:r>
+              <a:rPr lang="en-US" dirty="0" err="1" smtClean="0"/>
+              <a:t>Verfahren</a:t>
+            </a:r>
+            <a:r>
+              <a:rPr lang="en-US" dirty="0" smtClean="0"/>
+              <a:t> </a:t>
+            </a:r>
+            <a:r>
+              <a:rPr lang="en-US" dirty="0" err="1" smtClean="0"/>
+              <a:t>überall</a:t>
+            </a:r>
+            <a:r>
+              <a:rPr lang="en-US" dirty="0" smtClean="0"/>
+              <a:t> </a:t>
+            </a:r>
+            <a:r>
+              <a:rPr lang="en-US" dirty="0" err="1" smtClean="0"/>
+              <a:t>besser</a:t>
+            </a:r>
+            <a:r>
+              <a:rPr lang="en-US" dirty="0" smtClean="0"/>
+              <a:t> </a:t>
+            </a:r>
+            <a:r>
+              <a:rPr lang="en-US" dirty="0" err="1" smtClean="0"/>
+              <a:t>als</a:t>
+            </a:r>
+            <a:r>
+              <a:rPr lang="en-US" dirty="0" smtClean="0"/>
+              <a:t> Quicksort </a:t>
+            </a:r>
+            <a:r>
+              <a:rPr lang="en-US" dirty="0" err="1" smtClean="0"/>
+              <a:t>ist</a:t>
+            </a:r>
+            <a:r>
+              <a:rPr lang="en-US" dirty="0" smtClean="0"/>
+              <a:t>, </a:t>
+            </a:r>
+            <a:r>
+              <a:rPr lang="en-US" dirty="0" err="1" smtClean="0"/>
+              <a:t>dessen</a:t>
+            </a:r>
+            <a:r>
+              <a:rPr lang="en-US" dirty="0" smtClean="0"/>
+              <a:t> Worst-case </a:t>
+            </a:r>
+            <a:r>
+              <a:rPr lang="en-US" dirty="0" err="1" smtClean="0"/>
+              <a:t>Verhalten</a:t>
+            </a:r>
+            <a:r>
+              <a:rPr lang="en-US" dirty="0" smtClean="0"/>
+              <a:t> </a:t>
+            </a:r>
+            <a:r>
+              <a:rPr lang="en-US" dirty="0"/>
+              <a:t>O(n</a:t>
+            </a:r>
+            <a:r>
+              <a:rPr lang="en-US" baseline="30000" dirty="0"/>
+              <a:t>2</a:t>
+            </a:r>
+            <a:r>
+              <a:rPr lang="en-US" dirty="0" smtClean="0"/>
+              <a:t>) </a:t>
+            </a:r>
+            <a:r>
+              <a:rPr lang="en-US" dirty="0" err="1" smtClean="0"/>
+              <a:t>ist</a:t>
+            </a:r>
+            <a:r>
+              <a:rPr lang="en-US" dirty="0" smtClean="0"/>
+              <a:t>. </a:t>
+            </a:r>
+            <a:r>
+              <a:rPr lang="en-US" dirty="0" err="1" smtClean="0"/>
+              <a:t>Mergesort</a:t>
+            </a:r>
+            <a:r>
+              <a:rPr lang="en-US" dirty="0" smtClean="0"/>
+              <a:t> </a:t>
+            </a:r>
+            <a:r>
+              <a:rPr lang="en-US" dirty="0" err="1" smtClean="0"/>
+              <a:t>benützt</a:t>
+            </a:r>
+            <a:r>
+              <a:rPr lang="en-US" dirty="0" smtClean="0"/>
+              <a:t> </a:t>
+            </a:r>
+            <a:r>
+              <a:rPr lang="en-US" dirty="0" err="1" smtClean="0"/>
+              <a:t>aber</a:t>
+            </a:r>
+            <a:r>
+              <a:rPr lang="en-US" dirty="0" smtClean="0"/>
+              <a:t> </a:t>
+            </a:r>
+            <a:r>
+              <a:rPr lang="en-US" dirty="0" err="1" smtClean="0"/>
+              <a:t>mehrer</a:t>
+            </a:r>
+            <a:r>
+              <a:rPr lang="en-US" dirty="0" smtClean="0"/>
+              <a:t> </a:t>
+            </a:r>
+            <a:r>
+              <a:rPr lang="en-US" dirty="0" err="1" smtClean="0"/>
+              <a:t>Speicherplatz</a:t>
+            </a:r>
+            <a:r>
+              <a:rPr lang="en-US" smtClean="0"/>
+              <a:t>. </a:t>
+            </a:r>
+            <a:endParaRPr lang="en-US" dirty="0"/>
+          </a:p>
+          <a:p>
+            <a:endParaRPr lang="en-US" dirty="0" smtClean="0"/>
+          </a:p>
+          <a:p>
+            <a:endParaRPr lang="bg-BG" dirty="0"/>
+          </a:p>
+        </p:txBody>
+      </p:sp>
+    </p:spTree>
+    <p:extLst>
+      <p:ext uri="{BB962C8B-B14F-4D97-AF65-F5344CB8AC3E}">
+        <p14:creationId xmlns:p14="http://schemas.microsoft.com/office/powerpoint/2010/main" val="1894145807"/>
       </p:ext>
     </p:extLst>
   </p:cSld>

</xml_diff>

<commit_message>
Added Quicksort to documentation
</commit_message>
<xml_diff>
--- a/docs/sorting algorithms - presentation/Sortierverfahren.pptx
+++ b/docs/sorting algorithms - presentation/Sortierverfahren.pptx
@@ -40,6 +40,9 @@
     <p:sldId id="289" r:id="rId34"/>
     <p:sldId id="290" r:id="rId35"/>
     <p:sldId id="291" r:id="rId36"/>
+    <p:sldId id="292" r:id="rId37"/>
+    <p:sldId id="293" r:id="rId38"/>
+    <p:sldId id="294" r:id="rId39"/>
   </p:sldIdLst>
   <p:sldSz cx="12192000" cy="6858000"/>
   <p:notesSz cx="6858000" cy="9144000"/>
@@ -21173,7 +21176,7 @@
               <a:t>Speicherplatz</a:t>
             </a:r>
             <a:r>
-              <a:rPr lang="en-US" smtClean="0"/>
+              <a:rPr lang="en-US" dirty="0" smtClean="0"/>
               <a:t>. </a:t>
             </a:r>
             <a:endParaRPr lang="en-US" dirty="0"/>
@@ -21190,6 +21193,1599 @@
     <p:extLst>
       <p:ext uri="{BB962C8B-B14F-4D97-AF65-F5344CB8AC3E}">
         <p14:creationId xmlns:p14="http://schemas.microsoft.com/office/powerpoint/2010/main" val="1894145807"/>
+      </p:ext>
+    </p:extLst>
+  </p:cSld>
+  <p:clrMapOvr>
+    <a:masterClrMapping/>
+  </p:clrMapOvr>
+</p:sld>
+</file>
+
+<file path=ppt/slides/slide36.xml><?xml version="1.0" encoding="utf-8"?>
+<p:sld xmlns:a="http://schemas.openxmlformats.org/drawingml/2006/main" xmlns:r="http://schemas.openxmlformats.org/officeDocument/2006/relationships" xmlns:p="http://schemas.openxmlformats.org/presentationml/2006/main">
+  <p:cSld>
+    <p:spTree>
+      <p:nvGrpSpPr>
+        <p:cNvPr id="1" name=""/>
+        <p:cNvGrpSpPr/>
+        <p:nvPr/>
+      </p:nvGrpSpPr>
+      <p:grpSpPr>
+        <a:xfrm>
+          <a:off x="0" y="0"/>
+          <a:ext cx="0" cy="0"/>
+          <a:chOff x="0" y="0"/>
+          <a:chExt cx="0" cy="0"/>
+        </a:xfrm>
+      </p:grpSpPr>
+      <p:sp>
+        <p:nvSpPr>
+          <p:cNvPr id="2" name="Title 1"/>
+          <p:cNvSpPr>
+            <a:spLocks noGrp="1"/>
+          </p:cNvSpPr>
+          <p:nvPr>
+            <p:ph type="title"/>
+          </p:nvPr>
+        </p:nvSpPr>
+        <p:spPr/>
+        <p:txBody>
+          <a:bodyPr/>
+          <a:lstStyle/>
+          <a:p>
+            <a:r>
+              <a:rPr lang="en-US" dirty="0" smtClean="0"/>
+              <a:t>Quicksort – </a:t>
+            </a:r>
+            <a:r>
+              <a:rPr lang="en-US" dirty="0" err="1" smtClean="0"/>
+              <a:t>allgemeine</a:t>
+            </a:r>
+            <a:r>
+              <a:rPr lang="en-US" dirty="0" smtClean="0"/>
+              <a:t> </a:t>
+            </a:r>
+            <a:r>
+              <a:rPr lang="en-US" dirty="0" err="1" smtClean="0"/>
+              <a:t>idee</a:t>
+            </a:r>
+            <a:endParaRPr lang="bg-BG" dirty="0"/>
+          </a:p>
+        </p:txBody>
+      </p:sp>
+      <p:sp>
+        <p:nvSpPr>
+          <p:cNvPr id="3" name="Content Placeholder 2"/>
+          <p:cNvSpPr>
+            <a:spLocks noGrp="1"/>
+          </p:cNvSpPr>
+          <p:nvPr>
+            <p:ph idx="1"/>
+          </p:nvPr>
+        </p:nvSpPr>
+        <p:spPr>
+          <a:xfrm>
+            <a:off x="1141412" y="2249487"/>
+            <a:ext cx="9905999" cy="3541714"/>
+          </a:xfrm>
+        </p:spPr>
+        <p:txBody>
+          <a:bodyPr>
+            <a:normAutofit fontScale="85000" lnSpcReduction="20000"/>
+          </a:bodyPr>
+          <a:lstStyle/>
+          <a:p>
+            <a:r>
+              <a:rPr lang="en-US" dirty="0" err="1" smtClean="0"/>
+              <a:t>Wie</a:t>
+            </a:r>
+            <a:r>
+              <a:rPr lang="en-US" dirty="0" smtClean="0"/>
+              <a:t> </a:t>
+            </a:r>
+            <a:r>
+              <a:rPr lang="en-US" dirty="0" err="1" smtClean="0"/>
+              <a:t>Mergesort</a:t>
+            </a:r>
+            <a:r>
+              <a:rPr lang="en-US" dirty="0" smtClean="0"/>
+              <a:t>, das </a:t>
+            </a:r>
+            <a:r>
+              <a:rPr lang="en-US" dirty="0" err="1" smtClean="0"/>
+              <a:t>Verfahren</a:t>
+            </a:r>
+            <a:r>
+              <a:rPr lang="en-US" dirty="0" smtClean="0"/>
+              <a:t> </a:t>
+            </a:r>
+            <a:r>
+              <a:rPr lang="en-US" dirty="0" err="1" smtClean="0"/>
+              <a:t>arbeitet</a:t>
+            </a:r>
+            <a:r>
+              <a:rPr lang="en-US" dirty="0" smtClean="0"/>
+              <a:t> </a:t>
+            </a:r>
+            <a:r>
+              <a:rPr lang="en-US" dirty="0" err="1" smtClean="0"/>
+              <a:t>nach</a:t>
+            </a:r>
+            <a:r>
+              <a:rPr lang="en-US" dirty="0" smtClean="0"/>
+              <a:t> </a:t>
+            </a:r>
+            <a:r>
+              <a:rPr lang="en-US" dirty="0" err="1" smtClean="0"/>
+              <a:t>dem</a:t>
+            </a:r>
+            <a:r>
+              <a:rPr lang="en-US" dirty="0" smtClean="0"/>
+              <a:t> </a:t>
+            </a:r>
+            <a:r>
+              <a:rPr lang="en-US" dirty="0" err="1" smtClean="0"/>
+              <a:t>Prinizip</a:t>
+            </a:r>
+            <a:r>
+              <a:rPr lang="en-US" dirty="0" smtClean="0"/>
+              <a:t> “</a:t>
+            </a:r>
+            <a:r>
+              <a:rPr lang="en-US" dirty="0" err="1" smtClean="0"/>
+              <a:t>teile</a:t>
+            </a:r>
+            <a:r>
+              <a:rPr lang="en-US" dirty="0" smtClean="0"/>
+              <a:t> und </a:t>
+            </a:r>
+            <a:r>
+              <a:rPr lang="en-US" dirty="0" err="1" smtClean="0"/>
+              <a:t>herrsche</a:t>
+            </a:r>
+            <a:r>
+              <a:rPr lang="en-US" dirty="0" smtClean="0"/>
+              <a:t>”.</a:t>
+            </a:r>
+          </a:p>
+          <a:p>
+            <a:r>
+              <a:rPr lang="en-US" dirty="0" err="1" smtClean="0"/>
+              <a:t>Mit</a:t>
+            </a:r>
+            <a:r>
+              <a:rPr lang="en-US" dirty="0" smtClean="0"/>
+              <a:t> </a:t>
+            </a:r>
+            <a:r>
+              <a:rPr lang="en-US" dirty="0" err="1" smtClean="0"/>
+              <a:t>Mergesort</a:t>
+            </a:r>
+            <a:r>
+              <a:rPr lang="en-US" dirty="0" smtClean="0"/>
+              <a:t> </a:t>
+            </a:r>
+            <a:r>
+              <a:rPr lang="en-US" dirty="0" err="1" smtClean="0"/>
+              <a:t>verglichen</a:t>
+            </a:r>
+            <a:r>
+              <a:rPr lang="en-US" dirty="0" smtClean="0"/>
+              <a:t> hat Quicksort das </a:t>
+            </a:r>
+            <a:r>
+              <a:rPr lang="en-US" dirty="0" err="1" smtClean="0"/>
+              <a:t>Vorteil</a:t>
+            </a:r>
+            <a:r>
+              <a:rPr lang="en-US" dirty="0" smtClean="0"/>
+              <a:t>, </a:t>
+            </a:r>
+            <a:r>
+              <a:rPr lang="en-US" dirty="0" err="1" smtClean="0"/>
+              <a:t>dass</a:t>
+            </a:r>
+            <a:r>
+              <a:rPr lang="en-US" dirty="0" smtClean="0"/>
+              <a:t> </a:t>
+            </a:r>
+            <a:r>
+              <a:rPr lang="en-US" dirty="0" err="1" smtClean="0"/>
+              <a:t>es</a:t>
+            </a:r>
+            <a:r>
+              <a:rPr lang="en-US" dirty="0" smtClean="0"/>
+              <a:t> </a:t>
+            </a:r>
+            <a:r>
+              <a:rPr lang="en-US" dirty="0" err="1" smtClean="0"/>
+              <a:t>kein</a:t>
+            </a:r>
+            <a:r>
+              <a:rPr lang="en-US" dirty="0" smtClean="0"/>
+              <a:t> </a:t>
+            </a:r>
+            <a:r>
+              <a:rPr lang="en-US" dirty="0" err="1" smtClean="0"/>
+              <a:t>weiteres</a:t>
+            </a:r>
+            <a:r>
+              <a:rPr lang="en-US" dirty="0" smtClean="0"/>
+              <a:t> </a:t>
+            </a:r>
+            <a:r>
+              <a:rPr lang="en-US" dirty="0" err="1" smtClean="0"/>
+              <a:t>Speicherplatz</a:t>
+            </a:r>
+            <a:r>
+              <a:rPr lang="en-US" dirty="0" smtClean="0"/>
+              <a:t> </a:t>
+            </a:r>
+            <a:r>
+              <a:rPr lang="en-US" dirty="0" err="1" smtClean="0"/>
+              <a:t>benötigt</a:t>
+            </a:r>
+            <a:r>
+              <a:rPr lang="en-US" dirty="0" smtClean="0"/>
+              <a:t>.</a:t>
+            </a:r>
+          </a:p>
+          <a:p>
+            <a:r>
+              <a:rPr lang="en-US" dirty="0" err="1" smtClean="0"/>
+              <a:t>Wie</a:t>
+            </a:r>
+            <a:r>
+              <a:rPr lang="en-US" dirty="0" smtClean="0"/>
+              <a:t> </a:t>
+            </a:r>
+            <a:r>
+              <a:rPr lang="en-US" dirty="0" err="1" smtClean="0"/>
+              <a:t>Mergesort</a:t>
+            </a:r>
+            <a:r>
+              <a:rPr lang="en-US" dirty="0"/>
+              <a:t> </a:t>
+            </a:r>
+            <a:r>
+              <a:rPr lang="en-US" dirty="0" err="1" smtClean="0"/>
+              <a:t>wird</a:t>
+            </a:r>
+            <a:r>
+              <a:rPr lang="en-US" dirty="0" smtClean="0"/>
+              <a:t> die </a:t>
+            </a:r>
+            <a:r>
+              <a:rPr lang="en-US" dirty="0" err="1" smtClean="0"/>
+              <a:t>Eingabemenge</a:t>
+            </a:r>
+            <a:r>
+              <a:rPr lang="en-US" dirty="0" smtClean="0"/>
+              <a:t> (</a:t>
+            </a:r>
+            <a:r>
+              <a:rPr lang="en-US" dirty="0" err="1" smtClean="0"/>
+              <a:t>Liste</a:t>
+            </a:r>
+            <a:r>
+              <a:rPr lang="en-US" dirty="0" smtClean="0"/>
+              <a:t>) </a:t>
+            </a:r>
+            <a:r>
+              <a:rPr lang="en-US" dirty="0" err="1" smtClean="0"/>
+              <a:t>wieder</a:t>
+            </a:r>
+            <a:r>
+              <a:rPr lang="en-US" dirty="0" smtClean="0"/>
+              <a:t> in </a:t>
+            </a:r>
+            <a:r>
+              <a:rPr lang="en-US" dirty="0" err="1" smtClean="0"/>
+              <a:t>zwei</a:t>
+            </a:r>
+            <a:r>
+              <a:rPr lang="en-US" dirty="0" smtClean="0"/>
+              <a:t> </a:t>
+            </a:r>
+            <a:r>
+              <a:rPr lang="en-US" dirty="0" err="1" smtClean="0"/>
+              <a:t>Teillisten</a:t>
+            </a:r>
+            <a:r>
+              <a:rPr lang="en-US" dirty="0" smtClean="0"/>
+              <a:t> – </a:t>
+            </a:r>
+            <a:r>
+              <a:rPr lang="en-US" dirty="0" err="1" smtClean="0"/>
+              <a:t>linke</a:t>
+            </a:r>
+            <a:r>
+              <a:rPr lang="en-US" dirty="0" smtClean="0"/>
+              <a:t> und </a:t>
+            </a:r>
+            <a:r>
+              <a:rPr lang="en-US" dirty="0" err="1" smtClean="0"/>
+              <a:t>rechte</a:t>
+            </a:r>
+            <a:r>
+              <a:rPr lang="en-US" dirty="0" smtClean="0"/>
+              <a:t> </a:t>
+            </a:r>
+            <a:r>
+              <a:rPr lang="en-US" dirty="0" err="1" smtClean="0"/>
+              <a:t>Liste</a:t>
+            </a:r>
+            <a:r>
+              <a:rPr lang="en-US" dirty="0" smtClean="0"/>
+              <a:t> </a:t>
+            </a:r>
+            <a:r>
+              <a:rPr lang="en-US" dirty="0"/>
+              <a:t>– </a:t>
+            </a:r>
+            <a:r>
+              <a:rPr lang="en-US" dirty="0" err="1" smtClean="0"/>
+              <a:t>getrennt</a:t>
+            </a:r>
+            <a:r>
+              <a:rPr lang="en-US" dirty="0" smtClean="0"/>
+              <a:t> . Um </a:t>
+            </a:r>
+            <a:r>
+              <a:rPr lang="en-US" dirty="0" err="1" smtClean="0"/>
+              <a:t>sie</a:t>
+            </a:r>
+            <a:r>
+              <a:rPr lang="en-US" dirty="0" smtClean="0"/>
+              <a:t> </a:t>
+            </a:r>
+            <a:r>
+              <a:rPr lang="en-US" dirty="0" err="1" smtClean="0"/>
+              <a:t>zu</a:t>
+            </a:r>
+            <a:r>
+              <a:rPr lang="en-US" dirty="0" smtClean="0"/>
+              <a:t> </a:t>
+            </a:r>
+            <a:r>
+              <a:rPr lang="en-US" dirty="0" err="1" smtClean="0"/>
+              <a:t>trennen</a:t>
+            </a:r>
+            <a:r>
+              <a:rPr lang="en-US" dirty="0" smtClean="0"/>
+              <a:t>, </a:t>
+            </a:r>
+            <a:r>
+              <a:rPr lang="en-US" dirty="0" err="1" smtClean="0"/>
+              <a:t>wählt</a:t>
+            </a:r>
+            <a:r>
+              <a:rPr lang="en-US" dirty="0" smtClean="0"/>
+              <a:t> das </a:t>
+            </a:r>
+            <a:r>
+              <a:rPr lang="en-US" dirty="0" err="1" smtClean="0"/>
+              <a:t>Verfahren</a:t>
+            </a:r>
+            <a:r>
+              <a:rPr lang="en-US" dirty="0" smtClean="0"/>
+              <a:t> </a:t>
+            </a:r>
+            <a:r>
+              <a:rPr lang="en-US" dirty="0" err="1" smtClean="0"/>
+              <a:t>ein</a:t>
+            </a:r>
+            <a:r>
+              <a:rPr lang="en-US" dirty="0" smtClean="0"/>
+              <a:t> </a:t>
+            </a:r>
+            <a:r>
+              <a:rPr lang="en-US" dirty="0" err="1" smtClean="0"/>
+              <a:t>s.g</a:t>
+            </a:r>
+            <a:r>
+              <a:rPr lang="en-US" dirty="0" smtClean="0"/>
+              <a:t>. </a:t>
+            </a:r>
+            <a:r>
+              <a:rPr lang="en-US" dirty="0" err="1" smtClean="0"/>
+              <a:t>Pivotelement</a:t>
+            </a:r>
+            <a:r>
+              <a:rPr lang="en-US" dirty="0" smtClean="0"/>
+              <a:t>. </a:t>
+            </a:r>
+            <a:r>
+              <a:rPr lang="en-US" dirty="0" err="1" smtClean="0"/>
+              <a:t>Alle</a:t>
+            </a:r>
+            <a:r>
+              <a:rPr lang="en-US" dirty="0" smtClean="0"/>
+              <a:t> </a:t>
+            </a:r>
+            <a:r>
+              <a:rPr lang="en-US" dirty="0" err="1" smtClean="0"/>
+              <a:t>Elemente</a:t>
+            </a:r>
+            <a:r>
+              <a:rPr lang="en-US" dirty="0" smtClean="0"/>
+              <a:t>, die </a:t>
+            </a:r>
+            <a:r>
+              <a:rPr lang="en-US" dirty="0" err="1" smtClean="0"/>
+              <a:t>kleiner</a:t>
+            </a:r>
+            <a:r>
+              <a:rPr lang="en-US" dirty="0" smtClean="0"/>
+              <a:t> </a:t>
+            </a:r>
+            <a:r>
+              <a:rPr lang="en-US" dirty="0" err="1" smtClean="0"/>
+              <a:t>als</a:t>
+            </a:r>
+            <a:r>
+              <a:rPr lang="en-US" dirty="0" smtClean="0"/>
+              <a:t> das </a:t>
+            </a:r>
+            <a:r>
+              <a:rPr lang="en-US" dirty="0" err="1" smtClean="0"/>
+              <a:t>Pivotelement</a:t>
+            </a:r>
+            <a:r>
+              <a:rPr lang="en-US" dirty="0" smtClean="0"/>
+              <a:t> </a:t>
+            </a:r>
+            <a:r>
+              <a:rPr lang="en-US" dirty="0" err="1" smtClean="0"/>
+              <a:t>sind</a:t>
+            </a:r>
+            <a:r>
+              <a:rPr lang="en-US" dirty="0" smtClean="0"/>
+              <a:t>, </a:t>
+            </a:r>
+            <a:r>
+              <a:rPr lang="en-US" dirty="0" err="1" smtClean="0"/>
+              <a:t>gehen</a:t>
+            </a:r>
+            <a:r>
+              <a:rPr lang="en-US" dirty="0" smtClean="0"/>
+              <a:t> in die </a:t>
+            </a:r>
+            <a:r>
+              <a:rPr lang="en-US" dirty="0" err="1" smtClean="0"/>
+              <a:t>linke</a:t>
+            </a:r>
+            <a:r>
+              <a:rPr lang="en-US" dirty="0" smtClean="0"/>
+              <a:t> </a:t>
+            </a:r>
+            <a:r>
+              <a:rPr lang="en-US" dirty="0" err="1" smtClean="0"/>
+              <a:t>Liste</a:t>
+            </a:r>
+            <a:r>
+              <a:rPr lang="en-US" dirty="0" smtClean="0"/>
+              <a:t> </a:t>
+            </a:r>
+            <a:r>
+              <a:rPr lang="en-US" dirty="0" err="1" smtClean="0"/>
+              <a:t>hinein</a:t>
+            </a:r>
+            <a:r>
+              <a:rPr lang="en-US" dirty="0" smtClean="0"/>
+              <a:t>, die </a:t>
+            </a:r>
+            <a:r>
+              <a:rPr lang="en-US" dirty="0" err="1" smtClean="0"/>
+              <a:t>andere</a:t>
+            </a:r>
+            <a:r>
+              <a:rPr lang="en-US" dirty="0" smtClean="0"/>
+              <a:t> </a:t>
+            </a:r>
+            <a:r>
+              <a:rPr lang="en-US" dirty="0" err="1" smtClean="0"/>
+              <a:t>gehen</a:t>
+            </a:r>
+            <a:r>
+              <a:rPr lang="en-US" dirty="0" smtClean="0"/>
+              <a:t> in die </a:t>
+            </a:r>
+            <a:r>
+              <a:rPr lang="en-US" dirty="0" err="1" smtClean="0"/>
+              <a:t>rechte</a:t>
+            </a:r>
+            <a:r>
+              <a:rPr lang="en-US" dirty="0"/>
+              <a:t> </a:t>
+            </a:r>
+            <a:r>
+              <a:rPr lang="en-US" dirty="0" err="1" smtClean="0"/>
+              <a:t>Liste</a:t>
+            </a:r>
+            <a:r>
+              <a:rPr lang="en-US" dirty="0" smtClean="0"/>
+              <a:t>. </a:t>
+            </a:r>
+            <a:r>
+              <a:rPr lang="en-US" dirty="0" err="1" smtClean="0"/>
+              <a:t>Dann</a:t>
+            </a:r>
+            <a:r>
+              <a:rPr lang="en-US" dirty="0" smtClean="0"/>
+              <a:t> </a:t>
+            </a:r>
+            <a:r>
+              <a:rPr lang="en-US" dirty="0" err="1" smtClean="0"/>
+              <a:t>werde</a:t>
+            </a:r>
+            <a:r>
+              <a:rPr lang="en-US" dirty="0" smtClean="0"/>
+              <a:t> </a:t>
+            </a:r>
+            <a:r>
+              <a:rPr lang="en-US" dirty="0" err="1" smtClean="0"/>
+              <a:t>eine</a:t>
+            </a:r>
+            <a:r>
+              <a:rPr lang="en-US" dirty="0" smtClean="0"/>
+              <a:t> </a:t>
+            </a:r>
+            <a:r>
+              <a:rPr lang="en-US" dirty="0" err="1" smtClean="0"/>
+              <a:t>Rekursion</a:t>
+            </a:r>
+            <a:r>
+              <a:rPr lang="en-US" dirty="0" smtClean="0"/>
+              <a:t> </a:t>
+            </a:r>
+            <a:r>
+              <a:rPr lang="en-US" dirty="0" err="1" smtClean="0"/>
+              <a:t>aufgeruft</a:t>
+            </a:r>
+            <a:r>
+              <a:rPr lang="en-US" dirty="0" smtClean="0"/>
+              <a:t>, die </a:t>
+            </a:r>
+            <a:r>
+              <a:rPr lang="en-US" dirty="0" err="1" smtClean="0"/>
+              <a:t>jede</a:t>
+            </a:r>
+            <a:r>
+              <a:rPr lang="en-US" dirty="0" smtClean="0"/>
+              <a:t> </a:t>
+            </a:r>
+            <a:r>
+              <a:rPr lang="en-US" dirty="0" err="1" smtClean="0"/>
+              <a:t>Teilliste</a:t>
+            </a:r>
+            <a:r>
+              <a:rPr lang="en-US" dirty="0" smtClean="0"/>
+              <a:t> </a:t>
+            </a:r>
+            <a:r>
+              <a:rPr lang="en-US" dirty="0" err="1" smtClean="0"/>
+              <a:t>wieder</a:t>
+            </a:r>
+            <a:r>
+              <a:rPr lang="en-US" dirty="0" smtClean="0"/>
+              <a:t> auf </a:t>
+            </a:r>
+            <a:r>
+              <a:rPr lang="en-US" dirty="0" err="1" smtClean="0"/>
+              <a:t>zwei</a:t>
+            </a:r>
+            <a:r>
+              <a:rPr lang="en-US" dirty="0" smtClean="0"/>
+              <a:t> </a:t>
+            </a:r>
+            <a:r>
+              <a:rPr lang="en-US" dirty="0" err="1" smtClean="0"/>
+              <a:t>weitere</a:t>
+            </a:r>
+            <a:r>
+              <a:rPr lang="en-US" dirty="0" smtClean="0"/>
+              <a:t> </a:t>
+            </a:r>
+            <a:r>
+              <a:rPr lang="en-US" dirty="0" err="1" smtClean="0"/>
+              <a:t>Liste</a:t>
+            </a:r>
+            <a:r>
+              <a:rPr lang="en-US" dirty="0" smtClean="0"/>
+              <a:t> </a:t>
+            </a:r>
+            <a:r>
+              <a:rPr lang="en-US" dirty="0" err="1" smtClean="0"/>
+              <a:t>zerteilt</a:t>
+            </a:r>
+            <a:r>
+              <a:rPr lang="en-US" dirty="0" smtClean="0"/>
+              <a:t>– </a:t>
+            </a:r>
+            <a:r>
+              <a:rPr lang="en-US" dirty="0" err="1" smtClean="0"/>
+              <a:t>erst</a:t>
+            </a:r>
+            <a:r>
+              <a:rPr lang="en-US" dirty="0" smtClean="0"/>
+              <a:t> </a:t>
+            </a:r>
+            <a:r>
+              <a:rPr lang="en-US" dirty="0" err="1" smtClean="0"/>
+              <a:t>für</a:t>
+            </a:r>
+            <a:r>
+              <a:rPr lang="en-US" dirty="0" smtClean="0"/>
+              <a:t> die </a:t>
+            </a:r>
+            <a:r>
+              <a:rPr lang="en-US" dirty="0" err="1" smtClean="0"/>
+              <a:t>linke</a:t>
+            </a:r>
+            <a:r>
+              <a:rPr lang="en-US" dirty="0" smtClean="0"/>
+              <a:t>, </a:t>
+            </a:r>
+            <a:r>
+              <a:rPr lang="en-US" dirty="0" err="1" smtClean="0"/>
+              <a:t>dann</a:t>
+            </a:r>
+            <a:r>
+              <a:rPr lang="en-US" dirty="0" smtClean="0"/>
+              <a:t> </a:t>
+            </a:r>
+            <a:r>
+              <a:rPr lang="en-US" dirty="0" err="1"/>
+              <a:t>für</a:t>
+            </a:r>
+            <a:r>
+              <a:rPr lang="en-US" dirty="0" smtClean="0"/>
+              <a:t> die </a:t>
+            </a:r>
+            <a:r>
+              <a:rPr lang="en-US" dirty="0" err="1" smtClean="0"/>
+              <a:t>rechte</a:t>
+            </a:r>
+            <a:r>
+              <a:rPr lang="en-US" dirty="0" smtClean="0"/>
+              <a:t> </a:t>
+            </a:r>
+            <a:r>
+              <a:rPr lang="en-US" dirty="0" err="1" smtClean="0"/>
+              <a:t>Teilliste</a:t>
+            </a:r>
+            <a:r>
+              <a:rPr lang="en-US" dirty="0" smtClean="0"/>
+              <a:t>. Die </a:t>
+            </a:r>
+            <a:r>
+              <a:rPr lang="en-US" dirty="0" err="1" smtClean="0"/>
+              <a:t>Rekursion</a:t>
+            </a:r>
+            <a:r>
+              <a:rPr lang="en-US" dirty="0" smtClean="0"/>
+              <a:t> </a:t>
+            </a:r>
+            <a:r>
+              <a:rPr lang="en-US" dirty="0" err="1" smtClean="0"/>
+              <a:t>abbricht</a:t>
+            </a:r>
+            <a:r>
+              <a:rPr lang="en-US" dirty="0" smtClean="0"/>
+              <a:t>, </a:t>
+            </a:r>
+            <a:r>
+              <a:rPr lang="en-US" dirty="0" err="1" smtClean="0"/>
+              <a:t>wenn</a:t>
+            </a:r>
+            <a:r>
+              <a:rPr lang="en-US" dirty="0" smtClean="0"/>
+              <a:t> die </a:t>
+            </a:r>
+            <a:r>
+              <a:rPr lang="en-US" dirty="0" err="1" smtClean="0"/>
+              <a:t>Teilliste</a:t>
+            </a:r>
+            <a:r>
+              <a:rPr lang="en-US" dirty="0" smtClean="0"/>
+              <a:t> </a:t>
+            </a:r>
+            <a:r>
+              <a:rPr lang="en-US" dirty="0" err="1" smtClean="0"/>
+              <a:t>eine</a:t>
+            </a:r>
+            <a:r>
+              <a:rPr lang="en-US" dirty="0" smtClean="0"/>
+              <a:t> </a:t>
+            </a:r>
+            <a:r>
+              <a:rPr lang="en-US" dirty="0" err="1" smtClean="0"/>
+              <a:t>Länge</a:t>
+            </a:r>
+            <a:r>
+              <a:rPr lang="en-US" dirty="0" smtClean="0"/>
+              <a:t> von 1 </a:t>
+            </a:r>
+            <a:r>
+              <a:rPr lang="en-US" dirty="0" err="1" smtClean="0"/>
+              <a:t>oder</a:t>
+            </a:r>
+            <a:r>
+              <a:rPr lang="en-US" dirty="0" smtClean="0"/>
+              <a:t> 0 hat. Der </a:t>
+            </a:r>
+            <a:r>
+              <a:rPr lang="en-US" dirty="0" err="1" smtClean="0"/>
+              <a:t>Algorithmus</a:t>
+            </a:r>
+            <a:r>
+              <a:rPr lang="en-US" dirty="0" smtClean="0"/>
+              <a:t> </a:t>
+            </a:r>
+            <a:r>
+              <a:rPr lang="en-US" dirty="0" err="1" smtClean="0"/>
+              <a:t>abbricht</a:t>
+            </a:r>
+            <a:r>
+              <a:rPr lang="en-US" dirty="0" smtClean="0"/>
+              <a:t>, </a:t>
+            </a:r>
+            <a:r>
+              <a:rPr lang="en-US" dirty="0" err="1" smtClean="0"/>
+              <a:t>wenn</a:t>
+            </a:r>
+            <a:r>
+              <a:rPr lang="en-US" dirty="0" smtClean="0"/>
+              <a:t> </a:t>
+            </a:r>
+            <a:r>
+              <a:rPr lang="en-US" dirty="0" err="1" smtClean="0"/>
+              <a:t>alle</a:t>
+            </a:r>
+            <a:r>
+              <a:rPr lang="en-US" dirty="0" smtClean="0"/>
+              <a:t> </a:t>
+            </a:r>
+            <a:r>
+              <a:rPr lang="en-US" dirty="0" err="1" smtClean="0"/>
+              <a:t>Teillisten</a:t>
+            </a:r>
+            <a:r>
+              <a:rPr lang="en-US" dirty="0" smtClean="0"/>
+              <a:t> </a:t>
+            </a:r>
+            <a:r>
+              <a:rPr lang="en-US" dirty="0" err="1" smtClean="0"/>
+              <a:t>sortiert</a:t>
+            </a:r>
+            <a:r>
+              <a:rPr lang="en-US" dirty="0" smtClean="0"/>
+              <a:t> </a:t>
+            </a:r>
+            <a:r>
+              <a:rPr lang="en-US" dirty="0" err="1" smtClean="0"/>
+              <a:t>sind</a:t>
+            </a:r>
+            <a:r>
+              <a:rPr lang="en-US" dirty="0" smtClean="0"/>
+              <a:t>.</a:t>
+            </a:r>
+            <a:endParaRPr lang="bg-BG" dirty="0"/>
+          </a:p>
+        </p:txBody>
+      </p:sp>
+    </p:spTree>
+    <p:extLst>
+      <p:ext uri="{BB962C8B-B14F-4D97-AF65-F5344CB8AC3E}">
+        <p14:creationId xmlns:p14="http://schemas.microsoft.com/office/powerpoint/2010/main" val="542520536"/>
+      </p:ext>
+    </p:extLst>
+  </p:cSld>
+  <p:clrMapOvr>
+    <a:masterClrMapping/>
+  </p:clrMapOvr>
+</p:sld>
+</file>
+
+<file path=ppt/slides/slide37.xml><?xml version="1.0" encoding="utf-8"?>
+<p:sld xmlns:a="http://schemas.openxmlformats.org/drawingml/2006/main" xmlns:r="http://schemas.openxmlformats.org/officeDocument/2006/relationships" xmlns:p="http://schemas.openxmlformats.org/presentationml/2006/main">
+  <p:cSld>
+    <p:spTree>
+      <p:nvGrpSpPr>
+        <p:cNvPr id="1" name=""/>
+        <p:cNvGrpSpPr/>
+        <p:nvPr/>
+      </p:nvGrpSpPr>
+      <p:grpSpPr>
+        <a:xfrm>
+          <a:off x="0" y="0"/>
+          <a:ext cx="0" cy="0"/>
+          <a:chOff x="0" y="0"/>
+          <a:chExt cx="0" cy="0"/>
+        </a:xfrm>
+      </p:grpSpPr>
+      <p:sp>
+        <p:nvSpPr>
+          <p:cNvPr id="2" name="Title 1"/>
+          <p:cNvSpPr>
+            <a:spLocks noGrp="1"/>
+          </p:cNvSpPr>
+          <p:nvPr>
+            <p:ph type="title"/>
+          </p:nvPr>
+        </p:nvSpPr>
+        <p:spPr/>
+        <p:txBody>
+          <a:bodyPr/>
+          <a:lstStyle/>
+          <a:p>
+            <a:r>
+              <a:rPr lang="en-US" dirty="0" smtClean="0"/>
+              <a:t>Quicksort – </a:t>
+            </a:r>
+            <a:r>
+              <a:rPr lang="en-US" dirty="0" err="1" smtClean="0"/>
+              <a:t>c++</a:t>
+            </a:r>
+            <a:endParaRPr lang="bg-BG" dirty="0"/>
+          </a:p>
+        </p:txBody>
+      </p:sp>
+      <p:pic>
+        <p:nvPicPr>
+          <p:cNvPr id="4" name="Content Placeholder 3"/>
+          <p:cNvPicPr>
+            <a:picLocks noGrp="1" noChangeAspect="1"/>
+          </p:cNvPicPr>
+          <p:nvPr>
+            <p:ph idx="1"/>
+          </p:nvPr>
+        </p:nvPicPr>
+        <p:blipFill>
+          <a:blip r:embed="rId2">
+            <a:extLst>
+              <a:ext uri="{28A0092B-C50C-407E-A947-70E740481C1C}">
+                <a14:useLocalDpi xmlns:a14="http://schemas.microsoft.com/office/drawing/2010/main" val="0"/>
+              </a:ext>
+            </a:extLst>
+          </a:blip>
+          <a:stretch>
+            <a:fillRect/>
+          </a:stretch>
+        </p:blipFill>
+        <p:spPr>
+          <a:xfrm>
+            <a:off x="6337620" y="179388"/>
+            <a:ext cx="4709791" cy="6519962"/>
+          </a:xfrm>
+        </p:spPr>
+      </p:pic>
+    </p:spTree>
+    <p:extLst>
+      <p:ext uri="{BB962C8B-B14F-4D97-AF65-F5344CB8AC3E}">
+        <p14:creationId xmlns:p14="http://schemas.microsoft.com/office/powerpoint/2010/main" val="2868093304"/>
+      </p:ext>
+    </p:extLst>
+  </p:cSld>
+  <p:clrMapOvr>
+    <a:masterClrMapping/>
+  </p:clrMapOvr>
+</p:sld>
+</file>
+
+<file path=ppt/slides/slide38.xml><?xml version="1.0" encoding="utf-8"?>
+<p:sld xmlns:a="http://schemas.openxmlformats.org/drawingml/2006/main" xmlns:r="http://schemas.openxmlformats.org/officeDocument/2006/relationships" xmlns:p="http://schemas.openxmlformats.org/presentationml/2006/main">
+  <p:cSld>
+    <p:spTree>
+      <p:nvGrpSpPr>
+        <p:cNvPr id="1" name=""/>
+        <p:cNvGrpSpPr/>
+        <p:nvPr/>
+      </p:nvGrpSpPr>
+      <p:grpSpPr>
+        <a:xfrm>
+          <a:off x="0" y="0"/>
+          <a:ext cx="0" cy="0"/>
+          <a:chOff x="0" y="0"/>
+          <a:chExt cx="0" cy="0"/>
+        </a:xfrm>
+      </p:grpSpPr>
+      <p:sp>
+        <p:nvSpPr>
+          <p:cNvPr id="2" name="Title 1"/>
+          <p:cNvSpPr>
+            <a:spLocks noGrp="1"/>
+          </p:cNvSpPr>
+          <p:nvPr>
+            <p:ph type="title"/>
+          </p:nvPr>
+        </p:nvSpPr>
+        <p:spPr/>
+        <p:txBody>
+          <a:bodyPr/>
+          <a:lstStyle/>
+          <a:p>
+            <a:r>
+              <a:rPr lang="en-US" dirty="0" smtClean="0"/>
+              <a:t>Quicksort - </a:t>
+            </a:r>
+            <a:r>
+              <a:rPr lang="en-US" dirty="0" err="1" smtClean="0"/>
+              <a:t>eigenschaften</a:t>
+            </a:r>
+            <a:endParaRPr lang="bg-BG" dirty="0"/>
+          </a:p>
+        </p:txBody>
+      </p:sp>
+      <p:sp>
+        <p:nvSpPr>
+          <p:cNvPr id="3" name="Content Placeholder 2"/>
+          <p:cNvSpPr>
+            <a:spLocks noGrp="1"/>
+          </p:cNvSpPr>
+          <p:nvPr>
+            <p:ph idx="1"/>
+          </p:nvPr>
+        </p:nvSpPr>
+        <p:spPr/>
+        <p:txBody>
+          <a:bodyPr>
+            <a:normAutofit fontScale="85000" lnSpcReduction="10000"/>
+          </a:bodyPr>
+          <a:lstStyle/>
+          <a:p>
+            <a:r>
+              <a:rPr lang="en-US" dirty="0" smtClean="0"/>
+              <a:t>Die </a:t>
+            </a:r>
+            <a:r>
+              <a:rPr lang="en-US" dirty="0" err="1" smtClean="0"/>
+              <a:t>Laufzeit</a:t>
+            </a:r>
+            <a:r>
+              <a:rPr lang="en-US" dirty="0" smtClean="0"/>
+              <a:t> </a:t>
+            </a:r>
+            <a:r>
+              <a:rPr lang="en-US" dirty="0" err="1" smtClean="0"/>
+              <a:t>hängt</a:t>
+            </a:r>
+            <a:r>
+              <a:rPr lang="en-US" dirty="0" smtClean="0"/>
+              <a:t> </a:t>
+            </a:r>
+            <a:r>
+              <a:rPr lang="en-US" dirty="0" err="1" smtClean="0"/>
+              <a:t>vom</a:t>
+            </a:r>
+            <a:r>
+              <a:rPr lang="en-US" dirty="0" smtClean="0"/>
+              <a:t> </a:t>
+            </a:r>
+            <a:r>
+              <a:rPr lang="en-US" dirty="0" err="1" smtClean="0"/>
+              <a:t>Auswahl</a:t>
+            </a:r>
+            <a:r>
+              <a:rPr lang="en-US" dirty="0" smtClean="0"/>
+              <a:t> des </a:t>
+            </a:r>
+            <a:r>
+              <a:rPr lang="en-US" dirty="0" err="1" smtClean="0"/>
+              <a:t>Pivotelements</a:t>
+            </a:r>
+            <a:r>
+              <a:rPr lang="en-US" dirty="0" smtClean="0"/>
+              <a:t>, </a:t>
+            </a:r>
+            <a:r>
+              <a:rPr lang="en-US" dirty="0" err="1" smtClean="0"/>
+              <a:t>wobei</a:t>
+            </a:r>
+            <a:r>
+              <a:rPr lang="en-US" dirty="0" smtClean="0"/>
+              <a:t>:</a:t>
+            </a:r>
+          </a:p>
+          <a:p>
+            <a:pPr lvl="1"/>
+            <a:r>
+              <a:rPr lang="en-US" dirty="0" err="1" smtClean="0"/>
+              <a:t>Im</a:t>
+            </a:r>
+            <a:r>
+              <a:rPr lang="en-US" dirty="0" smtClean="0"/>
+              <a:t> Worst-case </a:t>
+            </a:r>
+            <a:r>
+              <a:rPr lang="en-US" dirty="0" err="1" smtClean="0"/>
+              <a:t>wird</a:t>
+            </a:r>
+            <a:r>
+              <a:rPr lang="en-US" dirty="0" smtClean="0"/>
+              <a:t> das </a:t>
+            </a:r>
+            <a:r>
+              <a:rPr lang="en-US" dirty="0" err="1" smtClean="0"/>
+              <a:t>Pivotelement</a:t>
+            </a:r>
+            <a:r>
+              <a:rPr lang="en-US" dirty="0" smtClean="0"/>
+              <a:t> so </a:t>
+            </a:r>
+            <a:r>
+              <a:rPr lang="en-US" dirty="0" err="1" smtClean="0"/>
+              <a:t>gewählt</a:t>
+            </a:r>
+            <a:r>
+              <a:rPr lang="en-US" dirty="0" smtClean="0"/>
+              <a:t>, das </a:t>
+            </a:r>
+            <a:r>
+              <a:rPr lang="en-US" dirty="0" err="1" smtClean="0"/>
+              <a:t>es</a:t>
+            </a:r>
+            <a:r>
+              <a:rPr lang="en-US" dirty="0" smtClean="0"/>
+              <a:t> das </a:t>
+            </a:r>
+            <a:r>
+              <a:rPr lang="en-US" dirty="0" err="1" smtClean="0"/>
+              <a:t>kleinste</a:t>
+            </a:r>
+            <a:r>
+              <a:rPr lang="en-US" dirty="0" smtClean="0"/>
+              <a:t> </a:t>
+            </a:r>
+            <a:r>
+              <a:rPr lang="en-US" dirty="0" err="1" smtClean="0"/>
+              <a:t>oder</a:t>
+            </a:r>
+            <a:r>
+              <a:rPr lang="en-US" dirty="0" smtClean="0"/>
+              <a:t> das </a:t>
+            </a:r>
+            <a:r>
+              <a:rPr lang="en-US" dirty="0" err="1" smtClean="0"/>
+              <a:t>größte</a:t>
+            </a:r>
+            <a:r>
+              <a:rPr lang="en-US" dirty="0" smtClean="0"/>
+              <a:t> Element </a:t>
+            </a:r>
+            <a:r>
+              <a:rPr lang="en-US" dirty="0" err="1" smtClean="0"/>
+              <a:t>ist</a:t>
+            </a:r>
+            <a:r>
+              <a:rPr lang="en-US" dirty="0" smtClean="0"/>
+              <a:t>. Die </a:t>
+            </a:r>
+            <a:r>
+              <a:rPr lang="en-US" dirty="0" err="1" smtClean="0"/>
+              <a:t>Liste</a:t>
+            </a:r>
+            <a:r>
+              <a:rPr lang="en-US" dirty="0" smtClean="0"/>
+              <a:t> </a:t>
+            </a:r>
+            <a:r>
+              <a:rPr lang="en-US" dirty="0" err="1" smtClean="0"/>
+              <a:t>würde</a:t>
+            </a:r>
+            <a:r>
+              <a:rPr lang="en-US" dirty="0" smtClean="0"/>
+              <a:t> </a:t>
+            </a:r>
+            <a:r>
+              <a:rPr lang="en-US" dirty="0" err="1" smtClean="0"/>
+              <a:t>dann</a:t>
+            </a:r>
+            <a:r>
+              <a:rPr lang="en-US" dirty="0" smtClean="0"/>
+              <a:t> </a:t>
+            </a:r>
+            <a:r>
+              <a:rPr lang="en-US" dirty="0" err="1" smtClean="0"/>
+              <a:t>jeder</a:t>
+            </a:r>
+            <a:r>
+              <a:rPr lang="en-US" dirty="0" smtClean="0"/>
+              <a:t> Iteration </a:t>
+            </a:r>
+            <a:r>
+              <a:rPr lang="en-US" dirty="0" err="1" smtClean="0"/>
+              <a:t>nur</a:t>
+            </a:r>
+            <a:r>
+              <a:rPr lang="en-US" dirty="0" smtClean="0"/>
+              <a:t> um </a:t>
+            </a:r>
+            <a:r>
+              <a:rPr lang="en-US" dirty="0" err="1" smtClean="0"/>
+              <a:t>eins</a:t>
+            </a:r>
+            <a:r>
+              <a:rPr lang="en-US" dirty="0" smtClean="0"/>
+              <a:t> </a:t>
+            </a:r>
+            <a:r>
+              <a:rPr lang="en-US" dirty="0" err="1" smtClean="0"/>
+              <a:t>kleiner</a:t>
+            </a:r>
+            <a:r>
+              <a:rPr lang="en-US" dirty="0" smtClean="0"/>
+              <a:t>. </a:t>
+            </a:r>
+            <a:r>
+              <a:rPr lang="en-US" dirty="0" err="1" smtClean="0"/>
+              <a:t>Dann</a:t>
+            </a:r>
+            <a:r>
+              <a:rPr lang="en-US" dirty="0" smtClean="0"/>
+              <a:t> </a:t>
+            </a:r>
+            <a:r>
+              <a:rPr lang="en-US" dirty="0" err="1" smtClean="0"/>
+              <a:t>beobachtet</a:t>
+            </a:r>
+            <a:r>
+              <a:rPr lang="en-US" dirty="0" smtClean="0"/>
+              <a:t> man </a:t>
+            </a:r>
+            <a:r>
+              <a:rPr lang="en-US" dirty="0" err="1" smtClean="0"/>
+              <a:t>eine</a:t>
+            </a:r>
+            <a:r>
+              <a:rPr lang="en-US" dirty="0" smtClean="0"/>
+              <a:t> </a:t>
+            </a:r>
+            <a:r>
+              <a:rPr lang="en-US" dirty="0" err="1" smtClean="0"/>
+              <a:t>Laufzeit</a:t>
+            </a:r>
+            <a:r>
+              <a:rPr lang="en-US" dirty="0" smtClean="0"/>
+              <a:t> von </a:t>
+            </a:r>
+            <a:r>
+              <a:rPr lang="en-US" dirty="0"/>
+              <a:t>O(n</a:t>
+            </a:r>
+            <a:r>
+              <a:rPr lang="en-US" baseline="30000" dirty="0"/>
+              <a:t>2</a:t>
+            </a:r>
+            <a:r>
+              <a:rPr lang="en-US" dirty="0" smtClean="0"/>
+              <a:t>).</a:t>
+            </a:r>
+          </a:p>
+          <a:p>
+            <a:pPr lvl="1"/>
+            <a:r>
+              <a:rPr lang="en-US" dirty="0" err="1" smtClean="0"/>
+              <a:t>Im</a:t>
+            </a:r>
+            <a:r>
+              <a:rPr lang="en-US" dirty="0" smtClean="0"/>
+              <a:t> Best-case </a:t>
+            </a:r>
+            <a:r>
+              <a:rPr lang="en-US" dirty="0" err="1"/>
+              <a:t>wird</a:t>
+            </a:r>
+            <a:r>
+              <a:rPr lang="en-US" dirty="0"/>
+              <a:t> das </a:t>
+            </a:r>
+            <a:r>
+              <a:rPr lang="en-US" dirty="0" err="1"/>
+              <a:t>Pivotelement</a:t>
+            </a:r>
+            <a:r>
+              <a:rPr lang="en-US" dirty="0"/>
+              <a:t> so </a:t>
+            </a:r>
+            <a:r>
+              <a:rPr lang="en-US" dirty="0" err="1" smtClean="0"/>
+              <a:t>gewählt</a:t>
+            </a:r>
+            <a:r>
+              <a:rPr lang="en-US" dirty="0" smtClean="0"/>
+              <a:t>, </a:t>
+            </a:r>
+            <a:r>
+              <a:rPr lang="en-US" dirty="0" err="1" smtClean="0"/>
+              <a:t>dass</a:t>
+            </a:r>
+            <a:r>
+              <a:rPr lang="en-US" dirty="0" smtClean="0"/>
+              <a:t> die </a:t>
+            </a:r>
+            <a:r>
+              <a:rPr lang="en-US" dirty="0" err="1" smtClean="0"/>
+              <a:t>zwei</a:t>
+            </a:r>
+            <a:r>
+              <a:rPr lang="en-US" dirty="0" smtClean="0"/>
+              <a:t> </a:t>
+            </a:r>
+            <a:r>
+              <a:rPr lang="en-US" dirty="0" err="1" smtClean="0"/>
+              <a:t>Teilliste</a:t>
+            </a:r>
+            <a:r>
+              <a:rPr lang="en-US" dirty="0" smtClean="0"/>
+              <a:t> die </a:t>
+            </a:r>
+            <a:r>
+              <a:rPr lang="en-US" dirty="0" err="1" smtClean="0"/>
+              <a:t>gleiche</a:t>
+            </a:r>
+            <a:r>
+              <a:rPr lang="en-US" dirty="0" smtClean="0"/>
+              <a:t> </a:t>
+            </a:r>
+            <a:r>
+              <a:rPr lang="en-US" dirty="0" err="1" smtClean="0"/>
+              <a:t>Länge</a:t>
+            </a:r>
+            <a:r>
+              <a:rPr lang="en-US" dirty="0" smtClean="0"/>
+              <a:t> </a:t>
+            </a:r>
+            <a:r>
+              <a:rPr lang="en-US" dirty="0" err="1" smtClean="0"/>
+              <a:t>haben</a:t>
+            </a:r>
+            <a:r>
+              <a:rPr lang="en-US" dirty="0" smtClean="0"/>
+              <a:t>. </a:t>
+            </a:r>
+            <a:r>
+              <a:rPr lang="en-US" dirty="0" err="1" smtClean="0"/>
+              <a:t>Dann</a:t>
+            </a:r>
+            <a:r>
+              <a:rPr lang="en-US" dirty="0" smtClean="0"/>
+              <a:t> </a:t>
+            </a:r>
+            <a:r>
+              <a:rPr lang="en-US" dirty="0" err="1" smtClean="0"/>
+              <a:t>beobachtet</a:t>
+            </a:r>
+            <a:r>
+              <a:rPr lang="en-US" dirty="0" smtClean="0"/>
+              <a:t> man </a:t>
+            </a:r>
+            <a:r>
+              <a:rPr lang="en-US" dirty="0" err="1" smtClean="0"/>
+              <a:t>eine</a:t>
+            </a:r>
+            <a:r>
+              <a:rPr lang="en-US" dirty="0" smtClean="0"/>
+              <a:t> </a:t>
+            </a:r>
+            <a:r>
+              <a:rPr lang="en-US" dirty="0" err="1" smtClean="0"/>
+              <a:t>Laufzeit</a:t>
+            </a:r>
+            <a:r>
+              <a:rPr lang="en-US" dirty="0" smtClean="0"/>
+              <a:t> </a:t>
+            </a:r>
+            <a:r>
+              <a:rPr lang="en-US" dirty="0"/>
+              <a:t>O(</a:t>
+            </a:r>
+            <a:r>
+              <a:rPr lang="en-US" dirty="0" err="1"/>
+              <a:t>nlogn</a:t>
+            </a:r>
+            <a:r>
+              <a:rPr lang="en-US" dirty="0" smtClean="0"/>
+              <a:t>), die </a:t>
+            </a:r>
+            <a:r>
+              <a:rPr lang="en-US" dirty="0" err="1" smtClean="0"/>
+              <a:t>auch</a:t>
+            </a:r>
+            <a:r>
+              <a:rPr lang="en-US" dirty="0" smtClean="0"/>
+              <a:t> </a:t>
+            </a:r>
+            <a:r>
+              <a:rPr lang="en-US" dirty="0" err="1" smtClean="0"/>
+              <a:t>für</a:t>
+            </a:r>
+            <a:r>
+              <a:rPr lang="en-US" dirty="0" smtClean="0"/>
+              <a:t> den Average-case </a:t>
+            </a:r>
+            <a:r>
+              <a:rPr lang="en-US" dirty="0" err="1" smtClean="0"/>
+              <a:t>characteristisch</a:t>
+            </a:r>
+            <a:r>
+              <a:rPr lang="en-US" dirty="0" smtClean="0"/>
+              <a:t> </a:t>
+            </a:r>
+            <a:r>
+              <a:rPr lang="en-US" dirty="0" err="1" smtClean="0"/>
+              <a:t>ist</a:t>
+            </a:r>
+            <a:r>
+              <a:rPr lang="en-US" dirty="0" smtClean="0"/>
+              <a:t>.</a:t>
+            </a:r>
+          </a:p>
+          <a:p>
+            <a:r>
+              <a:rPr lang="en-US" dirty="0" smtClean="0"/>
+              <a:t>Das </a:t>
+            </a:r>
+            <a:r>
+              <a:rPr lang="en-US" dirty="0" err="1" smtClean="0"/>
+              <a:t>Pivotelement</a:t>
+            </a:r>
+            <a:r>
+              <a:rPr lang="en-US" dirty="0" smtClean="0"/>
+              <a:t> </a:t>
+            </a:r>
+            <a:r>
+              <a:rPr lang="en-US" dirty="0" err="1" smtClean="0"/>
+              <a:t>kann</a:t>
+            </a:r>
+            <a:r>
+              <a:rPr lang="en-US" dirty="0" smtClean="0"/>
+              <a:t> </a:t>
+            </a:r>
+            <a:r>
+              <a:rPr lang="en-US" dirty="0" err="1" smtClean="0"/>
+              <a:t>mit</a:t>
+            </a:r>
+            <a:r>
+              <a:rPr lang="en-US" dirty="0" smtClean="0"/>
+              <a:t> </a:t>
+            </a:r>
+            <a:r>
+              <a:rPr lang="en-US" dirty="0" err="1" smtClean="0"/>
+              <a:t>verschedenen</a:t>
+            </a:r>
+            <a:r>
+              <a:rPr lang="en-US" dirty="0" smtClean="0"/>
+              <a:t> </a:t>
+            </a:r>
+            <a:r>
+              <a:rPr lang="en-US" dirty="0" err="1" smtClean="0"/>
+              <a:t>Methoden</a:t>
+            </a:r>
+            <a:r>
+              <a:rPr lang="en-US" dirty="0" smtClean="0"/>
+              <a:t> </a:t>
+            </a:r>
+            <a:r>
+              <a:rPr lang="en-US" dirty="0" err="1" smtClean="0"/>
+              <a:t>ausgewählt</a:t>
+            </a:r>
+            <a:r>
+              <a:rPr lang="en-US" dirty="0" smtClean="0"/>
+              <a:t> sein. </a:t>
+            </a:r>
+            <a:r>
+              <a:rPr lang="en-US" dirty="0" err="1" smtClean="0"/>
+              <a:t>Einer</a:t>
+            </a:r>
+            <a:r>
+              <a:rPr lang="en-US" dirty="0" smtClean="0"/>
+              <a:t> </a:t>
+            </a:r>
+            <a:r>
+              <a:rPr lang="en-US" dirty="0" err="1" smtClean="0"/>
+              <a:t>dieser</a:t>
+            </a:r>
+            <a:r>
+              <a:rPr lang="en-US" dirty="0" smtClean="0"/>
+              <a:t> </a:t>
+            </a:r>
+            <a:r>
+              <a:rPr lang="en-US" dirty="0" err="1" smtClean="0"/>
+              <a:t>ist</a:t>
+            </a:r>
+            <a:r>
+              <a:rPr lang="en-US" dirty="0" smtClean="0"/>
+              <a:t> </a:t>
+            </a:r>
+            <a:r>
+              <a:rPr lang="en-US" dirty="0" err="1" smtClean="0"/>
+              <a:t>immer</a:t>
+            </a:r>
+            <a:r>
+              <a:rPr lang="en-US" dirty="0" smtClean="0"/>
+              <a:t> das </a:t>
+            </a:r>
+            <a:r>
+              <a:rPr lang="en-US" dirty="0" err="1" smtClean="0"/>
+              <a:t>Mittelelement</a:t>
+            </a:r>
+            <a:r>
+              <a:rPr lang="en-US" dirty="0" smtClean="0"/>
+              <a:t> </a:t>
+            </a:r>
+            <a:r>
+              <a:rPr lang="en-US" dirty="0" err="1" smtClean="0"/>
+              <a:t>zu</a:t>
+            </a:r>
+            <a:r>
+              <a:rPr lang="en-US" dirty="0" smtClean="0"/>
+              <a:t> </a:t>
+            </a:r>
+            <a:r>
+              <a:rPr lang="en-US" dirty="0" err="1" smtClean="0"/>
+              <a:t>nehmen</a:t>
+            </a:r>
+            <a:r>
+              <a:rPr lang="en-US" dirty="0" smtClean="0"/>
+              <a:t>. </a:t>
+            </a:r>
+            <a:r>
+              <a:rPr lang="en-US" dirty="0" err="1" smtClean="0"/>
+              <a:t>Eie</a:t>
+            </a:r>
+            <a:r>
+              <a:rPr lang="en-US" dirty="0" smtClean="0"/>
+              <a:t> </a:t>
+            </a:r>
+            <a:r>
+              <a:rPr lang="en-US" dirty="0" err="1" smtClean="0"/>
+              <a:t>bessere</a:t>
+            </a:r>
+            <a:r>
+              <a:rPr lang="en-US" dirty="0" smtClean="0"/>
+              <a:t> </a:t>
+            </a:r>
+            <a:r>
+              <a:rPr lang="en-US" dirty="0" err="1" smtClean="0"/>
+              <a:t>Strategie</a:t>
+            </a:r>
+            <a:r>
+              <a:rPr lang="en-US" dirty="0" smtClean="0"/>
+              <a:t> </a:t>
+            </a:r>
+            <a:r>
+              <a:rPr lang="en-US" dirty="0" err="1" smtClean="0"/>
+              <a:t>ist</a:t>
+            </a:r>
+            <a:r>
+              <a:rPr lang="en-US" dirty="0" smtClean="0"/>
+              <a:t>, die </a:t>
+            </a:r>
+            <a:r>
+              <a:rPr lang="en-US" dirty="0" err="1" smtClean="0"/>
+              <a:t>Mediane</a:t>
+            </a:r>
+            <a:r>
+              <a:rPr lang="en-US" dirty="0" smtClean="0"/>
+              <a:t> von </a:t>
+            </a:r>
+            <a:r>
+              <a:rPr lang="en-US" dirty="0" err="1" smtClean="0"/>
+              <a:t>dem</a:t>
+            </a:r>
+            <a:r>
+              <a:rPr lang="en-US" dirty="0" smtClean="0"/>
+              <a:t> </a:t>
+            </a:r>
+            <a:r>
+              <a:rPr lang="en-US" dirty="0" err="1" smtClean="0"/>
+              <a:t>Ersten</a:t>
+            </a:r>
+            <a:r>
+              <a:rPr lang="en-US" dirty="0" smtClean="0"/>
+              <a:t>, </a:t>
+            </a:r>
+            <a:r>
+              <a:rPr lang="en-US" dirty="0" err="1" smtClean="0"/>
+              <a:t>Mittleren</a:t>
+            </a:r>
+            <a:r>
+              <a:rPr lang="en-US" dirty="0" smtClean="0"/>
+              <a:t> und </a:t>
+            </a:r>
+            <a:r>
+              <a:rPr lang="en-US" dirty="0" err="1" smtClean="0"/>
+              <a:t>Letzten</a:t>
+            </a:r>
+            <a:r>
+              <a:rPr lang="en-US" dirty="0" smtClean="0"/>
+              <a:t> </a:t>
+            </a:r>
+            <a:r>
+              <a:rPr lang="en-US" dirty="0" err="1" smtClean="0"/>
+              <a:t>Elementen</a:t>
+            </a:r>
+            <a:r>
+              <a:rPr lang="en-US" dirty="0" smtClean="0"/>
+              <a:t> </a:t>
+            </a:r>
+            <a:r>
+              <a:rPr lang="en-US" dirty="0" err="1" smtClean="0"/>
+              <a:t>zu</a:t>
+            </a:r>
+            <a:r>
+              <a:rPr lang="en-US" dirty="0" smtClean="0"/>
+              <a:t> </a:t>
+            </a:r>
+            <a:r>
+              <a:rPr lang="en-US" dirty="0" err="1" smtClean="0"/>
+              <a:t>wählen</a:t>
+            </a:r>
+            <a:r>
+              <a:rPr lang="en-US" dirty="0" smtClean="0"/>
+              <a:t>.</a:t>
+            </a:r>
+          </a:p>
+          <a:p>
+            <a:r>
+              <a:rPr lang="en-US" dirty="0" smtClean="0"/>
+              <a:t>Das </a:t>
+            </a:r>
+            <a:r>
+              <a:rPr lang="en-US" dirty="0" err="1" smtClean="0"/>
+              <a:t>Verfahren</a:t>
+            </a:r>
+            <a:r>
+              <a:rPr lang="en-US" dirty="0" smtClean="0"/>
+              <a:t> </a:t>
+            </a:r>
+            <a:r>
+              <a:rPr lang="en-US" dirty="0" err="1" smtClean="0"/>
+              <a:t>ist</a:t>
+            </a:r>
+            <a:r>
+              <a:rPr lang="en-US" dirty="0" smtClean="0"/>
+              <a:t> </a:t>
+            </a:r>
+            <a:r>
+              <a:rPr lang="en-US" dirty="0" err="1" smtClean="0"/>
+              <a:t>nicht</a:t>
+            </a:r>
+            <a:r>
+              <a:rPr lang="en-US" dirty="0" smtClean="0"/>
+              <a:t> </a:t>
+            </a:r>
+            <a:r>
+              <a:rPr lang="en-US" dirty="0" err="1" smtClean="0"/>
+              <a:t>stabil</a:t>
+            </a:r>
+            <a:r>
+              <a:rPr lang="en-US" dirty="0" smtClean="0"/>
+              <a:t>, </a:t>
+            </a:r>
+            <a:r>
+              <a:rPr lang="en-US" dirty="0" err="1" smtClean="0"/>
+              <a:t>arbeitet</a:t>
+            </a:r>
+            <a:r>
+              <a:rPr lang="en-US" smtClean="0"/>
+              <a:t> in-place.</a:t>
+            </a:r>
+            <a:endParaRPr lang="en-US" dirty="0"/>
+          </a:p>
+          <a:p>
+            <a:pPr lvl="1"/>
+            <a:endParaRPr lang="en-US" dirty="0"/>
+          </a:p>
+        </p:txBody>
+      </p:sp>
+    </p:spTree>
+    <p:extLst>
+      <p:ext uri="{BB962C8B-B14F-4D97-AF65-F5344CB8AC3E}">
+        <p14:creationId xmlns:p14="http://schemas.microsoft.com/office/powerpoint/2010/main" val="1373028393"/>
       </p:ext>
     </p:extLst>
   </p:cSld>

</xml_diff>

<commit_message>
Added Heapsort to documentation, some formatting in source and in presentation.
</commit_message>
<xml_diff>
--- a/docs/sorting algorithms - presentation/Sortierverfahren.pptx
+++ b/docs/sorting algorithms - presentation/Sortierverfahren.pptx
@@ -31,18 +31,23 @@
     <p:sldId id="279" r:id="rId25"/>
     <p:sldId id="280" r:id="rId26"/>
     <p:sldId id="281" r:id="rId27"/>
-    <p:sldId id="282" r:id="rId28"/>
-    <p:sldId id="283" r:id="rId29"/>
-    <p:sldId id="284" r:id="rId30"/>
-    <p:sldId id="285" r:id="rId31"/>
-    <p:sldId id="287" r:id="rId32"/>
-    <p:sldId id="288" r:id="rId33"/>
-    <p:sldId id="289" r:id="rId34"/>
-    <p:sldId id="290" r:id="rId35"/>
-    <p:sldId id="291" r:id="rId36"/>
-    <p:sldId id="292" r:id="rId37"/>
-    <p:sldId id="293" r:id="rId38"/>
-    <p:sldId id="294" r:id="rId39"/>
+    <p:sldId id="298" r:id="rId28"/>
+    <p:sldId id="282" r:id="rId29"/>
+    <p:sldId id="283" r:id="rId30"/>
+    <p:sldId id="284" r:id="rId31"/>
+    <p:sldId id="285" r:id="rId32"/>
+    <p:sldId id="287" r:id="rId33"/>
+    <p:sldId id="288" r:id="rId34"/>
+    <p:sldId id="289" r:id="rId35"/>
+    <p:sldId id="290" r:id="rId36"/>
+    <p:sldId id="291" r:id="rId37"/>
+    <p:sldId id="292" r:id="rId38"/>
+    <p:sldId id="293" r:id="rId39"/>
+    <p:sldId id="294" r:id="rId40"/>
+    <p:sldId id="295" r:id="rId41"/>
+    <p:sldId id="296" r:id="rId42"/>
+    <p:sldId id="297" r:id="rId43"/>
+    <p:sldId id="299" r:id="rId44"/>
   </p:sldIdLst>
   <p:sldSz cx="12192000" cy="6858000"/>
   <p:notesSz cx="6858000" cy="9144000"/>
@@ -13855,6 +13860,10 @@
               <a:rPr lang="en-US" dirty="0" err="1" smtClean="0"/>
               <a:t>Speicherplatz</a:t>
             </a:r>
+            <a:r>
+              <a:rPr lang="en-US" dirty="0" smtClean="0"/>
+              <a:t>. </a:t>
+            </a:r>
             <a:endParaRPr lang="en-US" dirty="0" smtClean="0"/>
           </a:p>
           <a:p>
@@ -14629,10 +14638,6 @@
           <a:bodyPr/>
           <a:lstStyle/>
           <a:p>
-            <a:r>
-              <a:rPr lang="en-US" dirty="0" smtClean="0"/>
-              <a:t>5.1 </a:t>
-            </a:r>
             <a:r>
               <a:rPr lang="en-US" dirty="0" err="1" smtClean="0"/>
               <a:t>Einfache</a:t>
@@ -17752,6 +17757,297 @@
           <a:p>
             <a:r>
               <a:rPr lang="en-US" dirty="0" err="1" smtClean="0"/>
+              <a:t>Effiziente</a:t>
+            </a:r>
+            <a:r>
+              <a:rPr lang="en-US" dirty="0" smtClean="0"/>
+              <a:t> </a:t>
+            </a:r>
+            <a:r>
+              <a:rPr lang="en-US" dirty="0" err="1" smtClean="0"/>
+              <a:t>verfahren</a:t>
+            </a:r>
+            <a:endParaRPr lang="bg-BG" dirty="0"/>
+          </a:p>
+        </p:txBody>
+      </p:sp>
+      <p:sp>
+        <p:nvSpPr>
+          <p:cNvPr id="3" name="Content Placeholder 2"/>
+          <p:cNvSpPr>
+            <a:spLocks noGrp="1"/>
+          </p:cNvSpPr>
+          <p:nvPr>
+            <p:ph idx="1"/>
+          </p:nvPr>
+        </p:nvSpPr>
+        <p:spPr/>
+        <p:txBody>
+          <a:bodyPr/>
+          <a:lstStyle/>
+          <a:p>
+            <a:r>
+              <a:rPr lang="en-US" dirty="0"/>
+              <a:t>Die </a:t>
+            </a:r>
+            <a:r>
+              <a:rPr lang="en-US" dirty="0" err="1"/>
+              <a:t>characterisieren</a:t>
+            </a:r>
+            <a:r>
+              <a:rPr lang="en-US" dirty="0"/>
+              <a:t> </a:t>
+            </a:r>
+            <a:r>
+              <a:rPr lang="en-US" dirty="0" err="1"/>
+              <a:t>sich</a:t>
+            </a:r>
+            <a:r>
+              <a:rPr lang="en-US" dirty="0"/>
+              <a:t> </a:t>
+            </a:r>
+            <a:r>
+              <a:rPr lang="en-US" dirty="0" err="1"/>
+              <a:t>mit</a:t>
+            </a:r>
+            <a:r>
+              <a:rPr lang="en-US" dirty="0"/>
+              <a:t> </a:t>
+            </a:r>
+            <a:r>
+              <a:rPr lang="en-US" dirty="0" err="1" smtClean="0"/>
+              <a:t>einer</a:t>
+            </a:r>
+            <a:r>
+              <a:rPr lang="en-US" dirty="0" smtClean="0"/>
+              <a:t> </a:t>
+            </a:r>
+            <a:r>
+              <a:rPr lang="en-US" dirty="0" err="1" smtClean="0"/>
+              <a:t>mittleren</a:t>
+            </a:r>
+            <a:r>
+              <a:rPr lang="en-US" dirty="0" smtClean="0"/>
+              <a:t> </a:t>
+            </a:r>
+            <a:r>
+              <a:rPr lang="en-US" dirty="0" err="1" smtClean="0"/>
+              <a:t>Komplexität</a:t>
+            </a:r>
+            <a:r>
+              <a:rPr lang="en-US" dirty="0" smtClean="0"/>
+              <a:t> und </a:t>
+            </a:r>
+            <a:r>
+              <a:rPr lang="en-US" dirty="0" err="1" smtClean="0"/>
+              <a:t>guter</a:t>
+            </a:r>
+            <a:r>
+              <a:rPr lang="en-US" dirty="0" smtClean="0"/>
+              <a:t> </a:t>
+            </a:r>
+            <a:r>
+              <a:rPr lang="en-US" dirty="0" err="1" smtClean="0"/>
+              <a:t>Laufzeit</a:t>
+            </a:r>
+            <a:r>
+              <a:rPr lang="en-US" dirty="0" smtClean="0"/>
+              <a:t>, </a:t>
+            </a:r>
+            <a:r>
+              <a:rPr lang="en-US" dirty="0" err="1"/>
+              <a:t>darum</a:t>
+            </a:r>
+            <a:r>
+              <a:rPr lang="en-US" dirty="0"/>
+              <a:t> </a:t>
+            </a:r>
+            <a:r>
+              <a:rPr lang="en-US" dirty="0" err="1"/>
+              <a:t>sind</a:t>
+            </a:r>
+            <a:r>
+              <a:rPr lang="en-US" dirty="0"/>
+              <a:t> </a:t>
+            </a:r>
+            <a:r>
+              <a:rPr lang="en-US" dirty="0" err="1"/>
+              <a:t>sie</a:t>
+            </a:r>
+            <a:r>
+              <a:rPr lang="en-US" dirty="0"/>
+              <a:t> gut </a:t>
+            </a:r>
+            <a:r>
+              <a:rPr lang="en-US" dirty="0" err="1" smtClean="0"/>
+              <a:t>zur</a:t>
+            </a:r>
+            <a:r>
+              <a:rPr lang="en-US" dirty="0" smtClean="0"/>
+              <a:t> </a:t>
+            </a:r>
+            <a:r>
+              <a:rPr lang="en-US" dirty="0" err="1" smtClean="0"/>
+              <a:t>Lösung</a:t>
+            </a:r>
+            <a:r>
+              <a:rPr lang="en-US" dirty="0" smtClean="0"/>
+              <a:t> </a:t>
+            </a:r>
+            <a:r>
+              <a:rPr lang="en-US" dirty="0" err="1" smtClean="0"/>
+              <a:t>wirklichen</a:t>
+            </a:r>
+            <a:r>
+              <a:rPr lang="en-US" dirty="0" smtClean="0"/>
+              <a:t> </a:t>
+            </a:r>
+            <a:r>
+              <a:rPr lang="en-US" dirty="0" err="1" smtClean="0"/>
+              <a:t>Aufgaben</a:t>
+            </a:r>
+            <a:r>
+              <a:rPr lang="en-US" dirty="0" smtClean="0"/>
+              <a:t> </a:t>
+            </a:r>
+            <a:r>
+              <a:rPr lang="en-US" dirty="0" err="1" smtClean="0"/>
+              <a:t>geeignet</a:t>
+            </a:r>
+            <a:r>
+              <a:rPr lang="en-US" dirty="0" smtClean="0"/>
+              <a:t>.</a:t>
+            </a:r>
+          </a:p>
+          <a:p>
+            <a:r>
+              <a:rPr lang="en-US" dirty="0" err="1"/>
+              <a:t>Typische</a:t>
+            </a:r>
+            <a:r>
+              <a:rPr lang="en-US" dirty="0"/>
+              <a:t> Average-</a:t>
+            </a:r>
+            <a:r>
+              <a:rPr lang="en-US" dirty="0" err="1"/>
+              <a:t>Komplexit</a:t>
+            </a:r>
+            <a:r>
+              <a:rPr lang="de-DE" dirty="0"/>
+              <a:t>ät </a:t>
+            </a:r>
+            <a:r>
+              <a:rPr lang="bg-BG" dirty="0"/>
+              <a:t>– </a:t>
+            </a:r>
+            <a:r>
+              <a:rPr lang="en-US" dirty="0" smtClean="0"/>
+              <a:t>O(</a:t>
+            </a:r>
+            <a:r>
+              <a:rPr lang="en-US" dirty="0" err="1" smtClean="0"/>
+              <a:t>nlogn</a:t>
+            </a:r>
+            <a:r>
+              <a:rPr lang="en-US" dirty="0" smtClean="0"/>
+              <a:t>).</a:t>
+            </a:r>
+            <a:endParaRPr lang="en-US" dirty="0"/>
+          </a:p>
+          <a:p>
+            <a:r>
+              <a:rPr lang="en-US" dirty="0" err="1"/>
+              <a:t>Typische</a:t>
+            </a:r>
+            <a:r>
+              <a:rPr lang="en-US" dirty="0"/>
+              <a:t> </a:t>
+            </a:r>
+            <a:r>
+              <a:rPr lang="en-US" dirty="0" err="1"/>
+              <a:t>Vertreter</a:t>
+            </a:r>
+            <a:r>
+              <a:rPr lang="en-US" dirty="0"/>
+              <a:t> – </a:t>
+            </a:r>
+            <a:r>
+              <a:rPr lang="en-US" dirty="0" smtClean="0"/>
+              <a:t>quicksort, </a:t>
+            </a:r>
+            <a:r>
+              <a:rPr lang="en-US" dirty="0" err="1" smtClean="0"/>
+              <a:t>mergesort</a:t>
+            </a:r>
+            <a:r>
+              <a:rPr lang="en-US" dirty="0" smtClean="0"/>
+              <a:t>, </a:t>
+            </a:r>
+            <a:r>
+              <a:rPr lang="en-US" dirty="0" err="1" smtClean="0"/>
+              <a:t>heapsort</a:t>
+            </a:r>
+            <a:r>
+              <a:rPr lang="en-US" dirty="0" smtClean="0"/>
+              <a:t>.</a:t>
+            </a:r>
+            <a:endParaRPr lang="bg-BG" dirty="0"/>
+          </a:p>
+          <a:p>
+            <a:endParaRPr lang="en-US" dirty="0"/>
+          </a:p>
+          <a:p>
+            <a:endParaRPr lang="bg-BG" dirty="0"/>
+          </a:p>
+        </p:txBody>
+      </p:sp>
+    </p:spTree>
+    <p:extLst>
+      <p:ext uri="{BB962C8B-B14F-4D97-AF65-F5344CB8AC3E}">
+        <p14:creationId xmlns:p14="http://schemas.microsoft.com/office/powerpoint/2010/main" val="2829301061"/>
+      </p:ext>
+    </p:extLst>
+  </p:cSld>
+  <p:clrMapOvr>
+    <a:masterClrMapping/>
+  </p:clrMapOvr>
+</p:sld>
+</file>
+
+<file path=ppt/slides/slide28.xml><?xml version="1.0" encoding="utf-8"?>
+<p:sld xmlns:a="http://schemas.openxmlformats.org/drawingml/2006/main" xmlns:r="http://schemas.openxmlformats.org/officeDocument/2006/relationships" xmlns:p="http://schemas.openxmlformats.org/presentationml/2006/main">
+  <p:cSld>
+    <p:spTree>
+      <p:nvGrpSpPr>
+        <p:cNvPr id="1" name=""/>
+        <p:cNvGrpSpPr/>
+        <p:nvPr/>
+      </p:nvGrpSpPr>
+      <p:grpSpPr>
+        <a:xfrm>
+          <a:off x="0" y="0"/>
+          <a:ext cx="0" cy="0"/>
+          <a:chOff x="0" y="0"/>
+          <a:chExt cx="0" cy="0"/>
+        </a:xfrm>
+      </p:grpSpPr>
+      <p:sp>
+        <p:nvSpPr>
+          <p:cNvPr id="2" name="Title 1"/>
+          <p:cNvSpPr>
+            <a:spLocks noGrp="1"/>
+          </p:cNvSpPr>
+          <p:nvPr>
+            <p:ph type="title"/>
+          </p:nvPr>
+        </p:nvSpPr>
+        <p:spPr/>
+        <p:txBody>
+          <a:bodyPr/>
+          <a:lstStyle/>
+          <a:p>
+            <a:r>
+              <a:rPr lang="en-US" dirty="0" err="1" smtClean="0"/>
               <a:t>Shellsort</a:t>
             </a:r>
             <a:r>
@@ -18581,7 +18877,7 @@
 </p:sld>
 </file>
 
-<file path=ppt/slides/slide28.xml><?xml version="1.0" encoding="utf-8"?>
+<file path=ppt/slides/slide29.xml><?xml version="1.0" encoding="utf-8"?>
 <p:sld xmlns:a="http://schemas.openxmlformats.org/drawingml/2006/main" xmlns:r="http://schemas.openxmlformats.org/officeDocument/2006/relationships" xmlns:p="http://schemas.openxmlformats.org/presentationml/2006/main">
   <p:cSld>
     <p:spTree>
@@ -18709,7 +19005,280 @@
 </p:sld>
 </file>
 
-<file path=ppt/slides/slide29.xml><?xml version="1.0" encoding="utf-8"?>
+<file path=ppt/slides/slide3.xml><?xml version="1.0" encoding="utf-8"?>
+<p:sld xmlns:a="http://schemas.openxmlformats.org/drawingml/2006/main" xmlns:r="http://schemas.openxmlformats.org/officeDocument/2006/relationships" xmlns:p="http://schemas.openxmlformats.org/presentationml/2006/main">
+  <p:cSld>
+    <p:spTree>
+      <p:nvGrpSpPr>
+        <p:cNvPr id="1" name=""/>
+        <p:cNvGrpSpPr/>
+        <p:nvPr/>
+      </p:nvGrpSpPr>
+      <p:grpSpPr>
+        <a:xfrm>
+          <a:off x="0" y="0"/>
+          <a:ext cx="0" cy="0"/>
+          <a:chOff x="0" y="0"/>
+          <a:chExt cx="0" cy="0"/>
+        </a:xfrm>
+      </p:grpSpPr>
+      <p:sp>
+        <p:nvSpPr>
+          <p:cNvPr id="2" name="Title 1"/>
+          <p:cNvSpPr>
+            <a:spLocks noGrp="1"/>
+          </p:cNvSpPr>
+          <p:nvPr>
+            <p:ph type="title"/>
+          </p:nvPr>
+        </p:nvSpPr>
+        <p:spPr/>
+        <p:txBody>
+          <a:bodyPr/>
+          <a:lstStyle/>
+          <a:p>
+            <a:r>
+              <a:rPr lang="en-US" dirty="0" err="1" smtClean="0"/>
+              <a:t>Inhalt</a:t>
+            </a:r>
+            <a:r>
+              <a:rPr lang="en-US" dirty="0" smtClean="0"/>
+              <a:t> </a:t>
+            </a:r>
+            <a:r>
+              <a:rPr lang="en-US" dirty="0" err="1" smtClean="0"/>
+              <a:t>teil</a:t>
+            </a:r>
+            <a:r>
+              <a:rPr lang="en-US" dirty="0" smtClean="0"/>
+              <a:t> 2</a:t>
+            </a:r>
+            <a:endParaRPr lang="bg-BG" dirty="0"/>
+          </a:p>
+        </p:txBody>
+      </p:sp>
+      <p:sp>
+        <p:nvSpPr>
+          <p:cNvPr id="3" name="Content Placeholder 2"/>
+          <p:cNvSpPr>
+            <a:spLocks noGrp="1"/>
+          </p:cNvSpPr>
+          <p:nvPr>
+            <p:ph idx="1"/>
+          </p:nvPr>
+        </p:nvSpPr>
+        <p:spPr>
+          <a:xfrm>
+            <a:off x="1141413" y="1612232"/>
+            <a:ext cx="10309183" cy="4862275"/>
+          </a:xfrm>
+        </p:spPr>
+        <p:txBody>
+          <a:bodyPr>
+            <a:normAutofit fontScale="77500" lnSpcReduction="20000"/>
+          </a:bodyPr>
+          <a:lstStyle/>
+          <a:p>
+            <a:r>
+              <a:rPr lang="en-US" dirty="0"/>
+              <a:t>5.Analyse </a:t>
+            </a:r>
+            <a:r>
+              <a:rPr lang="en-US" dirty="0" err="1"/>
+              <a:t>einiger</a:t>
+            </a:r>
+            <a:r>
+              <a:rPr lang="en-US" dirty="0"/>
+              <a:t> der </a:t>
+            </a:r>
+            <a:r>
+              <a:rPr lang="en-US" dirty="0" err="1"/>
+              <a:t>bekanntesten</a:t>
+            </a:r>
+            <a:r>
+              <a:rPr lang="en-US" dirty="0"/>
+              <a:t> </a:t>
+            </a:r>
+            <a:r>
+              <a:rPr lang="en-US" dirty="0" err="1" smtClean="0"/>
+              <a:t>Verfahren</a:t>
+            </a:r>
+            <a:endParaRPr lang="en-US" dirty="0" smtClean="0"/>
+          </a:p>
+          <a:p>
+            <a:pPr lvl="1"/>
+            <a:r>
+              <a:rPr lang="en-US" dirty="0" smtClean="0"/>
+              <a:t>5.1 </a:t>
+            </a:r>
+            <a:r>
+              <a:rPr lang="en-US" dirty="0" err="1" smtClean="0"/>
+              <a:t>Vergleichbasierte</a:t>
+            </a:r>
+            <a:endParaRPr lang="en-US" dirty="0"/>
+          </a:p>
+          <a:p>
+            <a:pPr lvl="2"/>
+            <a:r>
+              <a:rPr lang="en-US" dirty="0" err="1"/>
+              <a:t>Einfache</a:t>
+            </a:r>
+            <a:r>
+              <a:rPr lang="en-US" dirty="0"/>
+              <a:t> </a:t>
+            </a:r>
+            <a:r>
+              <a:rPr lang="en-US" dirty="0" err="1" smtClean="0"/>
+              <a:t>Algorithmen</a:t>
+            </a:r>
+            <a:endParaRPr lang="en-US" dirty="0" smtClean="0"/>
+          </a:p>
+          <a:p>
+            <a:pPr lvl="3"/>
+            <a:r>
+              <a:rPr lang="en-US" dirty="0" smtClean="0"/>
+              <a:t>Insertion sort</a:t>
+            </a:r>
+          </a:p>
+          <a:p>
+            <a:pPr lvl="3"/>
+            <a:r>
+              <a:rPr lang="en-US" dirty="0" smtClean="0"/>
+              <a:t>Selection sort</a:t>
+            </a:r>
+          </a:p>
+          <a:p>
+            <a:pPr lvl="3"/>
+            <a:r>
+              <a:rPr lang="en-US" dirty="0" smtClean="0"/>
+              <a:t>Bubble-sort</a:t>
+            </a:r>
+            <a:endParaRPr lang="en-US" dirty="0" smtClean="0"/>
+          </a:p>
+          <a:p>
+            <a:pPr lvl="3"/>
+            <a:r>
+              <a:rPr lang="en-US" dirty="0" smtClean="0"/>
+              <a:t>Shell sort</a:t>
+            </a:r>
+          </a:p>
+          <a:p>
+            <a:pPr lvl="3"/>
+            <a:r>
+              <a:rPr lang="en-US" dirty="0" smtClean="0"/>
+              <a:t>Comb sort</a:t>
+            </a:r>
+          </a:p>
+          <a:p>
+            <a:pPr lvl="2"/>
+            <a:r>
+              <a:rPr lang="en-US" dirty="0" err="1" smtClean="0"/>
+              <a:t>Effiziente</a:t>
+            </a:r>
+            <a:r>
+              <a:rPr lang="en-US" dirty="0" smtClean="0"/>
+              <a:t> </a:t>
+            </a:r>
+            <a:r>
+              <a:rPr lang="en-US" dirty="0" err="1" smtClean="0"/>
+              <a:t>Algorithmen</a:t>
+            </a:r>
+            <a:endParaRPr lang="en-US" dirty="0" smtClean="0"/>
+          </a:p>
+          <a:p>
+            <a:pPr lvl="3"/>
+            <a:r>
+              <a:rPr lang="en-US" dirty="0" smtClean="0"/>
+              <a:t>Merge sort</a:t>
+            </a:r>
+          </a:p>
+          <a:p>
+            <a:pPr lvl="3"/>
+            <a:r>
+              <a:rPr lang="en-US" dirty="0" smtClean="0"/>
+              <a:t>Quicksort</a:t>
+            </a:r>
+          </a:p>
+          <a:p>
+            <a:pPr lvl="3"/>
+            <a:r>
+              <a:rPr lang="en-US" dirty="0" smtClean="0"/>
+              <a:t>Heap sort</a:t>
+            </a:r>
+          </a:p>
+          <a:p>
+            <a:pPr lvl="1"/>
+            <a:r>
+              <a:rPr lang="en-US" dirty="0" smtClean="0"/>
+              <a:t>5.2 </a:t>
+            </a:r>
+            <a:r>
+              <a:rPr lang="en-US" dirty="0" err="1" smtClean="0"/>
+              <a:t>Nicht-vergleichbasierte</a:t>
+            </a:r>
+            <a:endParaRPr lang="en-US" dirty="0" smtClean="0"/>
+          </a:p>
+          <a:p>
+            <a:pPr lvl="2"/>
+            <a:r>
+              <a:rPr lang="en-US" dirty="0" err="1" smtClean="0"/>
+              <a:t>Distributierte</a:t>
+            </a:r>
+            <a:r>
+              <a:rPr lang="en-US" dirty="0" smtClean="0"/>
+              <a:t> </a:t>
+            </a:r>
+            <a:r>
+              <a:rPr lang="en-US" dirty="0" err="1" smtClean="0"/>
+              <a:t>Algorithmen</a:t>
+            </a:r>
+            <a:endParaRPr lang="en-US" dirty="0" smtClean="0"/>
+          </a:p>
+          <a:p>
+            <a:pPr lvl="3"/>
+            <a:r>
+              <a:rPr lang="en-US" dirty="0" smtClean="0"/>
+              <a:t>Counting sort</a:t>
+            </a:r>
+          </a:p>
+          <a:p>
+            <a:pPr lvl="3"/>
+            <a:r>
+              <a:rPr lang="en-US" dirty="0" smtClean="0"/>
+              <a:t>Bucket sort</a:t>
+            </a:r>
+          </a:p>
+          <a:p>
+            <a:pPr lvl="3"/>
+            <a:r>
+              <a:rPr lang="en-US" dirty="0" smtClean="0"/>
+              <a:t>Radix sort</a:t>
+            </a:r>
+            <a:endParaRPr lang="en-US" dirty="0"/>
+          </a:p>
+        </p:txBody>
+      </p:sp>
+    </p:spTree>
+    <p:extLst>
+      <p:ext uri="{BB962C8B-B14F-4D97-AF65-F5344CB8AC3E}">
+        <p14:creationId xmlns:p14="http://schemas.microsoft.com/office/powerpoint/2010/main" val="62634377"/>
+      </p:ext>
+    </p:extLst>
+  </p:cSld>
+  <p:clrMapOvr>
+    <a:masterClrMapping/>
+  </p:clrMapOvr>
+  <p:timing>
+    <p:tnLst>
+      <p:par>
+        <p:cTn id="1" dur="indefinite" restart="never" nodeType="tmRoot"/>
+      </p:par>
+    </p:tnLst>
+  </p:timing>
+</p:sld>
+</file>
+
+<file path=ppt/slides/slide30.xml><?xml version="1.0" encoding="utf-8"?>
 <p:sld xmlns:a="http://schemas.openxmlformats.org/drawingml/2006/main" xmlns:r="http://schemas.openxmlformats.org/officeDocument/2006/relationships" xmlns:p="http://schemas.openxmlformats.org/presentationml/2006/main">
   <p:cSld>
     <p:spTree>
@@ -19301,7 +19870,7 @@
 </p:sld>
 </file>
 
-<file path=ppt/slides/slide3.xml><?xml version="1.0" encoding="utf-8"?>
+<file path=ppt/slides/slide31.xml><?xml version="1.0" encoding="utf-8"?>
 <p:sld xmlns:a="http://schemas.openxmlformats.org/drawingml/2006/main" xmlns:r="http://schemas.openxmlformats.org/officeDocument/2006/relationships" xmlns:p="http://schemas.openxmlformats.org/presentationml/2006/main">
   <p:cSld>
     <p:spTree>
@@ -19335,290 +19904,6 @@
           <a:p>
             <a:r>
               <a:rPr lang="en-US" dirty="0" err="1" smtClean="0"/>
-              <a:t>Inhalt</a:t>
-            </a:r>
-            <a:r>
-              <a:rPr lang="en-US" dirty="0" smtClean="0"/>
-              <a:t> </a:t>
-            </a:r>
-            <a:r>
-              <a:rPr lang="en-US" dirty="0" err="1" smtClean="0"/>
-              <a:t>teil</a:t>
-            </a:r>
-            <a:r>
-              <a:rPr lang="en-US" dirty="0" smtClean="0"/>
-              <a:t> 2</a:t>
-            </a:r>
-            <a:endParaRPr lang="bg-BG" dirty="0"/>
-          </a:p>
-        </p:txBody>
-      </p:sp>
-      <p:sp>
-        <p:nvSpPr>
-          <p:cNvPr id="3" name="Content Placeholder 2"/>
-          <p:cNvSpPr>
-            <a:spLocks noGrp="1"/>
-          </p:cNvSpPr>
-          <p:nvPr>
-            <p:ph idx="1"/>
-          </p:nvPr>
-        </p:nvSpPr>
-        <p:spPr>
-          <a:xfrm>
-            <a:off x="1141413" y="1612232"/>
-            <a:ext cx="10309183" cy="4862275"/>
-          </a:xfrm>
-        </p:spPr>
-        <p:txBody>
-          <a:bodyPr>
-            <a:normAutofit fontScale="77500" lnSpcReduction="20000"/>
-          </a:bodyPr>
-          <a:lstStyle/>
-          <a:p>
-            <a:r>
-              <a:rPr lang="en-US" dirty="0"/>
-              <a:t>5.Analyse </a:t>
-            </a:r>
-            <a:r>
-              <a:rPr lang="en-US" dirty="0" err="1"/>
-              <a:t>einiger</a:t>
-            </a:r>
-            <a:r>
-              <a:rPr lang="en-US" dirty="0"/>
-              <a:t> der </a:t>
-            </a:r>
-            <a:r>
-              <a:rPr lang="en-US" dirty="0" err="1"/>
-              <a:t>bekanntesten</a:t>
-            </a:r>
-            <a:r>
-              <a:rPr lang="en-US" dirty="0"/>
-              <a:t> </a:t>
-            </a:r>
-            <a:r>
-              <a:rPr lang="en-US" dirty="0" err="1" smtClean="0"/>
-              <a:t>Verfahren</a:t>
-            </a:r>
-            <a:endParaRPr lang="en-US" dirty="0" smtClean="0"/>
-          </a:p>
-          <a:p>
-            <a:pPr lvl="1"/>
-            <a:r>
-              <a:rPr lang="en-US" dirty="0" smtClean="0"/>
-              <a:t>5.1 </a:t>
-            </a:r>
-            <a:r>
-              <a:rPr lang="en-US" dirty="0" err="1" smtClean="0"/>
-              <a:t>Vergleichbasierte</a:t>
-            </a:r>
-            <a:endParaRPr lang="en-US" dirty="0"/>
-          </a:p>
-          <a:p>
-            <a:pPr lvl="2"/>
-            <a:r>
-              <a:rPr lang="en-US" dirty="0" err="1"/>
-              <a:t>Einfache</a:t>
-            </a:r>
-            <a:r>
-              <a:rPr lang="en-US" dirty="0"/>
-              <a:t> </a:t>
-            </a:r>
-            <a:r>
-              <a:rPr lang="en-US" dirty="0" err="1" smtClean="0"/>
-              <a:t>Algorithmen</a:t>
-            </a:r>
-            <a:endParaRPr lang="en-US" dirty="0" smtClean="0"/>
-          </a:p>
-          <a:p>
-            <a:pPr lvl="3"/>
-            <a:r>
-              <a:rPr lang="en-US" dirty="0" smtClean="0"/>
-              <a:t>Insertion sort</a:t>
-            </a:r>
-          </a:p>
-          <a:p>
-            <a:pPr lvl="3"/>
-            <a:r>
-              <a:rPr lang="en-US" dirty="0" smtClean="0"/>
-              <a:t>Selection sort</a:t>
-            </a:r>
-          </a:p>
-          <a:p>
-            <a:pPr lvl="2"/>
-            <a:r>
-              <a:rPr lang="en-US" dirty="0" smtClean="0"/>
-              <a:t>Bubble-sort </a:t>
-            </a:r>
-            <a:r>
-              <a:rPr lang="en-US" dirty="0" err="1" smtClean="0"/>
-              <a:t>Familie</a:t>
-            </a:r>
-            <a:endParaRPr lang="en-US" dirty="0" smtClean="0"/>
-          </a:p>
-          <a:p>
-            <a:pPr lvl="3"/>
-            <a:r>
-              <a:rPr lang="en-US" dirty="0" smtClean="0"/>
-              <a:t>Bubble-sort</a:t>
-            </a:r>
-          </a:p>
-          <a:p>
-            <a:pPr lvl="3"/>
-            <a:r>
-              <a:rPr lang="en-US" dirty="0" smtClean="0"/>
-              <a:t>Shell sort</a:t>
-            </a:r>
-          </a:p>
-          <a:p>
-            <a:pPr lvl="3"/>
-            <a:r>
-              <a:rPr lang="en-US" dirty="0" smtClean="0"/>
-              <a:t>Comb sort</a:t>
-            </a:r>
-          </a:p>
-          <a:p>
-            <a:pPr lvl="2"/>
-            <a:r>
-              <a:rPr lang="en-US" dirty="0" err="1" smtClean="0"/>
-              <a:t>Effiziente</a:t>
-            </a:r>
-            <a:r>
-              <a:rPr lang="en-US" dirty="0" smtClean="0"/>
-              <a:t> </a:t>
-            </a:r>
-            <a:r>
-              <a:rPr lang="en-US" dirty="0" err="1" smtClean="0"/>
-              <a:t>Algorithmen</a:t>
-            </a:r>
-            <a:endParaRPr lang="en-US" dirty="0" smtClean="0"/>
-          </a:p>
-          <a:p>
-            <a:pPr lvl="3"/>
-            <a:r>
-              <a:rPr lang="en-US" dirty="0" smtClean="0"/>
-              <a:t>Merge sort</a:t>
-            </a:r>
-          </a:p>
-          <a:p>
-            <a:pPr lvl="3"/>
-            <a:r>
-              <a:rPr lang="en-US" dirty="0" smtClean="0"/>
-              <a:t>Quicksort</a:t>
-            </a:r>
-          </a:p>
-          <a:p>
-            <a:pPr lvl="3"/>
-            <a:r>
-              <a:rPr lang="en-US" dirty="0" smtClean="0"/>
-              <a:t>Heap sort</a:t>
-            </a:r>
-          </a:p>
-          <a:p>
-            <a:pPr lvl="1"/>
-            <a:r>
-              <a:rPr lang="en-US" dirty="0" smtClean="0"/>
-              <a:t>5.2 </a:t>
-            </a:r>
-            <a:r>
-              <a:rPr lang="en-US" dirty="0" err="1" smtClean="0"/>
-              <a:t>Nicht-vergleichbasierte</a:t>
-            </a:r>
-            <a:endParaRPr lang="en-US" dirty="0" smtClean="0"/>
-          </a:p>
-          <a:p>
-            <a:pPr lvl="2"/>
-            <a:r>
-              <a:rPr lang="en-US" dirty="0" err="1" smtClean="0"/>
-              <a:t>Distributierte</a:t>
-            </a:r>
-            <a:r>
-              <a:rPr lang="en-US" dirty="0" smtClean="0"/>
-              <a:t> </a:t>
-            </a:r>
-            <a:r>
-              <a:rPr lang="en-US" dirty="0" err="1" smtClean="0"/>
-              <a:t>Algorithmen</a:t>
-            </a:r>
-            <a:endParaRPr lang="en-US" dirty="0" smtClean="0"/>
-          </a:p>
-          <a:p>
-            <a:pPr lvl="3"/>
-            <a:r>
-              <a:rPr lang="en-US" dirty="0" smtClean="0"/>
-              <a:t>Counting sort</a:t>
-            </a:r>
-          </a:p>
-          <a:p>
-            <a:pPr lvl="3"/>
-            <a:r>
-              <a:rPr lang="en-US" dirty="0" smtClean="0"/>
-              <a:t>Bucket sort</a:t>
-            </a:r>
-          </a:p>
-          <a:p>
-            <a:pPr lvl="3"/>
-            <a:r>
-              <a:rPr lang="en-US" dirty="0" smtClean="0"/>
-              <a:t>Radix sort</a:t>
-            </a:r>
-            <a:endParaRPr lang="en-US" dirty="0"/>
-          </a:p>
-        </p:txBody>
-      </p:sp>
-    </p:spTree>
-    <p:extLst>
-      <p:ext uri="{BB962C8B-B14F-4D97-AF65-F5344CB8AC3E}">
-        <p14:creationId xmlns:p14="http://schemas.microsoft.com/office/powerpoint/2010/main" val="62634377"/>
-      </p:ext>
-    </p:extLst>
-  </p:cSld>
-  <p:clrMapOvr>
-    <a:masterClrMapping/>
-  </p:clrMapOvr>
-  <p:timing>
-    <p:tnLst>
-      <p:par>
-        <p:cTn id="1" dur="indefinite" restart="never" nodeType="tmRoot"/>
-      </p:par>
-    </p:tnLst>
-  </p:timing>
-</p:sld>
-</file>
-
-<file path=ppt/slides/slide30.xml><?xml version="1.0" encoding="utf-8"?>
-<p:sld xmlns:a="http://schemas.openxmlformats.org/drawingml/2006/main" xmlns:r="http://schemas.openxmlformats.org/officeDocument/2006/relationships" xmlns:p="http://schemas.openxmlformats.org/presentationml/2006/main">
-  <p:cSld>
-    <p:spTree>
-      <p:nvGrpSpPr>
-        <p:cNvPr id="1" name=""/>
-        <p:cNvGrpSpPr/>
-        <p:nvPr/>
-      </p:nvGrpSpPr>
-      <p:grpSpPr>
-        <a:xfrm>
-          <a:off x="0" y="0"/>
-          <a:ext cx="0" cy="0"/>
-          <a:chOff x="0" y="0"/>
-          <a:chExt cx="0" cy="0"/>
-        </a:xfrm>
-      </p:grpSpPr>
-      <p:sp>
-        <p:nvSpPr>
-          <p:cNvPr id="2" name="Title 1"/>
-          <p:cNvSpPr>
-            <a:spLocks noGrp="1"/>
-          </p:cNvSpPr>
-          <p:nvPr>
-            <p:ph type="title"/>
-          </p:nvPr>
-        </p:nvSpPr>
-        <p:spPr/>
-        <p:txBody>
-          <a:bodyPr/>
-          <a:lstStyle/>
-          <a:p>
-            <a:r>
-              <a:rPr lang="en-US" dirty="0" err="1" smtClean="0"/>
               <a:t>Combsort</a:t>
             </a:r>
             <a:r>
@@ -19999,7 +20284,7 @@
 </p:sld>
 </file>
 
-<file path=ppt/slides/slide31.xml><?xml version="1.0" encoding="utf-8"?>
+<file path=ppt/slides/slide32.xml><?xml version="1.0" encoding="utf-8"?>
 <p:sld xmlns:a="http://schemas.openxmlformats.org/drawingml/2006/main" xmlns:r="http://schemas.openxmlformats.org/officeDocument/2006/relationships" xmlns:p="http://schemas.openxmlformats.org/presentationml/2006/main">
   <p:cSld>
     <p:spTree>
@@ -20134,155 +20419,6 @@
 </p:sld>
 </file>
 
-<file path=ppt/slides/slide32.xml><?xml version="1.0" encoding="utf-8"?>
-<p:sld xmlns:a="http://schemas.openxmlformats.org/drawingml/2006/main" xmlns:r="http://schemas.openxmlformats.org/officeDocument/2006/relationships" xmlns:p="http://schemas.openxmlformats.org/presentationml/2006/main">
-  <p:cSld>
-    <p:spTree>
-      <p:nvGrpSpPr>
-        <p:cNvPr id="1" name=""/>
-        <p:cNvGrpSpPr/>
-        <p:nvPr/>
-      </p:nvGrpSpPr>
-      <p:grpSpPr>
-        <a:xfrm>
-          <a:off x="0" y="0"/>
-          <a:ext cx="0" cy="0"/>
-          <a:chOff x="0" y="0"/>
-          <a:chExt cx="0" cy="0"/>
-        </a:xfrm>
-      </p:grpSpPr>
-      <p:sp>
-        <p:nvSpPr>
-          <p:cNvPr id="2" name="Title 1"/>
-          <p:cNvSpPr>
-            <a:spLocks noGrp="1"/>
-          </p:cNvSpPr>
-          <p:nvPr>
-            <p:ph type="title"/>
-          </p:nvPr>
-        </p:nvSpPr>
-        <p:spPr/>
-        <p:txBody>
-          <a:bodyPr/>
-          <a:lstStyle/>
-          <a:p>
-            <a:r>
-              <a:rPr lang="en-US" dirty="0" err="1" smtClean="0"/>
-              <a:t>Combsort</a:t>
-            </a:r>
-            <a:r>
-              <a:rPr lang="en-US" dirty="0" smtClean="0"/>
-              <a:t> - </a:t>
-            </a:r>
-            <a:r>
-              <a:rPr lang="en-US" dirty="0" err="1" smtClean="0"/>
-              <a:t>eigenschaften</a:t>
-            </a:r>
-            <a:endParaRPr lang="bg-BG" dirty="0"/>
-          </a:p>
-        </p:txBody>
-      </p:sp>
-      <p:sp>
-        <p:nvSpPr>
-          <p:cNvPr id="3" name="Content Placeholder 2"/>
-          <p:cNvSpPr>
-            <a:spLocks noGrp="1"/>
-          </p:cNvSpPr>
-          <p:nvPr>
-            <p:ph idx="1"/>
-          </p:nvPr>
-        </p:nvSpPr>
-        <p:spPr/>
-        <p:txBody>
-          <a:bodyPr/>
-          <a:lstStyle/>
-          <a:p>
-            <a:r>
-              <a:rPr lang="en-US" dirty="0" err="1" smtClean="0"/>
-              <a:t>Arbeitet</a:t>
-            </a:r>
-            <a:r>
-              <a:rPr lang="en-US" dirty="0" smtClean="0"/>
-              <a:t> in-place</a:t>
-            </a:r>
-          </a:p>
-          <a:p>
-            <a:r>
-              <a:rPr lang="en-US" dirty="0" err="1" smtClean="0"/>
-              <a:t>Ist</a:t>
-            </a:r>
-            <a:r>
-              <a:rPr lang="en-US" dirty="0" smtClean="0"/>
-              <a:t> </a:t>
-            </a:r>
-            <a:r>
-              <a:rPr lang="en-US" dirty="0" err="1" smtClean="0"/>
-              <a:t>nicht</a:t>
-            </a:r>
-            <a:r>
-              <a:rPr lang="en-US" dirty="0" smtClean="0"/>
-              <a:t> </a:t>
-            </a:r>
-            <a:r>
-              <a:rPr lang="en-US" dirty="0" err="1" smtClean="0"/>
-              <a:t>stabil</a:t>
-            </a:r>
-            <a:endParaRPr lang="en-US" dirty="0" smtClean="0"/>
-          </a:p>
-          <a:p>
-            <a:r>
-              <a:rPr lang="en-US" dirty="0" smtClean="0"/>
-              <a:t>Worst-case:</a:t>
-            </a:r>
-            <a:r>
-              <a:rPr lang="en-US" dirty="0"/>
-              <a:t> O(n</a:t>
-            </a:r>
-            <a:r>
-              <a:rPr lang="en-US" baseline="30000" dirty="0"/>
-              <a:t>2</a:t>
-            </a:r>
-            <a:r>
-              <a:rPr lang="en-US" dirty="0" smtClean="0"/>
-              <a:t>)</a:t>
-            </a:r>
-          </a:p>
-          <a:p>
-            <a:r>
-              <a:rPr lang="en-US" dirty="0" smtClean="0"/>
-              <a:t>Average case: O(</a:t>
-            </a:r>
-            <a:r>
-              <a:rPr lang="en-US" dirty="0" err="1" smtClean="0"/>
-              <a:t>nlogn</a:t>
-            </a:r>
-            <a:r>
-              <a:rPr lang="en-US" dirty="0" smtClean="0"/>
-              <a:t>) </a:t>
-            </a:r>
-          </a:p>
-          <a:p>
-            <a:r>
-              <a:rPr lang="en-US" dirty="0" smtClean="0"/>
-              <a:t>Best case: O(n) </a:t>
-            </a:r>
-            <a:endParaRPr lang="bg-BG" dirty="0"/>
-          </a:p>
-        </p:txBody>
-      </p:sp>
-    </p:spTree>
-    <p:extLst>
-      <p:ext uri="{BB962C8B-B14F-4D97-AF65-F5344CB8AC3E}">
-        <p14:creationId xmlns:p14="http://schemas.microsoft.com/office/powerpoint/2010/main" val="2165275442"/>
-      </p:ext>
-    </p:extLst>
-  </p:cSld>
-  <p:clrMapOvr>
-    <a:masterClrMapping/>
-  </p:clrMapOvr>
-</p:sld>
-</file>
-
 <file path=ppt/slides/slide33.xml><?xml version="1.0" encoding="utf-8"?>
 <p:sld xmlns:a="http://schemas.openxmlformats.org/drawingml/2006/main" xmlns:r="http://schemas.openxmlformats.org/officeDocument/2006/relationships" xmlns:p="http://schemas.openxmlformats.org/presentationml/2006/main">
   <p:cSld>
@@ -20317,23 +20453,15 @@
           <a:p>
             <a:r>
               <a:rPr lang="en-US" dirty="0" err="1" smtClean="0"/>
-              <a:t>Mergesort</a:t>
-            </a:r>
-            <a:r>
-              <a:rPr lang="en-US" dirty="0" smtClean="0"/>
-              <a:t> – </a:t>
-            </a:r>
-            <a:r>
-              <a:rPr lang="en-US" dirty="0" err="1" smtClean="0"/>
-              <a:t>allgemeine</a:t>
-            </a:r>
-            <a:r>
-              <a:rPr lang="en-US" dirty="0" smtClean="0"/>
-              <a:t> </a:t>
-            </a:r>
-            <a:r>
-              <a:rPr lang="en-US" dirty="0" err="1" smtClean="0"/>
-              <a:t>idee</a:t>
+              <a:t>Combsort</a:t>
+            </a:r>
+            <a:r>
+              <a:rPr lang="en-US" dirty="0" smtClean="0"/>
+              <a:t> - </a:t>
+            </a:r>
+            <a:r>
+              <a:rPr lang="en-US" dirty="0" err="1" smtClean="0"/>
+              <a:t>eigenschaften</a:t>
             </a:r>
             <a:endParaRPr lang="bg-BG" dirty="0"/>
           </a:p>
@@ -20356,6 +20484,163 @@
           <a:p>
             <a:r>
               <a:rPr lang="en-US" dirty="0" err="1" smtClean="0"/>
+              <a:t>Arbeitet</a:t>
+            </a:r>
+            <a:r>
+              <a:rPr lang="en-US" dirty="0" smtClean="0"/>
+              <a:t> in-place</a:t>
+            </a:r>
+          </a:p>
+          <a:p>
+            <a:r>
+              <a:rPr lang="en-US" dirty="0" err="1" smtClean="0"/>
+              <a:t>Ist</a:t>
+            </a:r>
+            <a:r>
+              <a:rPr lang="en-US" dirty="0" smtClean="0"/>
+              <a:t> </a:t>
+            </a:r>
+            <a:r>
+              <a:rPr lang="en-US" dirty="0" err="1" smtClean="0"/>
+              <a:t>nicht</a:t>
+            </a:r>
+            <a:r>
+              <a:rPr lang="en-US" dirty="0" smtClean="0"/>
+              <a:t> </a:t>
+            </a:r>
+            <a:r>
+              <a:rPr lang="en-US" dirty="0" err="1" smtClean="0"/>
+              <a:t>stabil</a:t>
+            </a:r>
+            <a:endParaRPr lang="en-US" dirty="0" smtClean="0"/>
+          </a:p>
+          <a:p>
+            <a:r>
+              <a:rPr lang="en-US" dirty="0" smtClean="0"/>
+              <a:t>Worst-case:</a:t>
+            </a:r>
+            <a:r>
+              <a:rPr lang="en-US" dirty="0"/>
+              <a:t> O(n</a:t>
+            </a:r>
+            <a:r>
+              <a:rPr lang="en-US" baseline="30000" dirty="0"/>
+              <a:t>2</a:t>
+            </a:r>
+            <a:r>
+              <a:rPr lang="en-US" dirty="0" smtClean="0"/>
+              <a:t>)</a:t>
+            </a:r>
+          </a:p>
+          <a:p>
+            <a:r>
+              <a:rPr lang="en-US" dirty="0" smtClean="0"/>
+              <a:t>Average case: O(</a:t>
+            </a:r>
+            <a:r>
+              <a:rPr lang="en-US" dirty="0" err="1" smtClean="0"/>
+              <a:t>nlogn</a:t>
+            </a:r>
+            <a:r>
+              <a:rPr lang="en-US" dirty="0" smtClean="0"/>
+              <a:t>) </a:t>
+            </a:r>
+          </a:p>
+          <a:p>
+            <a:r>
+              <a:rPr lang="en-US" dirty="0" smtClean="0"/>
+              <a:t>Best case: O(n) </a:t>
+            </a:r>
+            <a:endParaRPr lang="bg-BG" dirty="0"/>
+          </a:p>
+        </p:txBody>
+      </p:sp>
+    </p:spTree>
+    <p:extLst>
+      <p:ext uri="{BB962C8B-B14F-4D97-AF65-F5344CB8AC3E}">
+        <p14:creationId xmlns:p14="http://schemas.microsoft.com/office/powerpoint/2010/main" val="2165275442"/>
+      </p:ext>
+    </p:extLst>
+  </p:cSld>
+  <p:clrMapOvr>
+    <a:masterClrMapping/>
+  </p:clrMapOvr>
+</p:sld>
+</file>
+
+<file path=ppt/slides/slide34.xml><?xml version="1.0" encoding="utf-8"?>
+<p:sld xmlns:a="http://schemas.openxmlformats.org/drawingml/2006/main" xmlns:r="http://schemas.openxmlformats.org/officeDocument/2006/relationships" xmlns:p="http://schemas.openxmlformats.org/presentationml/2006/main">
+  <p:cSld>
+    <p:spTree>
+      <p:nvGrpSpPr>
+        <p:cNvPr id="1" name=""/>
+        <p:cNvGrpSpPr/>
+        <p:nvPr/>
+      </p:nvGrpSpPr>
+      <p:grpSpPr>
+        <a:xfrm>
+          <a:off x="0" y="0"/>
+          <a:ext cx="0" cy="0"/>
+          <a:chOff x="0" y="0"/>
+          <a:chExt cx="0" cy="0"/>
+        </a:xfrm>
+      </p:grpSpPr>
+      <p:sp>
+        <p:nvSpPr>
+          <p:cNvPr id="2" name="Title 1"/>
+          <p:cNvSpPr>
+            <a:spLocks noGrp="1"/>
+          </p:cNvSpPr>
+          <p:nvPr>
+            <p:ph type="title"/>
+          </p:nvPr>
+        </p:nvSpPr>
+        <p:spPr/>
+        <p:txBody>
+          <a:bodyPr/>
+          <a:lstStyle/>
+          <a:p>
+            <a:r>
+              <a:rPr lang="en-US" dirty="0" err="1" smtClean="0"/>
+              <a:t>Mergesort</a:t>
+            </a:r>
+            <a:r>
+              <a:rPr lang="en-US" dirty="0" smtClean="0"/>
+              <a:t> – </a:t>
+            </a:r>
+            <a:r>
+              <a:rPr lang="en-US" dirty="0" err="1" smtClean="0"/>
+              <a:t>allgemeine</a:t>
+            </a:r>
+            <a:r>
+              <a:rPr lang="en-US" dirty="0" smtClean="0"/>
+              <a:t> </a:t>
+            </a:r>
+            <a:r>
+              <a:rPr lang="en-US" dirty="0" err="1" smtClean="0"/>
+              <a:t>idee</a:t>
+            </a:r>
+            <a:endParaRPr lang="bg-BG" dirty="0"/>
+          </a:p>
+        </p:txBody>
+      </p:sp>
+      <p:sp>
+        <p:nvSpPr>
+          <p:cNvPr id="3" name="Content Placeholder 2"/>
+          <p:cNvSpPr>
+            <a:spLocks noGrp="1"/>
+          </p:cNvSpPr>
+          <p:nvPr>
+            <p:ph idx="1"/>
+          </p:nvPr>
+        </p:nvSpPr>
+        <p:spPr/>
+        <p:txBody>
+          <a:bodyPr/>
+          <a:lstStyle/>
+          <a:p>
+            <a:r>
+              <a:rPr lang="en-US" dirty="0" err="1" smtClean="0"/>
               <a:t>Verfahren</a:t>
             </a:r>
             <a:r>
@@ -20713,7 +20998,7 @@
 </p:sld>
 </file>
 
-<file path=ppt/slides/slide34.xml><?xml version="1.0" encoding="utf-8"?>
+<file path=ppt/slides/slide35.xml><?xml version="1.0" encoding="utf-8"?>
 <p:sld xmlns:a="http://schemas.openxmlformats.org/drawingml/2006/main" xmlns:r="http://schemas.openxmlformats.org/officeDocument/2006/relationships" xmlns:p="http://schemas.openxmlformats.org/presentationml/2006/main">
   <p:cSld>
     <p:spTree>
@@ -20844,364 +21129,6 @@
 </p:sld>
 </file>
 
-<file path=ppt/slides/slide35.xml><?xml version="1.0" encoding="utf-8"?>
-<p:sld xmlns:a="http://schemas.openxmlformats.org/drawingml/2006/main" xmlns:r="http://schemas.openxmlformats.org/officeDocument/2006/relationships" xmlns:p="http://schemas.openxmlformats.org/presentationml/2006/main">
-  <p:cSld>
-    <p:spTree>
-      <p:nvGrpSpPr>
-        <p:cNvPr id="1" name=""/>
-        <p:cNvGrpSpPr/>
-        <p:nvPr/>
-      </p:nvGrpSpPr>
-      <p:grpSpPr>
-        <a:xfrm>
-          <a:off x="0" y="0"/>
-          <a:ext cx="0" cy="0"/>
-          <a:chOff x="0" y="0"/>
-          <a:chExt cx="0" cy="0"/>
-        </a:xfrm>
-      </p:grpSpPr>
-      <p:sp>
-        <p:nvSpPr>
-          <p:cNvPr id="2" name="Title 1"/>
-          <p:cNvSpPr>
-            <a:spLocks noGrp="1"/>
-          </p:cNvSpPr>
-          <p:nvPr>
-            <p:ph type="title"/>
-          </p:nvPr>
-        </p:nvSpPr>
-        <p:spPr/>
-        <p:txBody>
-          <a:bodyPr/>
-          <a:lstStyle/>
-          <a:p>
-            <a:r>
-              <a:rPr lang="en-US" dirty="0" err="1" smtClean="0"/>
-              <a:t>Mergesort</a:t>
-            </a:r>
-            <a:r>
-              <a:rPr lang="en-US" dirty="0" smtClean="0"/>
-              <a:t> </a:t>
-            </a:r>
-            <a:r>
-              <a:rPr lang="en-US" dirty="0" err="1" smtClean="0"/>
-              <a:t>eigenschaften</a:t>
-            </a:r>
-            <a:endParaRPr lang="bg-BG" dirty="0"/>
-          </a:p>
-        </p:txBody>
-      </p:sp>
-      <p:sp>
-        <p:nvSpPr>
-          <p:cNvPr id="3" name="Content Placeholder 2"/>
-          <p:cNvSpPr>
-            <a:spLocks noGrp="1"/>
-          </p:cNvSpPr>
-          <p:nvPr>
-            <p:ph idx="1"/>
-          </p:nvPr>
-        </p:nvSpPr>
-        <p:spPr/>
-        <p:txBody>
-          <a:bodyPr/>
-          <a:lstStyle/>
-          <a:p>
-            <a:r>
-              <a:rPr lang="en-US" dirty="0" err="1" smtClean="0"/>
-              <a:t>Arbeitet</a:t>
-            </a:r>
-            <a:r>
-              <a:rPr lang="en-US" dirty="0" smtClean="0"/>
-              <a:t> </a:t>
-            </a:r>
-            <a:r>
-              <a:rPr lang="en-US" dirty="0" err="1" smtClean="0"/>
-              <a:t>nicht</a:t>
-            </a:r>
-            <a:r>
-              <a:rPr lang="en-US" dirty="0" smtClean="0"/>
-              <a:t> in-place, </a:t>
-            </a:r>
-            <a:r>
-              <a:rPr lang="en-US" dirty="0" err="1" smtClean="0"/>
-              <a:t>weil</a:t>
-            </a:r>
-            <a:r>
-              <a:rPr lang="en-US" dirty="0" smtClean="0"/>
-              <a:t> </a:t>
-            </a:r>
-            <a:r>
-              <a:rPr lang="en-US" dirty="0" err="1" smtClean="0"/>
-              <a:t>eine</a:t>
-            </a:r>
-            <a:r>
-              <a:rPr lang="en-US" dirty="0" smtClean="0"/>
-              <a:t> </a:t>
-            </a:r>
-            <a:r>
-              <a:rPr lang="en-US" dirty="0" err="1" smtClean="0"/>
-              <a:t>resultante</a:t>
-            </a:r>
-            <a:r>
-              <a:rPr lang="en-US" dirty="0" smtClean="0"/>
-              <a:t> </a:t>
-            </a:r>
-            <a:r>
-              <a:rPr lang="en-US" dirty="0" err="1" smtClean="0"/>
-              <a:t>Menge</a:t>
-            </a:r>
-            <a:r>
-              <a:rPr lang="en-US" dirty="0" smtClean="0"/>
-              <a:t> </a:t>
-            </a:r>
-            <a:r>
-              <a:rPr lang="en-US" dirty="0" err="1" smtClean="0"/>
-              <a:t>im</a:t>
-            </a:r>
-            <a:r>
-              <a:rPr lang="en-US" dirty="0" smtClean="0"/>
-              <a:t> </a:t>
-            </a:r>
-            <a:r>
-              <a:rPr lang="en-US" dirty="0" err="1" smtClean="0"/>
-              <a:t>Speicher</a:t>
-            </a:r>
-            <a:r>
-              <a:rPr lang="en-US" dirty="0" smtClean="0"/>
-              <a:t> </a:t>
-            </a:r>
-            <a:r>
-              <a:rPr lang="en-US" dirty="0" err="1" smtClean="0"/>
-              <a:t>zugeteilt</a:t>
-            </a:r>
-            <a:r>
-              <a:rPr lang="en-US" dirty="0" smtClean="0"/>
-              <a:t> </a:t>
-            </a:r>
-            <a:r>
-              <a:rPr lang="en-US" dirty="0" err="1" smtClean="0"/>
-              <a:t>werden</a:t>
-            </a:r>
-            <a:r>
-              <a:rPr lang="en-US" dirty="0" smtClean="0"/>
-              <a:t> muss.</a:t>
-            </a:r>
-          </a:p>
-          <a:p>
-            <a:r>
-              <a:rPr lang="en-US" dirty="0" err="1" smtClean="0"/>
-              <a:t>Arbeitet</a:t>
-            </a:r>
-            <a:r>
-              <a:rPr lang="en-US" dirty="0" smtClean="0"/>
-              <a:t> </a:t>
-            </a:r>
-            <a:r>
-              <a:rPr lang="en-US" dirty="0" err="1" smtClean="0"/>
-              <a:t>stabil</a:t>
-            </a:r>
-            <a:r>
-              <a:rPr lang="en-US" dirty="0" smtClean="0"/>
-              <a:t>.</a:t>
-            </a:r>
-          </a:p>
-          <a:p>
-            <a:r>
-              <a:rPr lang="en-US" dirty="0" smtClean="0"/>
-              <a:t>In </a:t>
-            </a:r>
-            <a:r>
-              <a:rPr lang="en-US" dirty="0" err="1" smtClean="0"/>
-              <a:t>allen</a:t>
-            </a:r>
-            <a:r>
-              <a:rPr lang="en-US" dirty="0" smtClean="0"/>
-              <a:t> </a:t>
-            </a:r>
-            <a:r>
-              <a:rPr lang="en-US" dirty="0" err="1" smtClean="0"/>
-              <a:t>Fällen</a:t>
-            </a:r>
-            <a:r>
-              <a:rPr lang="en-US" dirty="0" smtClean="0"/>
-              <a:t> – </a:t>
-            </a:r>
-            <a:r>
-              <a:rPr lang="en-US" dirty="0" err="1" smtClean="0"/>
-              <a:t>Komlexität</a:t>
-            </a:r>
-            <a:r>
-              <a:rPr lang="en-US" dirty="0" smtClean="0"/>
-              <a:t> is </a:t>
-            </a:r>
-            <a:r>
-              <a:rPr lang="en-US" dirty="0"/>
-              <a:t>O(</a:t>
-            </a:r>
-            <a:r>
-              <a:rPr lang="en-US" dirty="0" err="1"/>
-              <a:t>nlogn</a:t>
-            </a:r>
-            <a:r>
-              <a:rPr lang="en-US" dirty="0" smtClean="0"/>
-              <a:t>) – das </a:t>
-            </a:r>
-            <a:r>
-              <a:rPr lang="en-US" dirty="0" err="1" smtClean="0"/>
-              <a:t>heißt</a:t>
-            </a:r>
-            <a:r>
-              <a:rPr lang="en-US" dirty="0" smtClean="0"/>
-              <a:t>, </a:t>
-            </a:r>
-            <a:r>
-              <a:rPr lang="en-US" dirty="0" err="1" smtClean="0"/>
-              <a:t>dass</a:t>
-            </a:r>
-            <a:r>
-              <a:rPr lang="en-US" dirty="0" smtClean="0"/>
-              <a:t> dieses </a:t>
-            </a:r>
-            <a:r>
-              <a:rPr lang="en-US" dirty="0" err="1" smtClean="0"/>
-              <a:t>Verfahren</a:t>
-            </a:r>
-            <a:r>
-              <a:rPr lang="en-US" dirty="0" smtClean="0"/>
-              <a:t> </a:t>
-            </a:r>
-            <a:r>
-              <a:rPr lang="en-US" dirty="0" err="1" smtClean="0"/>
-              <a:t>überall</a:t>
-            </a:r>
-            <a:r>
-              <a:rPr lang="en-US" dirty="0" smtClean="0"/>
-              <a:t> </a:t>
-            </a:r>
-            <a:r>
-              <a:rPr lang="en-US" dirty="0" err="1" smtClean="0"/>
-              <a:t>besser</a:t>
-            </a:r>
-            <a:r>
-              <a:rPr lang="en-US" dirty="0" smtClean="0"/>
-              <a:t> </a:t>
-            </a:r>
-            <a:r>
-              <a:rPr lang="en-US" dirty="0" err="1" smtClean="0"/>
-              <a:t>als</a:t>
-            </a:r>
-            <a:r>
-              <a:rPr lang="en-US" dirty="0" smtClean="0"/>
-              <a:t> Quicksort </a:t>
-            </a:r>
-            <a:r>
-              <a:rPr lang="en-US" dirty="0" err="1" smtClean="0"/>
-              <a:t>ist</a:t>
-            </a:r>
-            <a:r>
-              <a:rPr lang="en-US" dirty="0" smtClean="0"/>
-              <a:t>, </a:t>
-            </a:r>
-            <a:r>
-              <a:rPr lang="en-US" dirty="0" err="1" smtClean="0"/>
-              <a:t>dessen</a:t>
-            </a:r>
-            <a:r>
-              <a:rPr lang="en-US" dirty="0" smtClean="0"/>
-              <a:t> Worst-case </a:t>
-            </a:r>
-            <a:r>
-              <a:rPr lang="en-US" dirty="0" err="1" smtClean="0"/>
-              <a:t>Verhalten</a:t>
-            </a:r>
-            <a:r>
-              <a:rPr lang="en-US" dirty="0" smtClean="0"/>
-              <a:t> </a:t>
-            </a:r>
-            <a:r>
-              <a:rPr lang="en-US" dirty="0"/>
-              <a:t>O(n</a:t>
-            </a:r>
-            <a:r>
-              <a:rPr lang="en-US" baseline="30000" dirty="0"/>
-              <a:t>2</a:t>
-            </a:r>
-            <a:r>
-              <a:rPr lang="en-US" dirty="0" smtClean="0"/>
-              <a:t>) </a:t>
-            </a:r>
-            <a:r>
-              <a:rPr lang="en-US" dirty="0" err="1" smtClean="0"/>
-              <a:t>ist</a:t>
-            </a:r>
-            <a:r>
-              <a:rPr lang="en-US" dirty="0" smtClean="0"/>
-              <a:t>. </a:t>
-            </a:r>
-            <a:r>
-              <a:rPr lang="en-US" dirty="0" err="1" smtClean="0"/>
-              <a:t>Mergesort</a:t>
-            </a:r>
-            <a:r>
-              <a:rPr lang="en-US" dirty="0" smtClean="0"/>
-              <a:t> </a:t>
-            </a:r>
-            <a:r>
-              <a:rPr lang="en-US" dirty="0" err="1" smtClean="0"/>
-              <a:t>benützt</a:t>
-            </a:r>
-            <a:r>
-              <a:rPr lang="en-US" dirty="0" smtClean="0"/>
-              <a:t> </a:t>
-            </a:r>
-            <a:r>
-              <a:rPr lang="en-US" dirty="0" err="1" smtClean="0"/>
-              <a:t>aber</a:t>
-            </a:r>
-            <a:r>
-              <a:rPr lang="en-US" dirty="0" smtClean="0"/>
-              <a:t> </a:t>
-            </a:r>
-            <a:r>
-              <a:rPr lang="en-US" dirty="0" err="1" smtClean="0"/>
-              <a:t>mehrer</a:t>
-            </a:r>
-            <a:r>
-              <a:rPr lang="en-US" dirty="0" smtClean="0"/>
-              <a:t> </a:t>
-            </a:r>
-            <a:r>
-              <a:rPr lang="en-US" dirty="0" err="1" smtClean="0"/>
-              <a:t>Speicherplatz</a:t>
-            </a:r>
-            <a:r>
-              <a:rPr lang="en-US" dirty="0" smtClean="0"/>
-              <a:t>. </a:t>
-            </a:r>
-            <a:endParaRPr lang="en-US" dirty="0"/>
-          </a:p>
-          <a:p>
-            <a:endParaRPr lang="en-US" dirty="0" smtClean="0"/>
-          </a:p>
-          <a:p>
-            <a:endParaRPr lang="bg-BG" dirty="0"/>
-          </a:p>
-        </p:txBody>
-      </p:sp>
-    </p:spTree>
-    <p:extLst>
-      <p:ext uri="{BB962C8B-B14F-4D97-AF65-F5344CB8AC3E}">
-        <p14:creationId xmlns:p14="http://schemas.microsoft.com/office/powerpoint/2010/main" val="1894145807"/>
-      </p:ext>
-    </p:extLst>
-  </p:cSld>
-  <p:clrMapOvr>
-    <a:masterClrMapping/>
-  </p:clrMapOvr>
-</p:sld>
-</file>
-
 <file path=ppt/slides/slide36.xml><?xml version="1.0" encoding="utf-8"?>
 <p:sld xmlns:a="http://schemas.openxmlformats.org/drawingml/2006/main" xmlns:r="http://schemas.openxmlformats.org/officeDocument/2006/relationships" xmlns:p="http://schemas.openxmlformats.org/presentationml/2006/main">
   <p:cSld>
@@ -21235,6 +21162,364 @@
           <a:lstStyle/>
           <a:p>
             <a:r>
+              <a:rPr lang="en-US" dirty="0" err="1" smtClean="0"/>
+              <a:t>Mergesort</a:t>
+            </a:r>
+            <a:r>
+              <a:rPr lang="en-US" dirty="0" smtClean="0"/>
+              <a:t> </a:t>
+            </a:r>
+            <a:r>
+              <a:rPr lang="en-US" dirty="0" err="1" smtClean="0"/>
+              <a:t>eigenschaften</a:t>
+            </a:r>
+            <a:endParaRPr lang="bg-BG" dirty="0"/>
+          </a:p>
+        </p:txBody>
+      </p:sp>
+      <p:sp>
+        <p:nvSpPr>
+          <p:cNvPr id="3" name="Content Placeholder 2"/>
+          <p:cNvSpPr>
+            <a:spLocks noGrp="1"/>
+          </p:cNvSpPr>
+          <p:nvPr>
+            <p:ph idx="1"/>
+          </p:nvPr>
+        </p:nvSpPr>
+        <p:spPr/>
+        <p:txBody>
+          <a:bodyPr/>
+          <a:lstStyle/>
+          <a:p>
+            <a:r>
+              <a:rPr lang="en-US" dirty="0" err="1" smtClean="0"/>
+              <a:t>Arbeitet</a:t>
+            </a:r>
+            <a:r>
+              <a:rPr lang="en-US" dirty="0" smtClean="0"/>
+              <a:t> </a:t>
+            </a:r>
+            <a:r>
+              <a:rPr lang="en-US" dirty="0" err="1" smtClean="0"/>
+              <a:t>nicht</a:t>
+            </a:r>
+            <a:r>
+              <a:rPr lang="en-US" dirty="0" smtClean="0"/>
+              <a:t> in-place, </a:t>
+            </a:r>
+            <a:r>
+              <a:rPr lang="en-US" dirty="0" err="1" smtClean="0"/>
+              <a:t>weil</a:t>
+            </a:r>
+            <a:r>
+              <a:rPr lang="en-US" dirty="0" smtClean="0"/>
+              <a:t> </a:t>
+            </a:r>
+            <a:r>
+              <a:rPr lang="en-US" dirty="0" err="1" smtClean="0"/>
+              <a:t>eine</a:t>
+            </a:r>
+            <a:r>
+              <a:rPr lang="en-US" dirty="0" smtClean="0"/>
+              <a:t> </a:t>
+            </a:r>
+            <a:r>
+              <a:rPr lang="en-US" dirty="0" err="1" smtClean="0"/>
+              <a:t>resultante</a:t>
+            </a:r>
+            <a:r>
+              <a:rPr lang="en-US" dirty="0" smtClean="0"/>
+              <a:t> </a:t>
+            </a:r>
+            <a:r>
+              <a:rPr lang="en-US" dirty="0" err="1" smtClean="0"/>
+              <a:t>Menge</a:t>
+            </a:r>
+            <a:r>
+              <a:rPr lang="en-US" dirty="0" smtClean="0"/>
+              <a:t> </a:t>
+            </a:r>
+            <a:r>
+              <a:rPr lang="en-US" dirty="0" err="1" smtClean="0"/>
+              <a:t>im</a:t>
+            </a:r>
+            <a:r>
+              <a:rPr lang="en-US" dirty="0" smtClean="0"/>
+              <a:t> </a:t>
+            </a:r>
+            <a:r>
+              <a:rPr lang="en-US" dirty="0" err="1" smtClean="0"/>
+              <a:t>Speicher</a:t>
+            </a:r>
+            <a:r>
+              <a:rPr lang="en-US" dirty="0" smtClean="0"/>
+              <a:t> </a:t>
+            </a:r>
+            <a:r>
+              <a:rPr lang="en-US" dirty="0" err="1" smtClean="0"/>
+              <a:t>zugeteilt</a:t>
+            </a:r>
+            <a:r>
+              <a:rPr lang="en-US" dirty="0" smtClean="0"/>
+              <a:t> </a:t>
+            </a:r>
+            <a:r>
+              <a:rPr lang="en-US" dirty="0" err="1" smtClean="0"/>
+              <a:t>werden</a:t>
+            </a:r>
+            <a:r>
+              <a:rPr lang="en-US" dirty="0" smtClean="0"/>
+              <a:t> muss.</a:t>
+            </a:r>
+          </a:p>
+          <a:p>
+            <a:r>
+              <a:rPr lang="en-US" dirty="0" err="1" smtClean="0"/>
+              <a:t>Arbeitet</a:t>
+            </a:r>
+            <a:r>
+              <a:rPr lang="en-US" dirty="0" smtClean="0"/>
+              <a:t> </a:t>
+            </a:r>
+            <a:r>
+              <a:rPr lang="en-US" dirty="0" err="1" smtClean="0"/>
+              <a:t>stabil</a:t>
+            </a:r>
+            <a:r>
+              <a:rPr lang="en-US" dirty="0" smtClean="0"/>
+              <a:t>.</a:t>
+            </a:r>
+          </a:p>
+          <a:p>
+            <a:r>
+              <a:rPr lang="en-US" dirty="0" smtClean="0"/>
+              <a:t>In </a:t>
+            </a:r>
+            <a:r>
+              <a:rPr lang="en-US" dirty="0" err="1" smtClean="0"/>
+              <a:t>allen</a:t>
+            </a:r>
+            <a:r>
+              <a:rPr lang="en-US" dirty="0" smtClean="0"/>
+              <a:t> </a:t>
+            </a:r>
+            <a:r>
+              <a:rPr lang="en-US" dirty="0" err="1" smtClean="0"/>
+              <a:t>Fällen</a:t>
+            </a:r>
+            <a:r>
+              <a:rPr lang="en-US" dirty="0" smtClean="0"/>
+              <a:t> – </a:t>
+            </a:r>
+            <a:r>
+              <a:rPr lang="en-US" dirty="0" err="1" smtClean="0"/>
+              <a:t>Komlexität</a:t>
+            </a:r>
+            <a:r>
+              <a:rPr lang="en-US" dirty="0" smtClean="0"/>
+              <a:t> is </a:t>
+            </a:r>
+            <a:r>
+              <a:rPr lang="en-US" dirty="0"/>
+              <a:t>O(</a:t>
+            </a:r>
+            <a:r>
+              <a:rPr lang="en-US" dirty="0" err="1"/>
+              <a:t>nlogn</a:t>
+            </a:r>
+            <a:r>
+              <a:rPr lang="en-US" dirty="0" smtClean="0"/>
+              <a:t>) – das </a:t>
+            </a:r>
+            <a:r>
+              <a:rPr lang="en-US" dirty="0" err="1" smtClean="0"/>
+              <a:t>heißt</a:t>
+            </a:r>
+            <a:r>
+              <a:rPr lang="en-US" dirty="0" smtClean="0"/>
+              <a:t>, </a:t>
+            </a:r>
+            <a:r>
+              <a:rPr lang="en-US" dirty="0" err="1" smtClean="0"/>
+              <a:t>dass</a:t>
+            </a:r>
+            <a:r>
+              <a:rPr lang="en-US" dirty="0" smtClean="0"/>
+              <a:t> dieses </a:t>
+            </a:r>
+            <a:r>
+              <a:rPr lang="en-US" dirty="0" err="1" smtClean="0"/>
+              <a:t>Verfahren</a:t>
+            </a:r>
+            <a:r>
+              <a:rPr lang="en-US" dirty="0" smtClean="0"/>
+              <a:t> </a:t>
+            </a:r>
+            <a:r>
+              <a:rPr lang="en-US" dirty="0" err="1" smtClean="0"/>
+              <a:t>überall</a:t>
+            </a:r>
+            <a:r>
+              <a:rPr lang="en-US" dirty="0" smtClean="0"/>
+              <a:t> </a:t>
+            </a:r>
+            <a:r>
+              <a:rPr lang="en-US" dirty="0" err="1" smtClean="0"/>
+              <a:t>besser</a:t>
+            </a:r>
+            <a:r>
+              <a:rPr lang="en-US" dirty="0" smtClean="0"/>
+              <a:t> </a:t>
+            </a:r>
+            <a:r>
+              <a:rPr lang="en-US" dirty="0" err="1" smtClean="0"/>
+              <a:t>als</a:t>
+            </a:r>
+            <a:r>
+              <a:rPr lang="en-US" dirty="0" smtClean="0"/>
+              <a:t> Quicksort </a:t>
+            </a:r>
+            <a:r>
+              <a:rPr lang="en-US" dirty="0" err="1" smtClean="0"/>
+              <a:t>ist</a:t>
+            </a:r>
+            <a:r>
+              <a:rPr lang="en-US" dirty="0" smtClean="0"/>
+              <a:t>, </a:t>
+            </a:r>
+            <a:r>
+              <a:rPr lang="en-US" dirty="0" err="1" smtClean="0"/>
+              <a:t>dessen</a:t>
+            </a:r>
+            <a:r>
+              <a:rPr lang="en-US" dirty="0" smtClean="0"/>
+              <a:t> Worst-case </a:t>
+            </a:r>
+            <a:r>
+              <a:rPr lang="en-US" dirty="0" err="1" smtClean="0"/>
+              <a:t>Verhalten</a:t>
+            </a:r>
+            <a:r>
+              <a:rPr lang="en-US" dirty="0" smtClean="0"/>
+              <a:t> </a:t>
+            </a:r>
+            <a:r>
+              <a:rPr lang="en-US" dirty="0"/>
+              <a:t>O(n</a:t>
+            </a:r>
+            <a:r>
+              <a:rPr lang="en-US" baseline="30000" dirty="0"/>
+              <a:t>2</a:t>
+            </a:r>
+            <a:r>
+              <a:rPr lang="en-US" dirty="0" smtClean="0"/>
+              <a:t>) </a:t>
+            </a:r>
+            <a:r>
+              <a:rPr lang="en-US" dirty="0" err="1" smtClean="0"/>
+              <a:t>ist</a:t>
+            </a:r>
+            <a:r>
+              <a:rPr lang="en-US" dirty="0" smtClean="0"/>
+              <a:t>. </a:t>
+            </a:r>
+            <a:r>
+              <a:rPr lang="en-US" dirty="0" err="1" smtClean="0"/>
+              <a:t>Mergesort</a:t>
+            </a:r>
+            <a:r>
+              <a:rPr lang="en-US" dirty="0" smtClean="0"/>
+              <a:t> </a:t>
+            </a:r>
+            <a:r>
+              <a:rPr lang="en-US" dirty="0" err="1" smtClean="0"/>
+              <a:t>benützt</a:t>
+            </a:r>
+            <a:r>
+              <a:rPr lang="en-US" dirty="0" smtClean="0"/>
+              <a:t> </a:t>
+            </a:r>
+            <a:r>
+              <a:rPr lang="en-US" dirty="0" err="1" smtClean="0"/>
+              <a:t>aber</a:t>
+            </a:r>
+            <a:r>
+              <a:rPr lang="en-US" dirty="0" smtClean="0"/>
+              <a:t> </a:t>
+            </a:r>
+            <a:r>
+              <a:rPr lang="en-US" dirty="0" err="1" smtClean="0"/>
+              <a:t>mehrer</a:t>
+            </a:r>
+            <a:r>
+              <a:rPr lang="en-US" dirty="0" smtClean="0"/>
+              <a:t> </a:t>
+            </a:r>
+            <a:r>
+              <a:rPr lang="en-US" dirty="0" err="1" smtClean="0"/>
+              <a:t>Speicherplatz</a:t>
+            </a:r>
+            <a:r>
+              <a:rPr lang="en-US" dirty="0" smtClean="0"/>
+              <a:t>. </a:t>
+            </a:r>
+            <a:endParaRPr lang="en-US" dirty="0"/>
+          </a:p>
+          <a:p>
+            <a:endParaRPr lang="en-US" dirty="0" smtClean="0"/>
+          </a:p>
+          <a:p>
+            <a:endParaRPr lang="bg-BG" dirty="0"/>
+          </a:p>
+        </p:txBody>
+      </p:sp>
+    </p:spTree>
+    <p:extLst>
+      <p:ext uri="{BB962C8B-B14F-4D97-AF65-F5344CB8AC3E}">
+        <p14:creationId xmlns:p14="http://schemas.microsoft.com/office/powerpoint/2010/main" val="1894145807"/>
+      </p:ext>
+    </p:extLst>
+  </p:cSld>
+  <p:clrMapOvr>
+    <a:masterClrMapping/>
+  </p:clrMapOvr>
+</p:sld>
+</file>
+
+<file path=ppt/slides/slide37.xml><?xml version="1.0" encoding="utf-8"?>
+<p:sld xmlns:a="http://schemas.openxmlformats.org/drawingml/2006/main" xmlns:r="http://schemas.openxmlformats.org/officeDocument/2006/relationships" xmlns:p="http://schemas.openxmlformats.org/presentationml/2006/main">
+  <p:cSld>
+    <p:spTree>
+      <p:nvGrpSpPr>
+        <p:cNvPr id="1" name=""/>
+        <p:cNvGrpSpPr/>
+        <p:nvPr/>
+      </p:nvGrpSpPr>
+      <p:grpSpPr>
+        <a:xfrm>
+          <a:off x="0" y="0"/>
+          <a:ext cx="0" cy="0"/>
+          <a:chOff x="0" y="0"/>
+          <a:chExt cx="0" cy="0"/>
+        </a:xfrm>
+      </p:grpSpPr>
+      <p:sp>
+        <p:nvSpPr>
+          <p:cNvPr id="2" name="Title 1"/>
+          <p:cNvSpPr>
+            <a:spLocks noGrp="1"/>
+          </p:cNvSpPr>
+          <p:nvPr>
+            <p:ph type="title"/>
+          </p:nvPr>
+        </p:nvSpPr>
+        <p:spPr/>
+        <p:txBody>
+          <a:bodyPr/>
+          <a:lstStyle/>
+          <a:p>
+            <a:r>
               <a:rPr lang="en-US" dirty="0" smtClean="0"/>
               <a:t>Quicksort – </a:t>
             </a:r>
@@ -21989,7 +22274,7 @@
 </p:sld>
 </file>
 
-<file path=ppt/slides/slide37.xml><?xml version="1.0" encoding="utf-8"?>
+<file path=ppt/slides/slide38.xml><?xml version="1.0" encoding="utf-8"?>
 <p:sld xmlns:a="http://schemas.openxmlformats.org/drawingml/2006/main" xmlns:r="http://schemas.openxmlformats.org/officeDocument/2006/relationships" xmlns:p="http://schemas.openxmlformats.org/presentationml/2006/main">
   <p:cSld>
     <p:spTree>
@@ -22075,7 +22360,7 @@
 </p:sld>
 </file>
 
-<file path=ppt/slides/slide38.xml><?xml version="1.0" encoding="utf-8"?>
+<file path=ppt/slides/slide39.xml><?xml version="1.0" encoding="utf-8"?>
 <p:sld xmlns:a="http://schemas.openxmlformats.org/drawingml/2006/main" xmlns:r="http://schemas.openxmlformats.org/officeDocument/2006/relationships" xmlns:p="http://schemas.openxmlformats.org/presentationml/2006/main">
   <p:cSld>
     <p:spTree>
@@ -22771,7 +23056,7 @@
               <a:t>arbeitet</a:t>
             </a:r>
             <a:r>
-              <a:rPr lang="en-US" smtClean="0"/>
+              <a:rPr lang="en-US" dirty="0" smtClean="0"/>
               <a:t> in-place.</a:t>
             </a:r>
             <a:endParaRPr lang="en-US" dirty="0"/>
@@ -22893,6 +23178,961 @@
   <p:clrMapOvr>
     <a:masterClrMapping/>
   </p:clrMapOvr>
+</p:sld>
+</file>
+
+<file path=ppt/slides/slide40.xml><?xml version="1.0" encoding="utf-8"?>
+<p:sld xmlns:a="http://schemas.openxmlformats.org/drawingml/2006/main" xmlns:r="http://schemas.openxmlformats.org/officeDocument/2006/relationships" xmlns:p="http://schemas.openxmlformats.org/presentationml/2006/main">
+  <p:cSld>
+    <p:spTree>
+      <p:nvGrpSpPr>
+        <p:cNvPr id="1" name=""/>
+        <p:cNvGrpSpPr/>
+        <p:nvPr/>
+      </p:nvGrpSpPr>
+      <p:grpSpPr>
+        <a:xfrm>
+          <a:off x="0" y="0"/>
+          <a:ext cx="0" cy="0"/>
+          <a:chOff x="0" y="0"/>
+          <a:chExt cx="0" cy="0"/>
+        </a:xfrm>
+      </p:grpSpPr>
+      <p:sp>
+        <p:nvSpPr>
+          <p:cNvPr id="2" name="Title 1"/>
+          <p:cNvSpPr>
+            <a:spLocks noGrp="1"/>
+          </p:cNvSpPr>
+          <p:nvPr>
+            <p:ph type="title"/>
+          </p:nvPr>
+        </p:nvSpPr>
+        <p:spPr/>
+        <p:txBody>
+          <a:bodyPr/>
+          <a:lstStyle/>
+          <a:p>
+            <a:r>
+              <a:rPr lang="en-US" dirty="0" err="1" smtClean="0"/>
+              <a:t>Heapsort</a:t>
+            </a:r>
+            <a:r>
+              <a:rPr lang="en-US" dirty="0" smtClean="0"/>
+              <a:t> – </a:t>
+            </a:r>
+            <a:r>
+              <a:rPr lang="en-US" dirty="0" err="1" smtClean="0"/>
+              <a:t>allgemeine</a:t>
+            </a:r>
+            <a:r>
+              <a:rPr lang="en-US" dirty="0" smtClean="0"/>
+              <a:t> </a:t>
+            </a:r>
+            <a:r>
+              <a:rPr lang="en-US" dirty="0" err="1" smtClean="0"/>
+              <a:t>idee</a:t>
+            </a:r>
+            <a:endParaRPr lang="bg-BG" dirty="0"/>
+          </a:p>
+        </p:txBody>
+      </p:sp>
+      <p:sp>
+        <p:nvSpPr>
+          <p:cNvPr id="3" name="Content Placeholder 2"/>
+          <p:cNvSpPr>
+            <a:spLocks noGrp="1"/>
+          </p:cNvSpPr>
+          <p:nvPr>
+            <p:ph idx="1"/>
+          </p:nvPr>
+        </p:nvSpPr>
+        <p:spPr/>
+        <p:txBody>
+          <a:bodyPr/>
+          <a:lstStyle/>
+          <a:p>
+            <a:r>
+              <a:rPr lang="en-US" dirty="0" smtClean="0"/>
+              <a:t>Das </a:t>
+            </a:r>
+            <a:r>
+              <a:rPr lang="en-US" dirty="0" err="1" smtClean="0"/>
+              <a:t>Verfahren</a:t>
+            </a:r>
+            <a:r>
+              <a:rPr lang="en-US" dirty="0" smtClean="0"/>
+              <a:t> </a:t>
+            </a:r>
+            <a:r>
+              <a:rPr lang="en-US" dirty="0" err="1" smtClean="0"/>
+              <a:t>besteht</a:t>
+            </a:r>
+            <a:r>
+              <a:rPr lang="en-US" dirty="0" smtClean="0"/>
+              <a:t> </a:t>
+            </a:r>
+            <a:r>
+              <a:rPr lang="en-US" dirty="0" err="1" smtClean="0"/>
+              <a:t>davon</a:t>
+            </a:r>
+            <a:r>
+              <a:rPr lang="en-US" dirty="0" smtClean="0"/>
+              <a:t>, die </a:t>
+            </a:r>
+            <a:r>
+              <a:rPr lang="en-US" dirty="0" err="1" smtClean="0"/>
+              <a:t>Eingabe</a:t>
+            </a:r>
+            <a:r>
+              <a:rPr lang="en-US" dirty="0" smtClean="0"/>
+              <a:t> </a:t>
+            </a:r>
+            <a:r>
+              <a:rPr lang="en-US" dirty="0" err="1" smtClean="0"/>
+              <a:t>Menge</a:t>
+            </a:r>
+            <a:r>
+              <a:rPr lang="en-US" dirty="0" smtClean="0"/>
+              <a:t> </a:t>
+            </a:r>
+            <a:r>
+              <a:rPr lang="en-US" dirty="0" err="1" smtClean="0"/>
+              <a:t>als</a:t>
+            </a:r>
+            <a:r>
+              <a:rPr lang="en-US" dirty="0" smtClean="0"/>
+              <a:t> </a:t>
+            </a:r>
+            <a:r>
+              <a:rPr lang="en-US" dirty="0" err="1" smtClean="0"/>
+              <a:t>ein</a:t>
+            </a:r>
+            <a:r>
+              <a:rPr lang="en-US" dirty="0"/>
+              <a:t> </a:t>
+            </a:r>
+            <a:r>
+              <a:rPr lang="en-US" dirty="0" err="1" smtClean="0"/>
+              <a:t>binären</a:t>
+            </a:r>
+            <a:r>
+              <a:rPr lang="en-US" dirty="0" smtClean="0"/>
+              <a:t> Max-Heap </a:t>
+            </a:r>
+            <a:r>
+              <a:rPr lang="en-US" dirty="0" err="1" smtClean="0"/>
+              <a:t>zu</a:t>
+            </a:r>
+            <a:r>
+              <a:rPr lang="en-US" dirty="0" smtClean="0"/>
+              <a:t> </a:t>
+            </a:r>
+            <a:r>
+              <a:rPr lang="en-US" dirty="0" err="1" smtClean="0"/>
+              <a:t>repräsentieren</a:t>
+            </a:r>
+            <a:r>
+              <a:rPr lang="en-US" dirty="0" smtClean="0"/>
+              <a:t>, </a:t>
+            </a:r>
+            <a:r>
+              <a:rPr lang="en-US" dirty="0" err="1" smtClean="0"/>
+              <a:t>damit</a:t>
+            </a:r>
+            <a:r>
+              <a:rPr lang="en-US" dirty="0" smtClean="0"/>
+              <a:t> man den </a:t>
+            </a:r>
+            <a:r>
+              <a:rPr lang="en-US" dirty="0" err="1" smtClean="0"/>
+              <a:t>größten</a:t>
+            </a:r>
+            <a:r>
+              <a:rPr lang="en-US" dirty="0" smtClean="0"/>
+              <a:t> Element der </a:t>
+            </a:r>
+            <a:r>
+              <a:rPr lang="en-US" dirty="0" err="1" smtClean="0"/>
+              <a:t>Menge</a:t>
+            </a:r>
+            <a:r>
+              <a:rPr lang="en-US" dirty="0" smtClean="0"/>
+              <a:t> auf der </a:t>
+            </a:r>
+            <a:r>
+              <a:rPr lang="en-US" dirty="0" err="1" smtClean="0"/>
+              <a:t>Spitze</a:t>
+            </a:r>
+            <a:r>
+              <a:rPr lang="en-US" dirty="0" smtClean="0"/>
+              <a:t> </a:t>
+            </a:r>
+            <a:r>
+              <a:rPr lang="en-US" dirty="0" err="1" smtClean="0"/>
+              <a:t>bekommt</a:t>
+            </a:r>
+            <a:r>
+              <a:rPr lang="en-US" dirty="0" smtClean="0"/>
+              <a:t>. Dieses </a:t>
+            </a:r>
+            <a:r>
+              <a:rPr lang="en-US" dirty="0" err="1" smtClean="0"/>
+              <a:t>wird</a:t>
+            </a:r>
+            <a:r>
+              <a:rPr lang="en-US" dirty="0" smtClean="0"/>
+              <a:t> </a:t>
+            </a:r>
+            <a:r>
+              <a:rPr lang="en-US" dirty="0" err="1" smtClean="0"/>
+              <a:t>mit</a:t>
+            </a:r>
+            <a:r>
+              <a:rPr lang="en-US" dirty="0" smtClean="0"/>
+              <a:t> </a:t>
+            </a:r>
+            <a:r>
+              <a:rPr lang="en-US" dirty="0" err="1" smtClean="0"/>
+              <a:t>dem</a:t>
+            </a:r>
+            <a:r>
+              <a:rPr lang="en-US" dirty="0" smtClean="0"/>
+              <a:t> </a:t>
+            </a:r>
+            <a:r>
+              <a:rPr lang="en-US" dirty="0" err="1" smtClean="0"/>
+              <a:t>letzten</a:t>
+            </a:r>
+            <a:r>
+              <a:rPr lang="en-US" dirty="0" smtClean="0"/>
+              <a:t> Element der </a:t>
+            </a:r>
+            <a:r>
+              <a:rPr lang="en-US" dirty="0" err="1" smtClean="0"/>
+              <a:t>Menge</a:t>
+            </a:r>
+            <a:r>
+              <a:rPr lang="en-US" dirty="0" smtClean="0"/>
+              <a:t> </a:t>
+            </a:r>
+            <a:r>
+              <a:rPr lang="en-US" dirty="0" err="1" smtClean="0"/>
+              <a:t>vertausht</a:t>
+            </a:r>
+            <a:r>
+              <a:rPr lang="en-US" dirty="0" smtClean="0"/>
+              <a:t>, die </a:t>
+            </a:r>
+            <a:r>
+              <a:rPr lang="en-US" dirty="0" err="1" smtClean="0"/>
+              <a:t>Mengengröße</a:t>
+            </a:r>
+            <a:r>
+              <a:rPr lang="en-US" dirty="0" smtClean="0"/>
+              <a:t> </a:t>
+            </a:r>
+            <a:r>
+              <a:rPr lang="en-US" dirty="0" err="1" smtClean="0"/>
+              <a:t>wird</a:t>
+            </a:r>
+            <a:r>
+              <a:rPr lang="en-US" dirty="0" smtClean="0"/>
+              <a:t> </a:t>
+            </a:r>
+            <a:r>
+              <a:rPr lang="en-US" dirty="0" err="1" smtClean="0"/>
+              <a:t>mit</a:t>
+            </a:r>
+            <a:r>
+              <a:rPr lang="en-US" dirty="0" smtClean="0"/>
+              <a:t> </a:t>
+            </a:r>
+            <a:r>
+              <a:rPr lang="en-US" dirty="0" err="1" smtClean="0"/>
+              <a:t>eins</a:t>
+            </a:r>
+            <a:r>
+              <a:rPr lang="en-US" dirty="0" smtClean="0"/>
+              <a:t> </a:t>
+            </a:r>
+            <a:r>
+              <a:rPr lang="en-US" dirty="0" err="1" smtClean="0"/>
+              <a:t>verringert</a:t>
+            </a:r>
+            <a:r>
+              <a:rPr lang="en-US" dirty="0" smtClean="0"/>
+              <a:t>, und der Heap </a:t>
+            </a:r>
+            <a:r>
+              <a:rPr lang="en-US" dirty="0" err="1" smtClean="0"/>
+              <a:t>wird</a:t>
+            </a:r>
+            <a:r>
+              <a:rPr lang="en-US" dirty="0" smtClean="0"/>
+              <a:t> </a:t>
+            </a:r>
+            <a:r>
+              <a:rPr lang="en-US" dirty="0" err="1" smtClean="0"/>
+              <a:t>noch</a:t>
+            </a:r>
+            <a:r>
+              <a:rPr lang="en-US" dirty="0" smtClean="0"/>
+              <a:t> mal </a:t>
+            </a:r>
+            <a:r>
+              <a:rPr lang="en-US" dirty="0" err="1" smtClean="0"/>
+              <a:t>korrigiert</a:t>
+            </a:r>
+            <a:r>
+              <a:rPr lang="en-US" dirty="0" smtClean="0"/>
+              <a:t>. </a:t>
+            </a:r>
+            <a:r>
+              <a:rPr lang="en-US" dirty="0" err="1" smtClean="0"/>
+              <a:t>Diese</a:t>
+            </a:r>
+            <a:r>
+              <a:rPr lang="en-US" dirty="0" smtClean="0"/>
+              <a:t> </a:t>
+            </a:r>
+            <a:r>
+              <a:rPr lang="en-US" dirty="0" err="1" smtClean="0"/>
+              <a:t>Prozedur</a:t>
+            </a:r>
+            <a:r>
+              <a:rPr lang="en-US" dirty="0" smtClean="0"/>
+              <a:t> </a:t>
+            </a:r>
+            <a:r>
+              <a:rPr lang="en-US" dirty="0" err="1" smtClean="0"/>
+              <a:t>wiederholt</a:t>
+            </a:r>
+            <a:r>
+              <a:rPr lang="en-US" dirty="0" smtClean="0"/>
+              <a:t> </a:t>
+            </a:r>
+            <a:r>
+              <a:rPr lang="en-US" dirty="0" err="1" smtClean="0"/>
+              <a:t>sich</a:t>
+            </a:r>
+            <a:r>
+              <a:rPr lang="en-US" dirty="0" smtClean="0"/>
+              <a:t>, </a:t>
+            </a:r>
+            <a:r>
+              <a:rPr lang="en-US" dirty="0" err="1" smtClean="0"/>
+              <a:t>bis</a:t>
+            </a:r>
+            <a:r>
+              <a:rPr lang="en-US" dirty="0" smtClean="0"/>
+              <a:t> die </a:t>
+            </a:r>
+            <a:r>
+              <a:rPr lang="en-US" dirty="0" err="1"/>
+              <a:t>Mengengröße</a:t>
+            </a:r>
+            <a:r>
+              <a:rPr lang="en-US" dirty="0"/>
+              <a:t> </a:t>
+            </a:r>
+            <a:r>
+              <a:rPr lang="en-US" dirty="0" err="1" smtClean="0"/>
+              <a:t>eins</a:t>
+            </a:r>
+            <a:r>
+              <a:rPr lang="en-US" dirty="0" smtClean="0"/>
+              <a:t> </a:t>
+            </a:r>
+            <a:r>
+              <a:rPr lang="en-US" dirty="0" err="1" smtClean="0"/>
+              <a:t>ist</a:t>
+            </a:r>
+            <a:r>
+              <a:rPr lang="en-US" dirty="0" smtClean="0"/>
+              <a:t>.</a:t>
+            </a:r>
+            <a:endParaRPr lang="bg-BG" dirty="0"/>
+          </a:p>
+        </p:txBody>
+      </p:sp>
+    </p:spTree>
+    <p:extLst>
+      <p:ext uri="{BB962C8B-B14F-4D97-AF65-F5344CB8AC3E}">
+        <p14:creationId xmlns:p14="http://schemas.microsoft.com/office/powerpoint/2010/main" val="712450236"/>
+      </p:ext>
+    </p:extLst>
+  </p:cSld>
+  <p:clrMapOvr>
+    <a:masterClrMapping/>
+  </p:clrMapOvr>
+</p:sld>
+</file>
+
+<file path=ppt/slides/slide41.xml><?xml version="1.0" encoding="utf-8"?>
+<p:sld xmlns:a="http://schemas.openxmlformats.org/drawingml/2006/main" xmlns:r="http://schemas.openxmlformats.org/officeDocument/2006/relationships" xmlns:p="http://schemas.openxmlformats.org/presentationml/2006/main">
+  <p:cSld>
+    <p:spTree>
+      <p:nvGrpSpPr>
+        <p:cNvPr id="1" name=""/>
+        <p:cNvGrpSpPr/>
+        <p:nvPr/>
+      </p:nvGrpSpPr>
+      <p:grpSpPr>
+        <a:xfrm>
+          <a:off x="0" y="0"/>
+          <a:ext cx="0" cy="0"/>
+          <a:chOff x="0" y="0"/>
+          <a:chExt cx="0" cy="0"/>
+        </a:xfrm>
+      </p:grpSpPr>
+      <p:sp>
+        <p:nvSpPr>
+          <p:cNvPr id="2" name="Title 1"/>
+          <p:cNvSpPr>
+            <a:spLocks noGrp="1"/>
+          </p:cNvSpPr>
+          <p:nvPr>
+            <p:ph type="title"/>
+          </p:nvPr>
+        </p:nvSpPr>
+        <p:spPr/>
+        <p:txBody>
+          <a:bodyPr/>
+          <a:lstStyle/>
+          <a:p>
+            <a:r>
+              <a:rPr lang="en-US" dirty="0" err="1" smtClean="0"/>
+              <a:t>Heapsort</a:t>
+            </a:r>
+            <a:r>
+              <a:rPr lang="en-US" dirty="0" smtClean="0"/>
+              <a:t> – </a:t>
+            </a:r>
+            <a:r>
+              <a:rPr lang="en-US" dirty="0" err="1" smtClean="0"/>
+              <a:t>c++</a:t>
+            </a:r>
+            <a:endParaRPr lang="bg-BG" dirty="0"/>
+          </a:p>
+        </p:txBody>
+      </p:sp>
+      <p:pic>
+        <p:nvPicPr>
+          <p:cNvPr id="5" name="Content Placeholder 4"/>
+          <p:cNvPicPr>
+            <a:picLocks noGrp="1" noChangeAspect="1"/>
+          </p:cNvPicPr>
+          <p:nvPr>
+            <p:ph idx="1"/>
+          </p:nvPr>
+        </p:nvPicPr>
+        <p:blipFill>
+          <a:blip r:embed="rId2">
+            <a:extLst>
+              <a:ext uri="{28A0092B-C50C-407E-A947-70E740481C1C}">
+                <a14:useLocalDpi xmlns:a14="http://schemas.microsoft.com/office/drawing/2010/main" val="0"/>
+              </a:ext>
+            </a:extLst>
+          </a:blip>
+          <a:stretch>
+            <a:fillRect/>
+          </a:stretch>
+        </p:blipFill>
+        <p:spPr>
+          <a:xfrm>
+            <a:off x="4843834" y="153988"/>
+            <a:ext cx="6421065" cy="6560654"/>
+          </a:xfrm>
+        </p:spPr>
+      </p:pic>
+    </p:spTree>
+    <p:extLst>
+      <p:ext uri="{BB962C8B-B14F-4D97-AF65-F5344CB8AC3E}">
+        <p14:creationId xmlns:p14="http://schemas.microsoft.com/office/powerpoint/2010/main" val="3674338046"/>
+      </p:ext>
+    </p:extLst>
+  </p:cSld>
+  <p:clrMapOvr>
+    <a:masterClrMapping/>
+  </p:clrMapOvr>
+</p:sld>
+</file>
+
+<file path=ppt/slides/slide42.xml><?xml version="1.0" encoding="utf-8"?>
+<p:sld xmlns:a="http://schemas.openxmlformats.org/drawingml/2006/main" xmlns:r="http://schemas.openxmlformats.org/officeDocument/2006/relationships" xmlns:p="http://schemas.openxmlformats.org/presentationml/2006/main">
+  <p:cSld>
+    <p:spTree>
+      <p:nvGrpSpPr>
+        <p:cNvPr id="1" name=""/>
+        <p:cNvGrpSpPr/>
+        <p:nvPr/>
+      </p:nvGrpSpPr>
+      <p:grpSpPr>
+        <a:xfrm>
+          <a:off x="0" y="0"/>
+          <a:ext cx="0" cy="0"/>
+          <a:chOff x="0" y="0"/>
+          <a:chExt cx="0" cy="0"/>
+        </a:xfrm>
+      </p:grpSpPr>
+      <p:sp>
+        <p:nvSpPr>
+          <p:cNvPr id="2" name="Title 1"/>
+          <p:cNvSpPr>
+            <a:spLocks noGrp="1"/>
+          </p:cNvSpPr>
+          <p:nvPr>
+            <p:ph type="title"/>
+          </p:nvPr>
+        </p:nvSpPr>
+        <p:spPr/>
+        <p:txBody>
+          <a:bodyPr/>
+          <a:lstStyle/>
+          <a:p>
+            <a:r>
+              <a:rPr lang="en-US" dirty="0" err="1" smtClean="0"/>
+              <a:t>Heapsort</a:t>
+            </a:r>
+            <a:r>
+              <a:rPr lang="en-US" dirty="0" smtClean="0"/>
+              <a:t> - </a:t>
+            </a:r>
+            <a:r>
+              <a:rPr lang="en-US" dirty="0" err="1" smtClean="0"/>
+              <a:t>eigenschaften</a:t>
+            </a:r>
+            <a:endParaRPr lang="bg-BG" dirty="0"/>
+          </a:p>
+        </p:txBody>
+      </p:sp>
+      <p:sp>
+        <p:nvSpPr>
+          <p:cNvPr id="3" name="Content Placeholder 2"/>
+          <p:cNvSpPr>
+            <a:spLocks noGrp="1"/>
+          </p:cNvSpPr>
+          <p:nvPr>
+            <p:ph idx="1"/>
+          </p:nvPr>
+        </p:nvSpPr>
+        <p:spPr/>
+        <p:txBody>
+          <a:bodyPr/>
+          <a:lstStyle/>
+          <a:p>
+            <a:r>
+              <a:rPr lang="en-US" dirty="0" err="1" smtClean="0"/>
+              <a:t>Bei</a:t>
+            </a:r>
+            <a:r>
+              <a:rPr lang="en-US" dirty="0" smtClean="0"/>
+              <a:t> </a:t>
+            </a:r>
+            <a:r>
+              <a:rPr lang="en-US" dirty="0" err="1" smtClean="0"/>
+              <a:t>eine</a:t>
+            </a:r>
+            <a:r>
+              <a:rPr lang="en-US" dirty="0" smtClean="0"/>
+              <a:t> </a:t>
+            </a:r>
+            <a:r>
+              <a:rPr lang="en-US" dirty="0" err="1" smtClean="0"/>
+              <a:t>Datenmenge</a:t>
+            </a:r>
+            <a:r>
+              <a:rPr lang="en-US" dirty="0" smtClean="0"/>
+              <a:t> der </a:t>
+            </a:r>
+            <a:r>
+              <a:rPr lang="en-US" dirty="0" err="1" smtClean="0"/>
+              <a:t>Länge</a:t>
+            </a:r>
+            <a:r>
+              <a:rPr lang="en-US" dirty="0" smtClean="0"/>
+              <a:t> n </a:t>
+            </a:r>
+            <a:r>
+              <a:rPr lang="en-US" dirty="0" err="1" smtClean="0"/>
+              <a:t>ist</a:t>
+            </a:r>
+            <a:r>
+              <a:rPr lang="en-US" dirty="0" smtClean="0"/>
+              <a:t> die </a:t>
+            </a:r>
+            <a:r>
+              <a:rPr lang="en-US" dirty="0" err="1" smtClean="0"/>
+              <a:t>Komplexitätszahl</a:t>
+            </a:r>
+            <a:r>
+              <a:rPr lang="en-US" dirty="0" smtClean="0"/>
+              <a:t> </a:t>
+            </a:r>
+            <a:r>
+              <a:rPr lang="en-US" dirty="0" err="1" smtClean="0"/>
+              <a:t>immer</a:t>
+            </a:r>
+            <a:r>
+              <a:rPr lang="en-US" dirty="0" smtClean="0"/>
+              <a:t> </a:t>
+            </a:r>
+            <a:r>
+              <a:rPr lang="en-US" dirty="0"/>
+              <a:t>O(</a:t>
+            </a:r>
+            <a:r>
+              <a:rPr lang="en-US" dirty="0" err="1"/>
+              <a:t>nlogn</a:t>
+            </a:r>
+            <a:r>
+              <a:rPr lang="en-US" dirty="0" smtClean="0"/>
+              <a:t>).</a:t>
+            </a:r>
+          </a:p>
+          <a:p>
+            <a:r>
+              <a:rPr lang="en-US" dirty="0" err="1" smtClean="0"/>
+              <a:t>Arbeitet</a:t>
+            </a:r>
+            <a:r>
+              <a:rPr lang="en-US" dirty="0" smtClean="0"/>
+              <a:t> in-place, </a:t>
+            </a:r>
+            <a:r>
+              <a:rPr lang="en-US" dirty="0" err="1" smtClean="0"/>
+              <a:t>aber</a:t>
+            </a:r>
+            <a:r>
+              <a:rPr lang="en-US" dirty="0" smtClean="0"/>
+              <a:t> </a:t>
+            </a:r>
+            <a:r>
+              <a:rPr lang="en-US" dirty="0" err="1" smtClean="0"/>
+              <a:t>ist</a:t>
+            </a:r>
+            <a:r>
+              <a:rPr lang="en-US" dirty="0" smtClean="0"/>
+              <a:t> </a:t>
+            </a:r>
+            <a:r>
+              <a:rPr lang="en-US" dirty="0" err="1" smtClean="0"/>
+              <a:t>nicht</a:t>
+            </a:r>
+            <a:r>
+              <a:rPr lang="en-US" dirty="0" smtClean="0"/>
+              <a:t> </a:t>
+            </a:r>
+            <a:r>
+              <a:rPr lang="en-US" dirty="0" err="1" smtClean="0"/>
+              <a:t>stabil</a:t>
+            </a:r>
+            <a:r>
+              <a:rPr lang="en-US" dirty="0" smtClean="0"/>
+              <a:t>. </a:t>
+            </a:r>
+            <a:endParaRPr lang="bg-BG" dirty="0"/>
+          </a:p>
+        </p:txBody>
+      </p:sp>
+    </p:spTree>
+    <p:extLst>
+      <p:ext uri="{BB962C8B-B14F-4D97-AF65-F5344CB8AC3E}">
+        <p14:creationId xmlns:p14="http://schemas.microsoft.com/office/powerpoint/2010/main" val="1971914378"/>
+      </p:ext>
+    </p:extLst>
+  </p:cSld>
+  <p:clrMapOvr>
+    <a:masterClrMapping/>
+  </p:clrMapOvr>
+</p:sld>
+</file>
+
+<file path=ppt/slides/slide43.xml><?xml version="1.0" encoding="utf-8"?>
+<p:sld xmlns:a="http://schemas.openxmlformats.org/drawingml/2006/main" xmlns:r="http://schemas.openxmlformats.org/officeDocument/2006/relationships" xmlns:p="http://schemas.openxmlformats.org/presentationml/2006/main">
+  <p:cSld>
+    <p:spTree>
+      <p:nvGrpSpPr>
+        <p:cNvPr id="1" name=""/>
+        <p:cNvGrpSpPr/>
+        <p:nvPr/>
+      </p:nvGrpSpPr>
+      <p:grpSpPr>
+        <a:xfrm>
+          <a:off x="0" y="0"/>
+          <a:ext cx="0" cy="0"/>
+          <a:chOff x="0" y="0"/>
+          <a:chExt cx="0" cy="0"/>
+        </a:xfrm>
+      </p:grpSpPr>
+      <p:sp>
+        <p:nvSpPr>
+          <p:cNvPr id="2" name="Title 1"/>
+          <p:cNvSpPr>
+            <a:spLocks noGrp="1"/>
+          </p:cNvSpPr>
+          <p:nvPr>
+            <p:ph type="title"/>
+          </p:nvPr>
+        </p:nvSpPr>
+        <p:spPr/>
+        <p:txBody>
+          <a:bodyPr/>
+          <a:lstStyle/>
+          <a:p>
+            <a:r>
+              <a:rPr lang="en-US" dirty="0" smtClean="0"/>
+              <a:t>5.2 </a:t>
+            </a:r>
+            <a:r>
+              <a:rPr lang="en-US" dirty="0" err="1" smtClean="0"/>
+              <a:t>Nicht-Vergleichbasierte</a:t>
+            </a:r>
+            <a:r>
+              <a:rPr lang="en-US" dirty="0" smtClean="0"/>
+              <a:t> </a:t>
+            </a:r>
+            <a:r>
+              <a:rPr lang="en-US" dirty="0" err="1" smtClean="0"/>
+              <a:t>verfahren</a:t>
+            </a:r>
+            <a:endParaRPr lang="bg-BG" dirty="0"/>
+          </a:p>
+        </p:txBody>
+      </p:sp>
+      <p:sp>
+        <p:nvSpPr>
+          <p:cNvPr id="3" name="Content Placeholder 2"/>
+          <p:cNvSpPr>
+            <a:spLocks noGrp="1"/>
+          </p:cNvSpPr>
+          <p:nvPr>
+            <p:ph idx="1"/>
+          </p:nvPr>
+        </p:nvSpPr>
+        <p:spPr/>
+        <p:txBody>
+          <a:bodyPr/>
+          <a:lstStyle/>
+          <a:p>
+            <a:r>
+              <a:rPr lang="en-US" dirty="0" err="1" smtClean="0"/>
+              <a:t>Diese</a:t>
+            </a:r>
+            <a:r>
+              <a:rPr lang="en-US" dirty="0" smtClean="0"/>
+              <a:t> </a:t>
+            </a:r>
+            <a:r>
+              <a:rPr lang="en-US" dirty="0" err="1" smtClean="0"/>
+              <a:t>Verfahren</a:t>
+            </a:r>
+            <a:r>
+              <a:rPr lang="en-US" dirty="0" smtClean="0"/>
+              <a:t> </a:t>
+            </a:r>
+            <a:r>
+              <a:rPr lang="en-US" dirty="0" err="1" smtClean="0"/>
+              <a:t>basieren</a:t>
+            </a:r>
+            <a:r>
+              <a:rPr lang="en-US" dirty="0" smtClean="0"/>
+              <a:t> </a:t>
+            </a:r>
+            <a:r>
+              <a:rPr lang="en-US" dirty="0" err="1" smtClean="0"/>
+              <a:t>sich</a:t>
+            </a:r>
+            <a:r>
+              <a:rPr lang="en-US" dirty="0" smtClean="0"/>
+              <a:t> auf </a:t>
+            </a:r>
+            <a:r>
+              <a:rPr lang="en-US" dirty="0" smtClean="0"/>
+              <a:t>alternative </a:t>
+            </a:r>
+            <a:r>
+              <a:rPr lang="en-US" dirty="0" err="1" smtClean="0"/>
+              <a:t>Methoden</a:t>
+            </a:r>
+            <a:r>
+              <a:rPr lang="en-US" dirty="0" smtClean="0"/>
+              <a:t>, </a:t>
+            </a:r>
+            <a:r>
+              <a:rPr lang="en-US" dirty="0" err="1" smtClean="0"/>
+              <a:t>wie</a:t>
+            </a:r>
+            <a:r>
+              <a:rPr lang="en-US" dirty="0" smtClean="0"/>
+              <a:t> </a:t>
+            </a:r>
+            <a:r>
+              <a:rPr lang="en-US" dirty="0" err="1" smtClean="0"/>
+              <a:t>Indexieren</a:t>
+            </a:r>
+            <a:r>
+              <a:rPr lang="en-US" dirty="0" smtClean="0"/>
+              <a:t>, </a:t>
+            </a:r>
+            <a:r>
+              <a:rPr lang="en-US" dirty="0" err="1" smtClean="0"/>
+              <a:t>Zählen</a:t>
+            </a:r>
+            <a:r>
+              <a:rPr lang="en-US" dirty="0" smtClean="0"/>
+              <a:t> </a:t>
+            </a:r>
+            <a:r>
+              <a:rPr lang="en-US" dirty="0" err="1" smtClean="0"/>
+              <a:t>usw</a:t>
+            </a:r>
+            <a:r>
+              <a:rPr lang="en-US" dirty="0" smtClean="0"/>
+              <a:t>.</a:t>
+            </a:r>
+            <a:endParaRPr lang="en-US" dirty="0" smtClean="0"/>
+          </a:p>
+          <a:p>
+            <a:r>
+              <a:rPr lang="en-US" dirty="0" err="1" smtClean="0"/>
+              <a:t>Typische</a:t>
+            </a:r>
+            <a:r>
+              <a:rPr lang="en-US" dirty="0" smtClean="0"/>
+              <a:t> </a:t>
+            </a:r>
+            <a:r>
+              <a:rPr lang="en-US" dirty="0" err="1" smtClean="0"/>
+              <a:t>Vertr</a:t>
+            </a:r>
+            <a:r>
+              <a:rPr lang="de-DE" dirty="0"/>
+              <a:t>e</a:t>
+            </a:r>
+            <a:r>
+              <a:rPr lang="en-US" dirty="0" err="1" smtClean="0"/>
+              <a:t>ter</a:t>
+            </a:r>
+            <a:endParaRPr lang="en-US" dirty="0" smtClean="0"/>
+          </a:p>
+          <a:p>
+            <a:pPr lvl="1"/>
+            <a:r>
+              <a:rPr lang="en-US" dirty="0" smtClean="0"/>
+              <a:t>Counting sort, bucket sort</a:t>
+            </a:r>
+            <a:endParaRPr lang="en-US" dirty="0" smtClean="0"/>
+          </a:p>
+          <a:p>
+            <a:r>
+              <a:rPr lang="en-US" dirty="0" err="1" smtClean="0"/>
+              <a:t>Bei</a:t>
+            </a:r>
+            <a:r>
+              <a:rPr lang="en-US" dirty="0" smtClean="0"/>
+              <a:t> </a:t>
+            </a:r>
+            <a:r>
+              <a:rPr lang="en-US" dirty="0" err="1" smtClean="0"/>
+              <a:t>diese</a:t>
+            </a:r>
+            <a:r>
+              <a:rPr lang="en-US" dirty="0" smtClean="0"/>
+              <a:t> </a:t>
+            </a:r>
+            <a:r>
+              <a:rPr lang="en-US" dirty="0" err="1" smtClean="0"/>
+              <a:t>Verfahren</a:t>
+            </a:r>
+            <a:r>
+              <a:rPr lang="en-US" dirty="0" smtClean="0"/>
+              <a:t> </a:t>
+            </a:r>
+            <a:r>
+              <a:rPr lang="en-US" dirty="0" err="1" smtClean="0"/>
+              <a:t>macht</a:t>
+            </a:r>
+            <a:r>
+              <a:rPr lang="en-US" dirty="0" smtClean="0"/>
+              <a:t> man </a:t>
+            </a:r>
+            <a:r>
+              <a:rPr lang="en-US" dirty="0" err="1" smtClean="0"/>
+              <a:t>ein</a:t>
+            </a:r>
+            <a:r>
+              <a:rPr lang="en-US" dirty="0" smtClean="0"/>
+              <a:t> K</a:t>
+            </a:r>
+            <a:r>
+              <a:rPr lang="de-DE" dirty="0" smtClean="0"/>
+              <a:t>ompromiss mit Speicherbedarf, damit bessere Laufzeiten zu erreichen</a:t>
+            </a:r>
+            <a:r>
+              <a:rPr lang="en-US" dirty="0" smtClean="0"/>
+              <a:t>. </a:t>
+            </a:r>
+          </a:p>
+          <a:p>
+            <a:r>
+              <a:rPr lang="en-US" dirty="0" err="1" smtClean="0"/>
+              <a:t>Können</a:t>
+            </a:r>
+            <a:r>
+              <a:rPr lang="en-US" dirty="0" smtClean="0"/>
+              <a:t> </a:t>
+            </a:r>
+            <a:r>
+              <a:rPr lang="en-US" dirty="0" err="1" smtClean="0"/>
+              <a:t>nur</a:t>
+            </a:r>
+            <a:r>
+              <a:rPr lang="en-US" dirty="0" smtClean="0"/>
+              <a:t> </a:t>
+            </a:r>
+            <a:r>
+              <a:rPr lang="en-US" dirty="0" err="1" smtClean="0"/>
+              <a:t>allerdings</a:t>
+            </a:r>
+            <a:r>
+              <a:rPr lang="en-US" dirty="0" smtClean="0"/>
+              <a:t> </a:t>
+            </a:r>
+            <a:r>
+              <a:rPr lang="de-DE"/>
+              <a:t>für numerische Datentypen </a:t>
+            </a:r>
+            <a:r>
+              <a:rPr lang="de-DE"/>
+              <a:t>verwendet </a:t>
+            </a:r>
+            <a:r>
+              <a:rPr lang="de-DE" smtClean="0"/>
+              <a:t>werden.</a:t>
+            </a:r>
+            <a:endParaRPr lang="bg-BG" dirty="0"/>
+          </a:p>
+        </p:txBody>
+      </p:sp>
+    </p:spTree>
+    <p:extLst>
+      <p:ext uri="{BB962C8B-B14F-4D97-AF65-F5344CB8AC3E}">
+        <p14:creationId xmlns:p14="http://schemas.microsoft.com/office/powerpoint/2010/main" val="2612520836"/>
+      </p:ext>
+    </p:extLst>
+  </p:cSld>
+  <p:clrMapOvr>
+    <a:masterClrMapping/>
+  </p:clrMapOvr>
+  <p:timing>
+    <p:tnLst>
+      <p:par>
+        <p:cTn id="1" dur="indefinite" restart="never" nodeType="tmRoot"/>
+      </p:par>
+    </p:tnLst>
+  </p:timing>
 </p:sld>
 </file>
 

</xml_diff>

<commit_message>
Added Countingsort to source and documentation, cleaned up function return types
</commit_message>
<xml_diff>
--- a/docs/sorting algorithms - presentation/Sortierverfahren.pptx
+++ b/docs/sorting algorithms - presentation/Sortierverfahren.pptx
@@ -48,6 +48,8 @@
     <p:sldId id="296" r:id="rId42"/>
     <p:sldId id="297" r:id="rId43"/>
     <p:sldId id="299" r:id="rId44"/>
+    <p:sldId id="300" r:id="rId45"/>
+    <p:sldId id="301" r:id="rId46"/>
   </p:sldIdLst>
   <p:sldSz cx="12192000" cy="6858000"/>
   <p:notesSz cx="6858000" cy="9144000"/>
@@ -24101,15 +24103,11 @@
               <a:t> </a:t>
             </a:r>
             <a:r>
-              <a:rPr lang="de-DE"/>
-              <a:t>für numerische Datentypen </a:t>
-            </a:r>
-            <a:r>
-              <a:rPr lang="de-DE"/>
-              <a:t>verwendet </a:t>
-            </a:r>
-            <a:r>
-              <a:rPr lang="de-DE" smtClean="0"/>
+              <a:rPr lang="de-DE" dirty="0"/>
+              <a:t>für numerische Datentypen verwendet </a:t>
+            </a:r>
+            <a:r>
+              <a:rPr lang="de-DE" dirty="0" smtClean="0"/>
               <a:t>werden.</a:t>
             </a:r>
             <a:endParaRPr lang="bg-BG" dirty="0"/>
@@ -24133,6 +24131,331 @@
       </p:par>
     </p:tnLst>
   </p:timing>
+</p:sld>
+</file>
+
+<file path=ppt/slides/slide44.xml><?xml version="1.0" encoding="utf-8"?>
+<p:sld xmlns:a="http://schemas.openxmlformats.org/drawingml/2006/main" xmlns:r="http://schemas.openxmlformats.org/officeDocument/2006/relationships" xmlns:p="http://schemas.openxmlformats.org/presentationml/2006/main">
+  <p:cSld>
+    <p:spTree>
+      <p:nvGrpSpPr>
+        <p:cNvPr id="1" name=""/>
+        <p:cNvGrpSpPr/>
+        <p:nvPr/>
+      </p:nvGrpSpPr>
+      <p:grpSpPr>
+        <a:xfrm>
+          <a:off x="0" y="0"/>
+          <a:ext cx="0" cy="0"/>
+          <a:chOff x="0" y="0"/>
+          <a:chExt cx="0" cy="0"/>
+        </a:xfrm>
+      </p:grpSpPr>
+      <p:sp>
+        <p:nvSpPr>
+          <p:cNvPr id="2" name="Title 1"/>
+          <p:cNvSpPr>
+            <a:spLocks noGrp="1"/>
+          </p:cNvSpPr>
+          <p:nvPr>
+            <p:ph type="title"/>
+          </p:nvPr>
+        </p:nvSpPr>
+        <p:spPr/>
+        <p:txBody>
+          <a:bodyPr/>
+          <a:lstStyle/>
+          <a:p>
+            <a:r>
+              <a:rPr lang="en-US" dirty="0" smtClean="0"/>
+              <a:t>Counting sort – </a:t>
+            </a:r>
+            <a:r>
+              <a:rPr lang="en-US" dirty="0" err="1" smtClean="0"/>
+              <a:t>allgemeine</a:t>
+            </a:r>
+            <a:r>
+              <a:rPr lang="en-US" dirty="0" smtClean="0"/>
+              <a:t> </a:t>
+            </a:r>
+            <a:r>
+              <a:rPr lang="en-US" dirty="0" err="1" smtClean="0"/>
+              <a:t>idee</a:t>
+            </a:r>
+            <a:endParaRPr lang="bg-BG" dirty="0"/>
+          </a:p>
+        </p:txBody>
+      </p:sp>
+      <p:sp>
+        <p:nvSpPr>
+          <p:cNvPr id="3" name="Content Placeholder 2"/>
+          <p:cNvSpPr>
+            <a:spLocks noGrp="1"/>
+          </p:cNvSpPr>
+          <p:nvPr>
+            <p:ph idx="1"/>
+          </p:nvPr>
+        </p:nvSpPr>
+        <p:spPr/>
+        <p:txBody>
+          <a:bodyPr/>
+          <a:lstStyle/>
+          <a:p>
+            <a:r>
+              <a:rPr lang="en-US" dirty="0" smtClean="0"/>
+              <a:t>Counting sort </a:t>
+            </a:r>
+            <a:r>
+              <a:rPr lang="en-US" dirty="0" err="1" smtClean="0"/>
+              <a:t>ist</a:t>
+            </a:r>
+            <a:r>
+              <a:rPr lang="en-US" dirty="0" smtClean="0"/>
+              <a:t> </a:t>
+            </a:r>
+            <a:r>
+              <a:rPr lang="en-US" dirty="0" err="1" smtClean="0"/>
+              <a:t>ein</a:t>
+            </a:r>
+            <a:r>
+              <a:rPr lang="en-US" dirty="0" smtClean="0"/>
+              <a:t> </a:t>
+            </a:r>
+            <a:r>
+              <a:rPr lang="en-US" dirty="0" err="1" smtClean="0"/>
+              <a:t>Verfahren</a:t>
+            </a:r>
+            <a:r>
+              <a:rPr lang="en-US" dirty="0" smtClean="0"/>
+              <a:t>, das </a:t>
+            </a:r>
+            <a:r>
+              <a:rPr lang="en-US" dirty="0" err="1" smtClean="0"/>
+              <a:t>eine</a:t>
+            </a:r>
+            <a:r>
+              <a:rPr lang="en-US" dirty="0" smtClean="0"/>
+              <a:t> </a:t>
+            </a:r>
+            <a:r>
+              <a:rPr lang="en-US" dirty="0" err="1" smtClean="0"/>
+              <a:t>Reihe</a:t>
+            </a:r>
+            <a:r>
+              <a:rPr lang="en-US" dirty="0" smtClean="0"/>
+              <a:t> von </a:t>
+            </a:r>
+            <a:r>
+              <a:rPr lang="en-US" dirty="0" err="1" smtClean="0"/>
+              <a:t>natürlichen</a:t>
+            </a:r>
+            <a:r>
+              <a:rPr lang="en-US" dirty="0" smtClean="0"/>
+              <a:t> </a:t>
+            </a:r>
+            <a:r>
+              <a:rPr lang="en-US" dirty="0" err="1" smtClean="0"/>
+              <a:t>Zahlen</a:t>
+            </a:r>
+            <a:r>
+              <a:rPr lang="en-US" dirty="0" smtClean="0"/>
+              <a:t> </a:t>
+            </a:r>
+            <a:r>
+              <a:rPr lang="en-US" dirty="0" err="1" smtClean="0"/>
+              <a:t>mit</a:t>
+            </a:r>
+            <a:r>
+              <a:rPr lang="en-US" dirty="0" smtClean="0"/>
+              <a:t> </a:t>
+            </a:r>
+            <a:r>
+              <a:rPr lang="en-US" dirty="0" err="1" smtClean="0"/>
+              <a:t>einer</a:t>
+            </a:r>
+            <a:r>
+              <a:rPr lang="en-US" dirty="0" smtClean="0"/>
+              <a:t> </a:t>
+            </a:r>
+            <a:r>
+              <a:rPr lang="en-US" dirty="0" err="1" smtClean="0"/>
+              <a:t>Laufzeit</a:t>
+            </a:r>
+            <a:r>
+              <a:rPr lang="en-US" dirty="0" smtClean="0"/>
+              <a:t> O(n) </a:t>
+            </a:r>
+            <a:r>
+              <a:rPr lang="en-US" dirty="0" err="1" smtClean="0"/>
+              <a:t>sortieren</a:t>
+            </a:r>
+            <a:r>
+              <a:rPr lang="en-US" dirty="0" smtClean="0"/>
+              <a:t> </a:t>
+            </a:r>
+            <a:r>
+              <a:rPr lang="en-US" dirty="0" err="1" smtClean="0"/>
+              <a:t>kann</a:t>
+            </a:r>
+            <a:r>
+              <a:rPr lang="en-US" dirty="0" smtClean="0"/>
+              <a:t>, falls </a:t>
+            </a:r>
+            <a:r>
+              <a:rPr lang="en-US" dirty="0" err="1" smtClean="0"/>
+              <a:t>es</a:t>
+            </a:r>
+            <a:r>
+              <a:rPr lang="en-US" dirty="0" smtClean="0"/>
+              <a:t> die </a:t>
+            </a:r>
+            <a:r>
+              <a:rPr lang="en-US" dirty="0" err="1" smtClean="0"/>
+              <a:t>obere</a:t>
+            </a:r>
+            <a:r>
+              <a:rPr lang="en-US" dirty="0" smtClean="0"/>
+              <a:t> </a:t>
+            </a:r>
+            <a:r>
+              <a:rPr lang="en-US" dirty="0" err="1" smtClean="0"/>
+              <a:t>Schränke</a:t>
+            </a:r>
+            <a:r>
+              <a:rPr lang="en-US" dirty="0" smtClean="0"/>
+              <a:t> der </a:t>
+            </a:r>
+            <a:r>
+              <a:rPr lang="en-US" dirty="0" err="1" smtClean="0"/>
+              <a:t>Reihe</a:t>
+            </a:r>
+            <a:r>
+              <a:rPr lang="en-US" dirty="0" smtClean="0"/>
+              <a:t> </a:t>
+            </a:r>
+            <a:r>
+              <a:rPr lang="en-US" dirty="0" err="1" smtClean="0"/>
+              <a:t>weißt</a:t>
+            </a:r>
+            <a:r>
+              <a:rPr lang="en-US" dirty="0" smtClean="0"/>
+              <a:t>.</a:t>
+            </a:r>
+          </a:p>
+          <a:p>
+            <a:r>
+              <a:rPr lang="en-US" dirty="0" err="1" smtClean="0"/>
+              <a:t>Es</a:t>
+            </a:r>
+            <a:r>
+              <a:rPr lang="en-US" dirty="0" smtClean="0"/>
+              <a:t> </a:t>
+            </a:r>
+            <a:r>
+              <a:rPr lang="en-US" dirty="0" err="1" smtClean="0"/>
+              <a:t>schafft</a:t>
+            </a:r>
+            <a:r>
+              <a:rPr lang="en-US" dirty="0" smtClean="0"/>
+              <a:t> </a:t>
+            </a:r>
+            <a:r>
+              <a:rPr lang="en-US" dirty="0" err="1" smtClean="0"/>
+              <a:t>ein</a:t>
+            </a:r>
+            <a:r>
+              <a:rPr lang="en-US" dirty="0" smtClean="0"/>
+              <a:t> </a:t>
+            </a:r>
+            <a:r>
+              <a:rPr lang="de-DE" dirty="0" smtClean="0"/>
+              <a:t>Histogramm – wie oft man die verschedene Zahlen in der Reihe findet. Dann wird die Eingabe menge nach diesem Regel herumgeordnet.</a:t>
+            </a:r>
+          </a:p>
+        </p:txBody>
+      </p:sp>
+    </p:spTree>
+    <p:extLst>
+      <p:ext uri="{BB962C8B-B14F-4D97-AF65-F5344CB8AC3E}">
+        <p14:creationId xmlns:p14="http://schemas.microsoft.com/office/powerpoint/2010/main" val="1117496128"/>
+      </p:ext>
+    </p:extLst>
+  </p:cSld>
+  <p:clrMapOvr>
+    <a:masterClrMapping/>
+  </p:clrMapOvr>
+</p:sld>
+</file>
+
+<file path=ppt/slides/slide45.xml><?xml version="1.0" encoding="utf-8"?>
+<p:sld xmlns:a="http://schemas.openxmlformats.org/drawingml/2006/main" xmlns:r="http://schemas.openxmlformats.org/officeDocument/2006/relationships" xmlns:p="http://schemas.openxmlformats.org/presentationml/2006/main">
+  <p:cSld>
+    <p:spTree>
+      <p:nvGrpSpPr>
+        <p:cNvPr id="1" name=""/>
+        <p:cNvGrpSpPr/>
+        <p:nvPr/>
+      </p:nvGrpSpPr>
+      <p:grpSpPr>
+        <a:xfrm>
+          <a:off x="0" y="0"/>
+          <a:ext cx="0" cy="0"/>
+          <a:chOff x="0" y="0"/>
+          <a:chExt cx="0" cy="0"/>
+        </a:xfrm>
+      </p:grpSpPr>
+      <p:sp>
+        <p:nvSpPr>
+          <p:cNvPr id="2" name="Title 1"/>
+          <p:cNvSpPr>
+            <a:spLocks noGrp="1"/>
+          </p:cNvSpPr>
+          <p:nvPr>
+            <p:ph type="title"/>
+          </p:nvPr>
+        </p:nvSpPr>
+        <p:spPr/>
+        <p:txBody>
+          <a:bodyPr/>
+          <a:lstStyle/>
+          <a:p>
+            <a:r>
+              <a:rPr lang="en-US" smtClean="0"/>
+              <a:t>Counting sort – C++</a:t>
+            </a:r>
+            <a:endParaRPr lang="bg-BG"/>
+          </a:p>
+        </p:txBody>
+      </p:sp>
+      <p:sp>
+        <p:nvSpPr>
+          <p:cNvPr id="3" name="Content Placeholder 2"/>
+          <p:cNvSpPr>
+            <a:spLocks noGrp="1"/>
+          </p:cNvSpPr>
+          <p:nvPr>
+            <p:ph idx="1"/>
+          </p:nvPr>
+        </p:nvSpPr>
+        <p:spPr/>
+        <p:txBody>
+          <a:bodyPr/>
+          <a:lstStyle/>
+          <a:p>
+            <a:endParaRPr lang="bg-BG"/>
+          </a:p>
+        </p:txBody>
+      </p:sp>
+    </p:spTree>
+    <p:extLst>
+      <p:ext uri="{BB962C8B-B14F-4D97-AF65-F5344CB8AC3E}">
+        <p14:creationId xmlns:p14="http://schemas.microsoft.com/office/powerpoint/2010/main" val="866569565"/>
+      </p:ext>
+    </p:extLst>
+  </p:cSld>
+  <p:clrMapOvr>
+    <a:masterClrMapping/>
+  </p:clrMapOvr>
 </p:sld>
 </file>
 

</xml_diff>